<commit_message>
Update the attack design document, attack readme and train HMI config file template.
</commit_message>
<xml_diff>
--- a/attack/AttackScenario.pptx
+++ b/attack/AttackScenario.pptx
@@ -3463,7 +3463,11 @@
           <a:lstStyle/>
           <a:p>
             <a:r>
-              <a:rPr lang="en-SG" b="1" dirty="0"/>
+              <a:rPr lang="en-SG" b="1" dirty="0">
+                <a:solidFill>
+                  <a:srgbClr val="C00000"/>
+                </a:solidFill>
+              </a:rPr>
               <a:t>Attack Scenario 1: False command injection attack via phishing email and Backdoor Trojan</a:t>
             </a:r>
           </a:p>

</xml_diff>

<commit_message>
Added the ARP spoofing attack study case document.
</commit_message>
<xml_diff>
--- a/attack/AttackScenario.pptx
+++ b/attack/AttackScenario.pptx
@@ -7,9 +7,10 @@
   <p:sldIdLst>
     <p:sldId id="256" r:id="rId2"/>
     <p:sldId id="257" r:id="rId3"/>
-    <p:sldId id="258" r:id="rId4"/>
-    <p:sldId id="259" r:id="rId5"/>
-    <p:sldId id="260" r:id="rId6"/>
+    <p:sldId id="261" r:id="rId4"/>
+    <p:sldId id="258" r:id="rId5"/>
+    <p:sldId id="259" r:id="rId6"/>
+    <p:sldId id="260" r:id="rId7"/>
   </p:sldIdLst>
   <p:sldSz cx="12192000" cy="6858000"/>
   <p:notesSz cx="6858000" cy="9144000"/>
@@ -265,7 +266,7 @@
           <a:p>
             <a:fld id="{11AA06AF-8DFA-4137-89EF-0EFE93628E77}" type="datetimeFigureOut">
               <a:rPr lang="en-SG" smtClean="0"/>
-              <a:t>6/1/2024</a:t>
+              <a:t>9/1/2024</a:t>
             </a:fld>
             <a:endParaRPr lang="en-SG"/>
           </a:p>
@@ -465,7 +466,7 @@
           <a:p>
             <a:fld id="{11AA06AF-8DFA-4137-89EF-0EFE93628E77}" type="datetimeFigureOut">
               <a:rPr lang="en-SG" smtClean="0"/>
-              <a:t>6/1/2024</a:t>
+              <a:t>9/1/2024</a:t>
             </a:fld>
             <a:endParaRPr lang="en-SG"/>
           </a:p>
@@ -675,7 +676,7 @@
           <a:p>
             <a:fld id="{11AA06AF-8DFA-4137-89EF-0EFE93628E77}" type="datetimeFigureOut">
               <a:rPr lang="en-SG" smtClean="0"/>
-              <a:t>6/1/2024</a:t>
+              <a:t>9/1/2024</a:t>
             </a:fld>
             <a:endParaRPr lang="en-SG"/>
           </a:p>
@@ -875,7 +876,7 @@
           <a:p>
             <a:fld id="{11AA06AF-8DFA-4137-89EF-0EFE93628E77}" type="datetimeFigureOut">
               <a:rPr lang="en-SG" smtClean="0"/>
-              <a:t>6/1/2024</a:t>
+              <a:t>9/1/2024</a:t>
             </a:fld>
             <a:endParaRPr lang="en-SG"/>
           </a:p>
@@ -1151,7 +1152,7 @@
           <a:p>
             <a:fld id="{11AA06AF-8DFA-4137-89EF-0EFE93628E77}" type="datetimeFigureOut">
               <a:rPr lang="en-SG" smtClean="0"/>
-              <a:t>6/1/2024</a:t>
+              <a:t>9/1/2024</a:t>
             </a:fld>
             <a:endParaRPr lang="en-SG"/>
           </a:p>
@@ -1419,7 +1420,7 @@
           <a:p>
             <a:fld id="{11AA06AF-8DFA-4137-89EF-0EFE93628E77}" type="datetimeFigureOut">
               <a:rPr lang="en-SG" smtClean="0"/>
-              <a:t>6/1/2024</a:t>
+              <a:t>9/1/2024</a:t>
             </a:fld>
             <a:endParaRPr lang="en-SG"/>
           </a:p>
@@ -1834,7 +1835,7 @@
           <a:p>
             <a:fld id="{11AA06AF-8DFA-4137-89EF-0EFE93628E77}" type="datetimeFigureOut">
               <a:rPr lang="en-SG" smtClean="0"/>
-              <a:t>6/1/2024</a:t>
+              <a:t>9/1/2024</a:t>
             </a:fld>
             <a:endParaRPr lang="en-SG"/>
           </a:p>
@@ -1976,7 +1977,7 @@
           <a:p>
             <a:fld id="{11AA06AF-8DFA-4137-89EF-0EFE93628E77}" type="datetimeFigureOut">
               <a:rPr lang="en-SG" smtClean="0"/>
-              <a:t>6/1/2024</a:t>
+              <a:t>9/1/2024</a:t>
             </a:fld>
             <a:endParaRPr lang="en-SG"/>
           </a:p>
@@ -2089,7 +2090,7 @@
           <a:p>
             <a:fld id="{11AA06AF-8DFA-4137-89EF-0EFE93628E77}" type="datetimeFigureOut">
               <a:rPr lang="en-SG" smtClean="0"/>
-              <a:t>6/1/2024</a:t>
+              <a:t>9/1/2024</a:t>
             </a:fld>
             <a:endParaRPr lang="en-SG"/>
           </a:p>
@@ -2402,7 +2403,7 @@
           <a:p>
             <a:fld id="{11AA06AF-8DFA-4137-89EF-0EFE93628E77}" type="datetimeFigureOut">
               <a:rPr lang="en-SG" smtClean="0"/>
-              <a:t>6/1/2024</a:t>
+              <a:t>9/1/2024</a:t>
             </a:fld>
             <a:endParaRPr lang="en-SG"/>
           </a:p>
@@ -2691,7 +2692,7 @@
           <a:p>
             <a:fld id="{11AA06AF-8DFA-4137-89EF-0EFE93628E77}" type="datetimeFigureOut">
               <a:rPr lang="en-SG" smtClean="0"/>
-              <a:t>6/1/2024</a:t>
+              <a:t>9/1/2024</a:t>
             </a:fld>
             <a:endParaRPr lang="en-SG"/>
           </a:p>
@@ -2934,7 +2935,7 @@
           <a:p>
             <a:fld id="{11AA06AF-8DFA-4137-89EF-0EFE93628E77}" type="datetimeFigureOut">
               <a:rPr lang="en-SG" smtClean="0"/>
-              <a:t>6/1/2024</a:t>
+              <a:t>9/1/2024</a:t>
             </a:fld>
             <a:endParaRPr lang="en-SG"/>
           </a:p>
@@ -7897,64 +7898,12 @@
           <a:chExt cx="0" cy="0"/>
         </a:xfrm>
       </p:grpSpPr>
-      <p:sp>
-        <p:nvSpPr>
-          <p:cNvPr id="14" name="TextBox 13">
-            <a:extLst>
-              <a:ext uri="{FF2B5EF4-FFF2-40B4-BE49-F238E27FC236}">
-                <a16:creationId xmlns:a16="http://schemas.microsoft.com/office/drawing/2014/main" id="{BD6C4BB7-B7B5-A27A-D455-08D15EA10CEE}"/>
-              </a:ext>
-            </a:extLst>
-          </p:cNvPr>
-          <p:cNvSpPr txBox="1"/>
-          <p:nvPr/>
-        </p:nvSpPr>
-        <p:spPr>
-          <a:xfrm>
-            <a:off x="356095" y="3736620"/>
-            <a:ext cx="7993710" cy="307777"/>
-          </a:xfrm>
-          <a:prstGeom prst="rect">
-            <a:avLst/>
-          </a:prstGeom>
-          <a:noFill/>
-        </p:spPr>
-        <p:txBody>
-          <a:bodyPr wrap="square" rtlCol="0">
-            <a:spAutoFit/>
-          </a:bodyPr>
-          <a:lstStyle/>
-          <a:p>
-            <a:r>
-              <a:rPr lang="en-US" sz="1400" b="1" dirty="0">
-                <a:solidFill>
-                  <a:srgbClr val="FF0000"/>
-                </a:solidFill>
-              </a:rPr>
-              <a:t>Operation Scenario 1(Red) </a:t>
-            </a:r>
-            <a:r>
-              <a:rPr lang="en-US" sz="1400" b="1" dirty="0">
-                <a:solidFill>
-                  <a:srgbClr val="C00000"/>
-                </a:solidFill>
-              </a:rPr>
-              <a:t>: </a:t>
-            </a:r>
-            <a:r>
-              <a:rPr lang="en-US" sz="1400" b="1" dirty="0"/>
-              <a:t>Train power off, Train speed is 0 km/ h, Train emergency stopped or accident </a:t>
-            </a:r>
-            <a:endParaRPr lang="en-SG" sz="1400" b="1" dirty="0"/>
-          </a:p>
-        </p:txBody>
-      </p:sp>
       <p:pic>
         <p:nvPicPr>
-          <p:cNvPr id="15" name="Picture 14" descr="A red and green rectangles with a green arrow&#10;&#10;Description automatically generated">
-            <a:extLst>
-              <a:ext uri="{FF2B5EF4-FFF2-40B4-BE49-F238E27FC236}">
-                <a16:creationId xmlns:a16="http://schemas.microsoft.com/office/drawing/2014/main" id="{47BD6986-1D65-0EEF-E9C0-82653AEE398C}"/>
+          <p:cNvPr id="2" name="Picture 1">
+            <a:extLst>
+              <a:ext uri="{FF2B5EF4-FFF2-40B4-BE49-F238E27FC236}">
+                <a16:creationId xmlns:a16="http://schemas.microsoft.com/office/drawing/2014/main" id="{37EDEB6A-BE37-88BD-83ED-C974D5672875}"/>
               </a:ext>
             </a:extLst>
           </p:cNvPr>
@@ -7965,11 +7914,7 @@
         </p:nvPicPr>
         <p:blipFill>
           <a:blip r:embed="rId2">
-            <a:extLst>
-              <a:ext uri="{28A0092B-C50C-407E-A947-70E740481C1C}">
-                <a14:useLocalDpi xmlns:a14="http://schemas.microsoft.com/office/drawing/2010/main" val="0"/>
-              </a:ext>
-            </a:extLst>
+            <a:alphaModFix amt="35000"/>
           </a:blip>
           <a:stretch>
             <a:fillRect/>
@@ -7977,8 +7922,8 @@
         </p:blipFill>
         <p:spPr>
           <a:xfrm>
-            <a:off x="460465" y="4139100"/>
-            <a:ext cx="1476190" cy="628571"/>
+            <a:off x="512668" y="317659"/>
+            <a:ext cx="8499861" cy="4721249"/>
           </a:xfrm>
           <a:prstGeom prst="rect">
             <a:avLst/>
@@ -7987,10 +7932,10 @@
       </p:pic>
       <p:pic>
         <p:nvPicPr>
-          <p:cNvPr id="16" name="Picture 15" descr="A computer screen shot of a diagram&#10;&#10;Description automatically generated">
-            <a:extLst>
-              <a:ext uri="{FF2B5EF4-FFF2-40B4-BE49-F238E27FC236}">
-                <a16:creationId xmlns:a16="http://schemas.microsoft.com/office/drawing/2014/main" id="{4CA30A83-3924-A836-A4B2-97261497F521}"/>
+          <p:cNvPr id="3" name="Picture 2">
+            <a:extLst>
+              <a:ext uri="{FF2B5EF4-FFF2-40B4-BE49-F238E27FC236}">
+                <a16:creationId xmlns:a16="http://schemas.microsoft.com/office/drawing/2014/main" id="{109F7731-CBED-DE29-7B8B-D78B0B5F9E98}"/>
               </a:ext>
             </a:extLst>
           </p:cNvPr>
@@ -8000,33 +7945,266 @@
           <p:nvPr/>
         </p:nvPicPr>
         <p:blipFill>
-          <a:blip r:embed="rId3">
-            <a:extLst>
-              <a:ext uri="{28A0092B-C50C-407E-A947-70E740481C1C}">
-                <a14:useLocalDpi xmlns:a14="http://schemas.microsoft.com/office/drawing/2010/main" val="0"/>
-              </a:ext>
-            </a:extLst>
-          </a:blip>
+          <a:blip r:embed="rId3"/>
           <a:stretch>
             <a:fillRect/>
           </a:stretch>
         </p:blipFill>
         <p:spPr>
           <a:xfrm>
-            <a:off x="4747338" y="2099104"/>
-            <a:ext cx="1676190" cy="904762"/>
+            <a:off x="3494781" y="2078219"/>
+            <a:ext cx="417996" cy="292597"/>
           </a:xfrm>
           <a:prstGeom prst="rect">
             <a:avLst/>
           </a:prstGeom>
+          <a:ln w="12700">
+            <a:solidFill>
+              <a:schemeClr val="tx1"/>
+            </a:solidFill>
+          </a:ln>
         </p:spPr>
       </p:pic>
-      <p:sp>
-        <p:nvSpPr>
-          <p:cNvPr id="17" name="TextBox 16">
-            <a:extLst>
-              <a:ext uri="{FF2B5EF4-FFF2-40B4-BE49-F238E27FC236}">
-                <a16:creationId xmlns:a16="http://schemas.microsoft.com/office/drawing/2014/main" id="{A9348CFA-1BFC-1BE6-DFD3-74AD01BD1B14}"/>
+      <p:cxnSp>
+        <p:nvCxnSpPr>
+          <p:cNvPr id="4" name="Straight Arrow Connector 3">
+            <a:extLst>
+              <a:ext uri="{FF2B5EF4-FFF2-40B4-BE49-F238E27FC236}">
+                <a16:creationId xmlns:a16="http://schemas.microsoft.com/office/drawing/2014/main" id="{A14286EC-5F52-9B56-23DF-CA8F58DB355B}"/>
+              </a:ext>
+            </a:extLst>
+          </p:cNvPr>
+          <p:cNvCxnSpPr>
+            <a:cxnSpLocks/>
+          </p:cNvCxnSpPr>
+          <p:nvPr/>
+        </p:nvCxnSpPr>
+        <p:spPr>
+          <a:xfrm flipH="1">
+            <a:off x="3021768" y="2411264"/>
+            <a:ext cx="519452" cy="263927"/>
+          </a:xfrm>
+          <a:prstGeom prst="straightConnector1">
+            <a:avLst/>
+          </a:prstGeom>
+          <a:ln w="28575">
+            <a:solidFill>
+              <a:srgbClr val="FF0000"/>
+            </a:solidFill>
+            <a:prstDash val="sysDash"/>
+            <a:tailEnd type="triangle"/>
+          </a:ln>
+        </p:spPr>
+        <p:style>
+          <a:lnRef idx="1">
+            <a:schemeClr val="accent1"/>
+          </a:lnRef>
+          <a:fillRef idx="0">
+            <a:schemeClr val="accent1"/>
+          </a:fillRef>
+          <a:effectRef idx="0">
+            <a:schemeClr val="accent1"/>
+          </a:effectRef>
+          <a:fontRef idx="minor">
+            <a:schemeClr val="tx1"/>
+          </a:fontRef>
+        </p:style>
+      </p:cxnSp>
+      <p:cxnSp>
+        <p:nvCxnSpPr>
+          <p:cNvPr id="5" name="Straight Arrow Connector 4">
+            <a:extLst>
+              <a:ext uri="{FF2B5EF4-FFF2-40B4-BE49-F238E27FC236}">
+                <a16:creationId xmlns:a16="http://schemas.microsoft.com/office/drawing/2014/main" id="{365D17E6-0FE5-5984-277A-68FCED431C5D}"/>
+              </a:ext>
+            </a:extLst>
+          </p:cNvPr>
+          <p:cNvCxnSpPr>
+            <a:cxnSpLocks/>
+          </p:cNvCxnSpPr>
+          <p:nvPr/>
+        </p:nvCxnSpPr>
+        <p:spPr>
+          <a:xfrm>
+            <a:off x="4016513" y="2390636"/>
+            <a:ext cx="746086" cy="5962"/>
+          </a:xfrm>
+          <a:prstGeom prst="straightConnector1">
+            <a:avLst/>
+          </a:prstGeom>
+          <a:ln w="28575">
+            <a:solidFill>
+              <a:srgbClr val="FF0000"/>
+            </a:solidFill>
+            <a:prstDash val="sysDash"/>
+            <a:tailEnd type="triangle"/>
+          </a:ln>
+        </p:spPr>
+        <p:style>
+          <a:lnRef idx="1">
+            <a:schemeClr val="accent1"/>
+          </a:lnRef>
+          <a:fillRef idx="0">
+            <a:schemeClr val="accent1"/>
+          </a:fillRef>
+          <a:effectRef idx="0">
+            <a:schemeClr val="accent1"/>
+          </a:effectRef>
+          <a:fontRef idx="minor">
+            <a:schemeClr val="tx1"/>
+          </a:fontRef>
+        </p:style>
+      </p:cxnSp>
+      <p:cxnSp>
+        <p:nvCxnSpPr>
+          <p:cNvPr id="6" name="Straight Arrow Connector 5">
+            <a:extLst>
+              <a:ext uri="{FF2B5EF4-FFF2-40B4-BE49-F238E27FC236}">
+                <a16:creationId xmlns:a16="http://schemas.microsoft.com/office/drawing/2014/main" id="{1D643A63-AB5E-F773-DB48-AB8A6BAE69D5}"/>
+              </a:ext>
+            </a:extLst>
+          </p:cNvPr>
+          <p:cNvCxnSpPr>
+            <a:cxnSpLocks/>
+          </p:cNvCxnSpPr>
+          <p:nvPr/>
+        </p:nvCxnSpPr>
+        <p:spPr>
+          <a:xfrm>
+            <a:off x="4743667" y="2397850"/>
+            <a:ext cx="0" cy="625401"/>
+          </a:xfrm>
+          <a:prstGeom prst="straightConnector1">
+            <a:avLst/>
+          </a:prstGeom>
+          <a:ln w="28575">
+            <a:solidFill>
+              <a:srgbClr val="FF0000"/>
+            </a:solidFill>
+            <a:prstDash val="sysDash"/>
+            <a:tailEnd type="triangle"/>
+          </a:ln>
+        </p:spPr>
+        <p:style>
+          <a:lnRef idx="1">
+            <a:schemeClr val="accent1"/>
+          </a:lnRef>
+          <a:fillRef idx="0">
+            <a:schemeClr val="accent1"/>
+          </a:fillRef>
+          <a:effectRef idx="0">
+            <a:schemeClr val="accent1"/>
+          </a:effectRef>
+          <a:fontRef idx="minor">
+            <a:schemeClr val="tx1"/>
+          </a:fontRef>
+        </p:style>
+      </p:cxnSp>
+      <p:cxnSp>
+        <p:nvCxnSpPr>
+          <p:cNvPr id="7" name="Straight Arrow Connector 6">
+            <a:extLst>
+              <a:ext uri="{FF2B5EF4-FFF2-40B4-BE49-F238E27FC236}">
+                <a16:creationId xmlns:a16="http://schemas.microsoft.com/office/drawing/2014/main" id="{475B046D-890B-BB33-9ECF-48EC981297E8}"/>
+              </a:ext>
+            </a:extLst>
+          </p:cNvPr>
+          <p:cNvCxnSpPr>
+            <a:cxnSpLocks/>
+          </p:cNvCxnSpPr>
+          <p:nvPr/>
+        </p:nvCxnSpPr>
+        <p:spPr>
+          <a:xfrm>
+            <a:off x="4762599" y="3026205"/>
+            <a:ext cx="448065" cy="0"/>
+          </a:xfrm>
+          <a:prstGeom prst="straightConnector1">
+            <a:avLst/>
+          </a:prstGeom>
+          <a:ln w="28575">
+            <a:solidFill>
+              <a:srgbClr val="FF0000"/>
+            </a:solidFill>
+            <a:prstDash val="sysDash"/>
+            <a:tailEnd type="triangle"/>
+          </a:ln>
+        </p:spPr>
+        <p:style>
+          <a:lnRef idx="1">
+            <a:schemeClr val="accent1"/>
+          </a:lnRef>
+          <a:fillRef idx="0">
+            <a:schemeClr val="accent1"/>
+          </a:fillRef>
+          <a:effectRef idx="0">
+            <a:schemeClr val="accent1"/>
+          </a:effectRef>
+          <a:fontRef idx="minor">
+            <a:schemeClr val="tx1"/>
+          </a:fontRef>
+        </p:style>
+      </p:cxnSp>
+      <p:sp>
+        <p:nvSpPr>
+          <p:cNvPr id="9" name="Rectangle 8">
+            <a:extLst>
+              <a:ext uri="{FF2B5EF4-FFF2-40B4-BE49-F238E27FC236}">
+                <a16:creationId xmlns:a16="http://schemas.microsoft.com/office/drawing/2014/main" id="{8F881837-6C53-BB3A-C542-50E26F47B952}"/>
+              </a:ext>
+            </a:extLst>
+          </p:cNvPr>
+          <p:cNvSpPr/>
+          <p:nvPr/>
+        </p:nvSpPr>
+        <p:spPr>
+          <a:xfrm>
+            <a:off x="5196906" y="2827176"/>
+            <a:ext cx="681379" cy="541734"/>
+          </a:xfrm>
+          <a:prstGeom prst="rect">
+            <a:avLst/>
+          </a:prstGeom>
+          <a:noFill/>
+          <a:ln w="19050" cap="flat" cmpd="sng" algn="ctr">
+            <a:solidFill>
+              <a:srgbClr val="FF0000"/>
+            </a:solidFill>
+            <a:prstDash val="sysDash"/>
+            <a:round/>
+            <a:headEnd type="none" w="med" len="med"/>
+            <a:tailEnd type="none" w="med" len="med"/>
+          </a:ln>
+        </p:spPr>
+        <p:style>
+          <a:lnRef idx="0">
+            <a:scrgbClr r="0" g="0" b="0"/>
+          </a:lnRef>
+          <a:fillRef idx="0">
+            <a:scrgbClr r="0" g="0" b="0"/>
+          </a:fillRef>
+          <a:effectRef idx="0">
+            <a:scrgbClr r="0" g="0" b="0"/>
+          </a:effectRef>
+          <a:fontRef idx="minor">
+            <a:schemeClr val="dk1"/>
+          </a:fontRef>
+        </p:style>
+        <p:txBody>
+          <a:bodyPr rtlCol="0" anchor="ctr"/>
+          <a:lstStyle/>
+          <a:p>
+            <a:pPr algn="ctr"/>
+            <a:endParaRPr lang="en-SG" dirty="0"/>
+          </a:p>
+        </p:txBody>
+      </p:sp>
+      <p:sp>
+        <p:nvSpPr>
+          <p:cNvPr id="10" name="TextBox 9">
+            <a:extLst>
+              <a:ext uri="{FF2B5EF4-FFF2-40B4-BE49-F238E27FC236}">
+                <a16:creationId xmlns:a16="http://schemas.microsoft.com/office/drawing/2014/main" id="{8CF6C3AD-E26E-53A9-96AD-02878041150E}"/>
               </a:ext>
             </a:extLst>
           </p:cNvPr>
@@ -8035,8 +8213,8 @@
         </p:nvSpPr>
         <p:spPr>
           <a:xfrm>
-            <a:off x="4541100" y="1516197"/>
-            <a:ext cx="3966882" cy="523220"/>
+            <a:off x="3818990" y="1799968"/>
+            <a:ext cx="1377916" cy="276999"/>
           </a:xfrm>
           <a:prstGeom prst="rect">
             <a:avLst/>
@@ -8050,29 +8228,67 @@
           <a:lstStyle/>
           <a:p>
             <a:r>
-              <a:rPr lang="en-US" sz="1400" b="1" dirty="0">
+              <a:rPr lang="en-SG" sz="1200" b="1" dirty="0">
                 <a:solidFill>
-                  <a:schemeClr val="accent2">
-                    <a:lumMod val="75000"/>
-                  </a:schemeClr>
+                  <a:srgbClr val="C00000"/>
                 </a:solidFill>
               </a:rPr>
-              <a:t>Normal Operation Scenario 2(Orange) : </a:t>
-            </a:r>
-            <a:r>
-              <a:rPr lang="en-US" sz="1400" b="1" dirty="0"/>
-              <a:t>Train power on , Train speed is low (0 km/ h – 20km/h)</a:t>
-            </a:r>
-            <a:endParaRPr lang="en-SG" sz="1400" b="1" dirty="0"/>
-          </a:p>
-        </p:txBody>
-      </p:sp>
+              <a:t>Packet Dropper </a:t>
+            </a:r>
+          </a:p>
+        </p:txBody>
+      </p:sp>
+      <p:cxnSp>
+        <p:nvCxnSpPr>
+          <p:cNvPr id="17" name="Straight Arrow Connector 16">
+            <a:extLst>
+              <a:ext uri="{FF2B5EF4-FFF2-40B4-BE49-F238E27FC236}">
+                <a16:creationId xmlns:a16="http://schemas.microsoft.com/office/drawing/2014/main" id="{23D27479-3DF6-C56C-2419-318BAD92C5DA}"/>
+              </a:ext>
+            </a:extLst>
+          </p:cNvPr>
+          <p:cNvCxnSpPr>
+            <a:cxnSpLocks/>
+          </p:cNvCxnSpPr>
+          <p:nvPr/>
+        </p:nvCxnSpPr>
+        <p:spPr>
+          <a:xfrm flipH="1">
+            <a:off x="1385416" y="2318665"/>
+            <a:ext cx="2109365" cy="0"/>
+          </a:xfrm>
+          <a:prstGeom prst="straightConnector1">
+            <a:avLst/>
+          </a:prstGeom>
+          <a:ln w="19050">
+            <a:solidFill>
+              <a:srgbClr val="FF0000"/>
+            </a:solidFill>
+            <a:headEnd type="triangle"/>
+            <a:tailEnd type="triangle"/>
+          </a:ln>
+        </p:spPr>
+        <p:style>
+          <a:lnRef idx="1">
+            <a:schemeClr val="accent1"/>
+          </a:lnRef>
+          <a:fillRef idx="0">
+            <a:schemeClr val="accent1"/>
+          </a:fillRef>
+          <a:effectRef idx="0">
+            <a:schemeClr val="accent1"/>
+          </a:effectRef>
+          <a:fontRef idx="minor">
+            <a:schemeClr val="tx1"/>
+          </a:fontRef>
+        </p:style>
+      </p:cxnSp>
       <p:pic>
         <p:nvPicPr>
-          <p:cNvPr id="18" name="Picture 17" descr="A green squares with black lines&#10;&#10;Description automatically generated">
-            <a:extLst>
-              <a:ext uri="{FF2B5EF4-FFF2-40B4-BE49-F238E27FC236}">
-                <a16:creationId xmlns:a16="http://schemas.microsoft.com/office/drawing/2014/main" id="{931B59C4-DBA7-6A83-664C-92442D986A70}"/>
+          <p:cNvPr id="20" name="Picture 19">
+            <a:extLst>
+              <a:ext uri="{FF2B5EF4-FFF2-40B4-BE49-F238E27FC236}">
+                <a16:creationId xmlns:a16="http://schemas.microsoft.com/office/drawing/2014/main" id="{5F770960-D9DB-1EB5-A7C3-44E8422ADDB3}"/>
               </a:ext>
             </a:extLst>
           </p:cNvPr>
@@ -8082,33 +8298,186 @@
           <p:nvPr/>
         </p:nvPicPr>
         <p:blipFill>
-          <a:blip r:embed="rId4">
-            <a:extLst>
-              <a:ext uri="{28A0092B-C50C-407E-A947-70E740481C1C}">
-                <a14:useLocalDpi xmlns:a14="http://schemas.microsoft.com/office/drawing/2010/main" val="0"/>
-              </a:ext>
-            </a:extLst>
-          </a:blip>
+          <a:blip r:embed="rId4"/>
           <a:stretch>
             <a:fillRect/>
           </a:stretch>
         </p:blipFill>
         <p:spPr>
           <a:xfrm>
-            <a:off x="533716" y="2435191"/>
-            <a:ext cx="995158" cy="584783"/>
+            <a:off x="2361555" y="5662654"/>
+            <a:ext cx="969549" cy="446133"/>
           </a:xfrm>
           <a:prstGeom prst="rect">
             <a:avLst/>
           </a:prstGeom>
+          <a:ln w="28575">
+            <a:solidFill>
+              <a:srgbClr val="FF0000"/>
+            </a:solidFill>
+            <a:prstDash val="sysDash"/>
+          </a:ln>
         </p:spPr>
       </p:pic>
       <p:sp>
         <p:nvSpPr>
-          <p:cNvPr id="19" name="TextBox 18">
-            <a:extLst>
-              <a:ext uri="{FF2B5EF4-FFF2-40B4-BE49-F238E27FC236}">
-                <a16:creationId xmlns:a16="http://schemas.microsoft.com/office/drawing/2014/main" id="{8C2E4839-F8AB-3731-0308-337EC75ED695}"/>
+          <p:cNvPr id="21" name="Cloud 20">
+            <a:extLst>
+              <a:ext uri="{FF2B5EF4-FFF2-40B4-BE49-F238E27FC236}">
+                <a16:creationId xmlns:a16="http://schemas.microsoft.com/office/drawing/2014/main" id="{60D2F74F-9D3F-DBB6-A814-238410096837}"/>
+              </a:ext>
+            </a:extLst>
+          </p:cNvPr>
+          <p:cNvSpPr/>
+          <p:nvPr/>
+        </p:nvSpPr>
+        <p:spPr>
+          <a:xfrm>
+            <a:off x="775262" y="5509563"/>
+            <a:ext cx="1220308" cy="724015"/>
+          </a:xfrm>
+          <a:prstGeom prst="cloud">
+            <a:avLst/>
+          </a:prstGeom>
+          <a:noFill/>
+        </p:spPr>
+        <p:style>
+          <a:lnRef idx="2">
+            <a:schemeClr val="accent1">
+              <a:shade val="15000"/>
+            </a:schemeClr>
+          </a:lnRef>
+          <a:fillRef idx="1">
+            <a:schemeClr val="accent1"/>
+          </a:fillRef>
+          <a:effectRef idx="0">
+            <a:schemeClr val="accent1"/>
+          </a:effectRef>
+          <a:fontRef idx="minor">
+            <a:schemeClr val="lt1"/>
+          </a:fontRef>
+        </p:style>
+        <p:txBody>
+          <a:bodyPr rtlCol="0" anchor="ctr"/>
+          <a:lstStyle/>
+          <a:p>
+            <a:pPr algn="ctr"/>
+            <a:r>
+              <a:rPr lang="en-US" sz="1400" b="1" dirty="0">
+                <a:solidFill>
+                  <a:schemeClr val="tx1"/>
+                </a:solidFill>
+              </a:rPr>
+              <a:t>Internet</a:t>
+            </a:r>
+            <a:endParaRPr lang="en-SG" sz="1400" b="1" dirty="0">
+              <a:solidFill>
+                <a:schemeClr val="tx1"/>
+              </a:solidFill>
+            </a:endParaRPr>
+          </a:p>
+        </p:txBody>
+      </p:sp>
+      <p:cxnSp>
+        <p:nvCxnSpPr>
+          <p:cNvPr id="22" name="Straight Arrow Connector 21">
+            <a:extLst>
+              <a:ext uri="{FF2B5EF4-FFF2-40B4-BE49-F238E27FC236}">
+                <a16:creationId xmlns:a16="http://schemas.microsoft.com/office/drawing/2014/main" id="{3556502B-69E0-7E20-C498-DBA84DFA1E78}"/>
+              </a:ext>
+            </a:extLst>
+          </p:cNvPr>
+          <p:cNvCxnSpPr>
+            <a:cxnSpLocks/>
+            <a:stCxn id="21" idx="0"/>
+            <a:endCxn id="21" idx="3"/>
+          </p:cNvCxnSpPr>
+          <p:nvPr/>
+        </p:nvCxnSpPr>
+        <p:spPr>
+          <a:xfrm flipH="1" flipV="1">
+            <a:off x="1385416" y="5550959"/>
+            <a:ext cx="609137" cy="320612"/>
+          </a:xfrm>
+          <a:prstGeom prst="straightConnector1">
+            <a:avLst/>
+          </a:prstGeom>
+          <a:ln w="19050">
+            <a:solidFill>
+              <a:srgbClr val="FF0000"/>
+            </a:solidFill>
+            <a:headEnd type="triangle"/>
+            <a:tailEnd type="triangle"/>
+          </a:ln>
+        </p:spPr>
+        <p:style>
+          <a:lnRef idx="1">
+            <a:schemeClr val="accent1"/>
+          </a:lnRef>
+          <a:fillRef idx="0">
+            <a:schemeClr val="accent1"/>
+          </a:fillRef>
+          <a:effectRef idx="0">
+            <a:schemeClr val="accent1"/>
+          </a:effectRef>
+          <a:fontRef idx="minor">
+            <a:schemeClr val="tx1"/>
+          </a:fontRef>
+        </p:style>
+      </p:cxnSp>
+      <p:cxnSp>
+        <p:nvCxnSpPr>
+          <p:cNvPr id="26" name="Straight Arrow Connector 25">
+            <a:extLst>
+              <a:ext uri="{FF2B5EF4-FFF2-40B4-BE49-F238E27FC236}">
+                <a16:creationId xmlns:a16="http://schemas.microsoft.com/office/drawing/2014/main" id="{64B02EA8-D59C-269B-2FAD-C063A20D29A6}"/>
+              </a:ext>
+            </a:extLst>
+          </p:cNvPr>
+          <p:cNvCxnSpPr>
+            <a:cxnSpLocks/>
+            <a:stCxn id="20" idx="1"/>
+            <a:endCxn id="21" idx="0"/>
+          </p:cNvCxnSpPr>
+          <p:nvPr/>
+        </p:nvCxnSpPr>
+        <p:spPr>
+          <a:xfrm flipH="1" flipV="1">
+            <a:off x="1994553" y="5871571"/>
+            <a:ext cx="367002" cy="14150"/>
+          </a:xfrm>
+          <a:prstGeom prst="straightConnector1">
+            <a:avLst/>
+          </a:prstGeom>
+          <a:ln w="19050">
+            <a:solidFill>
+              <a:srgbClr val="FF0000"/>
+            </a:solidFill>
+            <a:headEnd type="triangle"/>
+            <a:tailEnd type="triangle"/>
+          </a:ln>
+        </p:spPr>
+        <p:style>
+          <a:lnRef idx="1">
+            <a:schemeClr val="accent1"/>
+          </a:lnRef>
+          <a:fillRef idx="0">
+            <a:schemeClr val="accent1"/>
+          </a:fillRef>
+          <a:effectRef idx="0">
+            <a:schemeClr val="accent1"/>
+          </a:effectRef>
+          <a:fontRef idx="minor">
+            <a:schemeClr val="tx1"/>
+          </a:fontRef>
+        </p:style>
+      </p:cxnSp>
+      <p:sp>
+        <p:nvSpPr>
+          <p:cNvPr id="31" name="TextBox 30">
+            <a:extLst>
+              <a:ext uri="{FF2B5EF4-FFF2-40B4-BE49-F238E27FC236}">
+                <a16:creationId xmlns:a16="http://schemas.microsoft.com/office/drawing/2014/main" id="{624357B9-BAA1-E9B7-968A-942B77060194}"/>
               </a:ext>
             </a:extLst>
           </p:cNvPr>
@@ -8117,8 +8486,8 @@
         </p:nvSpPr>
         <p:spPr>
           <a:xfrm>
-            <a:off x="306318" y="1777807"/>
-            <a:ext cx="4038754" cy="523220"/>
+            <a:off x="3885293" y="6095078"/>
+            <a:ext cx="1356668" cy="276999"/>
           </a:xfrm>
           <a:prstGeom prst="rect">
             <a:avLst/>
@@ -8132,29 +8501,189 @@
           <a:lstStyle/>
           <a:p>
             <a:r>
-              <a:rPr lang="en-US" sz="1400" b="1" dirty="0">
+              <a:rPr lang="en-US" sz="1200" b="1" dirty="0">
                 <a:solidFill>
-                  <a:schemeClr val="accent6">
-                    <a:lumMod val="75000"/>
-                  </a:schemeClr>
+                  <a:srgbClr val="C00000"/>
                 </a:solidFill>
               </a:rPr>
-              <a:t>Normal Operation Scenario 1 (Green) </a:t>
-            </a:r>
-            <a:r>
-              <a:rPr lang="en-US" sz="1400" b="1" dirty="0"/>
-              <a:t>: Train power on , Train speed is normal (56 km/ h – 90 km/ h)</a:t>
-            </a:r>
-            <a:endParaRPr lang="en-SG" sz="1400" b="1" dirty="0"/>
-          </a:p>
-        </p:txBody>
-      </p:sp>
-      <p:sp>
-        <p:nvSpPr>
-          <p:cNvPr id="20" name="TextBox 19">
-            <a:extLst>
-              <a:ext uri="{FF2B5EF4-FFF2-40B4-BE49-F238E27FC236}">
-                <a16:creationId xmlns:a16="http://schemas.microsoft.com/office/drawing/2014/main" id="{D0E687E0-ED8C-6756-75CF-E1FF24EC13E2}"/>
+              <a:t>Red Team attacker </a:t>
+            </a:r>
+            <a:endParaRPr lang="en-SG" sz="1200" b="1" dirty="0">
+              <a:solidFill>
+                <a:srgbClr val="C00000"/>
+              </a:solidFill>
+            </a:endParaRPr>
+          </a:p>
+        </p:txBody>
+      </p:sp>
+      <p:cxnSp>
+        <p:nvCxnSpPr>
+          <p:cNvPr id="35" name="Straight Arrow Connector 34">
+            <a:extLst>
+              <a:ext uri="{FF2B5EF4-FFF2-40B4-BE49-F238E27FC236}">
+                <a16:creationId xmlns:a16="http://schemas.microsoft.com/office/drawing/2014/main" id="{8A860A4C-D7DA-41AF-E434-21FA008F8C00}"/>
+              </a:ext>
+            </a:extLst>
+          </p:cNvPr>
+          <p:cNvCxnSpPr>
+            <a:cxnSpLocks/>
+          </p:cNvCxnSpPr>
+          <p:nvPr/>
+        </p:nvCxnSpPr>
+        <p:spPr>
+          <a:xfrm>
+            <a:off x="1301441" y="2339109"/>
+            <a:ext cx="0" cy="3181868"/>
+          </a:xfrm>
+          <a:prstGeom prst="straightConnector1">
+            <a:avLst/>
+          </a:prstGeom>
+          <a:ln w="19050">
+            <a:solidFill>
+              <a:srgbClr val="FF0000"/>
+            </a:solidFill>
+            <a:headEnd type="triangle"/>
+            <a:tailEnd type="triangle"/>
+          </a:ln>
+        </p:spPr>
+        <p:style>
+          <a:lnRef idx="1">
+            <a:schemeClr val="accent1"/>
+          </a:lnRef>
+          <a:fillRef idx="0">
+            <a:schemeClr val="accent1"/>
+          </a:fillRef>
+          <a:effectRef idx="0">
+            <a:schemeClr val="accent1"/>
+          </a:effectRef>
+          <a:fontRef idx="minor">
+            <a:schemeClr val="tx1"/>
+          </a:fontRef>
+        </p:style>
+      </p:cxnSp>
+      <p:pic>
+        <p:nvPicPr>
+          <p:cNvPr id="40" name="Picture 39">
+            <a:extLst>
+              <a:ext uri="{FF2B5EF4-FFF2-40B4-BE49-F238E27FC236}">
+                <a16:creationId xmlns:a16="http://schemas.microsoft.com/office/drawing/2014/main" id="{36903C6F-D1F1-A493-268A-6A5A682B210E}"/>
+              </a:ext>
+            </a:extLst>
+          </p:cNvPr>
+          <p:cNvPicPr>
+            <a:picLocks noChangeAspect="1"/>
+          </p:cNvPicPr>
+          <p:nvPr/>
+        </p:nvPicPr>
+        <p:blipFill>
+          <a:blip r:embed="rId5"/>
+          <a:stretch>
+            <a:fillRect/>
+          </a:stretch>
+        </p:blipFill>
+        <p:spPr>
+          <a:xfrm>
+            <a:off x="3653686" y="5035215"/>
+            <a:ext cx="1356669" cy="728079"/>
+          </a:xfrm>
+          <a:prstGeom prst="rect">
+            <a:avLst/>
+          </a:prstGeom>
+          <a:ln w="6350">
+            <a:solidFill>
+              <a:schemeClr val="tx1"/>
+            </a:solidFill>
+          </a:ln>
+        </p:spPr>
+      </p:pic>
+      <p:cxnSp>
+        <p:nvCxnSpPr>
+          <p:cNvPr id="51" name="Connector: Elbow 50">
+            <a:extLst>
+              <a:ext uri="{FF2B5EF4-FFF2-40B4-BE49-F238E27FC236}">
+                <a16:creationId xmlns:a16="http://schemas.microsoft.com/office/drawing/2014/main" id="{18BD5134-0366-70F2-B534-44401901F69D}"/>
+              </a:ext>
+            </a:extLst>
+          </p:cNvPr>
+          <p:cNvCxnSpPr>
+            <a:stCxn id="40" idx="1"/>
+            <a:endCxn id="21" idx="0"/>
+          </p:cNvCxnSpPr>
+          <p:nvPr/>
+        </p:nvCxnSpPr>
+        <p:spPr>
+          <a:xfrm rot="10800000" flipV="1">
+            <a:off x="1994554" y="5399255"/>
+            <a:ext cx="1659133" cy="472316"/>
+          </a:xfrm>
+          <a:prstGeom prst="bentConnector3">
+            <a:avLst>
+              <a:gd name="adj1" fmla="val 100614"/>
+            </a:avLst>
+          </a:prstGeom>
+          <a:ln w="19050">
+            <a:solidFill>
+              <a:srgbClr val="FF0000"/>
+            </a:solidFill>
+            <a:tailEnd type="triangle"/>
+          </a:ln>
+        </p:spPr>
+        <p:style>
+          <a:lnRef idx="1">
+            <a:schemeClr val="accent1"/>
+          </a:lnRef>
+          <a:fillRef idx="0">
+            <a:schemeClr val="accent1"/>
+          </a:fillRef>
+          <a:effectRef idx="0">
+            <a:schemeClr val="accent1"/>
+          </a:effectRef>
+          <a:fontRef idx="minor">
+            <a:schemeClr val="tx1"/>
+          </a:fontRef>
+        </p:style>
+      </p:cxnSp>
+      <p:pic>
+        <p:nvPicPr>
+          <p:cNvPr id="30" name="Picture 29">
+            <a:extLst>
+              <a:ext uri="{FF2B5EF4-FFF2-40B4-BE49-F238E27FC236}">
+                <a16:creationId xmlns:a16="http://schemas.microsoft.com/office/drawing/2014/main" id="{E97A0227-19E2-BC8E-BDE0-05AB69A001D8}"/>
+              </a:ext>
+            </a:extLst>
+          </p:cNvPr>
+          <p:cNvPicPr>
+            <a:picLocks noChangeAspect="1"/>
+          </p:cNvPicPr>
+          <p:nvPr/>
+        </p:nvPicPr>
+        <p:blipFill>
+          <a:blip r:embed="rId6"/>
+          <a:stretch>
+            <a:fillRect/>
+          </a:stretch>
+        </p:blipFill>
+        <p:spPr>
+          <a:xfrm>
+            <a:off x="4392917" y="5566072"/>
+            <a:ext cx="489507" cy="542715"/>
+          </a:xfrm>
+          <a:prstGeom prst="rect">
+            <a:avLst/>
+          </a:prstGeom>
+          <a:ln w="9525">
+            <a:solidFill>
+              <a:schemeClr val="tx1"/>
+            </a:solidFill>
+          </a:ln>
+        </p:spPr>
+      </p:pic>
+      <p:sp>
+        <p:nvSpPr>
+          <p:cNvPr id="53" name="TextBox 52">
+            <a:extLst>
+              <a:ext uri="{FF2B5EF4-FFF2-40B4-BE49-F238E27FC236}">
+                <a16:creationId xmlns:a16="http://schemas.microsoft.com/office/drawing/2014/main" id="{885B1585-7A22-FF1D-7193-E0D1AEC8B339}"/>
               </a:ext>
             </a:extLst>
           </p:cNvPr>
@@ -8163,8 +8692,8 @@
         </p:nvSpPr>
         <p:spPr>
           <a:xfrm>
-            <a:off x="306317" y="1471379"/>
-            <a:ext cx="3687565" cy="307777"/>
+            <a:off x="2297018" y="6140519"/>
+            <a:ext cx="1356668" cy="276999"/>
           </a:xfrm>
           <a:prstGeom prst="rect">
             <a:avLst/>
@@ -8178,16 +8707,16 @@
           <a:lstStyle/>
           <a:p>
             <a:r>
-              <a:rPr lang="en-US" sz="1400" b="1" dirty="0">
+              <a:rPr lang="en-US" sz="1200" b="1" dirty="0">
                 <a:solidFill>
-                  <a:schemeClr val="tx2"/>
+                  <a:srgbClr val="C00000"/>
                 </a:solidFill>
               </a:rPr>
-              <a:t>Normal states : </a:t>
-            </a:r>
-            <a:endParaRPr lang="en-SG" sz="1400" b="1" dirty="0">
+              <a:t>Red Team C2</a:t>
+            </a:r>
+            <a:endParaRPr lang="en-SG" sz="1200" b="1" dirty="0">
               <a:solidFill>
-                <a:schemeClr val="tx2"/>
+                <a:srgbClr val="C00000"/>
               </a:solidFill>
             </a:endParaRPr>
           </a:p>
@@ -8195,10 +8724,94 @@
       </p:sp>
       <p:sp>
         <p:nvSpPr>
-          <p:cNvPr id="21" name="TextBox 20">
-            <a:extLst>
-              <a:ext uri="{FF2B5EF4-FFF2-40B4-BE49-F238E27FC236}">
-                <a16:creationId xmlns:a16="http://schemas.microsoft.com/office/drawing/2014/main" id="{258543FF-6497-320F-EBE3-9EE982AA5F35}"/>
+          <p:cNvPr id="66" name="Rectangle 65">
+            <a:extLst>
+              <a:ext uri="{FF2B5EF4-FFF2-40B4-BE49-F238E27FC236}">
+                <a16:creationId xmlns:a16="http://schemas.microsoft.com/office/drawing/2014/main" id="{5029CF52-F01C-4AC9-6FF9-42469318320D}"/>
+              </a:ext>
+            </a:extLst>
+          </p:cNvPr>
+          <p:cNvSpPr/>
+          <p:nvPr/>
+        </p:nvSpPr>
+        <p:spPr>
+          <a:xfrm>
+            <a:off x="9559177" y="3638648"/>
+            <a:ext cx="354617" cy="259794"/>
+          </a:xfrm>
+          <a:prstGeom prst="rect">
+            <a:avLst/>
+          </a:prstGeom>
+          <a:noFill/>
+          <a:ln w="19050" cap="flat" cmpd="sng" algn="ctr">
+            <a:solidFill>
+              <a:srgbClr val="FF0000"/>
+            </a:solidFill>
+            <a:prstDash val="sysDash"/>
+            <a:round/>
+            <a:headEnd type="none" w="med" len="med"/>
+            <a:tailEnd type="none" w="med" len="med"/>
+          </a:ln>
+        </p:spPr>
+        <p:style>
+          <a:lnRef idx="0">
+            <a:scrgbClr r="0" g="0" b="0"/>
+          </a:lnRef>
+          <a:fillRef idx="0">
+            <a:scrgbClr r="0" g="0" b="0"/>
+          </a:fillRef>
+          <a:effectRef idx="0">
+            <a:scrgbClr r="0" g="0" b="0"/>
+          </a:effectRef>
+          <a:fontRef idx="minor">
+            <a:schemeClr val="dk1"/>
+          </a:fontRef>
+        </p:style>
+        <p:txBody>
+          <a:bodyPr rtlCol="0" anchor="ctr"/>
+          <a:lstStyle/>
+          <a:p>
+            <a:pPr algn="ctr"/>
+            <a:endParaRPr lang="en-SG" dirty="0"/>
+          </a:p>
+        </p:txBody>
+      </p:sp>
+      <p:pic>
+        <p:nvPicPr>
+          <p:cNvPr id="67" name="Picture 66">
+            <a:extLst>
+              <a:ext uri="{FF2B5EF4-FFF2-40B4-BE49-F238E27FC236}">
+                <a16:creationId xmlns:a16="http://schemas.microsoft.com/office/drawing/2014/main" id="{102B9E6A-4526-CBFA-A7BC-FB1B01A96CD6}"/>
+              </a:ext>
+            </a:extLst>
+          </p:cNvPr>
+          <p:cNvPicPr>
+            <a:picLocks noChangeAspect="1"/>
+          </p:cNvPicPr>
+          <p:nvPr/>
+        </p:nvPicPr>
+        <p:blipFill>
+          <a:blip r:embed="rId3"/>
+          <a:stretch>
+            <a:fillRect/>
+          </a:stretch>
+        </p:blipFill>
+        <p:spPr>
+          <a:xfrm>
+            <a:off x="9540709" y="3032282"/>
+            <a:ext cx="417996" cy="292597"/>
+          </a:xfrm>
+          <a:prstGeom prst="rect">
+            <a:avLst/>
+          </a:prstGeom>
+        </p:spPr>
+      </p:pic>
+      <p:sp>
+        <p:nvSpPr>
+          <p:cNvPr id="68" name="TextBox 67">
+            <a:extLst>
+              <a:ext uri="{FF2B5EF4-FFF2-40B4-BE49-F238E27FC236}">
+                <a16:creationId xmlns:a16="http://schemas.microsoft.com/office/drawing/2014/main" id="{552C6C9D-346A-834C-3DB1-4417C1C99F38}"/>
               </a:ext>
             </a:extLst>
           </p:cNvPr>
@@ -8207,8 +8820,8 @@
         </p:nvSpPr>
         <p:spPr>
           <a:xfrm>
-            <a:off x="356095" y="3482045"/>
-            <a:ext cx="3687565" cy="307777"/>
+            <a:off x="9994949" y="3621443"/>
+            <a:ext cx="1420312" cy="461665"/>
           </a:xfrm>
           <a:prstGeom prst="rect">
             <a:avLst/>
@@ -8222,27 +8835,22 @@
           <a:lstStyle/>
           <a:p>
             <a:r>
-              <a:rPr lang="en-US" sz="1400" b="1" dirty="0">
+              <a:rPr lang="en-SG" sz="1200" b="1" dirty="0">
                 <a:solidFill>
-                  <a:srgbClr val="FF0000"/>
+                  <a:srgbClr val="C00000"/>
                 </a:solidFill>
               </a:rPr>
-              <a:t>Exception states : </a:t>
-            </a:r>
-            <a:endParaRPr lang="en-SG" sz="1400" b="1" dirty="0">
-              <a:solidFill>
-                <a:srgbClr val="FF0000"/>
-              </a:solidFill>
-            </a:endParaRPr>
-          </a:p>
-        </p:txBody>
-      </p:sp>
-      <p:sp>
-        <p:nvSpPr>
-          <p:cNvPr id="22" name="TextBox 21">
-            <a:extLst>
-              <a:ext uri="{FF2B5EF4-FFF2-40B4-BE49-F238E27FC236}">
-                <a16:creationId xmlns:a16="http://schemas.microsoft.com/office/drawing/2014/main" id="{B7F51C80-B853-C93F-1000-83D30DC1B7F3}"/>
+              <a:t>Affected PLC and HMI nodes</a:t>
+            </a:r>
+          </a:p>
+        </p:txBody>
+      </p:sp>
+      <p:sp>
+        <p:nvSpPr>
+          <p:cNvPr id="69" name="TextBox 68">
+            <a:extLst>
+              <a:ext uri="{FF2B5EF4-FFF2-40B4-BE49-F238E27FC236}">
+                <a16:creationId xmlns:a16="http://schemas.microsoft.com/office/drawing/2014/main" id="{8D853726-9B82-2305-A320-9D881941F4F1}"/>
               </a:ext>
             </a:extLst>
           </p:cNvPr>
@@ -8251,8 +8859,8 @@
         </p:nvSpPr>
         <p:spPr>
           <a:xfrm>
-            <a:off x="1724902" y="2257335"/>
-            <a:ext cx="2318758" cy="1015663"/>
+            <a:off x="10037344" y="2994305"/>
+            <a:ext cx="1377916" cy="276999"/>
           </a:xfrm>
           <a:prstGeom prst="rect">
             <a:avLst/>
@@ -8266,47 +8874,67 @@
           <a:lstStyle/>
           <a:p>
             <a:r>
-              <a:rPr lang="en-US" sz="1200" dirty="0"/>
-              <a:t>Power: on </a:t>
-            </a:r>
-          </a:p>
-          <a:p>
-            <a:r>
-              <a:rPr lang="en-US" sz="1200" dirty="0"/>
-              <a:t>Throttle: on</a:t>
-            </a:r>
-          </a:p>
-          <a:p>
-            <a:r>
-              <a:rPr lang="en-US" sz="1200" dirty="0"/>
-              <a:t>Break: off </a:t>
-            </a:r>
-          </a:p>
-          <a:p>
-            <a:r>
-              <a:rPr lang="en-US" sz="1200" dirty="0"/>
-              <a:t>Front sensor: no detection</a:t>
-            </a:r>
-          </a:p>
-          <a:p>
-            <a:r>
-              <a:rPr lang="en-US" sz="1200" dirty="0"/>
-              <a:t>Speed sensor: </a:t>
-            </a:r>
-            <a:r>
-              <a:rPr lang="en-US" sz="1200" dirty="0" err="1"/>
-              <a:t>val</a:t>
-            </a:r>
-            <a:endParaRPr lang="en-SG" sz="1200" dirty="0"/>
-          </a:p>
-        </p:txBody>
-      </p:sp>
-      <p:sp>
-        <p:nvSpPr>
-          <p:cNvPr id="23" name="TextBox 22">
-            <a:extLst>
-              <a:ext uri="{FF2B5EF4-FFF2-40B4-BE49-F238E27FC236}">
-                <a16:creationId xmlns:a16="http://schemas.microsoft.com/office/drawing/2014/main" id="{00E3D8E0-BE8F-DE19-9064-A8E27D4E1209}"/>
+              <a:rPr lang="en-SG" sz="1200" b="1" dirty="0">
+                <a:solidFill>
+                  <a:srgbClr val="C00000"/>
+                </a:solidFill>
+              </a:rPr>
+              <a:t>Packet Dropper </a:t>
+            </a:r>
+          </a:p>
+        </p:txBody>
+      </p:sp>
+      <p:cxnSp>
+        <p:nvCxnSpPr>
+          <p:cNvPr id="70" name="Straight Arrow Connector 69">
+            <a:extLst>
+              <a:ext uri="{FF2B5EF4-FFF2-40B4-BE49-F238E27FC236}">
+                <a16:creationId xmlns:a16="http://schemas.microsoft.com/office/drawing/2014/main" id="{05B2B293-C249-0843-9A9C-55E597DA93A7}"/>
+              </a:ext>
+            </a:extLst>
+          </p:cNvPr>
+          <p:cNvCxnSpPr>
+            <a:cxnSpLocks/>
+          </p:cNvCxnSpPr>
+          <p:nvPr/>
+        </p:nvCxnSpPr>
+        <p:spPr>
+          <a:xfrm flipV="1">
+            <a:off x="9549345" y="2656770"/>
+            <a:ext cx="466996" cy="2954"/>
+          </a:xfrm>
+          <a:prstGeom prst="straightConnector1">
+            <a:avLst/>
+          </a:prstGeom>
+          <a:ln w="28575">
+            <a:solidFill>
+              <a:srgbClr val="FF0000"/>
+            </a:solidFill>
+            <a:prstDash val="sysDash"/>
+            <a:tailEnd type="triangle"/>
+          </a:ln>
+        </p:spPr>
+        <p:style>
+          <a:lnRef idx="1">
+            <a:schemeClr val="accent1"/>
+          </a:lnRef>
+          <a:fillRef idx="0">
+            <a:schemeClr val="accent1"/>
+          </a:fillRef>
+          <a:effectRef idx="0">
+            <a:schemeClr val="accent1"/>
+          </a:effectRef>
+          <a:fontRef idx="minor">
+            <a:schemeClr val="tx1"/>
+          </a:fontRef>
+        </p:style>
+      </p:cxnSp>
+      <p:sp>
+        <p:nvSpPr>
+          <p:cNvPr id="71" name="TextBox 70">
+            <a:extLst>
+              <a:ext uri="{FF2B5EF4-FFF2-40B4-BE49-F238E27FC236}">
+                <a16:creationId xmlns:a16="http://schemas.microsoft.com/office/drawing/2014/main" id="{FF1DE929-D96F-3A76-DF19-E1FE02BF6AF3}"/>
               </a:ext>
             </a:extLst>
           </p:cNvPr>
@@ -8315,8 +8943,8 @@
         </p:nvSpPr>
         <p:spPr>
           <a:xfrm>
-            <a:off x="6584553" y="2043654"/>
-            <a:ext cx="1765252" cy="1015663"/>
+            <a:off x="10016341" y="2448431"/>
+            <a:ext cx="1335133" cy="461665"/>
           </a:xfrm>
           <a:prstGeom prst="rect">
             <a:avLst/>
@@ -8330,43 +8958,67 @@
           <a:lstStyle/>
           <a:p>
             <a:r>
-              <a:rPr lang="en-US" sz="1200" dirty="0"/>
-              <a:t>Power: on </a:t>
-            </a:r>
-          </a:p>
-          <a:p>
-            <a:r>
-              <a:rPr lang="en-US" sz="1200" dirty="0"/>
-              <a:t>Throttle: Neutral </a:t>
-            </a:r>
-          </a:p>
-          <a:p>
-            <a:r>
-              <a:rPr lang="en-US" sz="1200" dirty="0"/>
-              <a:t>Break: on </a:t>
-            </a:r>
-          </a:p>
-          <a:p>
-            <a:r>
-              <a:rPr lang="en-US" sz="1200" dirty="0"/>
-              <a:t>Front sensor: detected</a:t>
-            </a:r>
-          </a:p>
-          <a:p>
-            <a:r>
-              <a:rPr lang="en-US" sz="1200" dirty="0"/>
-              <a:t>Speed sensor: 0 </a:t>
-            </a:r>
-            <a:endParaRPr lang="en-SG" sz="1200" dirty="0"/>
-          </a:p>
-        </p:txBody>
-      </p:sp>
-      <p:sp>
-        <p:nvSpPr>
-          <p:cNvPr id="24" name="TextBox 23">
-            <a:extLst>
-              <a:ext uri="{FF2B5EF4-FFF2-40B4-BE49-F238E27FC236}">
-                <a16:creationId xmlns:a16="http://schemas.microsoft.com/office/drawing/2014/main" id="{CFFA1989-0D5A-B4C7-6A72-A352D8A1F98E}"/>
+              <a:rPr lang="en-SG" sz="1200" b="1" dirty="0">
+                <a:solidFill>
+                  <a:srgbClr val="C00000"/>
+                </a:solidFill>
+              </a:rPr>
+              <a:t>ARP Spoofing attack broadcast </a:t>
+            </a:r>
+          </a:p>
+        </p:txBody>
+      </p:sp>
+      <p:cxnSp>
+        <p:nvCxnSpPr>
+          <p:cNvPr id="72" name="Straight Arrow Connector 71">
+            <a:extLst>
+              <a:ext uri="{FF2B5EF4-FFF2-40B4-BE49-F238E27FC236}">
+                <a16:creationId xmlns:a16="http://schemas.microsoft.com/office/drawing/2014/main" id="{8DD16E1B-1D99-FACE-A9F8-3E43DC1FA607}"/>
+              </a:ext>
+            </a:extLst>
+          </p:cNvPr>
+          <p:cNvCxnSpPr>
+            <a:cxnSpLocks/>
+          </p:cNvCxnSpPr>
+          <p:nvPr/>
+        </p:nvCxnSpPr>
+        <p:spPr>
+          <a:xfrm flipH="1">
+            <a:off x="9540709" y="2158970"/>
+            <a:ext cx="439479" cy="0"/>
+          </a:xfrm>
+          <a:prstGeom prst="straightConnector1">
+            <a:avLst/>
+          </a:prstGeom>
+          <a:ln w="19050">
+            <a:solidFill>
+              <a:srgbClr val="FF0000"/>
+            </a:solidFill>
+            <a:headEnd type="triangle"/>
+            <a:tailEnd type="triangle"/>
+          </a:ln>
+        </p:spPr>
+        <p:style>
+          <a:lnRef idx="1">
+            <a:schemeClr val="accent1"/>
+          </a:lnRef>
+          <a:fillRef idx="0">
+            <a:schemeClr val="accent1"/>
+          </a:fillRef>
+          <a:effectRef idx="0">
+            <a:schemeClr val="accent1"/>
+          </a:effectRef>
+          <a:fontRef idx="minor">
+            <a:schemeClr val="tx1"/>
+          </a:fontRef>
+        </p:style>
+      </p:cxnSp>
+      <p:sp>
+        <p:nvSpPr>
+          <p:cNvPr id="74" name="TextBox 73">
+            <a:extLst>
+              <a:ext uri="{FF2B5EF4-FFF2-40B4-BE49-F238E27FC236}">
+                <a16:creationId xmlns:a16="http://schemas.microsoft.com/office/drawing/2014/main" id="{87938CA2-7535-0791-CD31-0843EB348A97}"/>
               </a:ext>
             </a:extLst>
           </p:cNvPr>
@@ -8375,8 +9027,8 @@
         </p:nvSpPr>
         <p:spPr>
           <a:xfrm>
-            <a:off x="2024409" y="4014744"/>
-            <a:ext cx="2722929" cy="1015663"/>
+            <a:off x="9980188" y="1949599"/>
+            <a:ext cx="1435073" cy="461665"/>
           </a:xfrm>
           <a:prstGeom prst="rect">
             <a:avLst/>
@@ -8390,36 +9042,383 @@
           <a:lstStyle/>
           <a:p>
             <a:r>
-              <a:rPr lang="en-US" sz="1200" dirty="0"/>
-              <a:t>Power: off </a:t>
-            </a:r>
-          </a:p>
-          <a:p>
-            <a:r>
-              <a:rPr lang="en-US" sz="1200" dirty="0"/>
-              <a:t>Throttle: Neutral / On </a:t>
-            </a:r>
-          </a:p>
-          <a:p>
-            <a:r>
-              <a:rPr lang="en-US" sz="1200" dirty="0"/>
-              <a:t>Break: On/Off</a:t>
-            </a:r>
-          </a:p>
-          <a:p>
-            <a:r>
-              <a:rPr lang="en-US" sz="1200" dirty="0"/>
-              <a:t>Front sensor: detected </a:t>
-            </a:r>
-            <a:r>
-              <a:rPr lang="en-SG" sz="1200" dirty="0"/>
-              <a:t>/ no detection</a:t>
-            </a:r>
-          </a:p>
-          <a:p>
-            <a:r>
-              <a:rPr lang="en-SG" sz="1200" dirty="0"/>
-              <a:t>Speed sensor:0</a:t>
+              <a:rPr lang="en-US" sz="1200" b="1" dirty="0">
+                <a:solidFill>
+                  <a:srgbClr val="C00000"/>
+                </a:solidFill>
+              </a:rPr>
+              <a:t>Data flow between C2</a:t>
+            </a:r>
+            <a:endParaRPr lang="en-SG" sz="1200" b="1" dirty="0">
+              <a:solidFill>
+                <a:srgbClr val="C00000"/>
+              </a:solidFill>
+            </a:endParaRPr>
+          </a:p>
+        </p:txBody>
+      </p:sp>
+      <p:cxnSp>
+        <p:nvCxnSpPr>
+          <p:cNvPr id="11" name="Straight Arrow Connector 10">
+            <a:extLst>
+              <a:ext uri="{FF2B5EF4-FFF2-40B4-BE49-F238E27FC236}">
+                <a16:creationId xmlns:a16="http://schemas.microsoft.com/office/drawing/2014/main" id="{F023A05F-F361-CC8E-5139-3E45F4F2E339}"/>
+              </a:ext>
+            </a:extLst>
+          </p:cNvPr>
+          <p:cNvCxnSpPr>
+            <a:cxnSpLocks/>
+          </p:cNvCxnSpPr>
+          <p:nvPr/>
+        </p:nvCxnSpPr>
+        <p:spPr>
+          <a:xfrm>
+            <a:off x="3021768" y="2710551"/>
+            <a:ext cx="0" cy="233588"/>
+          </a:xfrm>
+          <a:prstGeom prst="straightConnector1">
+            <a:avLst/>
+          </a:prstGeom>
+          <a:ln w="28575">
+            <a:solidFill>
+              <a:srgbClr val="FF0000"/>
+            </a:solidFill>
+            <a:prstDash val="sysDash"/>
+            <a:tailEnd type="triangle"/>
+          </a:ln>
+        </p:spPr>
+        <p:style>
+          <a:lnRef idx="1">
+            <a:schemeClr val="accent1"/>
+          </a:lnRef>
+          <a:fillRef idx="0">
+            <a:schemeClr val="accent1"/>
+          </a:fillRef>
+          <a:effectRef idx="0">
+            <a:schemeClr val="accent1"/>
+          </a:effectRef>
+          <a:fontRef idx="minor">
+            <a:schemeClr val="tx1"/>
+          </a:fontRef>
+        </p:style>
+      </p:cxnSp>
+      <p:sp>
+        <p:nvSpPr>
+          <p:cNvPr id="14" name="Rectangle 13">
+            <a:extLst>
+              <a:ext uri="{FF2B5EF4-FFF2-40B4-BE49-F238E27FC236}">
+                <a16:creationId xmlns:a16="http://schemas.microsoft.com/office/drawing/2014/main" id="{865DA128-2656-C574-3877-8857EF0548E6}"/>
+              </a:ext>
+            </a:extLst>
+          </p:cNvPr>
+          <p:cNvSpPr/>
+          <p:nvPr/>
+        </p:nvSpPr>
+        <p:spPr>
+          <a:xfrm>
+            <a:off x="2526598" y="2944139"/>
+            <a:ext cx="990341" cy="1455001"/>
+          </a:xfrm>
+          <a:prstGeom prst="rect">
+            <a:avLst/>
+          </a:prstGeom>
+          <a:noFill/>
+          <a:ln w="19050" cap="flat" cmpd="sng" algn="ctr">
+            <a:solidFill>
+              <a:srgbClr val="FF0000"/>
+            </a:solidFill>
+            <a:prstDash val="sysDash"/>
+            <a:round/>
+            <a:headEnd type="none" w="med" len="med"/>
+            <a:tailEnd type="none" w="med" len="med"/>
+          </a:ln>
+        </p:spPr>
+        <p:style>
+          <a:lnRef idx="0">
+            <a:scrgbClr r="0" g="0" b="0"/>
+          </a:lnRef>
+          <a:fillRef idx="0">
+            <a:scrgbClr r="0" g="0" b="0"/>
+          </a:fillRef>
+          <a:effectRef idx="0">
+            <a:scrgbClr r="0" g="0" b="0"/>
+          </a:effectRef>
+          <a:fontRef idx="minor">
+            <a:schemeClr val="dk1"/>
+          </a:fontRef>
+        </p:style>
+        <p:txBody>
+          <a:bodyPr rtlCol="0" anchor="ctr"/>
+          <a:lstStyle/>
+          <a:p>
+            <a:pPr algn="ctr"/>
+            <a:endParaRPr lang="en-SG" dirty="0"/>
+          </a:p>
+        </p:txBody>
+      </p:sp>
+      <p:cxnSp>
+        <p:nvCxnSpPr>
+          <p:cNvPr id="24" name="Straight Arrow Connector 23">
+            <a:extLst>
+              <a:ext uri="{FF2B5EF4-FFF2-40B4-BE49-F238E27FC236}">
+                <a16:creationId xmlns:a16="http://schemas.microsoft.com/office/drawing/2014/main" id="{FBB80CAC-01CF-BF44-790D-06167A7905E8}"/>
+              </a:ext>
+            </a:extLst>
+          </p:cNvPr>
+          <p:cNvCxnSpPr>
+            <a:cxnSpLocks/>
+          </p:cNvCxnSpPr>
+          <p:nvPr/>
+        </p:nvCxnSpPr>
+        <p:spPr>
+          <a:xfrm>
+            <a:off x="4816593" y="2390636"/>
+            <a:ext cx="340075" cy="0"/>
+          </a:xfrm>
+          <a:prstGeom prst="straightConnector1">
+            <a:avLst/>
+          </a:prstGeom>
+          <a:ln w="28575">
+            <a:solidFill>
+              <a:srgbClr val="FF0000"/>
+            </a:solidFill>
+            <a:prstDash val="sysDash"/>
+            <a:tailEnd type="triangle"/>
+          </a:ln>
+        </p:spPr>
+        <p:style>
+          <a:lnRef idx="1">
+            <a:schemeClr val="accent1"/>
+          </a:lnRef>
+          <a:fillRef idx="0">
+            <a:schemeClr val="accent1"/>
+          </a:fillRef>
+          <a:effectRef idx="0">
+            <a:schemeClr val="accent1"/>
+          </a:effectRef>
+          <a:fontRef idx="minor">
+            <a:schemeClr val="tx1"/>
+          </a:fontRef>
+        </p:style>
+      </p:cxnSp>
+      <p:sp>
+        <p:nvSpPr>
+          <p:cNvPr id="29" name="Rectangle 28">
+            <a:extLst>
+              <a:ext uri="{FF2B5EF4-FFF2-40B4-BE49-F238E27FC236}">
+                <a16:creationId xmlns:a16="http://schemas.microsoft.com/office/drawing/2014/main" id="{A9BE2DBC-A40F-2F02-6207-E4BA546ACBF7}"/>
+              </a:ext>
+            </a:extLst>
+          </p:cNvPr>
+          <p:cNvSpPr/>
+          <p:nvPr/>
+        </p:nvSpPr>
+        <p:spPr>
+          <a:xfrm>
+            <a:off x="5176251" y="2099949"/>
+            <a:ext cx="681379" cy="541734"/>
+          </a:xfrm>
+          <a:prstGeom prst="rect">
+            <a:avLst/>
+          </a:prstGeom>
+          <a:noFill/>
+          <a:ln w="19050" cap="flat" cmpd="sng" algn="ctr">
+            <a:solidFill>
+              <a:srgbClr val="FF0000"/>
+            </a:solidFill>
+            <a:prstDash val="sysDash"/>
+            <a:round/>
+            <a:headEnd type="none" w="med" len="med"/>
+            <a:tailEnd type="none" w="med" len="med"/>
+          </a:ln>
+        </p:spPr>
+        <p:style>
+          <a:lnRef idx="0">
+            <a:scrgbClr r="0" g="0" b="0"/>
+          </a:lnRef>
+          <a:fillRef idx="0">
+            <a:scrgbClr r="0" g="0" b="0"/>
+          </a:fillRef>
+          <a:effectRef idx="0">
+            <a:scrgbClr r="0" g="0" b="0"/>
+          </a:effectRef>
+          <a:fontRef idx="minor">
+            <a:schemeClr val="dk1"/>
+          </a:fontRef>
+        </p:style>
+        <p:txBody>
+          <a:bodyPr rtlCol="0" anchor="ctr"/>
+          <a:lstStyle/>
+          <a:p>
+            <a:pPr algn="ctr"/>
+            <a:endParaRPr lang="en-SG" dirty="0"/>
+          </a:p>
+        </p:txBody>
+      </p:sp>
+      <p:sp>
+        <p:nvSpPr>
+          <p:cNvPr id="32" name="Arrow: Down 31">
+            <a:extLst>
+              <a:ext uri="{FF2B5EF4-FFF2-40B4-BE49-F238E27FC236}">
+                <a16:creationId xmlns:a16="http://schemas.microsoft.com/office/drawing/2014/main" id="{D474703E-896C-A5A1-622E-B200524EAB88}"/>
+              </a:ext>
+            </a:extLst>
+          </p:cNvPr>
+          <p:cNvSpPr/>
+          <p:nvPr/>
+        </p:nvSpPr>
+        <p:spPr>
+          <a:xfrm rot="17706813" flipH="1">
+            <a:off x="4651583" y="3298571"/>
+            <a:ext cx="120532" cy="2632921"/>
+          </a:xfrm>
+          <a:prstGeom prst="downArrow">
+            <a:avLst/>
+          </a:prstGeom>
+          <a:solidFill>
+            <a:srgbClr val="FF0000"/>
+          </a:solidFill>
+        </p:spPr>
+        <p:style>
+          <a:lnRef idx="2">
+            <a:schemeClr val="accent2">
+              <a:shade val="15000"/>
+            </a:schemeClr>
+          </a:lnRef>
+          <a:fillRef idx="1">
+            <a:schemeClr val="accent2"/>
+          </a:fillRef>
+          <a:effectRef idx="0">
+            <a:schemeClr val="accent2"/>
+          </a:effectRef>
+          <a:fontRef idx="minor">
+            <a:schemeClr val="lt1"/>
+          </a:fontRef>
+        </p:style>
+        <p:txBody>
+          <a:bodyPr rtlCol="0" anchor="ctr"/>
+          <a:lstStyle/>
+          <a:p>
+            <a:pPr algn="ctr"/>
+            <a:endParaRPr lang="en-SG"/>
+          </a:p>
+        </p:txBody>
+      </p:sp>
+      <p:pic>
+        <p:nvPicPr>
+          <p:cNvPr id="33" name="Picture 32" descr="A screenshot of a computer&#10;&#10;Description automatically generated">
+            <a:extLst>
+              <a:ext uri="{FF2B5EF4-FFF2-40B4-BE49-F238E27FC236}">
+                <a16:creationId xmlns:a16="http://schemas.microsoft.com/office/drawing/2014/main" id="{92AAB52A-BB43-CAD2-C5F0-CE4AB43A88DF}"/>
+              </a:ext>
+            </a:extLst>
+          </p:cNvPr>
+          <p:cNvPicPr>
+            <a:picLocks noChangeAspect="1"/>
+          </p:cNvPicPr>
+          <p:nvPr/>
+        </p:nvPicPr>
+        <p:blipFill rotWithShape="1">
+          <a:blip r:embed="rId7">
+            <a:extLst>
+              <a:ext uri="{28A0092B-C50C-407E-A947-70E740481C1C}">
+                <a14:useLocalDpi xmlns:a14="http://schemas.microsoft.com/office/drawing/2010/main" val="0"/>
+              </a:ext>
+            </a:extLst>
+          </a:blip>
+          <a:srcRect r="50000"/>
+          <a:stretch/>
+        </p:blipFill>
+        <p:spPr>
+          <a:xfrm>
+            <a:off x="6005931" y="4712910"/>
+            <a:ext cx="5504444" cy="876085"/>
+          </a:xfrm>
+          <a:prstGeom prst="rect">
+            <a:avLst/>
+          </a:prstGeom>
+          <a:ln w="3175">
+            <a:solidFill>
+              <a:schemeClr val="tx1"/>
+            </a:solidFill>
+          </a:ln>
+        </p:spPr>
+      </p:pic>
+      <p:pic>
+        <p:nvPicPr>
+          <p:cNvPr id="34" name="Picture 33" descr="A screenshot of a computer&#10;&#10;Description automatically generated">
+            <a:extLst>
+              <a:ext uri="{FF2B5EF4-FFF2-40B4-BE49-F238E27FC236}">
+                <a16:creationId xmlns:a16="http://schemas.microsoft.com/office/drawing/2014/main" id="{EC3078FD-E611-17DF-2C1F-AEA1E638570B}"/>
+              </a:ext>
+            </a:extLst>
+          </p:cNvPr>
+          <p:cNvPicPr>
+            <a:picLocks noChangeAspect="1"/>
+          </p:cNvPicPr>
+          <p:nvPr/>
+        </p:nvPicPr>
+        <p:blipFill rotWithShape="1">
+          <a:blip r:embed="rId7">
+            <a:extLst>
+              <a:ext uri="{28A0092B-C50C-407E-A947-70E740481C1C}">
+                <a14:useLocalDpi xmlns:a14="http://schemas.microsoft.com/office/drawing/2010/main" val="0"/>
+              </a:ext>
+            </a:extLst>
+          </a:blip>
+          <a:srcRect l="49607"/>
+          <a:stretch/>
+        </p:blipFill>
+        <p:spPr>
+          <a:xfrm>
+            <a:off x="6005929" y="5662314"/>
+            <a:ext cx="5504444" cy="876085"/>
+          </a:xfrm>
+          <a:prstGeom prst="rect">
+            <a:avLst/>
+          </a:prstGeom>
+          <a:ln w="3175">
+            <a:solidFill>
+              <a:schemeClr val="tx1"/>
+            </a:solidFill>
+          </a:ln>
+        </p:spPr>
+      </p:pic>
+      <p:sp>
+        <p:nvSpPr>
+          <p:cNvPr id="36" name="TextBox 35">
+            <a:extLst>
+              <a:ext uri="{FF2B5EF4-FFF2-40B4-BE49-F238E27FC236}">
+                <a16:creationId xmlns:a16="http://schemas.microsoft.com/office/drawing/2014/main" id="{2BC33706-561F-19C7-3E31-5710EDD82BED}"/>
+              </a:ext>
+            </a:extLst>
+          </p:cNvPr>
+          <p:cNvSpPr txBox="1"/>
+          <p:nvPr/>
+        </p:nvSpPr>
+        <p:spPr>
+          <a:xfrm>
+            <a:off x="5951900" y="4435911"/>
+            <a:ext cx="2035848" cy="276999"/>
+          </a:xfrm>
+          <a:prstGeom prst="rect">
+            <a:avLst/>
+          </a:prstGeom>
+          <a:noFill/>
+        </p:spPr>
+        <p:txBody>
+          <a:bodyPr wrap="square" rtlCol="0">
+            <a:spAutoFit/>
+          </a:bodyPr>
+          <a:lstStyle/>
+          <a:p>
+            <a:r>
+              <a:rPr lang="en-SG" sz="1200" b="1" dirty="0">
+                <a:solidFill>
+                  <a:srgbClr val="C00000"/>
+                </a:solidFill>
+              </a:rPr>
+              <a:t>All PLC lose connection </a:t>
             </a:r>
           </a:p>
         </p:txBody>
@@ -8427,7 +9426,7 @@
     </p:spTree>
     <p:extLst>
       <p:ext uri="{BB962C8B-B14F-4D97-AF65-F5344CB8AC3E}">
-        <p14:creationId xmlns:p14="http://schemas.microsoft.com/office/powerpoint/2010/main" val="3691481060"/>
+        <p14:creationId xmlns:p14="http://schemas.microsoft.com/office/powerpoint/2010/main" val="4285784019"/>
       </p:ext>
     </p:extLst>
   </p:cSld>
@@ -8454,6 +9453,563 @@
           <a:chExt cx="0" cy="0"/>
         </a:xfrm>
       </p:grpSpPr>
+      <p:sp>
+        <p:nvSpPr>
+          <p:cNvPr id="14" name="TextBox 13">
+            <a:extLst>
+              <a:ext uri="{FF2B5EF4-FFF2-40B4-BE49-F238E27FC236}">
+                <a16:creationId xmlns:a16="http://schemas.microsoft.com/office/drawing/2014/main" id="{BD6C4BB7-B7B5-A27A-D455-08D15EA10CEE}"/>
+              </a:ext>
+            </a:extLst>
+          </p:cNvPr>
+          <p:cNvSpPr txBox="1"/>
+          <p:nvPr/>
+        </p:nvSpPr>
+        <p:spPr>
+          <a:xfrm>
+            <a:off x="356095" y="3736620"/>
+            <a:ext cx="7993710" cy="307777"/>
+          </a:xfrm>
+          <a:prstGeom prst="rect">
+            <a:avLst/>
+          </a:prstGeom>
+          <a:noFill/>
+        </p:spPr>
+        <p:txBody>
+          <a:bodyPr wrap="square" rtlCol="0">
+            <a:spAutoFit/>
+          </a:bodyPr>
+          <a:lstStyle/>
+          <a:p>
+            <a:r>
+              <a:rPr lang="en-US" sz="1400" b="1" dirty="0">
+                <a:solidFill>
+                  <a:srgbClr val="FF0000"/>
+                </a:solidFill>
+              </a:rPr>
+              <a:t>Operation Scenario 1(Red) </a:t>
+            </a:r>
+            <a:r>
+              <a:rPr lang="en-US" sz="1400" b="1" dirty="0">
+                <a:solidFill>
+                  <a:srgbClr val="C00000"/>
+                </a:solidFill>
+              </a:rPr>
+              <a:t>: </a:t>
+            </a:r>
+            <a:r>
+              <a:rPr lang="en-US" sz="1400" b="1" dirty="0"/>
+              <a:t>Train power off, Train speed is 0 km/ h, Train emergency stopped or accident </a:t>
+            </a:r>
+            <a:endParaRPr lang="en-SG" sz="1400" b="1" dirty="0"/>
+          </a:p>
+        </p:txBody>
+      </p:sp>
+      <p:pic>
+        <p:nvPicPr>
+          <p:cNvPr id="15" name="Picture 14" descr="A red and green rectangles with a green arrow&#10;&#10;Description automatically generated">
+            <a:extLst>
+              <a:ext uri="{FF2B5EF4-FFF2-40B4-BE49-F238E27FC236}">
+                <a16:creationId xmlns:a16="http://schemas.microsoft.com/office/drawing/2014/main" id="{47BD6986-1D65-0EEF-E9C0-82653AEE398C}"/>
+              </a:ext>
+            </a:extLst>
+          </p:cNvPr>
+          <p:cNvPicPr>
+            <a:picLocks noChangeAspect="1"/>
+          </p:cNvPicPr>
+          <p:nvPr/>
+        </p:nvPicPr>
+        <p:blipFill>
+          <a:blip r:embed="rId2">
+            <a:extLst>
+              <a:ext uri="{28A0092B-C50C-407E-A947-70E740481C1C}">
+                <a14:useLocalDpi xmlns:a14="http://schemas.microsoft.com/office/drawing/2010/main" val="0"/>
+              </a:ext>
+            </a:extLst>
+          </a:blip>
+          <a:stretch>
+            <a:fillRect/>
+          </a:stretch>
+        </p:blipFill>
+        <p:spPr>
+          <a:xfrm>
+            <a:off x="460465" y="4139100"/>
+            <a:ext cx="1476190" cy="628571"/>
+          </a:xfrm>
+          <a:prstGeom prst="rect">
+            <a:avLst/>
+          </a:prstGeom>
+        </p:spPr>
+      </p:pic>
+      <p:pic>
+        <p:nvPicPr>
+          <p:cNvPr id="16" name="Picture 15" descr="A computer screen shot of a diagram&#10;&#10;Description automatically generated">
+            <a:extLst>
+              <a:ext uri="{FF2B5EF4-FFF2-40B4-BE49-F238E27FC236}">
+                <a16:creationId xmlns:a16="http://schemas.microsoft.com/office/drawing/2014/main" id="{4CA30A83-3924-A836-A4B2-97261497F521}"/>
+              </a:ext>
+            </a:extLst>
+          </p:cNvPr>
+          <p:cNvPicPr>
+            <a:picLocks noChangeAspect="1"/>
+          </p:cNvPicPr>
+          <p:nvPr/>
+        </p:nvPicPr>
+        <p:blipFill>
+          <a:blip r:embed="rId3">
+            <a:extLst>
+              <a:ext uri="{28A0092B-C50C-407E-A947-70E740481C1C}">
+                <a14:useLocalDpi xmlns:a14="http://schemas.microsoft.com/office/drawing/2010/main" val="0"/>
+              </a:ext>
+            </a:extLst>
+          </a:blip>
+          <a:stretch>
+            <a:fillRect/>
+          </a:stretch>
+        </p:blipFill>
+        <p:spPr>
+          <a:xfrm>
+            <a:off x="4747338" y="2099104"/>
+            <a:ext cx="1676190" cy="904762"/>
+          </a:xfrm>
+          <a:prstGeom prst="rect">
+            <a:avLst/>
+          </a:prstGeom>
+        </p:spPr>
+      </p:pic>
+      <p:sp>
+        <p:nvSpPr>
+          <p:cNvPr id="17" name="TextBox 16">
+            <a:extLst>
+              <a:ext uri="{FF2B5EF4-FFF2-40B4-BE49-F238E27FC236}">
+                <a16:creationId xmlns:a16="http://schemas.microsoft.com/office/drawing/2014/main" id="{A9348CFA-1BFC-1BE6-DFD3-74AD01BD1B14}"/>
+              </a:ext>
+            </a:extLst>
+          </p:cNvPr>
+          <p:cNvSpPr txBox="1"/>
+          <p:nvPr/>
+        </p:nvSpPr>
+        <p:spPr>
+          <a:xfrm>
+            <a:off x="4541100" y="1516197"/>
+            <a:ext cx="3966882" cy="523220"/>
+          </a:xfrm>
+          <a:prstGeom prst="rect">
+            <a:avLst/>
+          </a:prstGeom>
+          <a:noFill/>
+        </p:spPr>
+        <p:txBody>
+          <a:bodyPr wrap="square" rtlCol="0">
+            <a:spAutoFit/>
+          </a:bodyPr>
+          <a:lstStyle/>
+          <a:p>
+            <a:r>
+              <a:rPr lang="en-US" sz="1400" b="1" dirty="0">
+                <a:solidFill>
+                  <a:schemeClr val="accent2">
+                    <a:lumMod val="75000"/>
+                  </a:schemeClr>
+                </a:solidFill>
+              </a:rPr>
+              <a:t>Normal Operation Scenario 2(Orange) : </a:t>
+            </a:r>
+            <a:r>
+              <a:rPr lang="en-US" sz="1400" b="1" dirty="0"/>
+              <a:t>Train power on , Train speed is low (0 km/ h – 20km/h)</a:t>
+            </a:r>
+            <a:endParaRPr lang="en-SG" sz="1400" b="1" dirty="0"/>
+          </a:p>
+        </p:txBody>
+      </p:sp>
+      <p:pic>
+        <p:nvPicPr>
+          <p:cNvPr id="18" name="Picture 17" descr="A green squares with black lines&#10;&#10;Description automatically generated">
+            <a:extLst>
+              <a:ext uri="{FF2B5EF4-FFF2-40B4-BE49-F238E27FC236}">
+                <a16:creationId xmlns:a16="http://schemas.microsoft.com/office/drawing/2014/main" id="{931B59C4-DBA7-6A83-664C-92442D986A70}"/>
+              </a:ext>
+            </a:extLst>
+          </p:cNvPr>
+          <p:cNvPicPr>
+            <a:picLocks noChangeAspect="1"/>
+          </p:cNvPicPr>
+          <p:nvPr/>
+        </p:nvPicPr>
+        <p:blipFill>
+          <a:blip r:embed="rId4">
+            <a:extLst>
+              <a:ext uri="{28A0092B-C50C-407E-A947-70E740481C1C}">
+                <a14:useLocalDpi xmlns:a14="http://schemas.microsoft.com/office/drawing/2010/main" val="0"/>
+              </a:ext>
+            </a:extLst>
+          </a:blip>
+          <a:stretch>
+            <a:fillRect/>
+          </a:stretch>
+        </p:blipFill>
+        <p:spPr>
+          <a:xfrm>
+            <a:off x="533716" y="2435191"/>
+            <a:ext cx="995158" cy="584783"/>
+          </a:xfrm>
+          <a:prstGeom prst="rect">
+            <a:avLst/>
+          </a:prstGeom>
+        </p:spPr>
+      </p:pic>
+      <p:sp>
+        <p:nvSpPr>
+          <p:cNvPr id="19" name="TextBox 18">
+            <a:extLst>
+              <a:ext uri="{FF2B5EF4-FFF2-40B4-BE49-F238E27FC236}">
+                <a16:creationId xmlns:a16="http://schemas.microsoft.com/office/drawing/2014/main" id="{8C2E4839-F8AB-3731-0308-337EC75ED695}"/>
+              </a:ext>
+            </a:extLst>
+          </p:cNvPr>
+          <p:cNvSpPr txBox="1"/>
+          <p:nvPr/>
+        </p:nvSpPr>
+        <p:spPr>
+          <a:xfrm>
+            <a:off x="306318" y="1777807"/>
+            <a:ext cx="4038754" cy="523220"/>
+          </a:xfrm>
+          <a:prstGeom prst="rect">
+            <a:avLst/>
+          </a:prstGeom>
+          <a:noFill/>
+        </p:spPr>
+        <p:txBody>
+          <a:bodyPr wrap="square" rtlCol="0">
+            <a:spAutoFit/>
+          </a:bodyPr>
+          <a:lstStyle/>
+          <a:p>
+            <a:r>
+              <a:rPr lang="en-US" sz="1400" b="1" dirty="0">
+                <a:solidFill>
+                  <a:schemeClr val="accent6">
+                    <a:lumMod val="75000"/>
+                  </a:schemeClr>
+                </a:solidFill>
+              </a:rPr>
+              <a:t>Normal Operation Scenario 1 (Green) </a:t>
+            </a:r>
+            <a:r>
+              <a:rPr lang="en-US" sz="1400" b="1" dirty="0"/>
+              <a:t>: Train power on , Train speed is normal (56 km/ h – 90 km/ h)</a:t>
+            </a:r>
+            <a:endParaRPr lang="en-SG" sz="1400" b="1" dirty="0"/>
+          </a:p>
+        </p:txBody>
+      </p:sp>
+      <p:sp>
+        <p:nvSpPr>
+          <p:cNvPr id="20" name="TextBox 19">
+            <a:extLst>
+              <a:ext uri="{FF2B5EF4-FFF2-40B4-BE49-F238E27FC236}">
+                <a16:creationId xmlns:a16="http://schemas.microsoft.com/office/drawing/2014/main" id="{D0E687E0-ED8C-6756-75CF-E1FF24EC13E2}"/>
+              </a:ext>
+            </a:extLst>
+          </p:cNvPr>
+          <p:cNvSpPr txBox="1"/>
+          <p:nvPr/>
+        </p:nvSpPr>
+        <p:spPr>
+          <a:xfrm>
+            <a:off x="306317" y="1471379"/>
+            <a:ext cx="3687565" cy="307777"/>
+          </a:xfrm>
+          <a:prstGeom prst="rect">
+            <a:avLst/>
+          </a:prstGeom>
+          <a:noFill/>
+        </p:spPr>
+        <p:txBody>
+          <a:bodyPr wrap="square" rtlCol="0">
+            <a:spAutoFit/>
+          </a:bodyPr>
+          <a:lstStyle/>
+          <a:p>
+            <a:r>
+              <a:rPr lang="en-US" sz="1400" b="1" dirty="0">
+                <a:solidFill>
+                  <a:schemeClr val="tx2"/>
+                </a:solidFill>
+              </a:rPr>
+              <a:t>Normal states : </a:t>
+            </a:r>
+            <a:endParaRPr lang="en-SG" sz="1400" b="1" dirty="0">
+              <a:solidFill>
+                <a:schemeClr val="tx2"/>
+              </a:solidFill>
+            </a:endParaRPr>
+          </a:p>
+        </p:txBody>
+      </p:sp>
+      <p:sp>
+        <p:nvSpPr>
+          <p:cNvPr id="21" name="TextBox 20">
+            <a:extLst>
+              <a:ext uri="{FF2B5EF4-FFF2-40B4-BE49-F238E27FC236}">
+                <a16:creationId xmlns:a16="http://schemas.microsoft.com/office/drawing/2014/main" id="{258543FF-6497-320F-EBE3-9EE982AA5F35}"/>
+              </a:ext>
+            </a:extLst>
+          </p:cNvPr>
+          <p:cNvSpPr txBox="1"/>
+          <p:nvPr/>
+        </p:nvSpPr>
+        <p:spPr>
+          <a:xfrm>
+            <a:off x="356095" y="3482045"/>
+            <a:ext cx="3687565" cy="307777"/>
+          </a:xfrm>
+          <a:prstGeom prst="rect">
+            <a:avLst/>
+          </a:prstGeom>
+          <a:noFill/>
+        </p:spPr>
+        <p:txBody>
+          <a:bodyPr wrap="square" rtlCol="0">
+            <a:spAutoFit/>
+          </a:bodyPr>
+          <a:lstStyle/>
+          <a:p>
+            <a:r>
+              <a:rPr lang="en-US" sz="1400" b="1" dirty="0">
+                <a:solidFill>
+                  <a:srgbClr val="FF0000"/>
+                </a:solidFill>
+              </a:rPr>
+              <a:t>Exception states : </a:t>
+            </a:r>
+            <a:endParaRPr lang="en-SG" sz="1400" b="1" dirty="0">
+              <a:solidFill>
+                <a:srgbClr val="FF0000"/>
+              </a:solidFill>
+            </a:endParaRPr>
+          </a:p>
+        </p:txBody>
+      </p:sp>
+      <p:sp>
+        <p:nvSpPr>
+          <p:cNvPr id="22" name="TextBox 21">
+            <a:extLst>
+              <a:ext uri="{FF2B5EF4-FFF2-40B4-BE49-F238E27FC236}">
+                <a16:creationId xmlns:a16="http://schemas.microsoft.com/office/drawing/2014/main" id="{B7F51C80-B853-C93F-1000-83D30DC1B7F3}"/>
+              </a:ext>
+            </a:extLst>
+          </p:cNvPr>
+          <p:cNvSpPr txBox="1"/>
+          <p:nvPr/>
+        </p:nvSpPr>
+        <p:spPr>
+          <a:xfrm>
+            <a:off x="1724902" y="2257335"/>
+            <a:ext cx="2318758" cy="1015663"/>
+          </a:xfrm>
+          <a:prstGeom prst="rect">
+            <a:avLst/>
+          </a:prstGeom>
+          <a:noFill/>
+        </p:spPr>
+        <p:txBody>
+          <a:bodyPr wrap="square" rtlCol="0">
+            <a:spAutoFit/>
+          </a:bodyPr>
+          <a:lstStyle/>
+          <a:p>
+            <a:r>
+              <a:rPr lang="en-US" sz="1200" dirty="0"/>
+              <a:t>Power: on </a:t>
+            </a:r>
+          </a:p>
+          <a:p>
+            <a:r>
+              <a:rPr lang="en-US" sz="1200" dirty="0"/>
+              <a:t>Throttle: on</a:t>
+            </a:r>
+          </a:p>
+          <a:p>
+            <a:r>
+              <a:rPr lang="en-US" sz="1200" dirty="0"/>
+              <a:t>Break: off </a:t>
+            </a:r>
+          </a:p>
+          <a:p>
+            <a:r>
+              <a:rPr lang="en-US" sz="1200" dirty="0"/>
+              <a:t>Front sensor: no detection</a:t>
+            </a:r>
+          </a:p>
+          <a:p>
+            <a:r>
+              <a:rPr lang="en-US" sz="1200" dirty="0"/>
+              <a:t>Speed sensor: </a:t>
+            </a:r>
+            <a:r>
+              <a:rPr lang="en-US" sz="1200" dirty="0" err="1"/>
+              <a:t>val</a:t>
+            </a:r>
+            <a:endParaRPr lang="en-SG" sz="1200" dirty="0"/>
+          </a:p>
+        </p:txBody>
+      </p:sp>
+      <p:sp>
+        <p:nvSpPr>
+          <p:cNvPr id="23" name="TextBox 22">
+            <a:extLst>
+              <a:ext uri="{FF2B5EF4-FFF2-40B4-BE49-F238E27FC236}">
+                <a16:creationId xmlns:a16="http://schemas.microsoft.com/office/drawing/2014/main" id="{00E3D8E0-BE8F-DE19-9064-A8E27D4E1209}"/>
+              </a:ext>
+            </a:extLst>
+          </p:cNvPr>
+          <p:cNvSpPr txBox="1"/>
+          <p:nvPr/>
+        </p:nvSpPr>
+        <p:spPr>
+          <a:xfrm>
+            <a:off x="6584553" y="2043654"/>
+            <a:ext cx="1765252" cy="1015663"/>
+          </a:xfrm>
+          <a:prstGeom prst="rect">
+            <a:avLst/>
+          </a:prstGeom>
+          <a:noFill/>
+        </p:spPr>
+        <p:txBody>
+          <a:bodyPr wrap="square" rtlCol="0">
+            <a:spAutoFit/>
+          </a:bodyPr>
+          <a:lstStyle/>
+          <a:p>
+            <a:r>
+              <a:rPr lang="en-US" sz="1200" dirty="0"/>
+              <a:t>Power: on </a:t>
+            </a:r>
+          </a:p>
+          <a:p>
+            <a:r>
+              <a:rPr lang="en-US" sz="1200" dirty="0"/>
+              <a:t>Throttle: Neutral </a:t>
+            </a:r>
+          </a:p>
+          <a:p>
+            <a:r>
+              <a:rPr lang="en-US" sz="1200" dirty="0"/>
+              <a:t>Break: on </a:t>
+            </a:r>
+          </a:p>
+          <a:p>
+            <a:r>
+              <a:rPr lang="en-US" sz="1200" dirty="0"/>
+              <a:t>Front sensor: detected</a:t>
+            </a:r>
+          </a:p>
+          <a:p>
+            <a:r>
+              <a:rPr lang="en-US" sz="1200" dirty="0"/>
+              <a:t>Speed sensor: 0 </a:t>
+            </a:r>
+            <a:endParaRPr lang="en-SG" sz="1200" dirty="0"/>
+          </a:p>
+        </p:txBody>
+      </p:sp>
+      <p:sp>
+        <p:nvSpPr>
+          <p:cNvPr id="24" name="TextBox 23">
+            <a:extLst>
+              <a:ext uri="{FF2B5EF4-FFF2-40B4-BE49-F238E27FC236}">
+                <a16:creationId xmlns:a16="http://schemas.microsoft.com/office/drawing/2014/main" id="{CFFA1989-0D5A-B4C7-6A72-A352D8A1F98E}"/>
+              </a:ext>
+            </a:extLst>
+          </p:cNvPr>
+          <p:cNvSpPr txBox="1"/>
+          <p:nvPr/>
+        </p:nvSpPr>
+        <p:spPr>
+          <a:xfrm>
+            <a:off x="2024409" y="4014744"/>
+            <a:ext cx="2722929" cy="1015663"/>
+          </a:xfrm>
+          <a:prstGeom prst="rect">
+            <a:avLst/>
+          </a:prstGeom>
+          <a:noFill/>
+        </p:spPr>
+        <p:txBody>
+          <a:bodyPr wrap="square" rtlCol="0">
+            <a:spAutoFit/>
+          </a:bodyPr>
+          <a:lstStyle/>
+          <a:p>
+            <a:r>
+              <a:rPr lang="en-US" sz="1200" dirty="0"/>
+              <a:t>Power: off </a:t>
+            </a:r>
+          </a:p>
+          <a:p>
+            <a:r>
+              <a:rPr lang="en-US" sz="1200" dirty="0"/>
+              <a:t>Throttle: Neutral / On </a:t>
+            </a:r>
+          </a:p>
+          <a:p>
+            <a:r>
+              <a:rPr lang="en-US" sz="1200" dirty="0"/>
+              <a:t>Break: On/Off</a:t>
+            </a:r>
+          </a:p>
+          <a:p>
+            <a:r>
+              <a:rPr lang="en-US" sz="1200" dirty="0"/>
+              <a:t>Front sensor: detected </a:t>
+            </a:r>
+            <a:r>
+              <a:rPr lang="en-SG" sz="1200" dirty="0"/>
+              <a:t>/ no detection</a:t>
+            </a:r>
+          </a:p>
+          <a:p>
+            <a:r>
+              <a:rPr lang="en-SG" sz="1200" dirty="0"/>
+              <a:t>Speed sensor:0</a:t>
+            </a:r>
+          </a:p>
+        </p:txBody>
+      </p:sp>
+    </p:spTree>
+    <p:extLst>
+      <p:ext uri="{BB962C8B-B14F-4D97-AF65-F5344CB8AC3E}">
+        <p14:creationId xmlns:p14="http://schemas.microsoft.com/office/powerpoint/2010/main" val="3691481060"/>
+      </p:ext>
+    </p:extLst>
+  </p:cSld>
+  <p:clrMapOvr>
+    <a:masterClrMapping/>
+  </p:clrMapOvr>
+</p:sld>
+</file>
+
+<file path=ppt/slides/slide5.xml><?xml version="1.0" encoding="utf-8"?>
+<p:sld xmlns:a="http://schemas.openxmlformats.org/drawingml/2006/main" xmlns:r="http://schemas.openxmlformats.org/officeDocument/2006/relationships" xmlns:p="http://schemas.openxmlformats.org/presentationml/2006/main">
+  <p:cSld>
+    <p:spTree>
+      <p:nvGrpSpPr>
+        <p:cNvPr id="1" name=""/>
+        <p:cNvGrpSpPr/>
+        <p:nvPr/>
+      </p:nvGrpSpPr>
+      <p:grpSpPr>
+        <a:xfrm>
+          <a:off x="0" y="0"/>
+          <a:ext cx="0" cy="0"/>
+          <a:chOff x="0" y="0"/>
+          <a:chExt cx="0" cy="0"/>
+        </a:xfrm>
+      </p:grpSpPr>
       <p:pic>
         <p:nvPicPr>
           <p:cNvPr id="4" name="Picture 3" descr="A green squares with black lines&#10;&#10;Description automatically generated">
@@ -10319,7 +11875,7 @@
 </p:sld>
 </file>
 
-<file path=ppt/slides/slide5.xml><?xml version="1.0" encoding="utf-8"?>
+<file path=ppt/slides/slide6.xml><?xml version="1.0" encoding="utf-8"?>
 <p:sld xmlns:a="http://schemas.openxmlformats.org/drawingml/2006/main" xmlns:r="http://schemas.openxmlformats.org/officeDocument/2006/relationships" xmlns:p="http://schemas.openxmlformats.org/presentationml/2006/main">
   <p:cSld>
     <p:spTree>

</xml_diff>

<commit_message>
Update the ARP spoofing attack document.
</commit_message>
<xml_diff>
--- a/attack/AttackScenario.pptx
+++ b/attack/AttackScenario.pptx
@@ -11,6 +11,7 @@
     <p:sldId id="258" r:id="rId5"/>
     <p:sldId id="259" r:id="rId6"/>
     <p:sldId id="260" r:id="rId7"/>
+    <p:sldId id="262" r:id="rId8"/>
   </p:sldIdLst>
   <p:sldSz cx="12192000" cy="6858000"/>
   <p:notesSz cx="6858000" cy="9144000"/>
@@ -266,7 +267,7 @@
           <a:p>
             <a:fld id="{11AA06AF-8DFA-4137-89EF-0EFE93628E77}" type="datetimeFigureOut">
               <a:rPr lang="en-SG" smtClean="0"/>
-              <a:t>9/1/2024</a:t>
+              <a:t>12/1/2024</a:t>
             </a:fld>
             <a:endParaRPr lang="en-SG"/>
           </a:p>
@@ -466,7 +467,7 @@
           <a:p>
             <a:fld id="{11AA06AF-8DFA-4137-89EF-0EFE93628E77}" type="datetimeFigureOut">
               <a:rPr lang="en-SG" smtClean="0"/>
-              <a:t>9/1/2024</a:t>
+              <a:t>12/1/2024</a:t>
             </a:fld>
             <a:endParaRPr lang="en-SG"/>
           </a:p>
@@ -676,7 +677,7 @@
           <a:p>
             <a:fld id="{11AA06AF-8DFA-4137-89EF-0EFE93628E77}" type="datetimeFigureOut">
               <a:rPr lang="en-SG" smtClean="0"/>
-              <a:t>9/1/2024</a:t>
+              <a:t>12/1/2024</a:t>
             </a:fld>
             <a:endParaRPr lang="en-SG"/>
           </a:p>
@@ -876,7 +877,7 @@
           <a:p>
             <a:fld id="{11AA06AF-8DFA-4137-89EF-0EFE93628E77}" type="datetimeFigureOut">
               <a:rPr lang="en-SG" smtClean="0"/>
-              <a:t>9/1/2024</a:t>
+              <a:t>12/1/2024</a:t>
             </a:fld>
             <a:endParaRPr lang="en-SG"/>
           </a:p>
@@ -1152,7 +1153,7 @@
           <a:p>
             <a:fld id="{11AA06AF-8DFA-4137-89EF-0EFE93628E77}" type="datetimeFigureOut">
               <a:rPr lang="en-SG" smtClean="0"/>
-              <a:t>9/1/2024</a:t>
+              <a:t>12/1/2024</a:t>
             </a:fld>
             <a:endParaRPr lang="en-SG"/>
           </a:p>
@@ -1420,7 +1421,7 @@
           <a:p>
             <a:fld id="{11AA06AF-8DFA-4137-89EF-0EFE93628E77}" type="datetimeFigureOut">
               <a:rPr lang="en-SG" smtClean="0"/>
-              <a:t>9/1/2024</a:t>
+              <a:t>12/1/2024</a:t>
             </a:fld>
             <a:endParaRPr lang="en-SG"/>
           </a:p>
@@ -1835,7 +1836,7 @@
           <a:p>
             <a:fld id="{11AA06AF-8DFA-4137-89EF-0EFE93628E77}" type="datetimeFigureOut">
               <a:rPr lang="en-SG" smtClean="0"/>
-              <a:t>9/1/2024</a:t>
+              <a:t>12/1/2024</a:t>
             </a:fld>
             <a:endParaRPr lang="en-SG"/>
           </a:p>
@@ -1977,7 +1978,7 @@
           <a:p>
             <a:fld id="{11AA06AF-8DFA-4137-89EF-0EFE93628E77}" type="datetimeFigureOut">
               <a:rPr lang="en-SG" smtClean="0"/>
-              <a:t>9/1/2024</a:t>
+              <a:t>12/1/2024</a:t>
             </a:fld>
             <a:endParaRPr lang="en-SG"/>
           </a:p>
@@ -2090,7 +2091,7 @@
           <a:p>
             <a:fld id="{11AA06AF-8DFA-4137-89EF-0EFE93628E77}" type="datetimeFigureOut">
               <a:rPr lang="en-SG" smtClean="0"/>
-              <a:t>9/1/2024</a:t>
+              <a:t>12/1/2024</a:t>
             </a:fld>
             <a:endParaRPr lang="en-SG"/>
           </a:p>
@@ -2403,7 +2404,7 @@
           <a:p>
             <a:fld id="{11AA06AF-8DFA-4137-89EF-0EFE93628E77}" type="datetimeFigureOut">
               <a:rPr lang="en-SG" smtClean="0"/>
-              <a:t>9/1/2024</a:t>
+              <a:t>12/1/2024</a:t>
             </a:fld>
             <a:endParaRPr lang="en-SG"/>
           </a:p>
@@ -2692,7 +2693,7 @@
           <a:p>
             <a:fld id="{11AA06AF-8DFA-4137-89EF-0EFE93628E77}" type="datetimeFigureOut">
               <a:rPr lang="en-SG" smtClean="0"/>
-              <a:t>9/1/2024</a:t>
+              <a:t>12/1/2024</a:t>
             </a:fld>
             <a:endParaRPr lang="en-SG"/>
           </a:p>
@@ -2935,7 +2936,7 @@
           <a:p>
             <a:fld id="{11AA06AF-8DFA-4137-89EF-0EFE93628E77}" type="datetimeFigureOut">
               <a:rPr lang="en-SG" smtClean="0"/>
-              <a:t>9/1/2024</a:t>
+              <a:t>12/1/2024</a:t>
             </a:fld>
             <a:endParaRPr lang="en-SG"/>
           </a:p>
@@ -15162,6 +15163,2814 @@
 </p:sld>
 </file>
 
+<file path=ppt/slides/slide7.xml><?xml version="1.0" encoding="utf-8"?>
+<p:sld xmlns:a="http://schemas.openxmlformats.org/drawingml/2006/main" xmlns:r="http://schemas.openxmlformats.org/officeDocument/2006/relationships" xmlns:p="http://schemas.openxmlformats.org/presentationml/2006/main">
+  <p:cSld>
+    <p:spTree>
+      <p:nvGrpSpPr>
+        <p:cNvPr id="1" name=""/>
+        <p:cNvGrpSpPr/>
+        <p:nvPr/>
+      </p:nvGrpSpPr>
+      <p:grpSpPr>
+        <a:xfrm>
+          <a:off x="0" y="0"/>
+          <a:ext cx="0" cy="0"/>
+          <a:chOff x="0" y="0"/>
+          <a:chExt cx="0" cy="0"/>
+        </a:xfrm>
+      </p:grpSpPr>
+      <p:pic>
+        <p:nvPicPr>
+          <p:cNvPr id="4" name="Picture 3">
+            <a:extLst>
+              <a:ext uri="{FF2B5EF4-FFF2-40B4-BE49-F238E27FC236}">
+                <a16:creationId xmlns:a16="http://schemas.microsoft.com/office/drawing/2014/main" id="{CB9FFEA7-E117-DC68-5E38-AABC154046A4}"/>
+              </a:ext>
+            </a:extLst>
+          </p:cNvPr>
+          <p:cNvPicPr>
+            <a:picLocks noChangeAspect="1"/>
+          </p:cNvPicPr>
+          <p:nvPr/>
+        </p:nvPicPr>
+        <p:blipFill>
+          <a:blip r:embed="rId2"/>
+          <a:stretch>
+            <a:fillRect/>
+          </a:stretch>
+        </p:blipFill>
+        <p:spPr>
+          <a:xfrm>
+            <a:off x="5578311" y="2381107"/>
+            <a:ext cx="946045" cy="746322"/>
+          </a:xfrm>
+          <a:prstGeom prst="rect">
+            <a:avLst/>
+          </a:prstGeom>
+          <a:ln w="9525">
+            <a:solidFill>
+              <a:schemeClr val="tx1"/>
+            </a:solidFill>
+          </a:ln>
+        </p:spPr>
+      </p:pic>
+      <p:sp>
+        <p:nvSpPr>
+          <p:cNvPr id="5" name="TextBox 4">
+            <a:extLst>
+              <a:ext uri="{FF2B5EF4-FFF2-40B4-BE49-F238E27FC236}">
+                <a16:creationId xmlns:a16="http://schemas.microsoft.com/office/drawing/2014/main" id="{E3589FF8-1611-FEA7-D51F-90D672440164}"/>
+              </a:ext>
+            </a:extLst>
+          </p:cNvPr>
+          <p:cNvSpPr txBox="1"/>
+          <p:nvPr/>
+        </p:nvSpPr>
+        <p:spPr>
+          <a:xfrm>
+            <a:off x="5520885" y="2134886"/>
+            <a:ext cx="1257727" cy="246221"/>
+          </a:xfrm>
+          <a:prstGeom prst="rect">
+            <a:avLst/>
+          </a:prstGeom>
+          <a:noFill/>
+        </p:spPr>
+        <p:txBody>
+          <a:bodyPr wrap="square">
+            <a:spAutoFit/>
+          </a:bodyPr>
+          <a:lstStyle/>
+          <a:p>
+            <a:r>
+              <a:rPr lang="en-US" sz="1000" b="1" dirty="0">
+                <a:solidFill>
+                  <a:schemeClr val="tx1">
+                    <a:lumMod val="75000"/>
+                    <a:lumOff val="25000"/>
+                  </a:schemeClr>
+                </a:solidFill>
+              </a:rPr>
+              <a:t>VM_ID</a:t>
+            </a:r>
+            <a:r>
+              <a:rPr lang="en-US" sz="1000" dirty="0">
+                <a:solidFill>
+                  <a:schemeClr val="tx1">
+                    <a:lumMod val="75000"/>
+                    <a:lumOff val="25000"/>
+                  </a:schemeClr>
+                </a:solidFill>
+              </a:rPr>
+              <a:t>: fw1-rail</a:t>
+            </a:r>
+            <a:endParaRPr lang="en-SG" sz="1000" dirty="0">
+              <a:solidFill>
+                <a:schemeClr val="tx1">
+                  <a:lumMod val="75000"/>
+                  <a:lumOff val="25000"/>
+                </a:schemeClr>
+              </a:solidFill>
+            </a:endParaRPr>
+          </a:p>
+        </p:txBody>
+      </p:sp>
+      <p:sp>
+        <p:nvSpPr>
+          <p:cNvPr id="6" name="Rectangle 5">
+            <a:extLst>
+              <a:ext uri="{FF2B5EF4-FFF2-40B4-BE49-F238E27FC236}">
+                <a16:creationId xmlns:a16="http://schemas.microsoft.com/office/drawing/2014/main" id="{AD363EE8-343C-1CE4-B135-D62594B51D64}"/>
+              </a:ext>
+            </a:extLst>
+          </p:cNvPr>
+          <p:cNvSpPr/>
+          <p:nvPr/>
+        </p:nvSpPr>
+        <p:spPr>
+          <a:xfrm>
+            <a:off x="7595417" y="1463055"/>
+            <a:ext cx="4161267" cy="2574105"/>
+          </a:xfrm>
+          <a:prstGeom prst="rect">
+            <a:avLst/>
+          </a:prstGeom>
+          <a:noFill/>
+          <a:ln w="12700" cap="flat" cmpd="sng" algn="ctr">
+            <a:solidFill>
+              <a:schemeClr val="dk1"/>
+            </a:solidFill>
+            <a:prstDash val="dash"/>
+            <a:round/>
+            <a:headEnd type="none" w="med" len="med"/>
+            <a:tailEnd type="none" w="med" len="med"/>
+          </a:ln>
+        </p:spPr>
+        <p:style>
+          <a:lnRef idx="0">
+            <a:scrgbClr r="0" g="0" b="0"/>
+          </a:lnRef>
+          <a:fillRef idx="0">
+            <a:scrgbClr r="0" g="0" b="0"/>
+          </a:fillRef>
+          <a:effectRef idx="0">
+            <a:scrgbClr r="0" g="0" b="0"/>
+          </a:effectRef>
+          <a:fontRef idx="minor">
+            <a:schemeClr val="dk1"/>
+          </a:fontRef>
+        </p:style>
+        <p:txBody>
+          <a:bodyPr rtlCol="0" anchor="ctr"/>
+          <a:lstStyle/>
+          <a:p>
+            <a:pPr algn="ctr"/>
+            <a:endParaRPr lang="en-SG"/>
+          </a:p>
+        </p:txBody>
+      </p:sp>
+      <p:sp>
+        <p:nvSpPr>
+          <p:cNvPr id="7" name="TextBox 6">
+            <a:extLst>
+              <a:ext uri="{FF2B5EF4-FFF2-40B4-BE49-F238E27FC236}">
+                <a16:creationId xmlns:a16="http://schemas.microsoft.com/office/drawing/2014/main" id="{C8BB7C50-C29E-23CF-6F2C-430649F4D45C}"/>
+              </a:ext>
+            </a:extLst>
+          </p:cNvPr>
+          <p:cNvSpPr txBox="1"/>
+          <p:nvPr/>
+        </p:nvSpPr>
+        <p:spPr>
+          <a:xfrm>
+            <a:off x="7612706" y="1483145"/>
+            <a:ext cx="3008010" cy="276999"/>
+          </a:xfrm>
+          <a:prstGeom prst="rect">
+            <a:avLst/>
+          </a:prstGeom>
+          <a:noFill/>
+        </p:spPr>
+        <p:txBody>
+          <a:bodyPr wrap="square">
+            <a:spAutoFit/>
+          </a:bodyPr>
+          <a:lstStyle/>
+          <a:p>
+            <a:r>
+              <a:rPr lang="en-US" sz="1200" b="1" dirty="0" err="1">
+                <a:solidFill>
+                  <a:schemeClr val="tx1">
+                    <a:lumMod val="75000"/>
+                    <a:lumOff val="25000"/>
+                  </a:schemeClr>
+                </a:solidFill>
+              </a:rPr>
+              <a:t>Crimsonian</a:t>
+            </a:r>
+            <a:r>
+              <a:rPr lang="en-US" sz="1200" b="1" dirty="0">
+                <a:solidFill>
+                  <a:schemeClr val="tx1">
+                    <a:lumMod val="75000"/>
+                    <a:lumOff val="25000"/>
+                  </a:schemeClr>
+                </a:solidFill>
+              </a:rPr>
+              <a:t> Railway Engineer  Department </a:t>
+            </a:r>
+            <a:endParaRPr lang="en-SG" sz="1200" b="1" dirty="0">
+              <a:solidFill>
+                <a:schemeClr val="tx1">
+                  <a:lumMod val="75000"/>
+                  <a:lumOff val="25000"/>
+                </a:schemeClr>
+              </a:solidFill>
+            </a:endParaRPr>
+          </a:p>
+        </p:txBody>
+      </p:sp>
+      <p:pic>
+        <p:nvPicPr>
+          <p:cNvPr id="8" name="Picture 7">
+            <a:extLst>
+              <a:ext uri="{FF2B5EF4-FFF2-40B4-BE49-F238E27FC236}">
+                <a16:creationId xmlns:a16="http://schemas.microsoft.com/office/drawing/2014/main" id="{26987D0E-EDAB-E498-6CB7-C96B88D45A84}"/>
+              </a:ext>
+            </a:extLst>
+          </p:cNvPr>
+          <p:cNvPicPr>
+            <a:picLocks noChangeAspect="1"/>
+          </p:cNvPicPr>
+          <p:nvPr/>
+        </p:nvPicPr>
+        <p:blipFill>
+          <a:blip r:embed="rId3"/>
+          <a:stretch>
+            <a:fillRect/>
+          </a:stretch>
+        </p:blipFill>
+        <p:spPr>
+          <a:xfrm>
+            <a:off x="7733786" y="1819934"/>
+            <a:ext cx="657045" cy="374211"/>
+          </a:xfrm>
+          <a:prstGeom prst="rect">
+            <a:avLst/>
+          </a:prstGeom>
+        </p:spPr>
+      </p:pic>
+      <p:cxnSp>
+        <p:nvCxnSpPr>
+          <p:cNvPr id="9" name="Straight Connector 8">
+            <a:extLst>
+              <a:ext uri="{FF2B5EF4-FFF2-40B4-BE49-F238E27FC236}">
+                <a16:creationId xmlns:a16="http://schemas.microsoft.com/office/drawing/2014/main" id="{D0880EB9-8202-FD2D-B053-A3CA8E59472D}"/>
+              </a:ext>
+            </a:extLst>
+          </p:cNvPr>
+          <p:cNvCxnSpPr>
+            <a:stCxn id="4" idx="3"/>
+            <a:endCxn id="8" idx="1"/>
+          </p:cNvCxnSpPr>
+          <p:nvPr/>
+        </p:nvCxnSpPr>
+        <p:spPr>
+          <a:xfrm flipV="1">
+            <a:off x="6524356" y="2007040"/>
+            <a:ext cx="1209430" cy="747228"/>
+          </a:xfrm>
+          <a:prstGeom prst="line">
+            <a:avLst/>
+          </a:prstGeom>
+          <a:ln w="19050"/>
+        </p:spPr>
+        <p:style>
+          <a:lnRef idx="1">
+            <a:schemeClr val="accent1"/>
+          </a:lnRef>
+          <a:fillRef idx="0">
+            <a:schemeClr val="accent1"/>
+          </a:fillRef>
+          <a:effectRef idx="0">
+            <a:schemeClr val="accent1"/>
+          </a:effectRef>
+          <a:fontRef idx="minor">
+            <a:schemeClr val="tx1"/>
+          </a:fontRef>
+        </p:style>
+      </p:cxnSp>
+      <p:pic>
+        <p:nvPicPr>
+          <p:cNvPr id="10" name="Picture 9">
+            <a:extLst>
+              <a:ext uri="{FF2B5EF4-FFF2-40B4-BE49-F238E27FC236}">
+                <a16:creationId xmlns:a16="http://schemas.microsoft.com/office/drawing/2014/main" id="{026DE59D-4E12-9D7A-3038-042308B47A6E}"/>
+              </a:ext>
+            </a:extLst>
+          </p:cNvPr>
+          <p:cNvPicPr>
+            <a:picLocks noChangeAspect="1"/>
+          </p:cNvPicPr>
+          <p:nvPr/>
+        </p:nvPicPr>
+        <p:blipFill>
+          <a:blip r:embed="rId4"/>
+          <a:stretch>
+            <a:fillRect/>
+          </a:stretch>
+        </p:blipFill>
+        <p:spPr>
+          <a:xfrm>
+            <a:off x="9204451" y="3104032"/>
+            <a:ext cx="531176" cy="467941"/>
+          </a:xfrm>
+          <a:prstGeom prst="rect">
+            <a:avLst/>
+          </a:prstGeom>
+        </p:spPr>
+      </p:pic>
+      <p:pic>
+        <p:nvPicPr>
+          <p:cNvPr id="11" name="Picture 10">
+            <a:extLst>
+              <a:ext uri="{FF2B5EF4-FFF2-40B4-BE49-F238E27FC236}">
+                <a16:creationId xmlns:a16="http://schemas.microsoft.com/office/drawing/2014/main" id="{D2F07097-78C8-63FC-CA74-B753A5A8A7A5}"/>
+              </a:ext>
+            </a:extLst>
+          </p:cNvPr>
+          <p:cNvPicPr>
+            <a:picLocks noChangeAspect="1"/>
+          </p:cNvPicPr>
+          <p:nvPr/>
+        </p:nvPicPr>
+        <p:blipFill>
+          <a:blip r:embed="rId4"/>
+          <a:stretch>
+            <a:fillRect/>
+          </a:stretch>
+        </p:blipFill>
+        <p:spPr>
+          <a:xfrm>
+            <a:off x="9729027" y="2467206"/>
+            <a:ext cx="531176" cy="467941"/>
+          </a:xfrm>
+          <a:prstGeom prst="rect">
+            <a:avLst/>
+          </a:prstGeom>
+        </p:spPr>
+      </p:pic>
+      <p:cxnSp>
+        <p:nvCxnSpPr>
+          <p:cNvPr id="12" name="Straight Connector 11">
+            <a:extLst>
+              <a:ext uri="{FF2B5EF4-FFF2-40B4-BE49-F238E27FC236}">
+                <a16:creationId xmlns:a16="http://schemas.microsoft.com/office/drawing/2014/main" id="{ABB54848-AF32-EA8E-EF83-DBAFBE6DACDF}"/>
+              </a:ext>
+            </a:extLst>
+          </p:cNvPr>
+          <p:cNvCxnSpPr>
+            <a:cxnSpLocks/>
+            <a:stCxn id="8" idx="2"/>
+            <a:endCxn id="10" idx="0"/>
+          </p:cNvCxnSpPr>
+          <p:nvPr/>
+        </p:nvCxnSpPr>
+        <p:spPr>
+          <a:xfrm>
+            <a:off x="8062309" y="2194145"/>
+            <a:ext cx="1407730" cy="909887"/>
+          </a:xfrm>
+          <a:prstGeom prst="line">
+            <a:avLst/>
+          </a:prstGeom>
+          <a:ln w="19050"/>
+        </p:spPr>
+        <p:style>
+          <a:lnRef idx="1">
+            <a:schemeClr val="accent1"/>
+          </a:lnRef>
+          <a:fillRef idx="0">
+            <a:schemeClr val="accent1"/>
+          </a:fillRef>
+          <a:effectRef idx="0">
+            <a:schemeClr val="accent1"/>
+          </a:effectRef>
+          <a:fontRef idx="minor">
+            <a:schemeClr val="tx1"/>
+          </a:fontRef>
+        </p:style>
+      </p:cxnSp>
+      <p:cxnSp>
+        <p:nvCxnSpPr>
+          <p:cNvPr id="13" name="Straight Connector 12">
+            <a:extLst>
+              <a:ext uri="{FF2B5EF4-FFF2-40B4-BE49-F238E27FC236}">
+                <a16:creationId xmlns:a16="http://schemas.microsoft.com/office/drawing/2014/main" id="{DE5EF014-3240-AD23-D82A-4E1816136EE0}"/>
+              </a:ext>
+            </a:extLst>
+          </p:cNvPr>
+          <p:cNvCxnSpPr>
+            <a:cxnSpLocks/>
+            <a:stCxn id="8" idx="2"/>
+            <a:endCxn id="11" idx="0"/>
+          </p:cNvCxnSpPr>
+          <p:nvPr/>
+        </p:nvCxnSpPr>
+        <p:spPr>
+          <a:xfrm>
+            <a:off x="8062309" y="2194145"/>
+            <a:ext cx="1932306" cy="273061"/>
+          </a:xfrm>
+          <a:prstGeom prst="line">
+            <a:avLst/>
+          </a:prstGeom>
+          <a:ln w="19050"/>
+        </p:spPr>
+        <p:style>
+          <a:lnRef idx="1">
+            <a:schemeClr val="accent1"/>
+          </a:lnRef>
+          <a:fillRef idx="0">
+            <a:schemeClr val="accent1"/>
+          </a:fillRef>
+          <a:effectRef idx="0">
+            <a:schemeClr val="accent1"/>
+          </a:effectRef>
+          <a:fontRef idx="minor">
+            <a:schemeClr val="tx1"/>
+          </a:fontRef>
+        </p:style>
+      </p:cxnSp>
+      <p:sp>
+        <p:nvSpPr>
+          <p:cNvPr id="14" name="TextBox 13">
+            <a:extLst>
+              <a:ext uri="{FF2B5EF4-FFF2-40B4-BE49-F238E27FC236}">
+                <a16:creationId xmlns:a16="http://schemas.microsoft.com/office/drawing/2014/main" id="{24A6B392-98CC-8CC5-3872-4305F67E6BCA}"/>
+              </a:ext>
+            </a:extLst>
+          </p:cNvPr>
+          <p:cNvSpPr txBox="1"/>
+          <p:nvPr/>
+        </p:nvSpPr>
+        <p:spPr>
+          <a:xfrm>
+            <a:off x="9757613" y="3112150"/>
+            <a:ext cx="1440693" cy="553998"/>
+          </a:xfrm>
+          <a:prstGeom prst="rect">
+            <a:avLst/>
+          </a:prstGeom>
+          <a:noFill/>
+        </p:spPr>
+        <p:txBody>
+          <a:bodyPr wrap="square">
+            <a:spAutoFit/>
+          </a:bodyPr>
+          <a:lstStyle/>
+          <a:p>
+            <a:r>
+              <a:rPr lang="en-US" sz="1000" b="1" dirty="0">
+                <a:solidFill>
+                  <a:schemeClr val="tx1">
+                    <a:lumMod val="75000"/>
+                    <a:lumOff val="25000"/>
+                  </a:schemeClr>
+                </a:solidFill>
+              </a:rPr>
+              <a:t>VM_ID</a:t>
+            </a:r>
+            <a:r>
+              <a:rPr lang="en-US" sz="1000" dirty="0">
+                <a:solidFill>
+                  <a:schemeClr val="tx1">
+                    <a:lumMod val="75000"/>
+                    <a:lumOff val="25000"/>
+                  </a:schemeClr>
+                </a:solidFill>
+              </a:rPr>
+              <a:t>:rail-ed-plc01</a:t>
+            </a:r>
+          </a:p>
+          <a:p>
+            <a:r>
+              <a:rPr lang="en-US" sz="1000" b="1" dirty="0" err="1">
+                <a:solidFill>
+                  <a:schemeClr val="tx1">
+                    <a:lumMod val="75000"/>
+                    <a:lumOff val="25000"/>
+                  </a:schemeClr>
+                </a:solidFill>
+              </a:rPr>
+              <a:t>Func</a:t>
+            </a:r>
+            <a:r>
+              <a:rPr lang="en-US" sz="1000" dirty="0">
+                <a:solidFill>
+                  <a:schemeClr val="tx1">
+                    <a:lumMod val="75000"/>
+                    <a:lumOff val="25000"/>
+                  </a:schemeClr>
+                </a:solidFill>
+              </a:rPr>
+              <a:t>: Junction Plc set</a:t>
+            </a:r>
+          </a:p>
+          <a:p>
+            <a:r>
+              <a:rPr lang="en-US" sz="1000" b="1" dirty="0">
+                <a:solidFill>
+                  <a:schemeClr val="tx1">
+                    <a:lumMod val="75000"/>
+                    <a:lumOff val="25000"/>
+                  </a:schemeClr>
+                </a:solidFill>
+              </a:rPr>
+              <a:t>State</a:t>
+            </a:r>
+            <a:r>
+              <a:rPr lang="en-US" sz="1000" dirty="0">
+                <a:solidFill>
+                  <a:schemeClr val="tx1">
+                    <a:lumMod val="75000"/>
+                    <a:lumOff val="25000"/>
+                  </a:schemeClr>
+                </a:solidFill>
+              </a:rPr>
+              <a:t>: </a:t>
+            </a:r>
+            <a:r>
+              <a:rPr lang="en-US" sz="1000" b="1" dirty="0">
+                <a:solidFill>
+                  <a:srgbClr val="00B050"/>
+                </a:solidFill>
+              </a:rPr>
+              <a:t>ready</a:t>
+            </a:r>
+            <a:endParaRPr lang="en-SG" sz="1000" b="1" dirty="0">
+              <a:solidFill>
+                <a:srgbClr val="00B050"/>
+              </a:solidFill>
+            </a:endParaRPr>
+          </a:p>
+        </p:txBody>
+      </p:sp>
+      <p:sp>
+        <p:nvSpPr>
+          <p:cNvPr id="15" name="TextBox 14">
+            <a:extLst>
+              <a:ext uri="{FF2B5EF4-FFF2-40B4-BE49-F238E27FC236}">
+                <a16:creationId xmlns:a16="http://schemas.microsoft.com/office/drawing/2014/main" id="{BCDB0586-E059-7702-702C-90E82FFB9655}"/>
+              </a:ext>
+            </a:extLst>
+          </p:cNvPr>
+          <p:cNvSpPr txBox="1"/>
+          <p:nvPr/>
+        </p:nvSpPr>
+        <p:spPr>
+          <a:xfrm>
+            <a:off x="8968756" y="2849324"/>
+            <a:ext cx="1130069" cy="246221"/>
+          </a:xfrm>
+          <a:prstGeom prst="rect">
+            <a:avLst/>
+          </a:prstGeom>
+          <a:noFill/>
+        </p:spPr>
+        <p:txBody>
+          <a:bodyPr wrap="square">
+            <a:spAutoFit/>
+          </a:bodyPr>
+          <a:lstStyle/>
+          <a:p>
+            <a:r>
+              <a:rPr lang="en-US" sz="1000" b="1" dirty="0"/>
+              <a:t>10.107.105.5</a:t>
+            </a:r>
+            <a:endParaRPr lang="en-SG" sz="1000" b="1" dirty="0"/>
+          </a:p>
+        </p:txBody>
+      </p:sp>
+      <p:sp>
+        <p:nvSpPr>
+          <p:cNvPr id="16" name="TextBox 15">
+            <a:extLst>
+              <a:ext uri="{FF2B5EF4-FFF2-40B4-BE49-F238E27FC236}">
+                <a16:creationId xmlns:a16="http://schemas.microsoft.com/office/drawing/2014/main" id="{63F39ACC-FCC8-44F3-C077-A8EDF57961BB}"/>
+              </a:ext>
+            </a:extLst>
+          </p:cNvPr>
+          <p:cNvSpPr txBox="1"/>
+          <p:nvPr/>
+        </p:nvSpPr>
+        <p:spPr>
+          <a:xfrm>
+            <a:off x="9397636" y="2272629"/>
+            <a:ext cx="1130069" cy="246221"/>
+          </a:xfrm>
+          <a:prstGeom prst="rect">
+            <a:avLst/>
+          </a:prstGeom>
+          <a:noFill/>
+        </p:spPr>
+        <p:txBody>
+          <a:bodyPr wrap="square">
+            <a:spAutoFit/>
+          </a:bodyPr>
+          <a:lstStyle/>
+          <a:p>
+            <a:r>
+              <a:rPr lang="en-US" sz="1000" b="1" dirty="0"/>
+              <a:t>10.107.105.6</a:t>
+            </a:r>
+            <a:endParaRPr lang="en-SG" sz="1000" b="1" dirty="0"/>
+          </a:p>
+        </p:txBody>
+      </p:sp>
+      <p:sp>
+        <p:nvSpPr>
+          <p:cNvPr id="17" name="Rectangle 16">
+            <a:extLst>
+              <a:ext uri="{FF2B5EF4-FFF2-40B4-BE49-F238E27FC236}">
+                <a16:creationId xmlns:a16="http://schemas.microsoft.com/office/drawing/2014/main" id="{D456881F-F1C7-7F35-82FE-DFD3F94931FC}"/>
+              </a:ext>
+            </a:extLst>
+          </p:cNvPr>
+          <p:cNvSpPr/>
+          <p:nvPr/>
+        </p:nvSpPr>
+        <p:spPr>
+          <a:xfrm>
+            <a:off x="156473" y="1475295"/>
+            <a:ext cx="4588978" cy="2561866"/>
+          </a:xfrm>
+          <a:prstGeom prst="rect">
+            <a:avLst/>
+          </a:prstGeom>
+          <a:noFill/>
+          <a:ln w="12700" cap="flat" cmpd="sng" algn="ctr">
+            <a:solidFill>
+              <a:schemeClr val="dk1"/>
+            </a:solidFill>
+            <a:prstDash val="dash"/>
+            <a:round/>
+            <a:headEnd type="none" w="med" len="med"/>
+            <a:tailEnd type="none" w="med" len="med"/>
+          </a:ln>
+        </p:spPr>
+        <p:style>
+          <a:lnRef idx="0">
+            <a:scrgbClr r="0" g="0" b="0"/>
+          </a:lnRef>
+          <a:fillRef idx="0">
+            <a:scrgbClr r="0" g="0" b="0"/>
+          </a:fillRef>
+          <a:effectRef idx="0">
+            <a:scrgbClr r="0" g="0" b="0"/>
+          </a:effectRef>
+          <a:fontRef idx="minor">
+            <a:schemeClr val="dk1"/>
+          </a:fontRef>
+        </p:style>
+        <p:txBody>
+          <a:bodyPr rtlCol="0" anchor="ctr"/>
+          <a:lstStyle/>
+          <a:p>
+            <a:pPr algn="ctr"/>
+            <a:endParaRPr lang="en-SG"/>
+          </a:p>
+        </p:txBody>
+      </p:sp>
+      <p:sp>
+        <p:nvSpPr>
+          <p:cNvPr id="18" name="TextBox 17">
+            <a:extLst>
+              <a:ext uri="{FF2B5EF4-FFF2-40B4-BE49-F238E27FC236}">
+                <a16:creationId xmlns:a16="http://schemas.microsoft.com/office/drawing/2014/main" id="{EF4EEA9C-9323-FB9C-5331-0899333BB97D}"/>
+              </a:ext>
+            </a:extLst>
+          </p:cNvPr>
+          <p:cNvSpPr txBox="1"/>
+          <p:nvPr/>
+        </p:nvSpPr>
+        <p:spPr>
+          <a:xfrm>
+            <a:off x="202293" y="1497075"/>
+            <a:ext cx="2942480" cy="276999"/>
+          </a:xfrm>
+          <a:prstGeom prst="rect">
+            <a:avLst/>
+          </a:prstGeom>
+          <a:noFill/>
+        </p:spPr>
+        <p:txBody>
+          <a:bodyPr wrap="square">
+            <a:spAutoFit/>
+          </a:bodyPr>
+          <a:lstStyle/>
+          <a:p>
+            <a:r>
+              <a:rPr lang="en-US" sz="1200" b="1" dirty="0" err="1">
+                <a:solidFill>
+                  <a:schemeClr val="tx1">
+                    <a:lumMod val="75000"/>
+                    <a:lumOff val="25000"/>
+                  </a:schemeClr>
+                </a:solidFill>
+              </a:rPr>
+              <a:t>Crimsonian</a:t>
+            </a:r>
+            <a:r>
+              <a:rPr lang="en-US" sz="1200" b="1" dirty="0">
+                <a:solidFill>
+                  <a:schemeClr val="tx1">
+                    <a:lumMod val="75000"/>
+                    <a:lumOff val="25000"/>
+                  </a:schemeClr>
+                </a:solidFill>
+              </a:rPr>
+              <a:t> Railway Operational Room </a:t>
+            </a:r>
+            <a:endParaRPr lang="en-SG" sz="1200" b="1" dirty="0">
+              <a:solidFill>
+                <a:schemeClr val="tx1">
+                  <a:lumMod val="75000"/>
+                  <a:lumOff val="25000"/>
+                </a:schemeClr>
+              </a:solidFill>
+            </a:endParaRPr>
+          </a:p>
+        </p:txBody>
+      </p:sp>
+      <p:pic>
+        <p:nvPicPr>
+          <p:cNvPr id="19" name="Picture 18">
+            <a:extLst>
+              <a:ext uri="{FF2B5EF4-FFF2-40B4-BE49-F238E27FC236}">
+                <a16:creationId xmlns:a16="http://schemas.microsoft.com/office/drawing/2014/main" id="{0022C32E-624C-D3F0-0F4C-4A37F0A87699}"/>
+              </a:ext>
+            </a:extLst>
+          </p:cNvPr>
+          <p:cNvPicPr>
+            <a:picLocks noChangeAspect="1"/>
+          </p:cNvPicPr>
+          <p:nvPr/>
+        </p:nvPicPr>
+        <p:blipFill>
+          <a:blip r:embed="rId3"/>
+          <a:stretch>
+            <a:fillRect/>
+          </a:stretch>
+        </p:blipFill>
+        <p:spPr>
+          <a:xfrm>
+            <a:off x="3696984" y="3302274"/>
+            <a:ext cx="657045" cy="374211"/>
+          </a:xfrm>
+          <a:prstGeom prst="rect">
+            <a:avLst/>
+          </a:prstGeom>
+        </p:spPr>
+      </p:pic>
+      <p:cxnSp>
+        <p:nvCxnSpPr>
+          <p:cNvPr id="20" name="Straight Connector 19">
+            <a:extLst>
+              <a:ext uri="{FF2B5EF4-FFF2-40B4-BE49-F238E27FC236}">
+                <a16:creationId xmlns:a16="http://schemas.microsoft.com/office/drawing/2014/main" id="{17100DFE-7B76-1F54-73B9-4506BBB63DBD}"/>
+              </a:ext>
+            </a:extLst>
+          </p:cNvPr>
+          <p:cNvCxnSpPr>
+            <a:cxnSpLocks/>
+            <a:stCxn id="4" idx="1"/>
+            <a:endCxn id="19" idx="3"/>
+          </p:cNvCxnSpPr>
+          <p:nvPr/>
+        </p:nvCxnSpPr>
+        <p:spPr>
+          <a:xfrm flipH="1">
+            <a:off x="4354029" y="2754268"/>
+            <a:ext cx="1224282" cy="735112"/>
+          </a:xfrm>
+          <a:prstGeom prst="line">
+            <a:avLst/>
+          </a:prstGeom>
+          <a:ln w="19050"/>
+        </p:spPr>
+        <p:style>
+          <a:lnRef idx="1">
+            <a:schemeClr val="accent1"/>
+          </a:lnRef>
+          <a:fillRef idx="0">
+            <a:schemeClr val="accent1"/>
+          </a:fillRef>
+          <a:effectRef idx="0">
+            <a:schemeClr val="accent1"/>
+          </a:effectRef>
+          <a:fontRef idx="minor">
+            <a:schemeClr val="tx1"/>
+          </a:fontRef>
+        </p:style>
+      </p:cxnSp>
+      <p:sp>
+        <p:nvSpPr>
+          <p:cNvPr id="21" name="TextBox 20">
+            <a:extLst>
+              <a:ext uri="{FF2B5EF4-FFF2-40B4-BE49-F238E27FC236}">
+                <a16:creationId xmlns:a16="http://schemas.microsoft.com/office/drawing/2014/main" id="{E3DEA3C6-2075-0D8F-4F7E-D4CCAA26FCAA}"/>
+              </a:ext>
+            </a:extLst>
+          </p:cNvPr>
+          <p:cNvSpPr txBox="1"/>
+          <p:nvPr/>
+        </p:nvSpPr>
+        <p:spPr>
+          <a:xfrm>
+            <a:off x="4780439" y="2400661"/>
+            <a:ext cx="946045" cy="246221"/>
+          </a:xfrm>
+          <a:prstGeom prst="rect">
+            <a:avLst/>
+          </a:prstGeom>
+          <a:noFill/>
+        </p:spPr>
+        <p:txBody>
+          <a:bodyPr wrap="square">
+            <a:spAutoFit/>
+          </a:bodyPr>
+          <a:lstStyle/>
+          <a:p>
+            <a:r>
+              <a:rPr lang="en-US" sz="1000" b="1" dirty="0">
+                <a:solidFill>
+                  <a:schemeClr val="accent1"/>
+                </a:solidFill>
+              </a:rPr>
+              <a:t>10.107.X07.1</a:t>
+            </a:r>
+            <a:endParaRPr lang="en-SG" sz="1000" b="1" dirty="0">
+              <a:solidFill>
+                <a:schemeClr val="accent1"/>
+              </a:solidFill>
+            </a:endParaRPr>
+          </a:p>
+        </p:txBody>
+      </p:sp>
+      <p:sp>
+        <p:nvSpPr>
+          <p:cNvPr id="22" name="TextBox 21">
+            <a:extLst>
+              <a:ext uri="{FF2B5EF4-FFF2-40B4-BE49-F238E27FC236}">
+                <a16:creationId xmlns:a16="http://schemas.microsoft.com/office/drawing/2014/main" id="{E2F113EF-6662-7B0B-0876-B39A18990B0C}"/>
+              </a:ext>
+            </a:extLst>
+          </p:cNvPr>
+          <p:cNvSpPr txBox="1"/>
+          <p:nvPr/>
+        </p:nvSpPr>
+        <p:spPr>
+          <a:xfrm>
+            <a:off x="6573536" y="2908537"/>
+            <a:ext cx="946045" cy="246221"/>
+          </a:xfrm>
+          <a:prstGeom prst="rect">
+            <a:avLst/>
+          </a:prstGeom>
+          <a:noFill/>
+        </p:spPr>
+        <p:txBody>
+          <a:bodyPr wrap="square">
+            <a:spAutoFit/>
+          </a:bodyPr>
+          <a:lstStyle/>
+          <a:p>
+            <a:r>
+              <a:rPr lang="en-US" sz="1000" b="1" dirty="0">
+                <a:solidFill>
+                  <a:schemeClr val="accent1"/>
+                </a:solidFill>
+              </a:rPr>
+              <a:t>10.107.X04.1</a:t>
+            </a:r>
+            <a:endParaRPr lang="en-SG" sz="1000" b="1" dirty="0">
+              <a:solidFill>
+                <a:schemeClr val="accent1"/>
+              </a:solidFill>
+            </a:endParaRPr>
+          </a:p>
+        </p:txBody>
+      </p:sp>
+      <p:pic>
+        <p:nvPicPr>
+          <p:cNvPr id="23" name="Picture 22" descr="A screenshot of a computer&#10;&#10;Description automatically generated">
+            <a:extLst>
+              <a:ext uri="{FF2B5EF4-FFF2-40B4-BE49-F238E27FC236}">
+                <a16:creationId xmlns:a16="http://schemas.microsoft.com/office/drawing/2014/main" id="{08C251A4-A36B-7C24-E513-41F19A47D657}"/>
+              </a:ext>
+            </a:extLst>
+          </p:cNvPr>
+          <p:cNvPicPr>
+            <a:picLocks noChangeAspect="1"/>
+          </p:cNvPicPr>
+          <p:nvPr/>
+        </p:nvPicPr>
+        <p:blipFill>
+          <a:blip r:embed="rId5">
+            <a:extLst>
+              <a:ext uri="{28A0092B-C50C-407E-A947-70E740481C1C}">
+                <a14:useLocalDpi xmlns:a14="http://schemas.microsoft.com/office/drawing/2010/main" val="0"/>
+              </a:ext>
+            </a:extLst>
+          </a:blip>
+          <a:stretch>
+            <a:fillRect/>
+          </a:stretch>
+        </p:blipFill>
+        <p:spPr>
+          <a:xfrm>
+            <a:off x="361743" y="2201460"/>
+            <a:ext cx="2186396" cy="1252342"/>
+          </a:xfrm>
+          <a:prstGeom prst="rect">
+            <a:avLst/>
+          </a:prstGeom>
+          <a:ln w="9525">
+            <a:solidFill>
+              <a:schemeClr val="tx1"/>
+            </a:solidFill>
+          </a:ln>
+        </p:spPr>
+      </p:pic>
+      <p:cxnSp>
+        <p:nvCxnSpPr>
+          <p:cNvPr id="24" name="Straight Connector 23">
+            <a:extLst>
+              <a:ext uri="{FF2B5EF4-FFF2-40B4-BE49-F238E27FC236}">
+                <a16:creationId xmlns:a16="http://schemas.microsoft.com/office/drawing/2014/main" id="{8F742055-EDB3-81BE-9B32-B81B2887B579}"/>
+              </a:ext>
+            </a:extLst>
+          </p:cNvPr>
+          <p:cNvCxnSpPr>
+            <a:cxnSpLocks/>
+            <a:stCxn id="23" idx="3"/>
+            <a:endCxn id="19" idx="1"/>
+          </p:cNvCxnSpPr>
+          <p:nvPr/>
+        </p:nvCxnSpPr>
+        <p:spPr>
+          <a:xfrm>
+            <a:off x="2548139" y="2827631"/>
+            <a:ext cx="1148845" cy="661749"/>
+          </a:xfrm>
+          <a:prstGeom prst="line">
+            <a:avLst/>
+          </a:prstGeom>
+          <a:ln w="19050"/>
+        </p:spPr>
+        <p:style>
+          <a:lnRef idx="1">
+            <a:schemeClr val="accent1"/>
+          </a:lnRef>
+          <a:fillRef idx="0">
+            <a:schemeClr val="accent1"/>
+          </a:fillRef>
+          <a:effectRef idx="0">
+            <a:schemeClr val="accent1"/>
+          </a:effectRef>
+          <a:fontRef idx="minor">
+            <a:schemeClr val="tx1"/>
+          </a:fontRef>
+        </p:style>
+      </p:cxnSp>
+      <p:pic>
+        <p:nvPicPr>
+          <p:cNvPr id="25" name="Picture 24">
+            <a:extLst>
+              <a:ext uri="{FF2B5EF4-FFF2-40B4-BE49-F238E27FC236}">
+                <a16:creationId xmlns:a16="http://schemas.microsoft.com/office/drawing/2014/main" id="{C8B7E374-AF8E-2B2F-0185-AF1CAF9F642A}"/>
+              </a:ext>
+            </a:extLst>
+          </p:cNvPr>
+          <p:cNvPicPr>
+            <a:picLocks noChangeAspect="1"/>
+          </p:cNvPicPr>
+          <p:nvPr/>
+        </p:nvPicPr>
+        <p:blipFill>
+          <a:blip r:embed="rId4"/>
+          <a:stretch>
+            <a:fillRect/>
+          </a:stretch>
+        </p:blipFill>
+        <p:spPr>
+          <a:xfrm>
+            <a:off x="3627372" y="1742908"/>
+            <a:ext cx="750074" cy="660780"/>
+          </a:xfrm>
+          <a:prstGeom prst="rect">
+            <a:avLst/>
+          </a:prstGeom>
+        </p:spPr>
+      </p:pic>
+      <p:sp>
+        <p:nvSpPr>
+          <p:cNvPr id="26" name="TextBox 25">
+            <a:extLst>
+              <a:ext uri="{FF2B5EF4-FFF2-40B4-BE49-F238E27FC236}">
+                <a16:creationId xmlns:a16="http://schemas.microsoft.com/office/drawing/2014/main" id="{9E584EC0-6A46-96E8-F429-5B2956A4D0E7}"/>
+              </a:ext>
+            </a:extLst>
+          </p:cNvPr>
+          <p:cNvSpPr txBox="1"/>
+          <p:nvPr/>
+        </p:nvSpPr>
+        <p:spPr>
+          <a:xfrm>
+            <a:off x="3530248" y="2414043"/>
+            <a:ext cx="1402244" cy="246221"/>
+          </a:xfrm>
+          <a:prstGeom prst="rect">
+            <a:avLst/>
+          </a:prstGeom>
+          <a:noFill/>
+        </p:spPr>
+        <p:txBody>
+          <a:bodyPr wrap="square">
+            <a:spAutoFit/>
+          </a:bodyPr>
+          <a:lstStyle/>
+          <a:p>
+            <a:r>
+              <a:rPr lang="en-US" sz="1000" b="1" dirty="0">
+                <a:solidFill>
+                  <a:schemeClr val="tx1">
+                    <a:lumMod val="75000"/>
+                    <a:lumOff val="25000"/>
+                  </a:schemeClr>
+                </a:solidFill>
+              </a:rPr>
+              <a:t>VM_ID</a:t>
+            </a:r>
+            <a:r>
+              <a:rPr lang="en-US" sz="1000" dirty="0">
+                <a:solidFill>
+                  <a:schemeClr val="tx1">
+                    <a:lumMod val="75000"/>
+                    <a:lumOff val="25000"/>
+                  </a:schemeClr>
+                </a:solidFill>
+              </a:rPr>
+              <a:t>: rail-op-victim</a:t>
+            </a:r>
+            <a:endParaRPr lang="en-SG" sz="1000" dirty="0">
+              <a:solidFill>
+                <a:schemeClr val="tx1">
+                  <a:lumMod val="75000"/>
+                  <a:lumOff val="25000"/>
+                </a:schemeClr>
+              </a:solidFill>
+            </a:endParaRPr>
+          </a:p>
+        </p:txBody>
+      </p:sp>
+      <p:cxnSp>
+        <p:nvCxnSpPr>
+          <p:cNvPr id="27" name="Straight Connector 26">
+            <a:extLst>
+              <a:ext uri="{FF2B5EF4-FFF2-40B4-BE49-F238E27FC236}">
+                <a16:creationId xmlns:a16="http://schemas.microsoft.com/office/drawing/2014/main" id="{F7770976-67AA-C8BF-21CB-A4AFAB264FD1}"/>
+              </a:ext>
+            </a:extLst>
+          </p:cNvPr>
+          <p:cNvCxnSpPr>
+            <a:cxnSpLocks/>
+            <a:stCxn id="25" idx="2"/>
+            <a:endCxn id="19" idx="0"/>
+          </p:cNvCxnSpPr>
+          <p:nvPr/>
+        </p:nvCxnSpPr>
+        <p:spPr>
+          <a:xfrm>
+            <a:off x="4002409" y="2403688"/>
+            <a:ext cx="23098" cy="898586"/>
+          </a:xfrm>
+          <a:prstGeom prst="line">
+            <a:avLst/>
+          </a:prstGeom>
+          <a:ln w="19050"/>
+        </p:spPr>
+        <p:style>
+          <a:lnRef idx="1">
+            <a:schemeClr val="accent1"/>
+          </a:lnRef>
+          <a:fillRef idx="0">
+            <a:schemeClr val="accent1"/>
+          </a:fillRef>
+          <a:effectRef idx="0">
+            <a:schemeClr val="accent1"/>
+          </a:effectRef>
+          <a:fontRef idx="minor">
+            <a:schemeClr val="tx1"/>
+          </a:fontRef>
+        </p:style>
+      </p:cxnSp>
+      <p:sp>
+        <p:nvSpPr>
+          <p:cNvPr id="28" name="TextBox 27">
+            <a:extLst>
+              <a:ext uri="{FF2B5EF4-FFF2-40B4-BE49-F238E27FC236}">
+                <a16:creationId xmlns:a16="http://schemas.microsoft.com/office/drawing/2014/main" id="{8A6659E3-384E-7DB6-E287-CCB757C9CD9D}"/>
+              </a:ext>
+            </a:extLst>
+          </p:cNvPr>
+          <p:cNvSpPr txBox="1"/>
+          <p:nvPr/>
+        </p:nvSpPr>
+        <p:spPr>
+          <a:xfrm>
+            <a:off x="3559060" y="2581410"/>
+            <a:ext cx="946045" cy="246221"/>
+          </a:xfrm>
+          <a:prstGeom prst="rect">
+            <a:avLst/>
+          </a:prstGeom>
+          <a:noFill/>
+        </p:spPr>
+        <p:txBody>
+          <a:bodyPr wrap="square">
+            <a:spAutoFit/>
+          </a:bodyPr>
+          <a:lstStyle/>
+          <a:p>
+            <a:r>
+              <a:rPr lang="en-US" sz="1000" b="1" dirty="0">
+                <a:solidFill>
+                  <a:schemeClr val="accent1"/>
+                </a:solidFill>
+              </a:rPr>
+              <a:t>10.107.X07.6</a:t>
+            </a:r>
+            <a:endParaRPr lang="en-SG" sz="1000" b="1" dirty="0">
+              <a:solidFill>
+                <a:schemeClr val="accent1"/>
+              </a:solidFill>
+            </a:endParaRPr>
+          </a:p>
+        </p:txBody>
+      </p:sp>
+      <p:pic>
+        <p:nvPicPr>
+          <p:cNvPr id="29" name="Picture 28">
+            <a:extLst>
+              <a:ext uri="{FF2B5EF4-FFF2-40B4-BE49-F238E27FC236}">
+                <a16:creationId xmlns:a16="http://schemas.microsoft.com/office/drawing/2014/main" id="{D0E36DD5-5A33-AE23-3E25-D17BB3FFB362}"/>
+              </a:ext>
+            </a:extLst>
+          </p:cNvPr>
+          <p:cNvPicPr>
+            <a:picLocks noChangeAspect="1"/>
+          </p:cNvPicPr>
+          <p:nvPr/>
+        </p:nvPicPr>
+        <p:blipFill>
+          <a:blip r:embed="rId6"/>
+          <a:stretch>
+            <a:fillRect/>
+          </a:stretch>
+        </p:blipFill>
+        <p:spPr>
+          <a:xfrm>
+            <a:off x="6394148" y="2958418"/>
+            <a:ext cx="187634" cy="191125"/>
+          </a:xfrm>
+          <a:prstGeom prst="rect">
+            <a:avLst/>
+          </a:prstGeom>
+          <a:ln w="6350">
+            <a:solidFill>
+              <a:schemeClr val="tx1"/>
+            </a:solidFill>
+          </a:ln>
+        </p:spPr>
+      </p:pic>
+      <p:pic>
+        <p:nvPicPr>
+          <p:cNvPr id="30" name="Picture 29">
+            <a:extLst>
+              <a:ext uri="{FF2B5EF4-FFF2-40B4-BE49-F238E27FC236}">
+                <a16:creationId xmlns:a16="http://schemas.microsoft.com/office/drawing/2014/main" id="{69E5AB57-8B52-879E-32B9-650B2333AFD1}"/>
+              </a:ext>
+            </a:extLst>
+          </p:cNvPr>
+          <p:cNvPicPr>
+            <a:picLocks noChangeAspect="1"/>
+          </p:cNvPicPr>
+          <p:nvPr/>
+        </p:nvPicPr>
+        <p:blipFill>
+          <a:blip r:embed="rId6"/>
+          <a:stretch>
+            <a:fillRect/>
+          </a:stretch>
+        </p:blipFill>
+        <p:spPr>
+          <a:xfrm>
+            <a:off x="9552803" y="3377243"/>
+            <a:ext cx="187634" cy="191125"/>
+          </a:xfrm>
+          <a:prstGeom prst="rect">
+            <a:avLst/>
+          </a:prstGeom>
+          <a:ln w="6350">
+            <a:solidFill>
+              <a:schemeClr val="tx1"/>
+            </a:solidFill>
+          </a:ln>
+        </p:spPr>
+      </p:pic>
+      <p:sp>
+        <p:nvSpPr>
+          <p:cNvPr id="31" name="TextBox 30">
+            <a:extLst>
+              <a:ext uri="{FF2B5EF4-FFF2-40B4-BE49-F238E27FC236}">
+                <a16:creationId xmlns:a16="http://schemas.microsoft.com/office/drawing/2014/main" id="{BC89A259-B776-6626-549C-56E5BB0AB679}"/>
+              </a:ext>
+            </a:extLst>
+          </p:cNvPr>
+          <p:cNvSpPr txBox="1"/>
+          <p:nvPr/>
+        </p:nvSpPr>
+        <p:spPr>
+          <a:xfrm>
+            <a:off x="10069856" y="1780234"/>
+            <a:ext cx="1563134" cy="461665"/>
+          </a:xfrm>
+          <a:prstGeom prst="rect">
+            <a:avLst/>
+          </a:prstGeom>
+          <a:noFill/>
+        </p:spPr>
+        <p:txBody>
+          <a:bodyPr wrap="square">
+            <a:spAutoFit/>
+          </a:bodyPr>
+          <a:lstStyle/>
+          <a:p>
+            <a:r>
+              <a:rPr lang="en-US" sz="1200" dirty="0">
+                <a:solidFill>
+                  <a:schemeClr val="tx1">
+                    <a:lumMod val="75000"/>
+                    <a:lumOff val="25000"/>
+                  </a:schemeClr>
+                </a:solidFill>
+              </a:rPr>
+              <a:t>Production network [PLC mode bus]</a:t>
+            </a:r>
+            <a:endParaRPr lang="en-SG" sz="1200" dirty="0">
+              <a:solidFill>
+                <a:schemeClr val="tx1">
+                  <a:lumMod val="75000"/>
+                  <a:lumOff val="25000"/>
+                </a:schemeClr>
+              </a:solidFill>
+            </a:endParaRPr>
+          </a:p>
+        </p:txBody>
+      </p:sp>
+      <p:sp>
+        <p:nvSpPr>
+          <p:cNvPr id="32" name="TextBox 31">
+            <a:extLst>
+              <a:ext uri="{FF2B5EF4-FFF2-40B4-BE49-F238E27FC236}">
+                <a16:creationId xmlns:a16="http://schemas.microsoft.com/office/drawing/2014/main" id="{31B6D06A-868A-050D-BD14-756141960F77}"/>
+              </a:ext>
+            </a:extLst>
+          </p:cNvPr>
+          <p:cNvSpPr txBox="1"/>
+          <p:nvPr/>
+        </p:nvSpPr>
+        <p:spPr>
+          <a:xfrm>
+            <a:off x="10220846" y="2445008"/>
+            <a:ext cx="1241626" cy="553998"/>
+          </a:xfrm>
+          <a:prstGeom prst="rect">
+            <a:avLst/>
+          </a:prstGeom>
+          <a:noFill/>
+        </p:spPr>
+        <p:txBody>
+          <a:bodyPr wrap="square">
+            <a:spAutoFit/>
+          </a:bodyPr>
+          <a:lstStyle/>
+          <a:p>
+            <a:r>
+              <a:rPr lang="en-US" sz="1000" b="1" dirty="0">
+                <a:solidFill>
+                  <a:schemeClr val="tx1">
+                    <a:lumMod val="75000"/>
+                    <a:lumOff val="25000"/>
+                  </a:schemeClr>
+                </a:solidFill>
+              </a:rPr>
+              <a:t>VM_ID</a:t>
+            </a:r>
+            <a:r>
+              <a:rPr lang="en-US" sz="1000" dirty="0">
+                <a:solidFill>
+                  <a:schemeClr val="tx1">
+                    <a:lumMod val="75000"/>
+                    <a:lumOff val="25000"/>
+                  </a:schemeClr>
+                </a:solidFill>
+              </a:rPr>
+              <a:t>:rail-ed-plc02</a:t>
+            </a:r>
+          </a:p>
+          <a:p>
+            <a:r>
+              <a:rPr lang="en-US" sz="1000" b="1" dirty="0" err="1">
+                <a:solidFill>
+                  <a:schemeClr val="tx1">
+                    <a:lumMod val="75000"/>
+                    <a:lumOff val="25000"/>
+                  </a:schemeClr>
+                </a:solidFill>
+              </a:rPr>
+              <a:t>Func</a:t>
+            </a:r>
+            <a:r>
+              <a:rPr lang="en-US" sz="1000" dirty="0">
+                <a:solidFill>
+                  <a:schemeClr val="tx1">
+                    <a:lumMod val="75000"/>
+                    <a:lumOff val="25000"/>
+                  </a:schemeClr>
+                </a:solidFill>
+              </a:rPr>
+              <a:t>: Station Plc set</a:t>
+            </a:r>
+          </a:p>
+          <a:p>
+            <a:r>
+              <a:rPr lang="en-US" sz="1000" b="1" dirty="0">
+                <a:solidFill>
+                  <a:schemeClr val="tx1">
+                    <a:lumMod val="75000"/>
+                    <a:lumOff val="25000"/>
+                  </a:schemeClr>
+                </a:solidFill>
+              </a:rPr>
+              <a:t>State</a:t>
+            </a:r>
+            <a:r>
+              <a:rPr lang="en-US" sz="1000" dirty="0">
+                <a:solidFill>
+                  <a:schemeClr val="tx1">
+                    <a:lumMod val="75000"/>
+                    <a:lumOff val="25000"/>
+                  </a:schemeClr>
+                </a:solidFill>
+              </a:rPr>
+              <a:t>: </a:t>
+            </a:r>
+            <a:r>
+              <a:rPr lang="en-US" sz="1000" b="1" dirty="0">
+                <a:solidFill>
+                  <a:srgbClr val="00B050"/>
+                </a:solidFill>
+              </a:rPr>
+              <a:t>ready</a:t>
+            </a:r>
+            <a:endParaRPr lang="en-SG" sz="1000" b="1" dirty="0">
+              <a:solidFill>
+                <a:srgbClr val="00B050"/>
+              </a:solidFill>
+            </a:endParaRPr>
+          </a:p>
+        </p:txBody>
+      </p:sp>
+      <p:pic>
+        <p:nvPicPr>
+          <p:cNvPr id="33" name="Picture 32">
+            <a:extLst>
+              <a:ext uri="{FF2B5EF4-FFF2-40B4-BE49-F238E27FC236}">
+                <a16:creationId xmlns:a16="http://schemas.microsoft.com/office/drawing/2014/main" id="{C5CF0F10-1D52-83B5-A5FE-B022B7C6FCCF}"/>
+              </a:ext>
+            </a:extLst>
+          </p:cNvPr>
+          <p:cNvPicPr>
+            <a:picLocks noChangeAspect="1"/>
+          </p:cNvPicPr>
+          <p:nvPr/>
+        </p:nvPicPr>
+        <p:blipFill>
+          <a:blip r:embed="rId6"/>
+          <a:stretch>
+            <a:fillRect/>
+          </a:stretch>
+        </p:blipFill>
+        <p:spPr>
+          <a:xfrm>
+            <a:off x="10080031" y="2752324"/>
+            <a:ext cx="187634" cy="191125"/>
+          </a:xfrm>
+          <a:prstGeom prst="rect">
+            <a:avLst/>
+          </a:prstGeom>
+          <a:ln w="6350">
+            <a:solidFill>
+              <a:schemeClr val="tx1"/>
+            </a:solidFill>
+          </a:ln>
+        </p:spPr>
+      </p:pic>
+      <p:sp>
+        <p:nvSpPr>
+          <p:cNvPr id="34" name="TextBox 33">
+            <a:extLst>
+              <a:ext uri="{FF2B5EF4-FFF2-40B4-BE49-F238E27FC236}">
+                <a16:creationId xmlns:a16="http://schemas.microsoft.com/office/drawing/2014/main" id="{4ABDC59B-9867-4CDC-B26C-C4C34822EDDB}"/>
+              </a:ext>
+            </a:extLst>
+          </p:cNvPr>
+          <p:cNvSpPr txBox="1"/>
+          <p:nvPr/>
+        </p:nvSpPr>
+        <p:spPr>
+          <a:xfrm>
+            <a:off x="2517716" y="2640526"/>
+            <a:ext cx="946045" cy="246221"/>
+          </a:xfrm>
+          <a:prstGeom prst="rect">
+            <a:avLst/>
+          </a:prstGeom>
+          <a:noFill/>
+        </p:spPr>
+        <p:txBody>
+          <a:bodyPr wrap="square">
+            <a:spAutoFit/>
+          </a:bodyPr>
+          <a:lstStyle/>
+          <a:p>
+            <a:r>
+              <a:rPr lang="en-US" sz="1000" b="1" dirty="0"/>
+              <a:t>10.107.107.4</a:t>
+            </a:r>
+            <a:endParaRPr lang="en-SG" sz="1000" b="1" dirty="0"/>
+          </a:p>
+        </p:txBody>
+      </p:sp>
+      <p:sp>
+        <p:nvSpPr>
+          <p:cNvPr id="35" name="TextBox 34">
+            <a:extLst>
+              <a:ext uri="{FF2B5EF4-FFF2-40B4-BE49-F238E27FC236}">
+                <a16:creationId xmlns:a16="http://schemas.microsoft.com/office/drawing/2014/main" id="{9C15D54A-CA90-8A5F-B0A5-1816EEB94081}"/>
+              </a:ext>
+            </a:extLst>
+          </p:cNvPr>
+          <p:cNvSpPr txBox="1"/>
+          <p:nvPr/>
+        </p:nvSpPr>
+        <p:spPr>
+          <a:xfrm>
+            <a:off x="315628" y="3483164"/>
+            <a:ext cx="1720956" cy="553998"/>
+          </a:xfrm>
+          <a:prstGeom prst="rect">
+            <a:avLst/>
+          </a:prstGeom>
+          <a:noFill/>
+        </p:spPr>
+        <p:txBody>
+          <a:bodyPr wrap="square">
+            <a:spAutoFit/>
+          </a:bodyPr>
+          <a:lstStyle/>
+          <a:p>
+            <a:r>
+              <a:rPr lang="en-US" sz="1000" b="1" dirty="0">
+                <a:solidFill>
+                  <a:schemeClr val="tx1">
+                    <a:lumMod val="75000"/>
+                    <a:lumOff val="25000"/>
+                  </a:schemeClr>
+                </a:solidFill>
+              </a:rPr>
+              <a:t>VM_ID</a:t>
+            </a:r>
+            <a:r>
+              <a:rPr lang="en-US" sz="1000" dirty="0">
+                <a:solidFill>
+                  <a:schemeClr val="tx1">
+                    <a:lumMod val="75000"/>
+                    <a:lumOff val="25000"/>
+                  </a:schemeClr>
+                </a:solidFill>
+              </a:rPr>
+              <a:t>: railway-op-</a:t>
+            </a:r>
+            <a:r>
+              <a:rPr lang="en-US" sz="1000" dirty="0" err="1">
+                <a:solidFill>
+                  <a:schemeClr val="tx1">
+                    <a:lumMod val="75000"/>
+                    <a:lumOff val="25000"/>
+                  </a:schemeClr>
+                </a:solidFill>
+              </a:rPr>
+              <a:t>scadahmi</a:t>
+            </a:r>
+            <a:endParaRPr lang="en-US" sz="1000" dirty="0">
+              <a:solidFill>
+                <a:schemeClr val="tx1">
+                  <a:lumMod val="75000"/>
+                  <a:lumOff val="25000"/>
+                </a:schemeClr>
+              </a:solidFill>
+            </a:endParaRPr>
+          </a:p>
+          <a:p>
+            <a:r>
+              <a:rPr lang="en-US" sz="1000" b="1" dirty="0" err="1">
+                <a:solidFill>
+                  <a:schemeClr val="tx1">
+                    <a:lumMod val="75000"/>
+                    <a:lumOff val="25000"/>
+                  </a:schemeClr>
+                </a:solidFill>
+              </a:rPr>
+              <a:t>Func</a:t>
+            </a:r>
+            <a:r>
+              <a:rPr lang="en-US" sz="1000" dirty="0">
+                <a:solidFill>
+                  <a:schemeClr val="tx1">
+                    <a:lumMod val="75000"/>
+                    <a:lumOff val="25000"/>
+                  </a:schemeClr>
+                </a:solidFill>
+              </a:rPr>
+              <a:t>: Railway HQ HMI</a:t>
+            </a:r>
+          </a:p>
+          <a:p>
+            <a:r>
+              <a:rPr lang="en-US" sz="1000" b="1" dirty="0">
+                <a:solidFill>
+                  <a:schemeClr val="tx1">
+                    <a:lumMod val="75000"/>
+                    <a:lumOff val="25000"/>
+                  </a:schemeClr>
+                </a:solidFill>
+              </a:rPr>
+              <a:t>State</a:t>
+            </a:r>
+            <a:r>
+              <a:rPr lang="en-US" sz="1000" dirty="0">
+                <a:solidFill>
+                  <a:schemeClr val="tx1">
+                    <a:lumMod val="75000"/>
+                    <a:lumOff val="25000"/>
+                  </a:schemeClr>
+                </a:solidFill>
+              </a:rPr>
+              <a:t>: </a:t>
+            </a:r>
+            <a:r>
+              <a:rPr lang="en-US" sz="1000" b="1" dirty="0">
+                <a:solidFill>
+                  <a:srgbClr val="00B050"/>
+                </a:solidFill>
+              </a:rPr>
+              <a:t>ready</a:t>
+            </a:r>
+            <a:endParaRPr lang="en-SG" sz="1000" b="1" dirty="0">
+              <a:solidFill>
+                <a:srgbClr val="00B050"/>
+              </a:solidFill>
+            </a:endParaRPr>
+          </a:p>
+        </p:txBody>
+      </p:sp>
+      <p:pic>
+        <p:nvPicPr>
+          <p:cNvPr id="36" name="Picture 35">
+            <a:extLst>
+              <a:ext uri="{FF2B5EF4-FFF2-40B4-BE49-F238E27FC236}">
+                <a16:creationId xmlns:a16="http://schemas.microsoft.com/office/drawing/2014/main" id="{C7867774-BA39-5BD5-2AAB-46D0D78BD2B7}"/>
+              </a:ext>
+            </a:extLst>
+          </p:cNvPr>
+          <p:cNvPicPr>
+            <a:picLocks noChangeAspect="1"/>
+          </p:cNvPicPr>
+          <p:nvPr/>
+        </p:nvPicPr>
+        <p:blipFill>
+          <a:blip r:embed="rId6"/>
+          <a:stretch>
+            <a:fillRect/>
+          </a:stretch>
+        </p:blipFill>
+        <p:spPr>
+          <a:xfrm>
+            <a:off x="2294325" y="3252737"/>
+            <a:ext cx="187634" cy="191125"/>
+          </a:xfrm>
+          <a:prstGeom prst="rect">
+            <a:avLst/>
+          </a:prstGeom>
+          <a:ln w="6350">
+            <a:solidFill>
+              <a:schemeClr val="tx1"/>
+            </a:solidFill>
+          </a:ln>
+        </p:spPr>
+      </p:pic>
+      <p:pic>
+        <p:nvPicPr>
+          <p:cNvPr id="37" name="Picture 36">
+            <a:extLst>
+              <a:ext uri="{FF2B5EF4-FFF2-40B4-BE49-F238E27FC236}">
+                <a16:creationId xmlns:a16="http://schemas.microsoft.com/office/drawing/2014/main" id="{C8D56187-11A7-9699-B835-B8E69FA3CE92}"/>
+              </a:ext>
+            </a:extLst>
+          </p:cNvPr>
+          <p:cNvPicPr>
+            <a:picLocks noChangeAspect="1"/>
+          </p:cNvPicPr>
+          <p:nvPr/>
+        </p:nvPicPr>
+        <p:blipFill>
+          <a:blip r:embed="rId7"/>
+          <a:stretch>
+            <a:fillRect/>
+          </a:stretch>
+        </p:blipFill>
+        <p:spPr>
+          <a:xfrm>
+            <a:off x="9594729" y="2580350"/>
+            <a:ext cx="297869" cy="175743"/>
+          </a:xfrm>
+          <a:prstGeom prst="rect">
+            <a:avLst/>
+          </a:prstGeom>
+          <a:ln>
+            <a:solidFill>
+              <a:schemeClr val="tx1"/>
+            </a:solidFill>
+          </a:ln>
+        </p:spPr>
+      </p:pic>
+      <p:pic>
+        <p:nvPicPr>
+          <p:cNvPr id="38" name="Picture 37">
+            <a:extLst>
+              <a:ext uri="{FF2B5EF4-FFF2-40B4-BE49-F238E27FC236}">
+                <a16:creationId xmlns:a16="http://schemas.microsoft.com/office/drawing/2014/main" id="{6473CE55-7EC2-708D-A60E-0413A8C37177}"/>
+              </a:ext>
+            </a:extLst>
+          </p:cNvPr>
+          <p:cNvPicPr>
+            <a:picLocks noChangeAspect="1"/>
+          </p:cNvPicPr>
+          <p:nvPr/>
+        </p:nvPicPr>
+        <p:blipFill>
+          <a:blip r:embed="rId7"/>
+          <a:stretch>
+            <a:fillRect/>
+          </a:stretch>
+        </p:blipFill>
+        <p:spPr>
+          <a:xfrm>
+            <a:off x="9084942" y="3211680"/>
+            <a:ext cx="297869" cy="175743"/>
+          </a:xfrm>
+          <a:prstGeom prst="rect">
+            <a:avLst/>
+          </a:prstGeom>
+          <a:ln>
+            <a:solidFill>
+              <a:schemeClr val="tx1"/>
+            </a:solidFill>
+          </a:ln>
+        </p:spPr>
+      </p:pic>
+      <p:cxnSp>
+        <p:nvCxnSpPr>
+          <p:cNvPr id="39" name="Straight Arrow Connector 38">
+            <a:extLst>
+              <a:ext uri="{FF2B5EF4-FFF2-40B4-BE49-F238E27FC236}">
+                <a16:creationId xmlns:a16="http://schemas.microsoft.com/office/drawing/2014/main" id="{EA8313CD-3CBB-C475-8371-B096E3EBDA1E}"/>
+              </a:ext>
+            </a:extLst>
+          </p:cNvPr>
+          <p:cNvCxnSpPr>
+            <a:cxnSpLocks/>
+          </p:cNvCxnSpPr>
+          <p:nvPr/>
+        </p:nvCxnSpPr>
+        <p:spPr>
+          <a:xfrm>
+            <a:off x="2660364" y="3108877"/>
+            <a:ext cx="915974" cy="515751"/>
+          </a:xfrm>
+          <a:prstGeom prst="straightConnector1">
+            <a:avLst/>
+          </a:prstGeom>
+          <a:ln w="28575">
+            <a:solidFill>
+              <a:schemeClr val="accent6">
+                <a:lumMod val="75000"/>
+              </a:schemeClr>
+            </a:solidFill>
+            <a:prstDash val="sysDash"/>
+            <a:headEnd type="triangle"/>
+            <a:tailEnd type="triangle"/>
+          </a:ln>
+        </p:spPr>
+        <p:style>
+          <a:lnRef idx="1">
+            <a:schemeClr val="accent1"/>
+          </a:lnRef>
+          <a:fillRef idx="0">
+            <a:schemeClr val="accent1"/>
+          </a:fillRef>
+          <a:effectRef idx="0">
+            <a:schemeClr val="accent1"/>
+          </a:effectRef>
+          <a:fontRef idx="minor">
+            <a:schemeClr val="tx1"/>
+          </a:fontRef>
+        </p:style>
+      </p:cxnSp>
+      <p:cxnSp>
+        <p:nvCxnSpPr>
+          <p:cNvPr id="40" name="Straight Arrow Connector 39">
+            <a:extLst>
+              <a:ext uri="{FF2B5EF4-FFF2-40B4-BE49-F238E27FC236}">
+                <a16:creationId xmlns:a16="http://schemas.microsoft.com/office/drawing/2014/main" id="{A2A73AA8-9EF3-D8FB-5DF7-ACA413A0C6D9}"/>
+              </a:ext>
+            </a:extLst>
+          </p:cNvPr>
+          <p:cNvCxnSpPr>
+            <a:cxnSpLocks/>
+          </p:cNvCxnSpPr>
+          <p:nvPr/>
+        </p:nvCxnSpPr>
+        <p:spPr>
+          <a:xfrm flipV="1">
+            <a:off x="4341406" y="3013075"/>
+            <a:ext cx="1125147" cy="617355"/>
+          </a:xfrm>
+          <a:prstGeom prst="straightConnector1">
+            <a:avLst/>
+          </a:prstGeom>
+          <a:ln w="28575">
+            <a:solidFill>
+              <a:schemeClr val="accent6">
+                <a:lumMod val="75000"/>
+              </a:schemeClr>
+            </a:solidFill>
+            <a:prstDash val="sysDash"/>
+            <a:headEnd type="triangle"/>
+            <a:tailEnd type="triangle"/>
+          </a:ln>
+        </p:spPr>
+        <p:style>
+          <a:lnRef idx="1">
+            <a:schemeClr val="accent1"/>
+          </a:lnRef>
+          <a:fillRef idx="0">
+            <a:schemeClr val="accent1"/>
+          </a:fillRef>
+          <a:effectRef idx="0">
+            <a:schemeClr val="accent1"/>
+          </a:effectRef>
+          <a:fontRef idx="minor">
+            <a:schemeClr val="tx1"/>
+          </a:fontRef>
+        </p:style>
+      </p:cxnSp>
+      <p:cxnSp>
+        <p:nvCxnSpPr>
+          <p:cNvPr id="41" name="Straight Arrow Connector 40">
+            <a:extLst>
+              <a:ext uri="{FF2B5EF4-FFF2-40B4-BE49-F238E27FC236}">
+                <a16:creationId xmlns:a16="http://schemas.microsoft.com/office/drawing/2014/main" id="{7A8095AB-27FE-5B58-9453-AB4A3D3065F6}"/>
+              </a:ext>
+            </a:extLst>
+          </p:cNvPr>
+          <p:cNvCxnSpPr>
+            <a:cxnSpLocks/>
+          </p:cNvCxnSpPr>
+          <p:nvPr/>
+        </p:nvCxnSpPr>
+        <p:spPr>
+          <a:xfrm flipV="1">
+            <a:off x="6649372" y="2211624"/>
+            <a:ext cx="1050847" cy="644211"/>
+          </a:xfrm>
+          <a:prstGeom prst="straightConnector1">
+            <a:avLst/>
+          </a:prstGeom>
+          <a:ln w="28575">
+            <a:solidFill>
+              <a:schemeClr val="accent6">
+                <a:lumMod val="75000"/>
+              </a:schemeClr>
+            </a:solidFill>
+            <a:prstDash val="sysDash"/>
+            <a:headEnd type="triangle"/>
+            <a:tailEnd type="triangle"/>
+          </a:ln>
+        </p:spPr>
+        <p:style>
+          <a:lnRef idx="1">
+            <a:schemeClr val="accent1"/>
+          </a:lnRef>
+          <a:fillRef idx="0">
+            <a:schemeClr val="accent1"/>
+          </a:fillRef>
+          <a:effectRef idx="0">
+            <a:schemeClr val="accent1"/>
+          </a:effectRef>
+          <a:fontRef idx="minor">
+            <a:schemeClr val="tx1"/>
+          </a:fontRef>
+        </p:style>
+      </p:cxnSp>
+      <p:cxnSp>
+        <p:nvCxnSpPr>
+          <p:cNvPr id="42" name="Straight Arrow Connector 41">
+            <a:extLst>
+              <a:ext uri="{FF2B5EF4-FFF2-40B4-BE49-F238E27FC236}">
+                <a16:creationId xmlns:a16="http://schemas.microsoft.com/office/drawing/2014/main" id="{BE3BC3AF-907E-FCD9-A9CE-40FAEAE07A74}"/>
+              </a:ext>
+            </a:extLst>
+          </p:cNvPr>
+          <p:cNvCxnSpPr>
+            <a:cxnSpLocks/>
+          </p:cNvCxnSpPr>
+          <p:nvPr/>
+        </p:nvCxnSpPr>
+        <p:spPr>
+          <a:xfrm>
+            <a:off x="8389851" y="2083745"/>
+            <a:ext cx="1490475" cy="197321"/>
+          </a:xfrm>
+          <a:prstGeom prst="straightConnector1">
+            <a:avLst/>
+          </a:prstGeom>
+          <a:ln w="28575">
+            <a:solidFill>
+              <a:schemeClr val="accent6">
+                <a:lumMod val="75000"/>
+              </a:schemeClr>
+            </a:solidFill>
+            <a:prstDash val="sysDash"/>
+            <a:headEnd type="triangle"/>
+            <a:tailEnd type="triangle"/>
+          </a:ln>
+        </p:spPr>
+        <p:style>
+          <a:lnRef idx="1">
+            <a:schemeClr val="accent1"/>
+          </a:lnRef>
+          <a:fillRef idx="0">
+            <a:schemeClr val="accent1"/>
+          </a:fillRef>
+          <a:effectRef idx="0">
+            <a:schemeClr val="accent1"/>
+          </a:effectRef>
+          <a:fontRef idx="minor">
+            <a:schemeClr val="tx1"/>
+          </a:fontRef>
+        </p:style>
+      </p:cxnSp>
+      <p:cxnSp>
+        <p:nvCxnSpPr>
+          <p:cNvPr id="43" name="Straight Arrow Connector 42">
+            <a:extLst>
+              <a:ext uri="{FF2B5EF4-FFF2-40B4-BE49-F238E27FC236}">
+                <a16:creationId xmlns:a16="http://schemas.microsoft.com/office/drawing/2014/main" id="{6FA46728-384C-BF22-5753-C816E05AD4FD}"/>
+              </a:ext>
+            </a:extLst>
+          </p:cNvPr>
+          <p:cNvCxnSpPr>
+            <a:cxnSpLocks/>
+            <a:endCxn id="15" idx="1"/>
+          </p:cNvCxnSpPr>
+          <p:nvPr/>
+        </p:nvCxnSpPr>
+        <p:spPr>
+          <a:xfrm>
+            <a:off x="8011400" y="2294040"/>
+            <a:ext cx="957356" cy="678395"/>
+          </a:xfrm>
+          <a:prstGeom prst="straightConnector1">
+            <a:avLst/>
+          </a:prstGeom>
+          <a:ln w="28575">
+            <a:solidFill>
+              <a:schemeClr val="accent6">
+                <a:lumMod val="75000"/>
+              </a:schemeClr>
+            </a:solidFill>
+            <a:prstDash val="sysDash"/>
+            <a:headEnd type="triangle"/>
+            <a:tailEnd type="triangle"/>
+          </a:ln>
+        </p:spPr>
+        <p:style>
+          <a:lnRef idx="1">
+            <a:schemeClr val="accent1"/>
+          </a:lnRef>
+          <a:fillRef idx="0">
+            <a:schemeClr val="accent1"/>
+          </a:fillRef>
+          <a:effectRef idx="0">
+            <a:schemeClr val="accent1"/>
+          </a:effectRef>
+          <a:fontRef idx="minor">
+            <a:schemeClr val="tx1"/>
+          </a:fontRef>
+        </p:style>
+      </p:cxnSp>
+      <p:cxnSp>
+        <p:nvCxnSpPr>
+          <p:cNvPr id="44" name="Straight Arrow Connector 43">
+            <a:extLst>
+              <a:ext uri="{FF2B5EF4-FFF2-40B4-BE49-F238E27FC236}">
+                <a16:creationId xmlns:a16="http://schemas.microsoft.com/office/drawing/2014/main" id="{2482C1CC-4001-28BD-978B-1E0B4493D802}"/>
+              </a:ext>
+            </a:extLst>
+          </p:cNvPr>
+          <p:cNvCxnSpPr>
+            <a:cxnSpLocks/>
+          </p:cNvCxnSpPr>
+          <p:nvPr/>
+        </p:nvCxnSpPr>
+        <p:spPr>
+          <a:xfrm>
+            <a:off x="504630" y="4499942"/>
+            <a:ext cx="690316" cy="0"/>
+          </a:xfrm>
+          <a:prstGeom prst="straightConnector1">
+            <a:avLst/>
+          </a:prstGeom>
+          <a:ln w="28575">
+            <a:solidFill>
+              <a:schemeClr val="accent6">
+                <a:lumMod val="75000"/>
+              </a:schemeClr>
+            </a:solidFill>
+            <a:prstDash val="sysDash"/>
+            <a:headEnd type="triangle"/>
+            <a:tailEnd type="triangle"/>
+          </a:ln>
+        </p:spPr>
+        <p:style>
+          <a:lnRef idx="1">
+            <a:schemeClr val="accent1"/>
+          </a:lnRef>
+          <a:fillRef idx="0">
+            <a:schemeClr val="accent1"/>
+          </a:fillRef>
+          <a:effectRef idx="0">
+            <a:schemeClr val="accent1"/>
+          </a:effectRef>
+          <a:fontRef idx="minor">
+            <a:schemeClr val="tx1"/>
+          </a:fontRef>
+        </p:style>
+      </p:cxnSp>
+      <p:sp>
+        <p:nvSpPr>
+          <p:cNvPr id="45" name="TextBox 44">
+            <a:extLst>
+              <a:ext uri="{FF2B5EF4-FFF2-40B4-BE49-F238E27FC236}">
+                <a16:creationId xmlns:a16="http://schemas.microsoft.com/office/drawing/2014/main" id="{51658FFD-09CC-9C6C-5CBC-855C880D5DD3}"/>
+              </a:ext>
+            </a:extLst>
+          </p:cNvPr>
+          <p:cNvSpPr txBox="1"/>
+          <p:nvPr/>
+        </p:nvSpPr>
+        <p:spPr>
+          <a:xfrm>
+            <a:off x="1448205" y="4317161"/>
+            <a:ext cx="1692240" cy="461665"/>
+          </a:xfrm>
+          <a:prstGeom prst="rect">
+            <a:avLst/>
+          </a:prstGeom>
+          <a:noFill/>
+        </p:spPr>
+        <p:txBody>
+          <a:bodyPr wrap="square">
+            <a:spAutoFit/>
+          </a:bodyPr>
+          <a:lstStyle/>
+          <a:p>
+            <a:r>
+              <a:rPr lang="en-US" sz="1200" b="1" dirty="0">
+                <a:solidFill>
+                  <a:schemeClr val="tx1">
+                    <a:lumMod val="75000"/>
+                    <a:lumOff val="25000"/>
+                  </a:schemeClr>
+                </a:solidFill>
+              </a:rPr>
+              <a:t>Normal Modbus comm request and response</a:t>
+            </a:r>
+            <a:endParaRPr lang="en-SG" sz="1200" b="1" dirty="0">
+              <a:solidFill>
+                <a:schemeClr val="tx1">
+                  <a:lumMod val="75000"/>
+                  <a:lumOff val="25000"/>
+                </a:schemeClr>
+              </a:solidFill>
+            </a:endParaRPr>
+          </a:p>
+        </p:txBody>
+      </p:sp>
+      <p:pic>
+        <p:nvPicPr>
+          <p:cNvPr id="46" name="Picture 45">
+            <a:extLst>
+              <a:ext uri="{FF2B5EF4-FFF2-40B4-BE49-F238E27FC236}">
+                <a16:creationId xmlns:a16="http://schemas.microsoft.com/office/drawing/2014/main" id="{CFBF82D4-118D-93AB-BF24-C3533AF5E610}"/>
+              </a:ext>
+            </a:extLst>
+          </p:cNvPr>
+          <p:cNvPicPr>
+            <a:picLocks noChangeAspect="1"/>
+          </p:cNvPicPr>
+          <p:nvPr/>
+        </p:nvPicPr>
+        <p:blipFill>
+          <a:blip r:embed="rId8"/>
+          <a:stretch>
+            <a:fillRect/>
+          </a:stretch>
+        </p:blipFill>
+        <p:spPr>
+          <a:xfrm>
+            <a:off x="3815757" y="1859668"/>
+            <a:ext cx="742543" cy="277161"/>
+          </a:xfrm>
+          <a:prstGeom prst="rect">
+            <a:avLst/>
+          </a:prstGeom>
+          <a:ln w="9525">
+            <a:solidFill>
+              <a:schemeClr val="tx1"/>
+            </a:solidFill>
+          </a:ln>
+        </p:spPr>
+      </p:pic>
+      <p:sp>
+        <p:nvSpPr>
+          <p:cNvPr id="47" name="TextBox 46">
+            <a:extLst>
+              <a:ext uri="{FF2B5EF4-FFF2-40B4-BE49-F238E27FC236}">
+                <a16:creationId xmlns:a16="http://schemas.microsoft.com/office/drawing/2014/main" id="{235EB2B1-FEF4-9A2F-780A-8AFC0804D5E9}"/>
+              </a:ext>
+            </a:extLst>
+          </p:cNvPr>
+          <p:cNvSpPr txBox="1"/>
+          <p:nvPr/>
+        </p:nvSpPr>
+        <p:spPr>
+          <a:xfrm>
+            <a:off x="3606933" y="1475295"/>
+            <a:ext cx="1079631" cy="276999"/>
+          </a:xfrm>
+          <a:prstGeom prst="rect">
+            <a:avLst/>
+          </a:prstGeom>
+          <a:noFill/>
+        </p:spPr>
+        <p:txBody>
+          <a:bodyPr wrap="square">
+            <a:spAutoFit/>
+          </a:bodyPr>
+          <a:lstStyle/>
+          <a:p>
+            <a:r>
+              <a:rPr lang="en-SG" sz="1200" b="1" dirty="0">
+                <a:solidFill>
+                  <a:srgbClr val="FF0000"/>
+                </a:solidFill>
+              </a:rPr>
+              <a:t>victim vm1 </a:t>
+            </a:r>
+          </a:p>
+        </p:txBody>
+      </p:sp>
+      <p:cxnSp>
+        <p:nvCxnSpPr>
+          <p:cNvPr id="48" name="Straight Arrow Connector 47">
+            <a:extLst>
+              <a:ext uri="{FF2B5EF4-FFF2-40B4-BE49-F238E27FC236}">
+                <a16:creationId xmlns:a16="http://schemas.microsoft.com/office/drawing/2014/main" id="{377D1555-7B92-D969-17DF-AE1FCA75628C}"/>
+              </a:ext>
+            </a:extLst>
+          </p:cNvPr>
+          <p:cNvCxnSpPr>
+            <a:cxnSpLocks/>
+          </p:cNvCxnSpPr>
+          <p:nvPr/>
+        </p:nvCxnSpPr>
+        <p:spPr>
+          <a:xfrm flipH="1">
+            <a:off x="3805455" y="2637092"/>
+            <a:ext cx="93831" cy="657700"/>
+          </a:xfrm>
+          <a:prstGeom prst="straightConnector1">
+            <a:avLst/>
+          </a:prstGeom>
+          <a:ln w="28575">
+            <a:solidFill>
+              <a:srgbClr val="FF0000"/>
+            </a:solidFill>
+            <a:prstDash val="sysDash"/>
+            <a:tailEnd type="triangle"/>
+          </a:ln>
+        </p:spPr>
+        <p:style>
+          <a:lnRef idx="1">
+            <a:schemeClr val="accent1"/>
+          </a:lnRef>
+          <a:fillRef idx="0">
+            <a:schemeClr val="accent1"/>
+          </a:fillRef>
+          <a:effectRef idx="0">
+            <a:schemeClr val="accent1"/>
+          </a:effectRef>
+          <a:fontRef idx="minor">
+            <a:schemeClr val="tx1"/>
+          </a:fontRef>
+        </p:style>
+      </p:cxnSp>
+      <p:cxnSp>
+        <p:nvCxnSpPr>
+          <p:cNvPr id="49" name="Straight Arrow Connector 48">
+            <a:extLst>
+              <a:ext uri="{FF2B5EF4-FFF2-40B4-BE49-F238E27FC236}">
+                <a16:creationId xmlns:a16="http://schemas.microsoft.com/office/drawing/2014/main" id="{CEDE96CA-20F5-511F-B78C-D7A3CFB44E17}"/>
+              </a:ext>
+            </a:extLst>
+          </p:cNvPr>
+          <p:cNvCxnSpPr>
+            <a:cxnSpLocks/>
+          </p:cNvCxnSpPr>
+          <p:nvPr/>
+        </p:nvCxnSpPr>
+        <p:spPr>
+          <a:xfrm flipH="1" flipV="1">
+            <a:off x="2638378" y="2692383"/>
+            <a:ext cx="1089029" cy="655916"/>
+          </a:xfrm>
+          <a:prstGeom prst="straightConnector1">
+            <a:avLst/>
+          </a:prstGeom>
+          <a:ln w="28575">
+            <a:solidFill>
+              <a:srgbClr val="FF0000"/>
+            </a:solidFill>
+            <a:prstDash val="sysDash"/>
+            <a:tailEnd type="triangle"/>
+          </a:ln>
+        </p:spPr>
+        <p:style>
+          <a:lnRef idx="1">
+            <a:schemeClr val="accent1"/>
+          </a:lnRef>
+          <a:fillRef idx="0">
+            <a:schemeClr val="accent1"/>
+          </a:fillRef>
+          <a:effectRef idx="0">
+            <a:schemeClr val="accent1"/>
+          </a:effectRef>
+          <a:fontRef idx="minor">
+            <a:schemeClr val="tx1"/>
+          </a:fontRef>
+        </p:style>
+      </p:cxnSp>
+      <p:cxnSp>
+        <p:nvCxnSpPr>
+          <p:cNvPr id="50" name="Straight Arrow Connector 49">
+            <a:extLst>
+              <a:ext uri="{FF2B5EF4-FFF2-40B4-BE49-F238E27FC236}">
+                <a16:creationId xmlns:a16="http://schemas.microsoft.com/office/drawing/2014/main" id="{3F856469-77E2-4AE5-A0E9-80F5FF303F43}"/>
+              </a:ext>
+            </a:extLst>
+          </p:cNvPr>
+          <p:cNvCxnSpPr>
+            <a:cxnSpLocks/>
+          </p:cNvCxnSpPr>
+          <p:nvPr/>
+        </p:nvCxnSpPr>
+        <p:spPr>
+          <a:xfrm flipH="1">
+            <a:off x="3495023" y="4489875"/>
+            <a:ext cx="601879" cy="0"/>
+          </a:xfrm>
+          <a:prstGeom prst="straightConnector1">
+            <a:avLst/>
+          </a:prstGeom>
+          <a:ln w="28575">
+            <a:solidFill>
+              <a:srgbClr val="FF0000"/>
+            </a:solidFill>
+            <a:prstDash val="sysDash"/>
+            <a:tailEnd type="triangle"/>
+          </a:ln>
+        </p:spPr>
+        <p:style>
+          <a:lnRef idx="1">
+            <a:schemeClr val="accent1"/>
+          </a:lnRef>
+          <a:fillRef idx="0">
+            <a:schemeClr val="accent1"/>
+          </a:fillRef>
+          <a:effectRef idx="0">
+            <a:schemeClr val="accent1"/>
+          </a:effectRef>
+          <a:fontRef idx="minor">
+            <a:schemeClr val="tx1"/>
+          </a:fontRef>
+        </p:style>
+      </p:cxnSp>
+      <p:sp>
+        <p:nvSpPr>
+          <p:cNvPr id="51" name="TextBox 50">
+            <a:extLst>
+              <a:ext uri="{FF2B5EF4-FFF2-40B4-BE49-F238E27FC236}">
+                <a16:creationId xmlns:a16="http://schemas.microsoft.com/office/drawing/2014/main" id="{C98F0F80-3829-6418-59BB-223760657FFE}"/>
+              </a:ext>
+            </a:extLst>
+          </p:cNvPr>
+          <p:cNvSpPr txBox="1"/>
+          <p:nvPr/>
+        </p:nvSpPr>
+        <p:spPr>
+          <a:xfrm>
+            <a:off x="4146748" y="4280971"/>
+            <a:ext cx="2686529" cy="461665"/>
+          </a:xfrm>
+          <a:prstGeom prst="rect">
+            <a:avLst/>
+          </a:prstGeom>
+          <a:noFill/>
+        </p:spPr>
+        <p:txBody>
+          <a:bodyPr wrap="square">
+            <a:spAutoFit/>
+          </a:bodyPr>
+          <a:lstStyle/>
+          <a:p>
+            <a:r>
+              <a:rPr lang="en-US" sz="1200" b="1" i="0" dirty="0">
+                <a:solidFill>
+                  <a:srgbClr val="000000"/>
+                </a:solidFill>
+                <a:effectLst/>
+                <a:latin typeface="Inter"/>
+              </a:rPr>
+              <a:t>Redirected Modbus communication after ARP spoofing success. </a:t>
+            </a:r>
+            <a:endParaRPr lang="en-SG" sz="1200" b="1" i="0" dirty="0">
+              <a:solidFill>
+                <a:srgbClr val="000000"/>
+              </a:solidFill>
+              <a:effectLst/>
+              <a:latin typeface="Inter"/>
+            </a:endParaRPr>
+          </a:p>
+        </p:txBody>
+      </p:sp>
+      <p:pic>
+        <p:nvPicPr>
+          <p:cNvPr id="52" name="Picture 51">
+            <a:extLst>
+              <a:ext uri="{FF2B5EF4-FFF2-40B4-BE49-F238E27FC236}">
+                <a16:creationId xmlns:a16="http://schemas.microsoft.com/office/drawing/2014/main" id="{91938F09-4689-82AE-12FD-AB0D958A4329}"/>
+              </a:ext>
+            </a:extLst>
+          </p:cNvPr>
+          <p:cNvPicPr>
+            <a:picLocks noChangeAspect="1"/>
+          </p:cNvPicPr>
+          <p:nvPr/>
+        </p:nvPicPr>
+        <p:blipFill>
+          <a:blip r:embed="rId9"/>
+          <a:stretch>
+            <a:fillRect/>
+          </a:stretch>
+        </p:blipFill>
+        <p:spPr>
+          <a:xfrm>
+            <a:off x="3907973" y="2231563"/>
+            <a:ext cx="253165" cy="246221"/>
+          </a:xfrm>
+          <a:prstGeom prst="rect">
+            <a:avLst/>
+          </a:prstGeom>
+          <a:ln w="28575">
+            <a:solidFill>
+              <a:srgbClr val="FF0000"/>
+            </a:solidFill>
+          </a:ln>
+        </p:spPr>
+      </p:pic>
+      <p:cxnSp>
+        <p:nvCxnSpPr>
+          <p:cNvPr id="53" name="Straight Arrow Connector 52">
+            <a:extLst>
+              <a:ext uri="{FF2B5EF4-FFF2-40B4-BE49-F238E27FC236}">
+                <a16:creationId xmlns:a16="http://schemas.microsoft.com/office/drawing/2014/main" id="{A6053135-FFD2-0EA0-AF4E-B655DE3610FC}"/>
+              </a:ext>
+            </a:extLst>
+          </p:cNvPr>
+          <p:cNvCxnSpPr>
+            <a:cxnSpLocks/>
+          </p:cNvCxnSpPr>
+          <p:nvPr/>
+        </p:nvCxnSpPr>
+        <p:spPr>
+          <a:xfrm flipH="1" flipV="1">
+            <a:off x="4152575" y="2579732"/>
+            <a:ext cx="223259" cy="673005"/>
+          </a:xfrm>
+          <a:prstGeom prst="straightConnector1">
+            <a:avLst/>
+          </a:prstGeom>
+          <a:ln w="28575">
+            <a:solidFill>
+              <a:srgbClr val="FF0000"/>
+            </a:solidFill>
+            <a:prstDash val="sysDash"/>
+            <a:tailEnd type="triangle"/>
+          </a:ln>
+        </p:spPr>
+        <p:style>
+          <a:lnRef idx="1">
+            <a:schemeClr val="accent1"/>
+          </a:lnRef>
+          <a:fillRef idx="0">
+            <a:schemeClr val="accent1"/>
+          </a:fillRef>
+          <a:effectRef idx="0">
+            <a:schemeClr val="accent1"/>
+          </a:effectRef>
+          <a:fontRef idx="minor">
+            <a:schemeClr val="tx1"/>
+          </a:fontRef>
+        </p:style>
+      </p:cxnSp>
+      <p:pic>
+        <p:nvPicPr>
+          <p:cNvPr id="54" name="Picture 53">
+            <a:extLst>
+              <a:ext uri="{FF2B5EF4-FFF2-40B4-BE49-F238E27FC236}">
+                <a16:creationId xmlns:a16="http://schemas.microsoft.com/office/drawing/2014/main" id="{0D3A8A33-82F9-D48C-98EF-C608AF905112}"/>
+              </a:ext>
+            </a:extLst>
+          </p:cNvPr>
+          <p:cNvPicPr>
+            <a:picLocks noChangeAspect="1"/>
+          </p:cNvPicPr>
+          <p:nvPr/>
+        </p:nvPicPr>
+        <p:blipFill>
+          <a:blip r:embed="rId9"/>
+          <a:stretch>
+            <a:fillRect/>
+          </a:stretch>
+        </p:blipFill>
+        <p:spPr>
+          <a:xfrm>
+            <a:off x="7186776" y="4373639"/>
+            <a:ext cx="256527" cy="249491"/>
+          </a:xfrm>
+          <a:prstGeom prst="rect">
+            <a:avLst/>
+          </a:prstGeom>
+          <a:ln w="28575">
+            <a:solidFill>
+              <a:srgbClr val="FF0000"/>
+            </a:solidFill>
+          </a:ln>
+        </p:spPr>
+      </p:pic>
+      <p:sp>
+        <p:nvSpPr>
+          <p:cNvPr id="55" name="TextBox 54">
+            <a:extLst>
+              <a:ext uri="{FF2B5EF4-FFF2-40B4-BE49-F238E27FC236}">
+                <a16:creationId xmlns:a16="http://schemas.microsoft.com/office/drawing/2014/main" id="{12FB45C8-F04F-8285-0533-4E0543855FBD}"/>
+              </a:ext>
+            </a:extLst>
+          </p:cNvPr>
+          <p:cNvSpPr txBox="1"/>
+          <p:nvPr/>
+        </p:nvSpPr>
+        <p:spPr>
+          <a:xfrm>
+            <a:off x="7499577" y="4359884"/>
+            <a:ext cx="1585365" cy="276999"/>
+          </a:xfrm>
+          <a:prstGeom prst="rect">
+            <a:avLst/>
+          </a:prstGeom>
+          <a:noFill/>
+        </p:spPr>
+        <p:txBody>
+          <a:bodyPr wrap="square">
+            <a:spAutoFit/>
+          </a:bodyPr>
+          <a:lstStyle/>
+          <a:p>
+            <a:r>
+              <a:rPr lang="en-US" sz="1200" b="1" dirty="0">
+                <a:solidFill>
+                  <a:srgbClr val="000000"/>
+                </a:solidFill>
+                <a:latin typeface="Inter"/>
+              </a:rPr>
+              <a:t>Ettercap packet filter</a:t>
+            </a:r>
+            <a:endParaRPr lang="en-SG" sz="1200" b="1" i="0" dirty="0">
+              <a:solidFill>
+                <a:srgbClr val="000000"/>
+              </a:solidFill>
+              <a:effectLst/>
+              <a:latin typeface="Inter"/>
+            </a:endParaRPr>
+          </a:p>
+        </p:txBody>
+      </p:sp>
+      <p:sp>
+        <p:nvSpPr>
+          <p:cNvPr id="58" name="TextBox 57">
+            <a:extLst>
+              <a:ext uri="{FF2B5EF4-FFF2-40B4-BE49-F238E27FC236}">
+                <a16:creationId xmlns:a16="http://schemas.microsoft.com/office/drawing/2014/main" id="{0B39FF20-3510-9BF9-9BA9-35385B63EFC3}"/>
+              </a:ext>
+            </a:extLst>
+          </p:cNvPr>
+          <p:cNvSpPr txBox="1"/>
+          <p:nvPr/>
+        </p:nvSpPr>
+        <p:spPr>
+          <a:xfrm>
+            <a:off x="1" y="-4501"/>
+            <a:ext cx="12191999" cy="461665"/>
+          </a:xfrm>
+          <a:prstGeom prst="rect">
+            <a:avLst/>
+          </a:prstGeom>
+          <a:solidFill>
+            <a:schemeClr val="accent1">
+              <a:lumMod val="75000"/>
+            </a:schemeClr>
+          </a:solidFill>
+          <a:ln>
+            <a:solidFill>
+              <a:schemeClr val="tx1"/>
+            </a:solidFill>
+          </a:ln>
+        </p:spPr>
+        <p:txBody>
+          <a:bodyPr wrap="square" rtlCol="0">
+            <a:spAutoFit/>
+          </a:bodyPr>
+          <a:lstStyle/>
+          <a:p>
+            <a:r>
+              <a:rPr lang="sv-SE" sz="2400" dirty="0">
+                <a:solidFill>
+                  <a:schemeClr val="bg1"/>
+                </a:solidFill>
+              </a:rPr>
+              <a:t>ARP Spoofing Attack (Packet drop) </a:t>
+            </a:r>
+            <a:r>
+              <a:rPr lang="en-US" sz="2400" dirty="0">
+                <a:solidFill>
+                  <a:schemeClr val="bg1"/>
+                </a:solidFill>
+              </a:rPr>
+              <a:t>[ Attack Scenario Introduction ]</a:t>
+            </a:r>
+            <a:endParaRPr lang="en-SG" sz="2400" dirty="0">
+              <a:solidFill>
+                <a:srgbClr val="FF0000"/>
+              </a:solidFill>
+            </a:endParaRPr>
+          </a:p>
+        </p:txBody>
+      </p:sp>
+      <p:pic>
+        <p:nvPicPr>
+          <p:cNvPr id="59" name="Picture 58" descr="Graphical user interface, text&#10;&#10;Description automatically generated with medium confidence">
+            <a:extLst>
+              <a:ext uri="{FF2B5EF4-FFF2-40B4-BE49-F238E27FC236}">
+                <a16:creationId xmlns:a16="http://schemas.microsoft.com/office/drawing/2014/main" id="{A0299CFF-0E49-E140-FF5B-FF4CDC9C1D99}"/>
+              </a:ext>
+            </a:extLst>
+          </p:cNvPr>
+          <p:cNvPicPr>
+            <a:picLocks noChangeAspect="1"/>
+          </p:cNvPicPr>
+          <p:nvPr/>
+        </p:nvPicPr>
+        <p:blipFill>
+          <a:blip r:embed="rId10">
+            <a:extLst>
+              <a:ext uri="{28A0092B-C50C-407E-A947-70E740481C1C}">
+                <a14:useLocalDpi xmlns:a14="http://schemas.microsoft.com/office/drawing/2010/main" val="0"/>
+              </a:ext>
+            </a:extLst>
+          </a:blip>
+          <a:stretch>
+            <a:fillRect/>
+          </a:stretch>
+        </p:blipFill>
+        <p:spPr>
+          <a:xfrm>
+            <a:off x="10527245" y="53310"/>
+            <a:ext cx="1598494" cy="348275"/>
+          </a:xfrm>
+          <a:prstGeom prst="rect">
+            <a:avLst/>
+          </a:prstGeom>
+        </p:spPr>
+      </p:pic>
+      <p:cxnSp>
+        <p:nvCxnSpPr>
+          <p:cNvPr id="69" name="Straight Arrow Connector 68">
+            <a:extLst>
+              <a:ext uri="{FF2B5EF4-FFF2-40B4-BE49-F238E27FC236}">
+                <a16:creationId xmlns:a16="http://schemas.microsoft.com/office/drawing/2014/main" id="{80396A07-0472-DF49-55A2-E460F572DC26}"/>
+              </a:ext>
+            </a:extLst>
+          </p:cNvPr>
+          <p:cNvCxnSpPr>
+            <a:cxnSpLocks/>
+          </p:cNvCxnSpPr>
+          <p:nvPr/>
+        </p:nvCxnSpPr>
+        <p:spPr>
+          <a:xfrm flipH="1">
+            <a:off x="4425014" y="2660264"/>
+            <a:ext cx="1041539" cy="622989"/>
+          </a:xfrm>
+          <a:prstGeom prst="straightConnector1">
+            <a:avLst/>
+          </a:prstGeom>
+          <a:ln w="28575">
+            <a:solidFill>
+              <a:srgbClr val="FF0000"/>
+            </a:solidFill>
+            <a:prstDash val="sysDash"/>
+            <a:tailEnd type="triangle"/>
+          </a:ln>
+        </p:spPr>
+        <p:style>
+          <a:lnRef idx="1">
+            <a:schemeClr val="accent1"/>
+          </a:lnRef>
+          <a:fillRef idx="0">
+            <a:schemeClr val="accent1"/>
+          </a:fillRef>
+          <a:effectRef idx="0">
+            <a:schemeClr val="accent1"/>
+          </a:effectRef>
+          <a:fontRef idx="minor">
+            <a:schemeClr val="tx1"/>
+          </a:fontRef>
+        </p:style>
+      </p:cxnSp>
+      <p:sp>
+        <p:nvSpPr>
+          <p:cNvPr id="76" name="Multiplication Sign 75">
+            <a:extLst>
+              <a:ext uri="{FF2B5EF4-FFF2-40B4-BE49-F238E27FC236}">
+                <a16:creationId xmlns:a16="http://schemas.microsoft.com/office/drawing/2014/main" id="{E5744A7B-CF1A-3392-F4D2-E779439DF6DE}"/>
+              </a:ext>
+            </a:extLst>
+          </p:cNvPr>
+          <p:cNvSpPr/>
+          <p:nvPr/>
+        </p:nvSpPr>
+        <p:spPr>
+          <a:xfrm>
+            <a:off x="2864038" y="3184715"/>
+            <a:ext cx="413657" cy="426570"/>
+          </a:xfrm>
+          <a:prstGeom prst="mathMultiply">
+            <a:avLst/>
+          </a:prstGeom>
+          <a:solidFill>
+            <a:srgbClr val="FF0000"/>
+          </a:solidFill>
+        </p:spPr>
+        <p:style>
+          <a:lnRef idx="2">
+            <a:schemeClr val="accent1">
+              <a:shade val="15000"/>
+            </a:schemeClr>
+          </a:lnRef>
+          <a:fillRef idx="1">
+            <a:schemeClr val="accent1"/>
+          </a:fillRef>
+          <a:effectRef idx="0">
+            <a:schemeClr val="accent1"/>
+          </a:effectRef>
+          <a:fontRef idx="minor">
+            <a:schemeClr val="lt1"/>
+          </a:fontRef>
+        </p:style>
+        <p:txBody>
+          <a:bodyPr rtlCol="0" anchor="ctr"/>
+          <a:lstStyle/>
+          <a:p>
+            <a:pPr algn="ctr"/>
+            <a:endParaRPr lang="en-SG" dirty="0"/>
+          </a:p>
+        </p:txBody>
+      </p:sp>
+      <p:sp>
+        <p:nvSpPr>
+          <p:cNvPr id="77" name="Multiplication Sign 76">
+            <a:extLst>
+              <a:ext uri="{FF2B5EF4-FFF2-40B4-BE49-F238E27FC236}">
+                <a16:creationId xmlns:a16="http://schemas.microsoft.com/office/drawing/2014/main" id="{1F7DCE35-9D0B-5D5E-CAD2-BC9D48D870D5}"/>
+              </a:ext>
+            </a:extLst>
+          </p:cNvPr>
+          <p:cNvSpPr/>
+          <p:nvPr/>
+        </p:nvSpPr>
+        <p:spPr>
+          <a:xfrm>
+            <a:off x="4881144" y="3101979"/>
+            <a:ext cx="413657" cy="426570"/>
+          </a:xfrm>
+          <a:prstGeom prst="mathMultiply">
+            <a:avLst/>
+          </a:prstGeom>
+          <a:solidFill>
+            <a:srgbClr val="FF0000"/>
+          </a:solidFill>
+        </p:spPr>
+        <p:style>
+          <a:lnRef idx="2">
+            <a:schemeClr val="accent1">
+              <a:shade val="15000"/>
+            </a:schemeClr>
+          </a:lnRef>
+          <a:fillRef idx="1">
+            <a:schemeClr val="accent1"/>
+          </a:fillRef>
+          <a:effectRef idx="0">
+            <a:schemeClr val="accent1"/>
+          </a:effectRef>
+          <a:fontRef idx="minor">
+            <a:schemeClr val="lt1"/>
+          </a:fontRef>
+        </p:style>
+        <p:txBody>
+          <a:bodyPr rtlCol="0" anchor="ctr"/>
+          <a:lstStyle/>
+          <a:p>
+            <a:pPr algn="ctr"/>
+            <a:endParaRPr lang="en-SG" dirty="0"/>
+          </a:p>
+        </p:txBody>
+      </p:sp>
+      <p:sp>
+        <p:nvSpPr>
+          <p:cNvPr id="84" name="Multiplication Sign 83">
+            <a:extLst>
+              <a:ext uri="{FF2B5EF4-FFF2-40B4-BE49-F238E27FC236}">
+                <a16:creationId xmlns:a16="http://schemas.microsoft.com/office/drawing/2014/main" id="{7A469299-CDE5-55D7-0600-06F657A88970}"/>
+              </a:ext>
+            </a:extLst>
+          </p:cNvPr>
+          <p:cNvSpPr/>
+          <p:nvPr/>
+        </p:nvSpPr>
+        <p:spPr>
+          <a:xfrm>
+            <a:off x="9522198" y="4210405"/>
+            <a:ext cx="413657" cy="426570"/>
+          </a:xfrm>
+          <a:prstGeom prst="mathMultiply">
+            <a:avLst/>
+          </a:prstGeom>
+          <a:solidFill>
+            <a:srgbClr val="FF0000"/>
+          </a:solidFill>
+        </p:spPr>
+        <p:style>
+          <a:lnRef idx="2">
+            <a:schemeClr val="accent1">
+              <a:shade val="15000"/>
+            </a:schemeClr>
+          </a:lnRef>
+          <a:fillRef idx="1">
+            <a:schemeClr val="accent1"/>
+          </a:fillRef>
+          <a:effectRef idx="0">
+            <a:schemeClr val="accent1"/>
+          </a:effectRef>
+          <a:fontRef idx="minor">
+            <a:schemeClr val="lt1"/>
+          </a:fontRef>
+        </p:style>
+        <p:txBody>
+          <a:bodyPr rtlCol="0" anchor="ctr"/>
+          <a:lstStyle/>
+          <a:p>
+            <a:pPr algn="ctr"/>
+            <a:endParaRPr lang="en-SG" dirty="0"/>
+          </a:p>
+        </p:txBody>
+      </p:sp>
+      <p:sp>
+        <p:nvSpPr>
+          <p:cNvPr id="85" name="TextBox 84">
+            <a:extLst>
+              <a:ext uri="{FF2B5EF4-FFF2-40B4-BE49-F238E27FC236}">
+                <a16:creationId xmlns:a16="http://schemas.microsoft.com/office/drawing/2014/main" id="{C94BE6E2-5F97-453D-386E-B3C80D2E596A}"/>
+              </a:ext>
+            </a:extLst>
+          </p:cNvPr>
+          <p:cNvSpPr txBox="1"/>
+          <p:nvPr/>
+        </p:nvSpPr>
+        <p:spPr>
+          <a:xfrm>
+            <a:off x="9929960" y="4212795"/>
+            <a:ext cx="1585365" cy="461665"/>
+          </a:xfrm>
+          <a:prstGeom prst="rect">
+            <a:avLst/>
+          </a:prstGeom>
+          <a:noFill/>
+        </p:spPr>
+        <p:txBody>
+          <a:bodyPr wrap="square">
+            <a:spAutoFit/>
+          </a:bodyPr>
+          <a:lstStyle/>
+          <a:p>
+            <a:r>
+              <a:rPr lang="en-SG" sz="1200" b="1" dirty="0">
+                <a:solidFill>
+                  <a:srgbClr val="000000"/>
+                </a:solidFill>
+                <a:latin typeface="Inter"/>
+              </a:rPr>
+              <a:t>Traffic affected after ARP spoofing attack</a:t>
+            </a:r>
+            <a:endParaRPr lang="en-SG" sz="1200" b="1" i="0" dirty="0">
+              <a:solidFill>
+                <a:srgbClr val="000000"/>
+              </a:solidFill>
+              <a:effectLst/>
+              <a:latin typeface="Inter"/>
+            </a:endParaRPr>
+          </a:p>
+        </p:txBody>
+      </p:sp>
+    </p:spTree>
+    <p:extLst>
+      <p:ext uri="{BB962C8B-B14F-4D97-AF65-F5344CB8AC3E}">
+        <p14:creationId xmlns:p14="http://schemas.microsoft.com/office/powerpoint/2010/main" val="2023112776"/>
+      </p:ext>
+    </p:extLst>
+  </p:cSld>
+  <p:clrMapOvr>
+    <a:masterClrMapping/>
+  </p:clrMapOvr>
+</p:sld>
+</file>
+
 <file path=ppt/theme/theme1.xml><?xml version="1.0" encoding="utf-8"?>
 <a:theme xmlns:a="http://schemas.openxmlformats.org/drawingml/2006/main" name="Office Theme">
   <a:themeElements>

</xml_diff>

<commit_message>
Update the ARP spoofing study case document.
</commit_message>
<xml_diff>
--- a/attack/AttackScenario.pptx
+++ b/attack/AttackScenario.pptx
@@ -12,6 +12,7 @@
     <p:sldId id="259" r:id="rId6"/>
     <p:sldId id="260" r:id="rId7"/>
     <p:sldId id="262" r:id="rId8"/>
+    <p:sldId id="263" r:id="rId9"/>
   </p:sldIdLst>
   <p:sldSz cx="12192000" cy="6858000"/>
   <p:notesSz cx="6858000" cy="9144000"/>
@@ -267,7 +268,7 @@
           <a:p>
             <a:fld id="{11AA06AF-8DFA-4137-89EF-0EFE93628E77}" type="datetimeFigureOut">
               <a:rPr lang="en-SG" smtClean="0"/>
-              <a:t>12/1/2024</a:t>
+              <a:t>13/1/2024</a:t>
             </a:fld>
             <a:endParaRPr lang="en-SG"/>
           </a:p>
@@ -467,7 +468,7 @@
           <a:p>
             <a:fld id="{11AA06AF-8DFA-4137-89EF-0EFE93628E77}" type="datetimeFigureOut">
               <a:rPr lang="en-SG" smtClean="0"/>
-              <a:t>12/1/2024</a:t>
+              <a:t>13/1/2024</a:t>
             </a:fld>
             <a:endParaRPr lang="en-SG"/>
           </a:p>
@@ -677,7 +678,7 @@
           <a:p>
             <a:fld id="{11AA06AF-8DFA-4137-89EF-0EFE93628E77}" type="datetimeFigureOut">
               <a:rPr lang="en-SG" smtClean="0"/>
-              <a:t>12/1/2024</a:t>
+              <a:t>13/1/2024</a:t>
             </a:fld>
             <a:endParaRPr lang="en-SG"/>
           </a:p>
@@ -877,7 +878,7 @@
           <a:p>
             <a:fld id="{11AA06AF-8DFA-4137-89EF-0EFE93628E77}" type="datetimeFigureOut">
               <a:rPr lang="en-SG" smtClean="0"/>
-              <a:t>12/1/2024</a:t>
+              <a:t>13/1/2024</a:t>
             </a:fld>
             <a:endParaRPr lang="en-SG"/>
           </a:p>
@@ -1153,7 +1154,7 @@
           <a:p>
             <a:fld id="{11AA06AF-8DFA-4137-89EF-0EFE93628E77}" type="datetimeFigureOut">
               <a:rPr lang="en-SG" smtClean="0"/>
-              <a:t>12/1/2024</a:t>
+              <a:t>13/1/2024</a:t>
             </a:fld>
             <a:endParaRPr lang="en-SG"/>
           </a:p>
@@ -1421,7 +1422,7 @@
           <a:p>
             <a:fld id="{11AA06AF-8DFA-4137-89EF-0EFE93628E77}" type="datetimeFigureOut">
               <a:rPr lang="en-SG" smtClean="0"/>
-              <a:t>12/1/2024</a:t>
+              <a:t>13/1/2024</a:t>
             </a:fld>
             <a:endParaRPr lang="en-SG"/>
           </a:p>
@@ -1836,7 +1837,7 @@
           <a:p>
             <a:fld id="{11AA06AF-8DFA-4137-89EF-0EFE93628E77}" type="datetimeFigureOut">
               <a:rPr lang="en-SG" smtClean="0"/>
-              <a:t>12/1/2024</a:t>
+              <a:t>13/1/2024</a:t>
             </a:fld>
             <a:endParaRPr lang="en-SG"/>
           </a:p>
@@ -1978,7 +1979,7 @@
           <a:p>
             <a:fld id="{11AA06AF-8DFA-4137-89EF-0EFE93628E77}" type="datetimeFigureOut">
               <a:rPr lang="en-SG" smtClean="0"/>
-              <a:t>12/1/2024</a:t>
+              <a:t>13/1/2024</a:t>
             </a:fld>
             <a:endParaRPr lang="en-SG"/>
           </a:p>
@@ -2091,7 +2092,7 @@
           <a:p>
             <a:fld id="{11AA06AF-8DFA-4137-89EF-0EFE93628E77}" type="datetimeFigureOut">
               <a:rPr lang="en-SG" smtClean="0"/>
-              <a:t>12/1/2024</a:t>
+              <a:t>13/1/2024</a:t>
             </a:fld>
             <a:endParaRPr lang="en-SG"/>
           </a:p>
@@ -2404,7 +2405,7 @@
           <a:p>
             <a:fld id="{11AA06AF-8DFA-4137-89EF-0EFE93628E77}" type="datetimeFigureOut">
               <a:rPr lang="en-SG" smtClean="0"/>
-              <a:t>12/1/2024</a:t>
+              <a:t>13/1/2024</a:t>
             </a:fld>
             <a:endParaRPr lang="en-SG"/>
           </a:p>
@@ -2693,7 +2694,7 @@
           <a:p>
             <a:fld id="{11AA06AF-8DFA-4137-89EF-0EFE93628E77}" type="datetimeFigureOut">
               <a:rPr lang="en-SG" smtClean="0"/>
-              <a:t>12/1/2024</a:t>
+              <a:t>13/1/2024</a:t>
             </a:fld>
             <a:endParaRPr lang="en-SG"/>
           </a:p>
@@ -2936,7 +2937,7 @@
           <a:p>
             <a:fld id="{11AA06AF-8DFA-4137-89EF-0EFE93628E77}" type="datetimeFigureOut">
               <a:rPr lang="en-SG" smtClean="0"/>
-              <a:t>12/1/2024</a:t>
+              <a:t>13/1/2024</a:t>
             </a:fld>
             <a:endParaRPr lang="en-SG"/>
           </a:p>
@@ -17971,6 +17972,343 @@
 </p:sld>
 </file>
 
+<file path=ppt/slides/slide8.xml><?xml version="1.0" encoding="utf-8"?>
+<p:sld xmlns:a="http://schemas.openxmlformats.org/drawingml/2006/main" xmlns:r="http://schemas.openxmlformats.org/officeDocument/2006/relationships" xmlns:p="http://schemas.openxmlformats.org/presentationml/2006/main">
+  <p:cSld>
+    <p:spTree>
+      <p:nvGrpSpPr>
+        <p:cNvPr id="1" name=""/>
+        <p:cNvGrpSpPr/>
+        <p:nvPr/>
+      </p:nvGrpSpPr>
+      <p:grpSpPr>
+        <a:xfrm>
+          <a:off x="0" y="0"/>
+          <a:ext cx="0" cy="0"/>
+          <a:chOff x="0" y="0"/>
+          <a:chExt cx="0" cy="0"/>
+        </a:xfrm>
+      </p:grpSpPr>
+      <p:pic>
+        <p:nvPicPr>
+          <p:cNvPr id="5" name="Picture 4" descr="A diagram of a computer system&#10;&#10;Description automatically generated">
+            <a:extLst>
+              <a:ext uri="{FF2B5EF4-FFF2-40B4-BE49-F238E27FC236}">
+                <a16:creationId xmlns:a16="http://schemas.microsoft.com/office/drawing/2014/main" id="{0BB12E8B-97D4-7422-0D20-62C296230C77}"/>
+              </a:ext>
+            </a:extLst>
+          </p:cNvPr>
+          <p:cNvPicPr>
+            <a:picLocks noChangeAspect="1"/>
+          </p:cNvPicPr>
+          <p:nvPr/>
+        </p:nvPicPr>
+        <p:blipFill>
+          <a:blip r:embed="rId2">
+            <a:extLst>
+              <a:ext uri="{28A0092B-C50C-407E-A947-70E740481C1C}">
+                <a14:useLocalDpi xmlns:a14="http://schemas.microsoft.com/office/drawing/2010/main" val="0"/>
+              </a:ext>
+            </a:extLst>
+          </a:blip>
+          <a:stretch>
+            <a:fillRect/>
+          </a:stretch>
+        </p:blipFill>
+        <p:spPr>
+          <a:xfrm>
+            <a:off x="1562666" y="790905"/>
+            <a:ext cx="9066667" cy="5276190"/>
+          </a:xfrm>
+          <a:prstGeom prst="rect">
+            <a:avLst/>
+          </a:prstGeom>
+        </p:spPr>
+      </p:pic>
+      <p:sp>
+        <p:nvSpPr>
+          <p:cNvPr id="6" name="Multiplication Sign 5">
+            <a:extLst>
+              <a:ext uri="{FF2B5EF4-FFF2-40B4-BE49-F238E27FC236}">
+                <a16:creationId xmlns:a16="http://schemas.microsoft.com/office/drawing/2014/main" id="{FBE990A9-6EB8-6AED-63DF-C7261C90CFBD}"/>
+              </a:ext>
+            </a:extLst>
+          </p:cNvPr>
+          <p:cNvSpPr/>
+          <p:nvPr/>
+        </p:nvSpPr>
+        <p:spPr>
+          <a:xfrm>
+            <a:off x="7970294" y="3780616"/>
+            <a:ext cx="413657" cy="426570"/>
+          </a:xfrm>
+          <a:prstGeom prst="mathMultiply">
+            <a:avLst/>
+          </a:prstGeom>
+          <a:solidFill>
+            <a:srgbClr val="FF0000"/>
+          </a:solidFill>
+        </p:spPr>
+        <p:style>
+          <a:lnRef idx="2">
+            <a:schemeClr val="accent1">
+              <a:shade val="15000"/>
+            </a:schemeClr>
+          </a:lnRef>
+          <a:fillRef idx="1">
+            <a:schemeClr val="accent1"/>
+          </a:fillRef>
+          <a:effectRef idx="0">
+            <a:schemeClr val="accent1"/>
+          </a:effectRef>
+          <a:fontRef idx="minor">
+            <a:schemeClr val="lt1"/>
+          </a:fontRef>
+        </p:style>
+        <p:txBody>
+          <a:bodyPr rtlCol="0" anchor="ctr"/>
+          <a:lstStyle/>
+          <a:p>
+            <a:pPr algn="ctr"/>
+            <a:endParaRPr lang="en-SG" dirty="0"/>
+          </a:p>
+        </p:txBody>
+      </p:sp>
+      <p:sp>
+        <p:nvSpPr>
+          <p:cNvPr id="8" name="Multiplication Sign 7">
+            <a:extLst>
+              <a:ext uri="{FF2B5EF4-FFF2-40B4-BE49-F238E27FC236}">
+                <a16:creationId xmlns:a16="http://schemas.microsoft.com/office/drawing/2014/main" id="{676058BB-2262-F781-9275-7B434CA59ED3}"/>
+              </a:ext>
+            </a:extLst>
+          </p:cNvPr>
+          <p:cNvSpPr/>
+          <p:nvPr/>
+        </p:nvSpPr>
+        <p:spPr>
+          <a:xfrm>
+            <a:off x="7970293" y="4497285"/>
+            <a:ext cx="413657" cy="426570"/>
+          </a:xfrm>
+          <a:prstGeom prst="mathMultiply">
+            <a:avLst/>
+          </a:prstGeom>
+          <a:solidFill>
+            <a:srgbClr val="FF0000"/>
+          </a:solidFill>
+        </p:spPr>
+        <p:style>
+          <a:lnRef idx="2">
+            <a:schemeClr val="accent1">
+              <a:shade val="15000"/>
+            </a:schemeClr>
+          </a:lnRef>
+          <a:fillRef idx="1">
+            <a:schemeClr val="accent1"/>
+          </a:fillRef>
+          <a:effectRef idx="0">
+            <a:schemeClr val="accent1"/>
+          </a:effectRef>
+          <a:fontRef idx="minor">
+            <a:schemeClr val="lt1"/>
+          </a:fontRef>
+        </p:style>
+        <p:txBody>
+          <a:bodyPr rtlCol="0" anchor="ctr"/>
+          <a:lstStyle/>
+          <a:p>
+            <a:pPr algn="ctr"/>
+            <a:endParaRPr lang="en-SG" dirty="0"/>
+          </a:p>
+        </p:txBody>
+      </p:sp>
+      <p:pic>
+        <p:nvPicPr>
+          <p:cNvPr id="9" name="Picture 8">
+            <a:extLst>
+              <a:ext uri="{FF2B5EF4-FFF2-40B4-BE49-F238E27FC236}">
+                <a16:creationId xmlns:a16="http://schemas.microsoft.com/office/drawing/2014/main" id="{A7DFD07E-3004-7E60-2870-317CE540FDE0}"/>
+              </a:ext>
+            </a:extLst>
+          </p:cNvPr>
+          <p:cNvPicPr>
+            <a:picLocks noChangeAspect="1"/>
+          </p:cNvPicPr>
+          <p:nvPr/>
+        </p:nvPicPr>
+        <p:blipFill>
+          <a:blip r:embed="rId3"/>
+          <a:stretch>
+            <a:fillRect/>
+          </a:stretch>
+        </p:blipFill>
+        <p:spPr>
+          <a:xfrm>
+            <a:off x="8471758" y="685847"/>
+            <a:ext cx="489507" cy="542715"/>
+          </a:xfrm>
+          <a:prstGeom prst="rect">
+            <a:avLst/>
+          </a:prstGeom>
+          <a:ln w="9525">
+            <a:solidFill>
+              <a:schemeClr val="tx1"/>
+            </a:solidFill>
+          </a:ln>
+        </p:spPr>
+      </p:pic>
+      <p:cxnSp>
+        <p:nvCxnSpPr>
+          <p:cNvPr id="10" name="Straight Arrow Connector 9">
+            <a:extLst>
+              <a:ext uri="{FF2B5EF4-FFF2-40B4-BE49-F238E27FC236}">
+                <a16:creationId xmlns:a16="http://schemas.microsoft.com/office/drawing/2014/main" id="{5A42E0BD-172C-F5AB-2476-3DC5BA15DB38}"/>
+              </a:ext>
+            </a:extLst>
+          </p:cNvPr>
+          <p:cNvCxnSpPr>
+            <a:cxnSpLocks/>
+          </p:cNvCxnSpPr>
+          <p:nvPr/>
+        </p:nvCxnSpPr>
+        <p:spPr>
+          <a:xfrm flipH="1">
+            <a:off x="8177121" y="1228562"/>
+            <a:ext cx="294637" cy="2418764"/>
+          </a:xfrm>
+          <a:prstGeom prst="straightConnector1">
+            <a:avLst/>
+          </a:prstGeom>
+          <a:ln w="28575">
+            <a:solidFill>
+              <a:srgbClr val="FF0000"/>
+            </a:solidFill>
+            <a:prstDash val="sysDash"/>
+            <a:tailEnd type="triangle"/>
+          </a:ln>
+        </p:spPr>
+        <p:style>
+          <a:lnRef idx="1">
+            <a:schemeClr val="accent1"/>
+          </a:lnRef>
+          <a:fillRef idx="0">
+            <a:schemeClr val="accent1"/>
+          </a:fillRef>
+          <a:effectRef idx="0">
+            <a:schemeClr val="accent1"/>
+          </a:effectRef>
+          <a:fontRef idx="minor">
+            <a:schemeClr val="tx1"/>
+          </a:fontRef>
+        </p:style>
+      </p:cxnSp>
+      <p:cxnSp>
+        <p:nvCxnSpPr>
+          <p:cNvPr id="13" name="Straight Arrow Connector 12">
+            <a:extLst>
+              <a:ext uri="{FF2B5EF4-FFF2-40B4-BE49-F238E27FC236}">
+                <a16:creationId xmlns:a16="http://schemas.microsoft.com/office/drawing/2014/main" id="{1C86A106-186C-D2AB-D7E0-6F822E8A9E66}"/>
+              </a:ext>
+            </a:extLst>
+          </p:cNvPr>
+          <p:cNvCxnSpPr>
+            <a:cxnSpLocks/>
+          </p:cNvCxnSpPr>
+          <p:nvPr/>
+        </p:nvCxnSpPr>
+        <p:spPr>
+          <a:xfrm flipH="1">
+            <a:off x="8383950" y="1228562"/>
+            <a:ext cx="441551" cy="3384535"/>
+          </a:xfrm>
+          <a:prstGeom prst="straightConnector1">
+            <a:avLst/>
+          </a:prstGeom>
+          <a:ln w="28575">
+            <a:solidFill>
+              <a:srgbClr val="FF0000"/>
+            </a:solidFill>
+            <a:prstDash val="sysDash"/>
+            <a:tailEnd type="triangle"/>
+          </a:ln>
+        </p:spPr>
+        <p:style>
+          <a:lnRef idx="1">
+            <a:schemeClr val="accent1"/>
+          </a:lnRef>
+          <a:fillRef idx="0">
+            <a:schemeClr val="accent1"/>
+          </a:fillRef>
+          <a:effectRef idx="0">
+            <a:schemeClr val="accent1"/>
+          </a:effectRef>
+          <a:fontRef idx="minor">
+            <a:schemeClr val="tx1"/>
+          </a:fontRef>
+        </p:style>
+      </p:cxnSp>
+      <p:sp>
+        <p:nvSpPr>
+          <p:cNvPr id="17" name="TextBox 16">
+            <a:extLst>
+              <a:ext uri="{FF2B5EF4-FFF2-40B4-BE49-F238E27FC236}">
+                <a16:creationId xmlns:a16="http://schemas.microsoft.com/office/drawing/2014/main" id="{3069CBF3-FDA4-7813-A761-87B72F4BCBD5}"/>
+              </a:ext>
+            </a:extLst>
+          </p:cNvPr>
+          <p:cNvSpPr txBox="1"/>
+          <p:nvPr/>
+        </p:nvSpPr>
+        <p:spPr>
+          <a:xfrm>
+            <a:off x="8913309" y="558445"/>
+            <a:ext cx="2081725" cy="1569660"/>
+          </a:xfrm>
+          <a:prstGeom prst="rect">
+            <a:avLst/>
+          </a:prstGeom>
+          <a:noFill/>
+        </p:spPr>
+        <p:txBody>
+          <a:bodyPr wrap="square">
+            <a:spAutoFit/>
+          </a:bodyPr>
+          <a:lstStyle/>
+          <a:p>
+            <a:r>
+              <a:rPr lang="en-US" sz="1600" b="1" i="0" dirty="0">
+                <a:solidFill>
+                  <a:srgbClr val="FF0000"/>
+                </a:solidFill>
+                <a:effectLst/>
+                <a:latin typeface="Inter"/>
+              </a:rPr>
+              <a:t>The Attack need to block the 2 PLC challenge traffic to denial the Sensor and signal control HMI service </a:t>
+            </a:r>
+            <a:endParaRPr lang="en-SG" sz="1600" b="1" i="0" dirty="0">
+              <a:solidFill>
+                <a:srgbClr val="FF0000"/>
+              </a:solidFill>
+              <a:effectLst/>
+              <a:latin typeface="Inter"/>
+            </a:endParaRPr>
+          </a:p>
+        </p:txBody>
+      </p:sp>
+    </p:spTree>
+    <p:extLst>
+      <p:ext uri="{BB962C8B-B14F-4D97-AF65-F5344CB8AC3E}">
+        <p14:creationId xmlns:p14="http://schemas.microsoft.com/office/powerpoint/2010/main" val="2356608875"/>
+      </p:ext>
+    </p:extLst>
+  </p:cSld>
+  <p:clrMapOvr>
+    <a:masterClrMapping/>
+  </p:clrMapOvr>
+</p:sld>
+</file>
+
 <file path=ppt/theme/theme1.xml><?xml version="1.0" encoding="utf-8"?>
 <a:theme xmlns:a="http://schemas.openxmlformats.org/drawingml/2006/main" name="Office Theme">
   <a:themeElements>

</xml_diff>

<commit_message>
Improve the attack case study 2 and added the table of contents to the case1 and case 2.
</commit_message>
<xml_diff>
--- a/attack/AttackScenario.pptx
+++ b/attack/AttackScenario.pptx
@@ -13,6 +13,7 @@
     <p:sldId id="260" r:id="rId7"/>
     <p:sldId id="262" r:id="rId8"/>
     <p:sldId id="263" r:id="rId9"/>
+    <p:sldId id="304" r:id="rId10"/>
   </p:sldIdLst>
   <p:sldSz cx="12192000" cy="6858000"/>
   <p:notesSz cx="6858000" cy="9144000"/>
@@ -268,7 +269,7 @@
           <a:p>
             <a:fld id="{11AA06AF-8DFA-4137-89EF-0EFE93628E77}" type="datetimeFigureOut">
               <a:rPr lang="en-SG" smtClean="0"/>
-              <a:t>13/1/2024</a:t>
+              <a:t>14/1/2024</a:t>
             </a:fld>
             <a:endParaRPr lang="en-SG"/>
           </a:p>
@@ -468,7 +469,7 @@
           <a:p>
             <a:fld id="{11AA06AF-8DFA-4137-89EF-0EFE93628E77}" type="datetimeFigureOut">
               <a:rPr lang="en-SG" smtClean="0"/>
-              <a:t>13/1/2024</a:t>
+              <a:t>14/1/2024</a:t>
             </a:fld>
             <a:endParaRPr lang="en-SG"/>
           </a:p>
@@ -678,7 +679,7 @@
           <a:p>
             <a:fld id="{11AA06AF-8DFA-4137-89EF-0EFE93628E77}" type="datetimeFigureOut">
               <a:rPr lang="en-SG" smtClean="0"/>
-              <a:t>13/1/2024</a:t>
+              <a:t>14/1/2024</a:t>
             </a:fld>
             <a:endParaRPr lang="en-SG"/>
           </a:p>
@@ -878,7 +879,7 @@
           <a:p>
             <a:fld id="{11AA06AF-8DFA-4137-89EF-0EFE93628E77}" type="datetimeFigureOut">
               <a:rPr lang="en-SG" smtClean="0"/>
-              <a:t>13/1/2024</a:t>
+              <a:t>14/1/2024</a:t>
             </a:fld>
             <a:endParaRPr lang="en-SG"/>
           </a:p>
@@ -1154,7 +1155,7 @@
           <a:p>
             <a:fld id="{11AA06AF-8DFA-4137-89EF-0EFE93628E77}" type="datetimeFigureOut">
               <a:rPr lang="en-SG" smtClean="0"/>
-              <a:t>13/1/2024</a:t>
+              <a:t>14/1/2024</a:t>
             </a:fld>
             <a:endParaRPr lang="en-SG"/>
           </a:p>
@@ -1422,7 +1423,7 @@
           <a:p>
             <a:fld id="{11AA06AF-8DFA-4137-89EF-0EFE93628E77}" type="datetimeFigureOut">
               <a:rPr lang="en-SG" smtClean="0"/>
-              <a:t>13/1/2024</a:t>
+              <a:t>14/1/2024</a:t>
             </a:fld>
             <a:endParaRPr lang="en-SG"/>
           </a:p>
@@ -1837,7 +1838,7 @@
           <a:p>
             <a:fld id="{11AA06AF-8DFA-4137-89EF-0EFE93628E77}" type="datetimeFigureOut">
               <a:rPr lang="en-SG" smtClean="0"/>
-              <a:t>13/1/2024</a:t>
+              <a:t>14/1/2024</a:t>
             </a:fld>
             <a:endParaRPr lang="en-SG"/>
           </a:p>
@@ -1979,7 +1980,7 @@
           <a:p>
             <a:fld id="{11AA06AF-8DFA-4137-89EF-0EFE93628E77}" type="datetimeFigureOut">
               <a:rPr lang="en-SG" smtClean="0"/>
-              <a:t>13/1/2024</a:t>
+              <a:t>14/1/2024</a:t>
             </a:fld>
             <a:endParaRPr lang="en-SG"/>
           </a:p>
@@ -2092,7 +2093,7 @@
           <a:p>
             <a:fld id="{11AA06AF-8DFA-4137-89EF-0EFE93628E77}" type="datetimeFigureOut">
               <a:rPr lang="en-SG" smtClean="0"/>
-              <a:t>13/1/2024</a:t>
+              <a:t>14/1/2024</a:t>
             </a:fld>
             <a:endParaRPr lang="en-SG"/>
           </a:p>
@@ -2405,7 +2406,7 @@
           <a:p>
             <a:fld id="{11AA06AF-8DFA-4137-89EF-0EFE93628E77}" type="datetimeFigureOut">
               <a:rPr lang="en-SG" smtClean="0"/>
-              <a:t>13/1/2024</a:t>
+              <a:t>14/1/2024</a:t>
             </a:fld>
             <a:endParaRPr lang="en-SG"/>
           </a:p>
@@ -2694,7 +2695,7 @@
           <a:p>
             <a:fld id="{11AA06AF-8DFA-4137-89EF-0EFE93628E77}" type="datetimeFigureOut">
               <a:rPr lang="en-SG" smtClean="0"/>
-              <a:t>13/1/2024</a:t>
+              <a:t>14/1/2024</a:t>
             </a:fld>
             <a:endParaRPr lang="en-SG"/>
           </a:p>
@@ -2937,7 +2938,7 @@
           <a:p>
             <a:fld id="{11AA06AF-8DFA-4137-89EF-0EFE93628E77}" type="datetimeFigureOut">
               <a:rPr lang="en-SG" smtClean="0"/>
-              <a:t>13/1/2024</a:t>
+              <a:t>14/1/2024</a:t>
             </a:fld>
             <a:endParaRPr lang="en-SG"/>
           </a:p>
@@ -18309,6 +18310,2207 @@
 </p:sld>
 </file>
 
+<file path=ppt/slides/slide9.xml><?xml version="1.0" encoding="utf-8"?>
+<p:sld xmlns:a="http://schemas.openxmlformats.org/drawingml/2006/main" xmlns:r="http://schemas.openxmlformats.org/officeDocument/2006/relationships" xmlns:p="http://schemas.openxmlformats.org/presentationml/2006/main">
+  <p:cSld>
+    <p:spTree>
+      <p:nvGrpSpPr>
+        <p:cNvPr id="1" name=""/>
+        <p:cNvGrpSpPr/>
+        <p:nvPr/>
+      </p:nvGrpSpPr>
+      <p:grpSpPr>
+        <a:xfrm>
+          <a:off x="0" y="0"/>
+          <a:ext cx="0" cy="0"/>
+          <a:chOff x="0" y="0"/>
+          <a:chExt cx="0" cy="0"/>
+        </a:xfrm>
+      </p:grpSpPr>
+      <p:pic>
+        <p:nvPicPr>
+          <p:cNvPr id="86" name="Picture 85">
+            <a:extLst>
+              <a:ext uri="{FF2B5EF4-FFF2-40B4-BE49-F238E27FC236}">
+                <a16:creationId xmlns:a16="http://schemas.microsoft.com/office/drawing/2014/main" id="{1C753E98-B339-648C-8214-50D1B51C4C21}"/>
+              </a:ext>
+            </a:extLst>
+          </p:cNvPr>
+          <p:cNvPicPr>
+            <a:picLocks noChangeAspect="1"/>
+          </p:cNvPicPr>
+          <p:nvPr/>
+        </p:nvPicPr>
+        <p:blipFill>
+          <a:blip r:embed="rId2"/>
+          <a:stretch>
+            <a:fillRect/>
+          </a:stretch>
+        </p:blipFill>
+        <p:spPr>
+          <a:xfrm>
+            <a:off x="295607" y="2014759"/>
+            <a:ext cx="2295431" cy="1231881"/>
+          </a:xfrm>
+          <a:prstGeom prst="rect">
+            <a:avLst/>
+          </a:prstGeom>
+          <a:ln w="6350">
+            <a:solidFill>
+              <a:schemeClr val="tx1"/>
+            </a:solidFill>
+          </a:ln>
+        </p:spPr>
+      </p:pic>
+      <p:cxnSp>
+        <p:nvCxnSpPr>
+          <p:cNvPr id="88" name="Connector: Elbow 87">
+            <a:extLst>
+              <a:ext uri="{FF2B5EF4-FFF2-40B4-BE49-F238E27FC236}">
+                <a16:creationId xmlns:a16="http://schemas.microsoft.com/office/drawing/2014/main" id="{42EE0748-A296-EEC5-0F05-2F7B463B1E66}"/>
+              </a:ext>
+            </a:extLst>
+          </p:cNvPr>
+          <p:cNvCxnSpPr>
+            <a:cxnSpLocks/>
+            <a:endCxn id="96" idx="3"/>
+          </p:cNvCxnSpPr>
+          <p:nvPr/>
+        </p:nvCxnSpPr>
+        <p:spPr>
+          <a:xfrm rot="5400000">
+            <a:off x="693032" y="3517624"/>
+            <a:ext cx="590155" cy="2584"/>
+          </a:xfrm>
+          <a:prstGeom prst="bentConnector3">
+            <a:avLst>
+              <a:gd name="adj1" fmla="val 50000"/>
+            </a:avLst>
+          </a:prstGeom>
+          <a:ln>
+            <a:headEnd type="triangle"/>
+            <a:tailEnd type="triangle"/>
+          </a:ln>
+        </p:spPr>
+        <p:style>
+          <a:lnRef idx="1">
+            <a:schemeClr val="accent1"/>
+          </a:lnRef>
+          <a:fillRef idx="0">
+            <a:schemeClr val="accent1"/>
+          </a:fillRef>
+          <a:effectRef idx="0">
+            <a:schemeClr val="accent1"/>
+          </a:effectRef>
+          <a:fontRef idx="minor">
+            <a:schemeClr val="tx1"/>
+          </a:fontRef>
+        </p:style>
+      </p:cxnSp>
+      <p:sp>
+        <p:nvSpPr>
+          <p:cNvPr id="89" name="TextBox 88">
+            <a:extLst>
+              <a:ext uri="{FF2B5EF4-FFF2-40B4-BE49-F238E27FC236}">
+                <a16:creationId xmlns:a16="http://schemas.microsoft.com/office/drawing/2014/main" id="{16C01D49-CD69-3369-7C35-FAE17A52F767}"/>
+              </a:ext>
+            </a:extLst>
+          </p:cNvPr>
+          <p:cNvSpPr txBox="1"/>
+          <p:nvPr/>
+        </p:nvSpPr>
+        <p:spPr>
+          <a:xfrm>
+            <a:off x="150451" y="1737759"/>
+            <a:ext cx="1057737" cy="276999"/>
+          </a:xfrm>
+          <a:prstGeom prst="rect">
+            <a:avLst/>
+          </a:prstGeom>
+          <a:noFill/>
+        </p:spPr>
+        <p:txBody>
+          <a:bodyPr wrap="square" rtlCol="0">
+            <a:spAutoFit/>
+          </a:bodyPr>
+          <a:lstStyle/>
+          <a:p>
+            <a:r>
+              <a:rPr lang="en-US" sz="1200" b="1" dirty="0"/>
+              <a:t>RTC2 Web-UI</a:t>
+            </a:r>
+            <a:endParaRPr lang="en-SG" sz="1200" b="1" dirty="0"/>
+          </a:p>
+        </p:txBody>
+      </p:sp>
+      <p:pic>
+        <p:nvPicPr>
+          <p:cNvPr id="91" name="Picture 90">
+            <a:extLst>
+              <a:ext uri="{FF2B5EF4-FFF2-40B4-BE49-F238E27FC236}">
+                <a16:creationId xmlns:a16="http://schemas.microsoft.com/office/drawing/2014/main" id="{236DD7EF-7A0B-65B5-43B1-507636046B32}"/>
+              </a:ext>
+            </a:extLst>
+          </p:cNvPr>
+          <p:cNvPicPr>
+            <a:picLocks noChangeAspect="1"/>
+          </p:cNvPicPr>
+          <p:nvPr/>
+        </p:nvPicPr>
+        <p:blipFill>
+          <a:blip r:embed="rId3"/>
+          <a:stretch>
+            <a:fillRect/>
+          </a:stretch>
+        </p:blipFill>
+        <p:spPr>
+          <a:xfrm>
+            <a:off x="749389" y="5045876"/>
+            <a:ext cx="474854" cy="521753"/>
+          </a:xfrm>
+          <a:prstGeom prst="rect">
+            <a:avLst/>
+          </a:prstGeom>
+          <a:ln w="3175">
+            <a:solidFill>
+              <a:schemeClr val="tx1"/>
+            </a:solidFill>
+          </a:ln>
+        </p:spPr>
+      </p:pic>
+      <p:cxnSp>
+        <p:nvCxnSpPr>
+          <p:cNvPr id="92" name="Connector: Elbow 91">
+            <a:extLst>
+              <a:ext uri="{FF2B5EF4-FFF2-40B4-BE49-F238E27FC236}">
+                <a16:creationId xmlns:a16="http://schemas.microsoft.com/office/drawing/2014/main" id="{D168B791-DCEF-5234-39BC-6E194F032B2B}"/>
+              </a:ext>
+            </a:extLst>
+          </p:cNvPr>
+          <p:cNvCxnSpPr>
+            <a:cxnSpLocks/>
+            <a:stCxn id="91" idx="0"/>
+            <a:endCxn id="96" idx="1"/>
+          </p:cNvCxnSpPr>
+          <p:nvPr/>
+        </p:nvCxnSpPr>
+        <p:spPr>
+          <a:xfrm rot="5400000" flipH="1" flipV="1">
+            <a:off x="657913" y="4716973"/>
+            <a:ext cx="657807" cy="1"/>
+          </a:xfrm>
+          <a:prstGeom prst="bentConnector3">
+            <a:avLst>
+              <a:gd name="adj1" fmla="val 50000"/>
+            </a:avLst>
+          </a:prstGeom>
+          <a:ln>
+            <a:headEnd type="triangle"/>
+            <a:tailEnd type="triangle"/>
+          </a:ln>
+        </p:spPr>
+        <p:style>
+          <a:lnRef idx="1">
+            <a:schemeClr val="accent1"/>
+          </a:lnRef>
+          <a:fillRef idx="0">
+            <a:schemeClr val="accent1"/>
+          </a:fillRef>
+          <a:effectRef idx="0">
+            <a:schemeClr val="accent1"/>
+          </a:effectRef>
+          <a:fontRef idx="minor">
+            <a:schemeClr val="tx1"/>
+          </a:fontRef>
+        </p:style>
+      </p:cxnSp>
+      <p:sp>
+        <p:nvSpPr>
+          <p:cNvPr id="95" name="TextBox 94">
+            <a:extLst>
+              <a:ext uri="{FF2B5EF4-FFF2-40B4-BE49-F238E27FC236}">
+                <a16:creationId xmlns:a16="http://schemas.microsoft.com/office/drawing/2014/main" id="{1CED2168-E07E-47CB-68C1-5B8A5C1B5A6F}"/>
+              </a:ext>
+            </a:extLst>
+          </p:cNvPr>
+          <p:cNvSpPr txBox="1"/>
+          <p:nvPr/>
+        </p:nvSpPr>
+        <p:spPr>
+          <a:xfrm>
+            <a:off x="1211792" y="5043625"/>
+            <a:ext cx="1534074" cy="461665"/>
+          </a:xfrm>
+          <a:prstGeom prst="rect">
+            <a:avLst/>
+          </a:prstGeom>
+          <a:noFill/>
+        </p:spPr>
+        <p:txBody>
+          <a:bodyPr wrap="square" rtlCol="0">
+            <a:spAutoFit/>
+          </a:bodyPr>
+          <a:lstStyle/>
+          <a:p>
+            <a:r>
+              <a:rPr lang="en-US" sz="1200" b="1" dirty="0"/>
+              <a:t>User customized program all RTC2 API</a:t>
+            </a:r>
+            <a:endParaRPr lang="en-SG" sz="1200" b="1" dirty="0"/>
+          </a:p>
+        </p:txBody>
+      </p:sp>
+      <p:sp>
+        <p:nvSpPr>
+          <p:cNvPr id="96" name="Cloud 95">
+            <a:extLst>
+              <a:ext uri="{FF2B5EF4-FFF2-40B4-BE49-F238E27FC236}">
+                <a16:creationId xmlns:a16="http://schemas.microsoft.com/office/drawing/2014/main" id="{67888D0D-3BAB-8CAA-3A71-A3DA432A750A}"/>
+              </a:ext>
+            </a:extLst>
+          </p:cNvPr>
+          <p:cNvSpPr/>
+          <p:nvPr/>
+        </p:nvSpPr>
+        <p:spPr>
+          <a:xfrm>
+            <a:off x="418895" y="3779141"/>
+            <a:ext cx="1135843" cy="609577"/>
+          </a:xfrm>
+          <a:prstGeom prst="cloud">
+            <a:avLst/>
+          </a:prstGeom>
+          <a:solidFill>
+            <a:schemeClr val="accent1">
+              <a:lumMod val="60000"/>
+              <a:lumOff val="40000"/>
+            </a:schemeClr>
+          </a:solidFill>
+        </p:spPr>
+        <p:style>
+          <a:lnRef idx="2">
+            <a:schemeClr val="accent1">
+              <a:shade val="15000"/>
+            </a:schemeClr>
+          </a:lnRef>
+          <a:fillRef idx="1">
+            <a:schemeClr val="accent1"/>
+          </a:fillRef>
+          <a:effectRef idx="0">
+            <a:schemeClr val="accent1"/>
+          </a:effectRef>
+          <a:fontRef idx="minor">
+            <a:schemeClr val="lt1"/>
+          </a:fontRef>
+        </p:style>
+        <p:txBody>
+          <a:bodyPr rtlCol="0" anchor="ctr"/>
+          <a:lstStyle/>
+          <a:p>
+            <a:pPr algn="ctr"/>
+            <a:r>
+              <a:rPr lang="en-SG" sz="1200" b="1" dirty="0">
+                <a:solidFill>
+                  <a:schemeClr val="tx1"/>
+                </a:solidFill>
+              </a:rPr>
+              <a:t>Internet</a:t>
+            </a:r>
+            <a:r>
+              <a:rPr lang="en-SG" dirty="0">
+                <a:solidFill>
+                  <a:schemeClr val="tx1"/>
+                </a:solidFill>
+              </a:rPr>
+              <a:t> </a:t>
+            </a:r>
+          </a:p>
+        </p:txBody>
+      </p:sp>
+      <p:sp>
+        <p:nvSpPr>
+          <p:cNvPr id="112" name="Cloud 111">
+            <a:extLst>
+              <a:ext uri="{FF2B5EF4-FFF2-40B4-BE49-F238E27FC236}">
+                <a16:creationId xmlns:a16="http://schemas.microsoft.com/office/drawing/2014/main" id="{DCCC4B3D-8DD9-AE33-DC25-7E89EC69BE3C}"/>
+              </a:ext>
+            </a:extLst>
+          </p:cNvPr>
+          <p:cNvSpPr/>
+          <p:nvPr/>
+        </p:nvSpPr>
+        <p:spPr>
+          <a:xfrm>
+            <a:off x="6496612" y="3956869"/>
+            <a:ext cx="1135843" cy="609577"/>
+          </a:xfrm>
+          <a:prstGeom prst="cloud">
+            <a:avLst/>
+          </a:prstGeom>
+          <a:solidFill>
+            <a:schemeClr val="accent1">
+              <a:lumMod val="60000"/>
+              <a:lumOff val="40000"/>
+            </a:schemeClr>
+          </a:solidFill>
+        </p:spPr>
+        <p:style>
+          <a:lnRef idx="2">
+            <a:schemeClr val="accent1">
+              <a:shade val="15000"/>
+            </a:schemeClr>
+          </a:lnRef>
+          <a:fillRef idx="1">
+            <a:schemeClr val="accent1"/>
+          </a:fillRef>
+          <a:effectRef idx="0">
+            <a:schemeClr val="accent1"/>
+          </a:effectRef>
+          <a:fontRef idx="minor">
+            <a:schemeClr val="lt1"/>
+          </a:fontRef>
+        </p:style>
+        <p:txBody>
+          <a:bodyPr rtlCol="0" anchor="ctr"/>
+          <a:lstStyle/>
+          <a:p>
+            <a:pPr algn="ctr"/>
+            <a:r>
+              <a:rPr lang="en-SG" sz="1200" b="1" dirty="0">
+                <a:solidFill>
+                  <a:schemeClr val="tx1"/>
+                </a:solidFill>
+              </a:rPr>
+              <a:t>Internet</a:t>
+            </a:r>
+            <a:r>
+              <a:rPr lang="en-SG" dirty="0">
+                <a:solidFill>
+                  <a:schemeClr val="tx1"/>
+                </a:solidFill>
+              </a:rPr>
+              <a:t> </a:t>
+            </a:r>
+          </a:p>
+        </p:txBody>
+      </p:sp>
+      <p:sp>
+        <p:nvSpPr>
+          <p:cNvPr id="117" name="Rectangle 116">
+            <a:extLst>
+              <a:ext uri="{FF2B5EF4-FFF2-40B4-BE49-F238E27FC236}">
+                <a16:creationId xmlns:a16="http://schemas.microsoft.com/office/drawing/2014/main" id="{49E304DE-D56A-CB95-BE71-5174AA39F1AB}"/>
+              </a:ext>
+            </a:extLst>
+          </p:cNvPr>
+          <p:cNvSpPr/>
+          <p:nvPr/>
+        </p:nvSpPr>
+        <p:spPr>
+          <a:xfrm>
+            <a:off x="7997059" y="1754249"/>
+            <a:ext cx="884473" cy="401443"/>
+          </a:xfrm>
+          <a:prstGeom prst="rect">
+            <a:avLst/>
+          </a:prstGeom>
+          <a:solidFill>
+            <a:srgbClr val="C00000"/>
+          </a:solidFill>
+        </p:spPr>
+        <p:style>
+          <a:lnRef idx="2">
+            <a:schemeClr val="accent1">
+              <a:shade val="50000"/>
+            </a:schemeClr>
+          </a:lnRef>
+          <a:fillRef idx="1">
+            <a:schemeClr val="accent1"/>
+          </a:fillRef>
+          <a:effectRef idx="0">
+            <a:schemeClr val="accent1"/>
+          </a:effectRef>
+          <a:fontRef idx="minor">
+            <a:schemeClr val="lt1"/>
+          </a:fontRef>
+        </p:style>
+        <p:txBody>
+          <a:bodyPr rtlCol="0" anchor="ctr"/>
+          <a:lstStyle/>
+          <a:p>
+            <a:r>
+              <a:rPr lang="en-US" sz="1100" b="1" dirty="0"/>
+              <a:t>Malware </a:t>
+            </a:r>
+            <a:r>
+              <a:rPr lang="en-US" sz="1100" b="1" dirty="0" err="1"/>
+              <a:t>init</a:t>
+            </a:r>
+            <a:r>
+              <a:rPr lang="en-US" sz="1100" b="1" dirty="0"/>
+              <a:t> start  </a:t>
+            </a:r>
+            <a:endParaRPr lang="en-SG" sz="1100" b="1" dirty="0"/>
+          </a:p>
+        </p:txBody>
+      </p:sp>
+      <p:sp>
+        <p:nvSpPr>
+          <p:cNvPr id="118" name="Rectangle 117">
+            <a:extLst>
+              <a:ext uri="{FF2B5EF4-FFF2-40B4-BE49-F238E27FC236}">
+                <a16:creationId xmlns:a16="http://schemas.microsoft.com/office/drawing/2014/main" id="{ABDC2E7D-B9B2-B453-1A31-722423930C7B}"/>
+              </a:ext>
+            </a:extLst>
+          </p:cNvPr>
+          <p:cNvSpPr/>
+          <p:nvPr/>
+        </p:nvSpPr>
+        <p:spPr>
+          <a:xfrm>
+            <a:off x="6933310" y="2716286"/>
+            <a:ext cx="884473" cy="283697"/>
+          </a:xfrm>
+          <a:prstGeom prst="rect">
+            <a:avLst/>
+          </a:prstGeom>
+          <a:solidFill>
+            <a:srgbClr val="C00000"/>
+          </a:solidFill>
+        </p:spPr>
+        <p:style>
+          <a:lnRef idx="2">
+            <a:schemeClr val="accent1">
+              <a:shade val="50000"/>
+            </a:schemeClr>
+          </a:lnRef>
+          <a:fillRef idx="1">
+            <a:schemeClr val="accent1"/>
+          </a:fillRef>
+          <a:effectRef idx="0">
+            <a:schemeClr val="accent1"/>
+          </a:effectRef>
+          <a:fontRef idx="minor">
+            <a:schemeClr val="lt1"/>
+          </a:fontRef>
+        </p:style>
+        <p:txBody>
+          <a:bodyPr rtlCol="0" anchor="ctr"/>
+          <a:lstStyle/>
+          <a:p>
+            <a:r>
+              <a:rPr lang="en-US" sz="1100" b="1" dirty="0"/>
+              <a:t>RTC2 client </a:t>
+            </a:r>
+          </a:p>
+        </p:txBody>
+      </p:sp>
+      <p:sp>
+        <p:nvSpPr>
+          <p:cNvPr id="121" name="Rectangle 120">
+            <a:extLst>
+              <a:ext uri="{FF2B5EF4-FFF2-40B4-BE49-F238E27FC236}">
+                <a16:creationId xmlns:a16="http://schemas.microsoft.com/office/drawing/2014/main" id="{A0E1C03F-312D-0848-3EFF-E6D1F5BFEBFD}"/>
+              </a:ext>
+            </a:extLst>
+          </p:cNvPr>
+          <p:cNvSpPr/>
+          <p:nvPr/>
+        </p:nvSpPr>
+        <p:spPr>
+          <a:xfrm>
+            <a:off x="8260404" y="2493205"/>
+            <a:ext cx="1063750" cy="430887"/>
+          </a:xfrm>
+          <a:prstGeom prst="rect">
+            <a:avLst/>
+          </a:prstGeom>
+          <a:solidFill>
+            <a:srgbClr val="C00000"/>
+          </a:solidFill>
+        </p:spPr>
+        <p:style>
+          <a:lnRef idx="2">
+            <a:schemeClr val="accent1">
+              <a:shade val="50000"/>
+            </a:schemeClr>
+          </a:lnRef>
+          <a:fillRef idx="1">
+            <a:schemeClr val="accent1"/>
+          </a:fillRef>
+          <a:effectRef idx="0">
+            <a:schemeClr val="accent1"/>
+          </a:effectRef>
+          <a:fontRef idx="minor">
+            <a:schemeClr val="lt1"/>
+          </a:fontRef>
+        </p:style>
+        <p:txBody>
+          <a:bodyPr rtlCol="0" anchor="ctr"/>
+          <a:lstStyle/>
+          <a:p>
+            <a:r>
+              <a:rPr lang="en-US" sz="1100" b="1" dirty="0"/>
+              <a:t>Malware data manager </a:t>
+            </a:r>
+          </a:p>
+        </p:txBody>
+      </p:sp>
+      <p:cxnSp>
+        <p:nvCxnSpPr>
+          <p:cNvPr id="122" name="Straight Arrow Connector 121">
+            <a:extLst>
+              <a:ext uri="{FF2B5EF4-FFF2-40B4-BE49-F238E27FC236}">
+                <a16:creationId xmlns:a16="http://schemas.microsoft.com/office/drawing/2014/main" id="{3BA6EAD8-8CCD-18BA-10E7-478536D1135F}"/>
+              </a:ext>
+            </a:extLst>
+          </p:cNvPr>
+          <p:cNvCxnSpPr>
+            <a:cxnSpLocks/>
+          </p:cNvCxnSpPr>
+          <p:nvPr/>
+        </p:nvCxnSpPr>
+        <p:spPr>
+          <a:xfrm>
+            <a:off x="8387308" y="2192616"/>
+            <a:ext cx="0" cy="276903"/>
+          </a:xfrm>
+          <a:prstGeom prst="straightConnector1">
+            <a:avLst/>
+          </a:prstGeom>
+          <a:ln w="19050">
+            <a:solidFill>
+              <a:schemeClr val="accent6">
+                <a:lumMod val="50000"/>
+              </a:schemeClr>
+            </a:solidFill>
+            <a:tailEnd type="triangle"/>
+          </a:ln>
+        </p:spPr>
+        <p:style>
+          <a:lnRef idx="1">
+            <a:schemeClr val="accent1"/>
+          </a:lnRef>
+          <a:fillRef idx="0">
+            <a:schemeClr val="accent1"/>
+          </a:fillRef>
+          <a:effectRef idx="0">
+            <a:schemeClr val="accent1"/>
+          </a:effectRef>
+          <a:fontRef idx="minor">
+            <a:schemeClr val="tx1"/>
+          </a:fontRef>
+        </p:style>
+      </p:cxnSp>
+      <p:cxnSp>
+        <p:nvCxnSpPr>
+          <p:cNvPr id="125" name="Connector: Elbow 124">
+            <a:extLst>
+              <a:ext uri="{FF2B5EF4-FFF2-40B4-BE49-F238E27FC236}">
+                <a16:creationId xmlns:a16="http://schemas.microsoft.com/office/drawing/2014/main" id="{9823CC5D-D01A-652A-2302-1F5D79C13141}"/>
+              </a:ext>
+            </a:extLst>
+          </p:cNvPr>
+          <p:cNvCxnSpPr>
+            <a:cxnSpLocks/>
+            <a:stCxn id="117" idx="1"/>
+            <a:endCxn id="118" idx="0"/>
+          </p:cNvCxnSpPr>
+          <p:nvPr/>
+        </p:nvCxnSpPr>
+        <p:spPr>
+          <a:xfrm rot="10800000" flipV="1">
+            <a:off x="7375547" y="1954970"/>
+            <a:ext cx="621512" cy="761315"/>
+          </a:xfrm>
+          <a:prstGeom prst="bentConnector2">
+            <a:avLst/>
+          </a:prstGeom>
+          <a:ln>
+            <a:tailEnd type="triangle"/>
+          </a:ln>
+        </p:spPr>
+        <p:style>
+          <a:lnRef idx="1">
+            <a:schemeClr val="dk1"/>
+          </a:lnRef>
+          <a:fillRef idx="0">
+            <a:schemeClr val="dk1"/>
+          </a:fillRef>
+          <a:effectRef idx="0">
+            <a:schemeClr val="dk1"/>
+          </a:effectRef>
+          <a:fontRef idx="minor">
+            <a:schemeClr val="tx1"/>
+          </a:fontRef>
+        </p:style>
+      </p:cxnSp>
+      <p:sp>
+        <p:nvSpPr>
+          <p:cNvPr id="128" name="TextBox 127">
+            <a:extLst>
+              <a:ext uri="{FF2B5EF4-FFF2-40B4-BE49-F238E27FC236}">
+                <a16:creationId xmlns:a16="http://schemas.microsoft.com/office/drawing/2014/main" id="{C6B7F592-D999-8728-E573-46033D360567}"/>
+              </a:ext>
+            </a:extLst>
+          </p:cNvPr>
+          <p:cNvSpPr txBox="1"/>
+          <p:nvPr/>
+        </p:nvSpPr>
+        <p:spPr>
+          <a:xfrm>
+            <a:off x="8397283" y="2193019"/>
+            <a:ext cx="1063750" cy="261610"/>
+          </a:xfrm>
+          <a:prstGeom prst="rect">
+            <a:avLst/>
+          </a:prstGeom>
+          <a:noFill/>
+        </p:spPr>
+        <p:txBody>
+          <a:bodyPr wrap="square" rtlCol="0">
+            <a:spAutoFit/>
+          </a:bodyPr>
+          <a:lstStyle/>
+          <a:p>
+            <a:r>
+              <a:rPr lang="en-SG" sz="1100" dirty="0"/>
+              <a:t>Main thread</a:t>
+            </a:r>
+          </a:p>
+        </p:txBody>
+      </p:sp>
+      <p:cxnSp>
+        <p:nvCxnSpPr>
+          <p:cNvPr id="129" name="Connector: Elbow 128">
+            <a:extLst>
+              <a:ext uri="{FF2B5EF4-FFF2-40B4-BE49-F238E27FC236}">
+                <a16:creationId xmlns:a16="http://schemas.microsoft.com/office/drawing/2014/main" id="{152AFA19-AE6F-6491-3B15-2917EF40CE1A}"/>
+              </a:ext>
+            </a:extLst>
+          </p:cNvPr>
+          <p:cNvCxnSpPr>
+            <a:cxnSpLocks/>
+          </p:cNvCxnSpPr>
+          <p:nvPr/>
+        </p:nvCxnSpPr>
+        <p:spPr>
+          <a:xfrm rot="5400000" flipH="1" flipV="1">
+            <a:off x="6530169" y="3489393"/>
+            <a:ext cx="991739" cy="1"/>
+          </a:xfrm>
+          <a:prstGeom prst="bentConnector3">
+            <a:avLst>
+              <a:gd name="adj1" fmla="val 50000"/>
+            </a:avLst>
+          </a:prstGeom>
+          <a:ln w="12700">
+            <a:solidFill>
+              <a:schemeClr val="accent1">
+                <a:lumMod val="75000"/>
+              </a:schemeClr>
+            </a:solidFill>
+            <a:prstDash val="sysDash"/>
+            <a:tailEnd type="triangle"/>
+          </a:ln>
+        </p:spPr>
+        <p:style>
+          <a:lnRef idx="1">
+            <a:schemeClr val="accent1"/>
+          </a:lnRef>
+          <a:fillRef idx="0">
+            <a:schemeClr val="accent1"/>
+          </a:fillRef>
+          <a:effectRef idx="0">
+            <a:schemeClr val="accent1"/>
+          </a:effectRef>
+          <a:fontRef idx="minor">
+            <a:schemeClr val="tx1"/>
+          </a:fontRef>
+        </p:style>
+      </p:cxnSp>
+      <p:cxnSp>
+        <p:nvCxnSpPr>
+          <p:cNvPr id="132" name="Straight Arrow Connector 131">
+            <a:extLst>
+              <a:ext uri="{FF2B5EF4-FFF2-40B4-BE49-F238E27FC236}">
+                <a16:creationId xmlns:a16="http://schemas.microsoft.com/office/drawing/2014/main" id="{AF2C4C95-37AF-8EDD-BF7C-2E93443098DF}"/>
+              </a:ext>
+            </a:extLst>
+          </p:cNvPr>
+          <p:cNvCxnSpPr>
+            <a:cxnSpLocks/>
+          </p:cNvCxnSpPr>
+          <p:nvPr/>
+        </p:nvCxnSpPr>
+        <p:spPr>
+          <a:xfrm flipH="1">
+            <a:off x="7207110" y="3023226"/>
+            <a:ext cx="257" cy="953790"/>
+          </a:xfrm>
+          <a:prstGeom prst="straightConnector1">
+            <a:avLst/>
+          </a:prstGeom>
+          <a:ln>
+            <a:solidFill>
+              <a:schemeClr val="accent6">
+                <a:lumMod val="75000"/>
+              </a:schemeClr>
+            </a:solidFill>
+            <a:prstDash val="dash"/>
+            <a:tailEnd type="triangle"/>
+          </a:ln>
+        </p:spPr>
+        <p:style>
+          <a:lnRef idx="1">
+            <a:schemeClr val="accent1"/>
+          </a:lnRef>
+          <a:fillRef idx="0">
+            <a:schemeClr val="accent1"/>
+          </a:fillRef>
+          <a:effectRef idx="0">
+            <a:schemeClr val="accent1"/>
+          </a:effectRef>
+          <a:fontRef idx="minor">
+            <a:schemeClr val="tx1"/>
+          </a:fontRef>
+        </p:style>
+      </p:cxnSp>
+      <p:cxnSp>
+        <p:nvCxnSpPr>
+          <p:cNvPr id="136" name="Connector: Elbow 135">
+            <a:extLst>
+              <a:ext uri="{FF2B5EF4-FFF2-40B4-BE49-F238E27FC236}">
+                <a16:creationId xmlns:a16="http://schemas.microsoft.com/office/drawing/2014/main" id="{E73DA3ED-AF07-F41B-860F-AEFC9E526268}"/>
+              </a:ext>
+            </a:extLst>
+          </p:cNvPr>
+          <p:cNvCxnSpPr>
+            <a:cxnSpLocks/>
+            <a:stCxn id="38" idx="3"/>
+            <a:endCxn id="112" idx="2"/>
+          </p:cNvCxnSpPr>
+          <p:nvPr/>
+        </p:nvCxnSpPr>
+        <p:spPr>
+          <a:xfrm>
+            <a:off x="5230752" y="4166835"/>
+            <a:ext cx="1269383" cy="94823"/>
+          </a:xfrm>
+          <a:prstGeom prst="bentConnector3">
+            <a:avLst>
+              <a:gd name="adj1" fmla="val 50000"/>
+            </a:avLst>
+          </a:prstGeom>
+          <a:ln w="12700">
+            <a:solidFill>
+              <a:schemeClr val="accent1">
+                <a:lumMod val="75000"/>
+              </a:schemeClr>
+            </a:solidFill>
+            <a:prstDash val="sysDash"/>
+            <a:tailEnd type="triangle"/>
+          </a:ln>
+        </p:spPr>
+        <p:style>
+          <a:lnRef idx="1">
+            <a:schemeClr val="accent1"/>
+          </a:lnRef>
+          <a:fillRef idx="0">
+            <a:schemeClr val="accent1"/>
+          </a:fillRef>
+          <a:effectRef idx="0">
+            <a:schemeClr val="accent1"/>
+          </a:effectRef>
+          <a:fontRef idx="minor">
+            <a:schemeClr val="tx1"/>
+          </a:fontRef>
+        </p:style>
+      </p:cxnSp>
+      <p:cxnSp>
+        <p:nvCxnSpPr>
+          <p:cNvPr id="141" name="Connector: Elbow 140">
+            <a:extLst>
+              <a:ext uri="{FF2B5EF4-FFF2-40B4-BE49-F238E27FC236}">
+                <a16:creationId xmlns:a16="http://schemas.microsoft.com/office/drawing/2014/main" id="{FB167114-A472-C856-A45A-900F1BD706AE}"/>
+              </a:ext>
+            </a:extLst>
+          </p:cNvPr>
+          <p:cNvCxnSpPr>
+            <a:cxnSpLocks/>
+            <a:stCxn id="112" idx="1"/>
+            <a:endCxn id="38" idx="2"/>
+          </p:cNvCxnSpPr>
+          <p:nvPr/>
+        </p:nvCxnSpPr>
+        <p:spPr>
+          <a:xfrm rot="5400000" flipH="1">
+            <a:off x="5733047" y="3234310"/>
+            <a:ext cx="32256" cy="2630718"/>
+          </a:xfrm>
+          <a:prstGeom prst="bentConnector3">
+            <a:avLst>
+              <a:gd name="adj1" fmla="val -710717"/>
+            </a:avLst>
+          </a:prstGeom>
+          <a:ln>
+            <a:solidFill>
+              <a:schemeClr val="accent6">
+                <a:lumMod val="75000"/>
+              </a:schemeClr>
+            </a:solidFill>
+            <a:prstDash val="dash"/>
+            <a:tailEnd type="triangle"/>
+          </a:ln>
+        </p:spPr>
+        <p:style>
+          <a:lnRef idx="1">
+            <a:schemeClr val="accent1"/>
+          </a:lnRef>
+          <a:fillRef idx="0">
+            <a:schemeClr val="accent1"/>
+          </a:fillRef>
+          <a:effectRef idx="0">
+            <a:schemeClr val="accent1"/>
+          </a:effectRef>
+          <a:fontRef idx="minor">
+            <a:schemeClr val="tx1"/>
+          </a:fontRef>
+        </p:style>
+      </p:cxnSp>
+      <p:cxnSp>
+        <p:nvCxnSpPr>
+          <p:cNvPr id="148" name="Straight Arrow Connector 147">
+            <a:extLst>
+              <a:ext uri="{FF2B5EF4-FFF2-40B4-BE49-F238E27FC236}">
+                <a16:creationId xmlns:a16="http://schemas.microsoft.com/office/drawing/2014/main" id="{0F172A10-31A1-7E5A-B100-4D8D4D5EE299}"/>
+              </a:ext>
+            </a:extLst>
+          </p:cNvPr>
+          <p:cNvCxnSpPr>
+            <a:cxnSpLocks/>
+          </p:cNvCxnSpPr>
+          <p:nvPr/>
+        </p:nvCxnSpPr>
+        <p:spPr>
+          <a:xfrm>
+            <a:off x="8397283" y="2965329"/>
+            <a:ext cx="0" cy="309128"/>
+          </a:xfrm>
+          <a:prstGeom prst="straightConnector1">
+            <a:avLst/>
+          </a:prstGeom>
+          <a:ln w="19050">
+            <a:solidFill>
+              <a:schemeClr val="accent6">
+                <a:lumMod val="50000"/>
+              </a:schemeClr>
+            </a:solidFill>
+            <a:tailEnd type="triangle"/>
+          </a:ln>
+        </p:spPr>
+        <p:style>
+          <a:lnRef idx="1">
+            <a:schemeClr val="accent1"/>
+          </a:lnRef>
+          <a:fillRef idx="0">
+            <a:schemeClr val="accent1"/>
+          </a:fillRef>
+          <a:effectRef idx="0">
+            <a:schemeClr val="accent1"/>
+          </a:effectRef>
+          <a:fontRef idx="minor">
+            <a:schemeClr val="tx1"/>
+          </a:fontRef>
+        </p:style>
+      </p:cxnSp>
+      <p:sp>
+        <p:nvSpPr>
+          <p:cNvPr id="150" name="Rectangle 149">
+            <a:extLst>
+              <a:ext uri="{FF2B5EF4-FFF2-40B4-BE49-F238E27FC236}">
+                <a16:creationId xmlns:a16="http://schemas.microsoft.com/office/drawing/2014/main" id="{E77BAE04-6976-38DB-2510-1EB55E3935C3}"/>
+              </a:ext>
+            </a:extLst>
+          </p:cNvPr>
+          <p:cNvSpPr/>
+          <p:nvPr/>
+        </p:nvSpPr>
+        <p:spPr>
+          <a:xfrm>
+            <a:off x="8273094" y="3297014"/>
+            <a:ext cx="1063750" cy="430887"/>
+          </a:xfrm>
+          <a:prstGeom prst="rect">
+            <a:avLst/>
+          </a:prstGeom>
+          <a:solidFill>
+            <a:srgbClr val="C00000"/>
+          </a:solidFill>
+        </p:spPr>
+        <p:style>
+          <a:lnRef idx="2">
+            <a:schemeClr val="accent1">
+              <a:shade val="50000"/>
+            </a:schemeClr>
+          </a:lnRef>
+          <a:fillRef idx="1">
+            <a:schemeClr val="accent1"/>
+          </a:fillRef>
+          <a:effectRef idx="0">
+            <a:schemeClr val="accent1"/>
+          </a:effectRef>
+          <a:fontRef idx="minor">
+            <a:schemeClr val="lt1"/>
+          </a:fontRef>
+        </p:style>
+        <p:txBody>
+          <a:bodyPr rtlCol="0" anchor="ctr"/>
+          <a:lstStyle/>
+          <a:p>
+            <a:r>
+              <a:rPr lang="en-US" sz="1100" b="1" dirty="0"/>
+              <a:t>Malware main functions</a:t>
+            </a:r>
+          </a:p>
+        </p:txBody>
+      </p:sp>
+      <p:cxnSp>
+        <p:nvCxnSpPr>
+          <p:cNvPr id="151" name="Connector: Elbow 150">
+            <a:extLst>
+              <a:ext uri="{FF2B5EF4-FFF2-40B4-BE49-F238E27FC236}">
+                <a16:creationId xmlns:a16="http://schemas.microsoft.com/office/drawing/2014/main" id="{DADB53EB-E374-4743-54DC-649FE2B42FE2}"/>
+              </a:ext>
+            </a:extLst>
+          </p:cNvPr>
+          <p:cNvCxnSpPr>
+            <a:cxnSpLocks/>
+            <a:stCxn id="121" idx="1"/>
+            <a:endCxn id="118" idx="3"/>
+          </p:cNvCxnSpPr>
+          <p:nvPr/>
+        </p:nvCxnSpPr>
+        <p:spPr>
+          <a:xfrm rot="10800000" flipV="1">
+            <a:off x="7817784" y="2708649"/>
+            <a:ext cx="442621" cy="149486"/>
+          </a:xfrm>
+          <a:prstGeom prst="bentConnector3">
+            <a:avLst>
+              <a:gd name="adj1" fmla="val 50000"/>
+            </a:avLst>
+          </a:prstGeom>
+          <a:ln>
+            <a:solidFill>
+              <a:schemeClr val="accent6">
+                <a:lumMod val="75000"/>
+              </a:schemeClr>
+            </a:solidFill>
+            <a:prstDash val="dash"/>
+            <a:tailEnd type="triangle"/>
+          </a:ln>
+        </p:spPr>
+        <p:style>
+          <a:lnRef idx="1">
+            <a:schemeClr val="accent1"/>
+          </a:lnRef>
+          <a:fillRef idx="0">
+            <a:schemeClr val="accent1"/>
+          </a:fillRef>
+          <a:effectRef idx="0">
+            <a:schemeClr val="accent1"/>
+          </a:effectRef>
+          <a:fontRef idx="minor">
+            <a:schemeClr val="tx1"/>
+          </a:fontRef>
+        </p:style>
+      </p:cxnSp>
+      <p:cxnSp>
+        <p:nvCxnSpPr>
+          <p:cNvPr id="154" name="Connector: Elbow 153">
+            <a:extLst>
+              <a:ext uri="{FF2B5EF4-FFF2-40B4-BE49-F238E27FC236}">
+                <a16:creationId xmlns:a16="http://schemas.microsoft.com/office/drawing/2014/main" id="{A7FEBCE4-12B9-D66B-48CA-E89ABD35540D}"/>
+              </a:ext>
+            </a:extLst>
+          </p:cNvPr>
+          <p:cNvCxnSpPr>
+            <a:cxnSpLocks/>
+            <a:stCxn id="118" idx="2"/>
+            <a:endCxn id="150" idx="1"/>
+          </p:cNvCxnSpPr>
+          <p:nvPr/>
+        </p:nvCxnSpPr>
+        <p:spPr>
+          <a:xfrm rot="16200000" flipH="1">
+            <a:off x="7568083" y="2807446"/>
+            <a:ext cx="512475" cy="897547"/>
+          </a:xfrm>
+          <a:prstGeom prst="bentConnector2">
+            <a:avLst/>
+          </a:prstGeom>
+          <a:ln w="12700">
+            <a:solidFill>
+              <a:schemeClr val="accent1">
+                <a:lumMod val="75000"/>
+              </a:schemeClr>
+            </a:solidFill>
+            <a:prstDash val="sysDash"/>
+            <a:tailEnd type="triangle"/>
+          </a:ln>
+        </p:spPr>
+        <p:style>
+          <a:lnRef idx="1">
+            <a:schemeClr val="accent1"/>
+          </a:lnRef>
+          <a:fillRef idx="0">
+            <a:schemeClr val="accent1"/>
+          </a:fillRef>
+          <a:effectRef idx="0">
+            <a:schemeClr val="accent1"/>
+          </a:effectRef>
+          <a:fontRef idx="minor">
+            <a:schemeClr val="tx1"/>
+          </a:fontRef>
+        </p:style>
+      </p:cxnSp>
+      <p:sp>
+        <p:nvSpPr>
+          <p:cNvPr id="157" name="TextBox 156">
+            <a:extLst>
+              <a:ext uri="{FF2B5EF4-FFF2-40B4-BE49-F238E27FC236}">
+                <a16:creationId xmlns:a16="http://schemas.microsoft.com/office/drawing/2014/main" id="{330589DC-ACF3-0E35-3A0E-6881FF6F9E98}"/>
+              </a:ext>
+            </a:extLst>
+          </p:cNvPr>
+          <p:cNvSpPr txBox="1"/>
+          <p:nvPr/>
+        </p:nvSpPr>
+        <p:spPr>
+          <a:xfrm>
+            <a:off x="6669906" y="1171903"/>
+            <a:ext cx="2977528" cy="276999"/>
+          </a:xfrm>
+          <a:prstGeom prst="rect">
+            <a:avLst/>
+          </a:prstGeom>
+          <a:noFill/>
+        </p:spPr>
+        <p:txBody>
+          <a:bodyPr wrap="square" rtlCol="0">
+            <a:spAutoFit/>
+          </a:bodyPr>
+          <a:lstStyle/>
+          <a:p>
+            <a:r>
+              <a:rPr lang="en-US" sz="1200" b="1" dirty="0">
+                <a:solidFill>
+                  <a:srgbClr val="C00000"/>
+                </a:solidFill>
+              </a:rPr>
+              <a:t>ARP spoofing attacker program workflow </a:t>
+            </a:r>
+            <a:endParaRPr lang="en-SG" sz="1200" b="1" dirty="0">
+              <a:solidFill>
+                <a:srgbClr val="C00000"/>
+              </a:solidFill>
+            </a:endParaRPr>
+          </a:p>
+        </p:txBody>
+      </p:sp>
+      <p:sp>
+        <p:nvSpPr>
+          <p:cNvPr id="158" name="TextBox 157">
+            <a:extLst>
+              <a:ext uri="{FF2B5EF4-FFF2-40B4-BE49-F238E27FC236}">
+                <a16:creationId xmlns:a16="http://schemas.microsoft.com/office/drawing/2014/main" id="{97E62AE0-D45A-BD76-A097-29E52B347514}"/>
+              </a:ext>
+            </a:extLst>
+          </p:cNvPr>
+          <p:cNvSpPr txBox="1"/>
+          <p:nvPr/>
+        </p:nvSpPr>
+        <p:spPr>
+          <a:xfrm>
+            <a:off x="150451" y="1171903"/>
+            <a:ext cx="1925097" cy="461665"/>
+          </a:xfrm>
+          <a:prstGeom prst="rect">
+            <a:avLst/>
+          </a:prstGeom>
+          <a:noFill/>
+        </p:spPr>
+        <p:txBody>
+          <a:bodyPr wrap="square" rtlCol="0">
+            <a:spAutoFit/>
+          </a:bodyPr>
+          <a:lstStyle/>
+          <a:p>
+            <a:r>
+              <a:rPr lang="en-US" sz="1200" b="1" dirty="0">
+                <a:solidFill>
+                  <a:schemeClr val="accent1">
+                    <a:lumMod val="75000"/>
+                  </a:schemeClr>
+                </a:solidFill>
+              </a:rPr>
+              <a:t>Red team user / program workflow </a:t>
+            </a:r>
+            <a:endParaRPr lang="en-SG" sz="1200" b="1" dirty="0">
+              <a:solidFill>
+                <a:schemeClr val="accent1">
+                  <a:lumMod val="75000"/>
+                </a:schemeClr>
+              </a:solidFill>
+            </a:endParaRPr>
+          </a:p>
+        </p:txBody>
+      </p:sp>
+      <p:cxnSp>
+        <p:nvCxnSpPr>
+          <p:cNvPr id="159" name="Straight Arrow Connector 158">
+            <a:extLst>
+              <a:ext uri="{FF2B5EF4-FFF2-40B4-BE49-F238E27FC236}">
+                <a16:creationId xmlns:a16="http://schemas.microsoft.com/office/drawing/2014/main" id="{E3CBC29D-53C8-988F-5B93-4FF4102D912F}"/>
+              </a:ext>
+            </a:extLst>
+          </p:cNvPr>
+          <p:cNvCxnSpPr>
+            <a:cxnSpLocks/>
+          </p:cNvCxnSpPr>
+          <p:nvPr/>
+        </p:nvCxnSpPr>
+        <p:spPr>
+          <a:xfrm>
+            <a:off x="3405483" y="5921967"/>
+            <a:ext cx="351080" cy="0"/>
+          </a:xfrm>
+          <a:prstGeom prst="straightConnector1">
+            <a:avLst/>
+          </a:prstGeom>
+          <a:ln>
+            <a:headEnd type="triangle"/>
+            <a:tailEnd type="triangle"/>
+          </a:ln>
+        </p:spPr>
+        <p:style>
+          <a:lnRef idx="1">
+            <a:schemeClr val="accent1"/>
+          </a:lnRef>
+          <a:fillRef idx="0">
+            <a:schemeClr val="accent1"/>
+          </a:fillRef>
+          <a:effectRef idx="0">
+            <a:schemeClr val="accent1"/>
+          </a:effectRef>
+          <a:fontRef idx="minor">
+            <a:schemeClr val="tx1"/>
+          </a:fontRef>
+        </p:style>
+      </p:cxnSp>
+      <p:cxnSp>
+        <p:nvCxnSpPr>
+          <p:cNvPr id="161" name="Straight Arrow Connector 160">
+            <a:extLst>
+              <a:ext uri="{FF2B5EF4-FFF2-40B4-BE49-F238E27FC236}">
+                <a16:creationId xmlns:a16="http://schemas.microsoft.com/office/drawing/2014/main" id="{65F67AB9-A5EA-B2BB-E6BA-4B206C5D540F}"/>
+              </a:ext>
+            </a:extLst>
+          </p:cNvPr>
+          <p:cNvCxnSpPr>
+            <a:cxnSpLocks/>
+          </p:cNvCxnSpPr>
+          <p:nvPr/>
+        </p:nvCxnSpPr>
+        <p:spPr>
+          <a:xfrm>
+            <a:off x="1304037" y="5887415"/>
+            <a:ext cx="390259" cy="0"/>
+          </a:xfrm>
+          <a:prstGeom prst="straightConnector1">
+            <a:avLst/>
+          </a:prstGeom>
+          <a:ln>
+            <a:tailEnd type="triangle"/>
+          </a:ln>
+        </p:spPr>
+        <p:style>
+          <a:lnRef idx="1">
+            <a:schemeClr val="dk1"/>
+          </a:lnRef>
+          <a:fillRef idx="0">
+            <a:schemeClr val="dk1"/>
+          </a:fillRef>
+          <a:effectRef idx="0">
+            <a:schemeClr val="dk1"/>
+          </a:effectRef>
+          <a:fontRef idx="minor">
+            <a:schemeClr val="tx1"/>
+          </a:fontRef>
+        </p:style>
+      </p:cxnSp>
+      <p:sp>
+        <p:nvSpPr>
+          <p:cNvPr id="162" name="TextBox 161">
+            <a:extLst>
+              <a:ext uri="{FF2B5EF4-FFF2-40B4-BE49-F238E27FC236}">
+                <a16:creationId xmlns:a16="http://schemas.microsoft.com/office/drawing/2014/main" id="{91C9723B-BBF7-EFD0-8A82-8AC6321C2705}"/>
+              </a:ext>
+            </a:extLst>
+          </p:cNvPr>
+          <p:cNvSpPr txBox="1"/>
+          <p:nvPr/>
+        </p:nvSpPr>
+        <p:spPr>
+          <a:xfrm>
+            <a:off x="1694296" y="5770000"/>
+            <a:ext cx="1793483" cy="246221"/>
+          </a:xfrm>
+          <a:prstGeom prst="rect">
+            <a:avLst/>
+          </a:prstGeom>
+          <a:noFill/>
+        </p:spPr>
+        <p:txBody>
+          <a:bodyPr wrap="square" rtlCol="0">
+            <a:spAutoFit/>
+          </a:bodyPr>
+          <a:lstStyle/>
+          <a:p>
+            <a:r>
+              <a:rPr lang="en-US" sz="1000" b="1" dirty="0"/>
+              <a:t>Program execution flow </a:t>
+            </a:r>
+            <a:endParaRPr lang="en-SG" sz="1000" b="1" dirty="0"/>
+          </a:p>
+        </p:txBody>
+      </p:sp>
+      <p:sp>
+        <p:nvSpPr>
+          <p:cNvPr id="167" name="TextBox 166">
+            <a:extLst>
+              <a:ext uri="{FF2B5EF4-FFF2-40B4-BE49-F238E27FC236}">
+                <a16:creationId xmlns:a16="http://schemas.microsoft.com/office/drawing/2014/main" id="{AD60869D-5619-FBDA-DB5E-11076CDDF64A}"/>
+              </a:ext>
+            </a:extLst>
+          </p:cNvPr>
+          <p:cNvSpPr txBox="1"/>
+          <p:nvPr/>
+        </p:nvSpPr>
+        <p:spPr>
+          <a:xfrm>
+            <a:off x="3777792" y="5795280"/>
+            <a:ext cx="1793483" cy="246221"/>
+          </a:xfrm>
+          <a:prstGeom prst="rect">
+            <a:avLst/>
+          </a:prstGeom>
+          <a:noFill/>
+        </p:spPr>
+        <p:txBody>
+          <a:bodyPr wrap="square" rtlCol="0">
+            <a:spAutoFit/>
+          </a:bodyPr>
+          <a:lstStyle/>
+          <a:p>
+            <a:r>
+              <a:rPr lang="en-US" sz="1000" b="1" dirty="0"/>
+              <a:t>Red team communication</a:t>
+            </a:r>
+            <a:endParaRPr lang="en-SG" sz="1000" b="1" dirty="0"/>
+          </a:p>
+        </p:txBody>
+      </p:sp>
+      <p:cxnSp>
+        <p:nvCxnSpPr>
+          <p:cNvPr id="168" name="Straight Arrow Connector 167">
+            <a:extLst>
+              <a:ext uri="{FF2B5EF4-FFF2-40B4-BE49-F238E27FC236}">
+                <a16:creationId xmlns:a16="http://schemas.microsoft.com/office/drawing/2014/main" id="{BFC1D2ED-D582-C15A-0A83-A086C8ED7B5C}"/>
+              </a:ext>
+            </a:extLst>
+          </p:cNvPr>
+          <p:cNvCxnSpPr>
+            <a:cxnSpLocks/>
+          </p:cNvCxnSpPr>
+          <p:nvPr/>
+        </p:nvCxnSpPr>
+        <p:spPr>
+          <a:xfrm>
+            <a:off x="5477742" y="5936550"/>
+            <a:ext cx="293088" cy="0"/>
+          </a:xfrm>
+          <a:prstGeom prst="straightConnector1">
+            <a:avLst/>
+          </a:prstGeom>
+          <a:ln w="19050">
+            <a:solidFill>
+              <a:srgbClr val="0070C0"/>
+            </a:solidFill>
+            <a:prstDash val="sysDash"/>
+            <a:tailEnd type="triangle"/>
+          </a:ln>
+        </p:spPr>
+        <p:style>
+          <a:lnRef idx="1">
+            <a:schemeClr val="accent1"/>
+          </a:lnRef>
+          <a:fillRef idx="0">
+            <a:schemeClr val="accent1"/>
+          </a:fillRef>
+          <a:effectRef idx="0">
+            <a:schemeClr val="accent1"/>
+          </a:effectRef>
+          <a:fontRef idx="minor">
+            <a:schemeClr val="tx1"/>
+          </a:fontRef>
+        </p:style>
+      </p:cxnSp>
+      <p:sp>
+        <p:nvSpPr>
+          <p:cNvPr id="170" name="TextBox 169">
+            <a:extLst>
+              <a:ext uri="{FF2B5EF4-FFF2-40B4-BE49-F238E27FC236}">
+                <a16:creationId xmlns:a16="http://schemas.microsoft.com/office/drawing/2014/main" id="{509A2FDA-0F54-C698-D5B6-5DA9F29E8859}"/>
+              </a:ext>
+            </a:extLst>
+          </p:cNvPr>
+          <p:cNvSpPr txBox="1"/>
+          <p:nvPr/>
+        </p:nvSpPr>
+        <p:spPr>
+          <a:xfrm>
+            <a:off x="5742910" y="5813439"/>
+            <a:ext cx="1936044" cy="246221"/>
+          </a:xfrm>
+          <a:prstGeom prst="rect">
+            <a:avLst/>
+          </a:prstGeom>
+          <a:noFill/>
+        </p:spPr>
+        <p:txBody>
+          <a:bodyPr wrap="square" rtlCol="0">
+            <a:spAutoFit/>
+          </a:bodyPr>
+          <a:lstStyle/>
+          <a:p>
+            <a:r>
+              <a:rPr lang="en-US" sz="1000" b="1" dirty="0"/>
+              <a:t>Malware tasks assignment flow</a:t>
+            </a:r>
+            <a:endParaRPr lang="en-SG" sz="1000" b="1" dirty="0"/>
+          </a:p>
+        </p:txBody>
+      </p:sp>
+      <p:cxnSp>
+        <p:nvCxnSpPr>
+          <p:cNvPr id="171" name="Straight Arrow Connector 170">
+            <a:extLst>
+              <a:ext uri="{FF2B5EF4-FFF2-40B4-BE49-F238E27FC236}">
+                <a16:creationId xmlns:a16="http://schemas.microsoft.com/office/drawing/2014/main" id="{C4ECD996-008E-A6B7-37E6-A7AF8711BDC6}"/>
+              </a:ext>
+            </a:extLst>
+          </p:cNvPr>
+          <p:cNvCxnSpPr>
+            <a:cxnSpLocks/>
+          </p:cNvCxnSpPr>
+          <p:nvPr/>
+        </p:nvCxnSpPr>
+        <p:spPr>
+          <a:xfrm>
+            <a:off x="7742886" y="5958287"/>
+            <a:ext cx="293088" cy="0"/>
+          </a:xfrm>
+          <a:prstGeom prst="straightConnector1">
+            <a:avLst/>
+          </a:prstGeom>
+          <a:ln w="19050">
+            <a:solidFill>
+              <a:schemeClr val="accent6">
+                <a:lumMod val="75000"/>
+              </a:schemeClr>
+            </a:solidFill>
+            <a:prstDash val="sysDash"/>
+            <a:tailEnd type="triangle"/>
+          </a:ln>
+        </p:spPr>
+        <p:style>
+          <a:lnRef idx="1">
+            <a:schemeClr val="accent1"/>
+          </a:lnRef>
+          <a:fillRef idx="0">
+            <a:schemeClr val="accent1"/>
+          </a:fillRef>
+          <a:effectRef idx="0">
+            <a:schemeClr val="accent1"/>
+          </a:effectRef>
+          <a:fontRef idx="minor">
+            <a:schemeClr val="tx1"/>
+          </a:fontRef>
+        </p:style>
+      </p:cxnSp>
+      <p:sp>
+        <p:nvSpPr>
+          <p:cNvPr id="172" name="TextBox 171">
+            <a:extLst>
+              <a:ext uri="{FF2B5EF4-FFF2-40B4-BE49-F238E27FC236}">
+                <a16:creationId xmlns:a16="http://schemas.microsoft.com/office/drawing/2014/main" id="{7E95235A-5B69-B613-7148-416C934BA6CC}"/>
+              </a:ext>
+            </a:extLst>
+          </p:cNvPr>
+          <p:cNvSpPr txBox="1"/>
+          <p:nvPr/>
+        </p:nvSpPr>
+        <p:spPr>
+          <a:xfrm>
+            <a:off x="8044953" y="5822602"/>
+            <a:ext cx="1936044" cy="246221"/>
+          </a:xfrm>
+          <a:prstGeom prst="rect">
+            <a:avLst/>
+          </a:prstGeom>
+          <a:noFill/>
+        </p:spPr>
+        <p:txBody>
+          <a:bodyPr wrap="square" rtlCol="0">
+            <a:spAutoFit/>
+          </a:bodyPr>
+          <a:lstStyle/>
+          <a:p>
+            <a:r>
+              <a:rPr lang="en-US" sz="1000" b="1" dirty="0"/>
+              <a:t>Malware state data flow</a:t>
+            </a:r>
+            <a:endParaRPr lang="en-SG" sz="1000" b="1" dirty="0"/>
+          </a:p>
+        </p:txBody>
+      </p:sp>
+      <p:cxnSp>
+        <p:nvCxnSpPr>
+          <p:cNvPr id="173" name="Straight Arrow Connector 172">
+            <a:extLst>
+              <a:ext uri="{FF2B5EF4-FFF2-40B4-BE49-F238E27FC236}">
+                <a16:creationId xmlns:a16="http://schemas.microsoft.com/office/drawing/2014/main" id="{F9CACC38-251D-921D-FA2B-6F5A9C64D619}"/>
+              </a:ext>
+            </a:extLst>
+          </p:cNvPr>
+          <p:cNvCxnSpPr>
+            <a:cxnSpLocks/>
+          </p:cNvCxnSpPr>
+          <p:nvPr/>
+        </p:nvCxnSpPr>
+        <p:spPr>
+          <a:xfrm flipH="1">
+            <a:off x="9587660" y="5936550"/>
+            <a:ext cx="282744" cy="0"/>
+          </a:xfrm>
+          <a:prstGeom prst="straightConnector1">
+            <a:avLst/>
+          </a:prstGeom>
+          <a:ln w="28575">
+            <a:solidFill>
+              <a:srgbClr val="7030A0"/>
+            </a:solidFill>
+            <a:tailEnd type="triangle"/>
+          </a:ln>
+        </p:spPr>
+        <p:style>
+          <a:lnRef idx="1">
+            <a:schemeClr val="accent1"/>
+          </a:lnRef>
+          <a:fillRef idx="0">
+            <a:schemeClr val="accent1"/>
+          </a:fillRef>
+          <a:effectRef idx="0">
+            <a:schemeClr val="accent1"/>
+          </a:effectRef>
+          <a:fontRef idx="minor">
+            <a:schemeClr val="tx1"/>
+          </a:fontRef>
+        </p:style>
+      </p:cxnSp>
+      <p:sp>
+        <p:nvSpPr>
+          <p:cNvPr id="174" name="TextBox 173">
+            <a:extLst>
+              <a:ext uri="{FF2B5EF4-FFF2-40B4-BE49-F238E27FC236}">
+                <a16:creationId xmlns:a16="http://schemas.microsoft.com/office/drawing/2014/main" id="{EF275A41-76DF-04E0-261F-5B7F715DA158}"/>
+              </a:ext>
+            </a:extLst>
+          </p:cNvPr>
+          <p:cNvSpPr txBox="1"/>
+          <p:nvPr/>
+        </p:nvSpPr>
+        <p:spPr>
+          <a:xfrm>
+            <a:off x="9976523" y="5813438"/>
+            <a:ext cx="1936044" cy="246221"/>
+          </a:xfrm>
+          <a:prstGeom prst="rect">
+            <a:avLst/>
+          </a:prstGeom>
+          <a:noFill/>
+        </p:spPr>
+        <p:txBody>
+          <a:bodyPr wrap="square" rtlCol="0">
+            <a:spAutoFit/>
+          </a:bodyPr>
+          <a:lstStyle/>
+          <a:p>
+            <a:r>
+              <a:rPr lang="en-US" sz="1000" b="1" dirty="0"/>
+              <a:t>Internal function call</a:t>
+            </a:r>
+            <a:endParaRPr lang="en-SG" sz="1000" b="1" dirty="0"/>
+          </a:p>
+        </p:txBody>
+      </p:sp>
+      <p:sp>
+        <p:nvSpPr>
+          <p:cNvPr id="3" name="Rectangle 2">
+            <a:extLst>
+              <a:ext uri="{FF2B5EF4-FFF2-40B4-BE49-F238E27FC236}">
+                <a16:creationId xmlns:a16="http://schemas.microsoft.com/office/drawing/2014/main" id="{EB156DD5-BB9D-FB89-A902-E33803E083B8}"/>
+              </a:ext>
+            </a:extLst>
+          </p:cNvPr>
+          <p:cNvSpPr/>
+          <p:nvPr/>
+        </p:nvSpPr>
+        <p:spPr>
+          <a:xfrm>
+            <a:off x="8152320" y="4071845"/>
+            <a:ext cx="1203876" cy="601656"/>
+          </a:xfrm>
+          <a:prstGeom prst="rect">
+            <a:avLst/>
+          </a:prstGeom>
+          <a:noFill/>
+          <a:ln w="28575">
+            <a:solidFill>
+              <a:srgbClr val="FF0000"/>
+            </a:solidFill>
+          </a:ln>
+        </p:spPr>
+        <p:style>
+          <a:lnRef idx="2">
+            <a:schemeClr val="accent1">
+              <a:shade val="50000"/>
+            </a:schemeClr>
+          </a:lnRef>
+          <a:fillRef idx="1">
+            <a:schemeClr val="accent1"/>
+          </a:fillRef>
+          <a:effectRef idx="0">
+            <a:schemeClr val="accent1"/>
+          </a:effectRef>
+          <a:fontRef idx="minor">
+            <a:schemeClr val="lt1"/>
+          </a:fontRef>
+        </p:style>
+        <p:txBody>
+          <a:bodyPr rtlCol="0" anchor="ctr"/>
+          <a:lstStyle/>
+          <a:p>
+            <a:endParaRPr lang="en-US" sz="1100" b="1" dirty="0"/>
+          </a:p>
+        </p:txBody>
+      </p:sp>
+      <p:cxnSp>
+        <p:nvCxnSpPr>
+          <p:cNvPr id="8" name="Straight Arrow Connector 7">
+            <a:extLst>
+              <a:ext uri="{FF2B5EF4-FFF2-40B4-BE49-F238E27FC236}">
+                <a16:creationId xmlns:a16="http://schemas.microsoft.com/office/drawing/2014/main" id="{EA289BBD-A53E-CAA3-39EB-639B4832B301}"/>
+              </a:ext>
+            </a:extLst>
+          </p:cNvPr>
+          <p:cNvCxnSpPr>
+            <a:cxnSpLocks/>
+          </p:cNvCxnSpPr>
+          <p:nvPr/>
+        </p:nvCxnSpPr>
+        <p:spPr>
+          <a:xfrm>
+            <a:off x="8397283" y="3746322"/>
+            <a:ext cx="0" cy="309128"/>
+          </a:xfrm>
+          <a:prstGeom prst="straightConnector1">
+            <a:avLst/>
+          </a:prstGeom>
+          <a:ln w="19050">
+            <a:solidFill>
+              <a:schemeClr val="accent6">
+                <a:lumMod val="50000"/>
+              </a:schemeClr>
+            </a:solidFill>
+            <a:tailEnd type="triangle"/>
+          </a:ln>
+        </p:spPr>
+        <p:style>
+          <a:lnRef idx="1">
+            <a:schemeClr val="accent1"/>
+          </a:lnRef>
+          <a:fillRef idx="0">
+            <a:schemeClr val="accent1"/>
+          </a:fillRef>
+          <a:effectRef idx="0">
+            <a:schemeClr val="accent1"/>
+          </a:effectRef>
+          <a:fontRef idx="minor">
+            <a:schemeClr val="tx1"/>
+          </a:fontRef>
+        </p:style>
+      </p:cxnSp>
+      <p:sp>
+        <p:nvSpPr>
+          <p:cNvPr id="21" name="TextBox 20">
+            <a:extLst>
+              <a:ext uri="{FF2B5EF4-FFF2-40B4-BE49-F238E27FC236}">
+                <a16:creationId xmlns:a16="http://schemas.microsoft.com/office/drawing/2014/main" id="{AAE7657E-80A6-EBE4-E209-8243107A18F4}"/>
+              </a:ext>
+            </a:extLst>
+          </p:cNvPr>
+          <p:cNvSpPr txBox="1"/>
+          <p:nvPr/>
+        </p:nvSpPr>
+        <p:spPr>
+          <a:xfrm>
+            <a:off x="8101978" y="4038412"/>
+            <a:ext cx="1359055" cy="261610"/>
+          </a:xfrm>
+          <a:prstGeom prst="rect">
+            <a:avLst/>
+          </a:prstGeom>
+          <a:noFill/>
+        </p:spPr>
+        <p:txBody>
+          <a:bodyPr wrap="square" rtlCol="0">
+            <a:spAutoFit/>
+          </a:bodyPr>
+          <a:lstStyle/>
+          <a:p>
+            <a:r>
+              <a:rPr lang="en-US" sz="1100" b="1" dirty="0">
+                <a:solidFill>
+                  <a:srgbClr val="FF0000"/>
+                </a:solidFill>
+              </a:rPr>
+              <a:t>Ettercap Wrapper </a:t>
+            </a:r>
+            <a:endParaRPr lang="en-SG" sz="1100" b="1" dirty="0">
+              <a:solidFill>
+                <a:srgbClr val="FF0000"/>
+              </a:solidFill>
+            </a:endParaRPr>
+          </a:p>
+        </p:txBody>
+      </p:sp>
+      <p:pic>
+        <p:nvPicPr>
+          <p:cNvPr id="22" name="Picture 21">
+            <a:extLst>
+              <a:ext uri="{FF2B5EF4-FFF2-40B4-BE49-F238E27FC236}">
+                <a16:creationId xmlns:a16="http://schemas.microsoft.com/office/drawing/2014/main" id="{CCCCB132-5D30-E744-BBE5-1C4C4E0A57B2}"/>
+              </a:ext>
+            </a:extLst>
+          </p:cNvPr>
+          <p:cNvPicPr>
+            <a:picLocks noChangeAspect="1"/>
+          </p:cNvPicPr>
+          <p:nvPr/>
+        </p:nvPicPr>
+        <p:blipFill>
+          <a:blip r:embed="rId4"/>
+          <a:stretch>
+            <a:fillRect/>
+          </a:stretch>
+        </p:blipFill>
+        <p:spPr>
+          <a:xfrm>
+            <a:off x="8498082" y="4327771"/>
+            <a:ext cx="742543" cy="277161"/>
+          </a:xfrm>
+          <a:prstGeom prst="rect">
+            <a:avLst/>
+          </a:prstGeom>
+          <a:ln w="9525">
+            <a:solidFill>
+              <a:schemeClr val="tx1"/>
+            </a:solidFill>
+          </a:ln>
+        </p:spPr>
+      </p:pic>
+      <p:sp>
+        <p:nvSpPr>
+          <p:cNvPr id="25" name="Rectangle 24">
+            <a:extLst>
+              <a:ext uri="{FF2B5EF4-FFF2-40B4-BE49-F238E27FC236}">
+                <a16:creationId xmlns:a16="http://schemas.microsoft.com/office/drawing/2014/main" id="{D1D18D61-BD6C-9069-98A2-69350DF00FBD}"/>
+              </a:ext>
+            </a:extLst>
+          </p:cNvPr>
+          <p:cNvSpPr/>
+          <p:nvPr/>
+        </p:nvSpPr>
+        <p:spPr>
+          <a:xfrm>
+            <a:off x="7534909" y="4845396"/>
+            <a:ext cx="691807" cy="521754"/>
+          </a:xfrm>
+          <a:prstGeom prst="rect">
+            <a:avLst/>
+          </a:prstGeom>
+          <a:noFill/>
+          <a:ln w="19050">
+            <a:solidFill>
+              <a:srgbClr val="FF0000"/>
+            </a:solidFill>
+            <a:prstDash val="sysDash"/>
+          </a:ln>
+        </p:spPr>
+        <p:style>
+          <a:lnRef idx="2">
+            <a:schemeClr val="accent1">
+              <a:shade val="50000"/>
+            </a:schemeClr>
+          </a:lnRef>
+          <a:fillRef idx="1">
+            <a:schemeClr val="accent1"/>
+          </a:fillRef>
+          <a:effectRef idx="0">
+            <a:schemeClr val="accent1"/>
+          </a:effectRef>
+          <a:fontRef idx="minor">
+            <a:schemeClr val="lt1"/>
+          </a:fontRef>
+        </p:style>
+        <p:txBody>
+          <a:bodyPr rtlCol="0" anchor="ctr"/>
+          <a:lstStyle/>
+          <a:p>
+            <a:endParaRPr lang="en-US" sz="1100" b="1" dirty="0"/>
+          </a:p>
+        </p:txBody>
+      </p:sp>
+      <p:sp>
+        <p:nvSpPr>
+          <p:cNvPr id="26" name="TextBox 25">
+            <a:extLst>
+              <a:ext uri="{FF2B5EF4-FFF2-40B4-BE49-F238E27FC236}">
+                <a16:creationId xmlns:a16="http://schemas.microsoft.com/office/drawing/2014/main" id="{2489CB64-5385-CEF2-F90C-B0FAFFE7B424}"/>
+              </a:ext>
+            </a:extLst>
+          </p:cNvPr>
+          <p:cNvSpPr txBox="1"/>
+          <p:nvPr/>
+        </p:nvSpPr>
+        <p:spPr>
+          <a:xfrm>
+            <a:off x="7246564" y="4619259"/>
+            <a:ext cx="962549" cy="261610"/>
+          </a:xfrm>
+          <a:prstGeom prst="rect">
+            <a:avLst/>
+          </a:prstGeom>
+          <a:noFill/>
+        </p:spPr>
+        <p:txBody>
+          <a:bodyPr wrap="square" rtlCol="0">
+            <a:spAutoFit/>
+          </a:bodyPr>
+          <a:lstStyle/>
+          <a:p>
+            <a:r>
+              <a:rPr lang="en-US" sz="1100" b="1" dirty="0">
+                <a:solidFill>
+                  <a:srgbClr val="FF0000"/>
+                </a:solidFill>
+              </a:rPr>
+              <a:t>Filters Repo</a:t>
+            </a:r>
+            <a:endParaRPr lang="en-SG" sz="1100" b="1" dirty="0">
+              <a:solidFill>
+                <a:srgbClr val="FF0000"/>
+              </a:solidFill>
+            </a:endParaRPr>
+          </a:p>
+        </p:txBody>
+      </p:sp>
+      <p:pic>
+        <p:nvPicPr>
+          <p:cNvPr id="27" name="Picture 26">
+            <a:extLst>
+              <a:ext uri="{FF2B5EF4-FFF2-40B4-BE49-F238E27FC236}">
+                <a16:creationId xmlns:a16="http://schemas.microsoft.com/office/drawing/2014/main" id="{37E62C04-A802-D221-3FB5-6A1630CA80C8}"/>
+              </a:ext>
+            </a:extLst>
+          </p:cNvPr>
+          <p:cNvPicPr>
+            <a:picLocks noChangeAspect="1"/>
+          </p:cNvPicPr>
+          <p:nvPr/>
+        </p:nvPicPr>
+        <p:blipFill>
+          <a:blip r:embed="rId5"/>
+          <a:stretch>
+            <a:fillRect/>
+          </a:stretch>
+        </p:blipFill>
+        <p:spPr>
+          <a:xfrm>
+            <a:off x="7648167" y="4975386"/>
+            <a:ext cx="253165" cy="246221"/>
+          </a:xfrm>
+          <a:prstGeom prst="rect">
+            <a:avLst/>
+          </a:prstGeom>
+          <a:ln w="28575">
+            <a:solidFill>
+              <a:srgbClr val="FF0000"/>
+            </a:solidFill>
+          </a:ln>
+        </p:spPr>
+      </p:pic>
+      <p:pic>
+        <p:nvPicPr>
+          <p:cNvPr id="28" name="Picture 27">
+            <a:extLst>
+              <a:ext uri="{FF2B5EF4-FFF2-40B4-BE49-F238E27FC236}">
+                <a16:creationId xmlns:a16="http://schemas.microsoft.com/office/drawing/2014/main" id="{D3DAE47A-DC73-ED7E-E36F-4EA81F6369A6}"/>
+              </a:ext>
+            </a:extLst>
+          </p:cNvPr>
+          <p:cNvPicPr>
+            <a:picLocks noChangeAspect="1"/>
+          </p:cNvPicPr>
+          <p:nvPr/>
+        </p:nvPicPr>
+        <p:blipFill>
+          <a:blip r:embed="rId5"/>
+          <a:stretch>
+            <a:fillRect/>
+          </a:stretch>
+        </p:blipFill>
+        <p:spPr>
+          <a:xfrm>
+            <a:off x="7842623" y="5048157"/>
+            <a:ext cx="253165" cy="246221"/>
+          </a:xfrm>
+          <a:prstGeom prst="rect">
+            <a:avLst/>
+          </a:prstGeom>
+          <a:ln w="28575">
+            <a:solidFill>
+              <a:srgbClr val="FF0000"/>
+            </a:solidFill>
+          </a:ln>
+        </p:spPr>
+      </p:pic>
+      <p:cxnSp>
+        <p:nvCxnSpPr>
+          <p:cNvPr id="29" name="Connector: Elbow 28">
+            <a:extLst>
+              <a:ext uri="{FF2B5EF4-FFF2-40B4-BE49-F238E27FC236}">
+                <a16:creationId xmlns:a16="http://schemas.microsoft.com/office/drawing/2014/main" id="{6524D412-7315-9D23-D255-732067722873}"/>
+              </a:ext>
+            </a:extLst>
+          </p:cNvPr>
+          <p:cNvCxnSpPr>
+            <a:cxnSpLocks/>
+            <a:stCxn id="28" idx="0"/>
+            <a:endCxn id="22" idx="1"/>
+          </p:cNvCxnSpPr>
+          <p:nvPr/>
+        </p:nvCxnSpPr>
+        <p:spPr>
+          <a:xfrm rot="5400000" flipH="1" flipV="1">
+            <a:off x="7942742" y="4492817"/>
+            <a:ext cx="581805" cy="528876"/>
+          </a:xfrm>
+          <a:prstGeom prst="bentConnector2">
+            <a:avLst/>
+          </a:prstGeom>
+          <a:ln>
+            <a:solidFill>
+              <a:schemeClr val="accent6">
+                <a:lumMod val="75000"/>
+              </a:schemeClr>
+            </a:solidFill>
+            <a:prstDash val="dash"/>
+            <a:tailEnd type="triangle"/>
+          </a:ln>
+        </p:spPr>
+        <p:style>
+          <a:lnRef idx="1">
+            <a:schemeClr val="accent1"/>
+          </a:lnRef>
+          <a:fillRef idx="0">
+            <a:schemeClr val="accent1"/>
+          </a:fillRef>
+          <a:effectRef idx="0">
+            <a:schemeClr val="accent1"/>
+          </a:effectRef>
+          <a:fontRef idx="minor">
+            <a:schemeClr val="tx1"/>
+          </a:fontRef>
+        </p:style>
+      </p:cxnSp>
+      <p:pic>
+        <p:nvPicPr>
+          <p:cNvPr id="36" name="Picture 35">
+            <a:extLst>
+              <a:ext uri="{FF2B5EF4-FFF2-40B4-BE49-F238E27FC236}">
+                <a16:creationId xmlns:a16="http://schemas.microsoft.com/office/drawing/2014/main" id="{81512D29-45B9-960F-CD8D-E03EBF549837}"/>
+              </a:ext>
+            </a:extLst>
+          </p:cNvPr>
+          <p:cNvPicPr>
+            <a:picLocks noChangeAspect="1"/>
+          </p:cNvPicPr>
+          <p:nvPr/>
+        </p:nvPicPr>
+        <p:blipFill>
+          <a:blip r:embed="rId6"/>
+          <a:stretch>
+            <a:fillRect/>
+          </a:stretch>
+        </p:blipFill>
+        <p:spPr>
+          <a:xfrm>
+            <a:off x="9927016" y="3659666"/>
+            <a:ext cx="1465326" cy="1704563"/>
+          </a:xfrm>
+          <a:prstGeom prst="rect">
+            <a:avLst/>
+          </a:prstGeom>
+          <a:ln w="12700">
+            <a:solidFill>
+              <a:schemeClr val="tx1"/>
+            </a:solidFill>
+          </a:ln>
+        </p:spPr>
+      </p:pic>
+      <p:pic>
+        <p:nvPicPr>
+          <p:cNvPr id="38" name="Picture 37">
+            <a:extLst>
+              <a:ext uri="{FF2B5EF4-FFF2-40B4-BE49-F238E27FC236}">
+                <a16:creationId xmlns:a16="http://schemas.microsoft.com/office/drawing/2014/main" id="{79407C9F-C40F-43B7-C7E9-7B92264519FF}"/>
+              </a:ext>
+            </a:extLst>
+          </p:cNvPr>
+          <p:cNvPicPr>
+            <a:picLocks noChangeAspect="1"/>
+          </p:cNvPicPr>
+          <p:nvPr/>
+        </p:nvPicPr>
+        <p:blipFill>
+          <a:blip r:embed="rId7"/>
+          <a:stretch>
+            <a:fillRect/>
+          </a:stretch>
+        </p:blipFill>
+        <p:spPr>
+          <a:xfrm>
+            <a:off x="3636880" y="3800129"/>
+            <a:ext cx="1593872" cy="733412"/>
+          </a:xfrm>
+          <a:prstGeom prst="rect">
+            <a:avLst/>
+          </a:prstGeom>
+          <a:ln w="28575">
+            <a:solidFill>
+              <a:srgbClr val="FF0000"/>
+            </a:solidFill>
+            <a:prstDash val="sysDash"/>
+          </a:ln>
+        </p:spPr>
+      </p:pic>
+      <p:sp>
+        <p:nvSpPr>
+          <p:cNvPr id="42" name="Arrow: Down 41">
+            <a:extLst>
+              <a:ext uri="{FF2B5EF4-FFF2-40B4-BE49-F238E27FC236}">
+                <a16:creationId xmlns:a16="http://schemas.microsoft.com/office/drawing/2014/main" id="{6E03F470-3943-C67F-5764-1E074CB19884}"/>
+              </a:ext>
+            </a:extLst>
+          </p:cNvPr>
+          <p:cNvSpPr/>
+          <p:nvPr/>
+        </p:nvSpPr>
+        <p:spPr>
+          <a:xfrm rot="16200000" flipH="1">
+            <a:off x="9535547" y="4141340"/>
+            <a:ext cx="96547" cy="644668"/>
+          </a:xfrm>
+          <a:prstGeom prst="downArrow">
+            <a:avLst/>
+          </a:prstGeom>
+          <a:solidFill>
+            <a:srgbClr val="FF0000"/>
+          </a:solidFill>
+        </p:spPr>
+        <p:style>
+          <a:lnRef idx="2">
+            <a:schemeClr val="accent2">
+              <a:shade val="15000"/>
+            </a:schemeClr>
+          </a:lnRef>
+          <a:fillRef idx="1">
+            <a:schemeClr val="accent2"/>
+          </a:fillRef>
+          <a:effectRef idx="0">
+            <a:schemeClr val="accent2"/>
+          </a:effectRef>
+          <a:fontRef idx="minor">
+            <a:schemeClr val="lt1"/>
+          </a:fontRef>
+        </p:style>
+        <p:txBody>
+          <a:bodyPr rtlCol="0" anchor="ctr"/>
+          <a:lstStyle/>
+          <a:p>
+            <a:pPr algn="ctr"/>
+            <a:endParaRPr lang="en-SG"/>
+          </a:p>
+        </p:txBody>
+      </p:sp>
+      <p:cxnSp>
+        <p:nvCxnSpPr>
+          <p:cNvPr id="46" name="Straight Arrow Connector 45">
+            <a:extLst>
+              <a:ext uri="{FF2B5EF4-FFF2-40B4-BE49-F238E27FC236}">
+                <a16:creationId xmlns:a16="http://schemas.microsoft.com/office/drawing/2014/main" id="{24D072DC-E628-69A8-45AF-22835BC1F478}"/>
+              </a:ext>
+            </a:extLst>
+          </p:cNvPr>
+          <p:cNvCxnSpPr>
+            <a:cxnSpLocks/>
+            <a:endCxn id="38" idx="1"/>
+          </p:cNvCxnSpPr>
+          <p:nvPr/>
+        </p:nvCxnSpPr>
+        <p:spPr>
+          <a:xfrm>
+            <a:off x="1518756" y="4071845"/>
+            <a:ext cx="2118124" cy="0"/>
+          </a:xfrm>
+          <a:prstGeom prst="straightConnector1">
+            <a:avLst/>
+          </a:prstGeom>
+          <a:ln>
+            <a:headEnd type="triangle"/>
+            <a:tailEnd type="triangle"/>
+          </a:ln>
+        </p:spPr>
+        <p:style>
+          <a:lnRef idx="1">
+            <a:schemeClr val="accent1"/>
+          </a:lnRef>
+          <a:fillRef idx="0">
+            <a:schemeClr val="accent1"/>
+          </a:fillRef>
+          <a:effectRef idx="0">
+            <a:schemeClr val="accent1"/>
+          </a:effectRef>
+          <a:fontRef idx="minor">
+            <a:schemeClr val="tx1"/>
+          </a:fontRef>
+        </p:style>
+      </p:cxnSp>
+      <p:pic>
+        <p:nvPicPr>
+          <p:cNvPr id="49" name="Picture 48">
+            <a:extLst>
+              <a:ext uri="{FF2B5EF4-FFF2-40B4-BE49-F238E27FC236}">
+                <a16:creationId xmlns:a16="http://schemas.microsoft.com/office/drawing/2014/main" id="{C8D6D018-5584-CE28-483D-D933B3A7B7AE}"/>
+              </a:ext>
+            </a:extLst>
+          </p:cNvPr>
+          <p:cNvPicPr>
+            <a:picLocks noChangeAspect="1"/>
+          </p:cNvPicPr>
+          <p:nvPr/>
+        </p:nvPicPr>
+        <p:blipFill rotWithShape="1">
+          <a:blip r:embed="rId8"/>
+          <a:srcRect l="23963"/>
+          <a:stretch/>
+        </p:blipFill>
+        <p:spPr>
+          <a:xfrm>
+            <a:off x="2754748" y="986512"/>
+            <a:ext cx="3703212" cy="2751278"/>
+          </a:xfrm>
+          <a:prstGeom prst="rect">
+            <a:avLst/>
+          </a:prstGeom>
+          <a:ln w="19050">
+            <a:solidFill>
+              <a:schemeClr val="tx1"/>
+            </a:solidFill>
+          </a:ln>
+        </p:spPr>
+      </p:pic>
+      <p:sp>
+        <p:nvSpPr>
+          <p:cNvPr id="50" name="TextBox 49">
+            <a:extLst>
+              <a:ext uri="{FF2B5EF4-FFF2-40B4-BE49-F238E27FC236}">
+                <a16:creationId xmlns:a16="http://schemas.microsoft.com/office/drawing/2014/main" id="{9B3F95D9-3A30-7EFA-BF67-6C5F6146BECB}"/>
+              </a:ext>
+            </a:extLst>
+          </p:cNvPr>
+          <p:cNvSpPr txBox="1"/>
+          <p:nvPr/>
+        </p:nvSpPr>
+        <p:spPr>
+          <a:xfrm>
+            <a:off x="9752562" y="3324978"/>
+            <a:ext cx="1639780" cy="276999"/>
+          </a:xfrm>
+          <a:prstGeom prst="rect">
+            <a:avLst/>
+          </a:prstGeom>
+          <a:noFill/>
+        </p:spPr>
+        <p:txBody>
+          <a:bodyPr wrap="square" rtlCol="0">
+            <a:spAutoFit/>
+          </a:bodyPr>
+          <a:lstStyle/>
+          <a:p>
+            <a:r>
+              <a:rPr lang="en-US" sz="1200" b="1" dirty="0">
+                <a:solidFill>
+                  <a:srgbClr val="C00000"/>
+                </a:solidFill>
+              </a:rPr>
+              <a:t>Targeted HMI service </a:t>
+            </a:r>
+            <a:endParaRPr lang="en-SG" sz="1200" b="1" dirty="0">
+              <a:solidFill>
+                <a:srgbClr val="C00000"/>
+              </a:solidFill>
+            </a:endParaRPr>
+          </a:p>
+        </p:txBody>
+      </p:sp>
+    </p:spTree>
+    <p:extLst>
+      <p:ext uri="{BB962C8B-B14F-4D97-AF65-F5344CB8AC3E}">
+        <p14:creationId xmlns:p14="http://schemas.microsoft.com/office/powerpoint/2010/main" val="1958533782"/>
+      </p:ext>
+    </p:extLst>
+  </p:cSld>
+  <p:clrMapOvr>
+    <a:masterClrMapping/>
+  </p:clrMapOvr>
+</p:sld>
+</file>
+
 <file path=ppt/theme/theme1.xml><?xml version="1.0" encoding="utf-8"?>
 <a:theme xmlns:a="http://schemas.openxmlformats.org/drawingml/2006/main" name="Office Theme">
   <a:themeElements>

</xml_diff>

<commit_message>
Fix the 1st draft of the OT_attack_case3_ddosModbusAttack.
</commit_message>
<xml_diff>
--- a/attack/AttackScenario.pptx
+++ b/attack/AttackScenario.pptx
@@ -13,8 +13,10 @@
     <p:sldId id="259" r:id="rId7"/>
     <p:sldId id="260" r:id="rId8"/>
     <p:sldId id="262" r:id="rId9"/>
-    <p:sldId id="263" r:id="rId10"/>
-    <p:sldId id="304" r:id="rId11"/>
+    <p:sldId id="307" r:id="rId10"/>
+    <p:sldId id="263" r:id="rId11"/>
+    <p:sldId id="306" r:id="rId12"/>
+    <p:sldId id="304" r:id="rId13"/>
   </p:sldIdLst>
   <p:sldSz cx="12192000" cy="6858000"/>
   <p:notesSz cx="6858000" cy="9144000"/>
@@ -270,7 +272,7 @@
           <a:p>
             <a:fld id="{11AA06AF-8DFA-4137-89EF-0EFE93628E77}" type="datetimeFigureOut">
               <a:rPr lang="en-SG" smtClean="0"/>
-              <a:t>18/1/2024</a:t>
+              <a:t>20/1/2024</a:t>
             </a:fld>
             <a:endParaRPr lang="en-SG"/>
           </a:p>
@@ -470,7 +472,7 @@
           <a:p>
             <a:fld id="{11AA06AF-8DFA-4137-89EF-0EFE93628E77}" type="datetimeFigureOut">
               <a:rPr lang="en-SG" smtClean="0"/>
-              <a:t>18/1/2024</a:t>
+              <a:t>20/1/2024</a:t>
             </a:fld>
             <a:endParaRPr lang="en-SG"/>
           </a:p>
@@ -680,7 +682,7 @@
           <a:p>
             <a:fld id="{11AA06AF-8DFA-4137-89EF-0EFE93628E77}" type="datetimeFigureOut">
               <a:rPr lang="en-SG" smtClean="0"/>
-              <a:t>18/1/2024</a:t>
+              <a:t>20/1/2024</a:t>
             </a:fld>
             <a:endParaRPr lang="en-SG"/>
           </a:p>
@@ -880,7 +882,7 @@
           <a:p>
             <a:fld id="{11AA06AF-8DFA-4137-89EF-0EFE93628E77}" type="datetimeFigureOut">
               <a:rPr lang="en-SG" smtClean="0"/>
-              <a:t>18/1/2024</a:t>
+              <a:t>20/1/2024</a:t>
             </a:fld>
             <a:endParaRPr lang="en-SG"/>
           </a:p>
@@ -1156,7 +1158,7 @@
           <a:p>
             <a:fld id="{11AA06AF-8DFA-4137-89EF-0EFE93628E77}" type="datetimeFigureOut">
               <a:rPr lang="en-SG" smtClean="0"/>
-              <a:t>18/1/2024</a:t>
+              <a:t>20/1/2024</a:t>
             </a:fld>
             <a:endParaRPr lang="en-SG"/>
           </a:p>
@@ -1424,7 +1426,7 @@
           <a:p>
             <a:fld id="{11AA06AF-8DFA-4137-89EF-0EFE93628E77}" type="datetimeFigureOut">
               <a:rPr lang="en-SG" smtClean="0"/>
-              <a:t>18/1/2024</a:t>
+              <a:t>20/1/2024</a:t>
             </a:fld>
             <a:endParaRPr lang="en-SG"/>
           </a:p>
@@ -1839,7 +1841,7 @@
           <a:p>
             <a:fld id="{11AA06AF-8DFA-4137-89EF-0EFE93628E77}" type="datetimeFigureOut">
               <a:rPr lang="en-SG" smtClean="0"/>
-              <a:t>18/1/2024</a:t>
+              <a:t>20/1/2024</a:t>
             </a:fld>
             <a:endParaRPr lang="en-SG"/>
           </a:p>
@@ -1981,7 +1983,7 @@
           <a:p>
             <a:fld id="{11AA06AF-8DFA-4137-89EF-0EFE93628E77}" type="datetimeFigureOut">
               <a:rPr lang="en-SG" smtClean="0"/>
-              <a:t>18/1/2024</a:t>
+              <a:t>20/1/2024</a:t>
             </a:fld>
             <a:endParaRPr lang="en-SG"/>
           </a:p>
@@ -2094,7 +2096,7 @@
           <a:p>
             <a:fld id="{11AA06AF-8DFA-4137-89EF-0EFE93628E77}" type="datetimeFigureOut">
               <a:rPr lang="en-SG" smtClean="0"/>
-              <a:t>18/1/2024</a:t>
+              <a:t>20/1/2024</a:t>
             </a:fld>
             <a:endParaRPr lang="en-SG"/>
           </a:p>
@@ -2407,7 +2409,7 @@
           <a:p>
             <a:fld id="{11AA06AF-8DFA-4137-89EF-0EFE93628E77}" type="datetimeFigureOut">
               <a:rPr lang="en-SG" smtClean="0"/>
-              <a:t>18/1/2024</a:t>
+              <a:t>20/1/2024</a:t>
             </a:fld>
             <a:endParaRPr lang="en-SG"/>
           </a:p>
@@ -2696,7 +2698,7 @@
           <a:p>
             <a:fld id="{11AA06AF-8DFA-4137-89EF-0EFE93628E77}" type="datetimeFigureOut">
               <a:rPr lang="en-SG" smtClean="0"/>
-              <a:t>18/1/2024</a:t>
+              <a:t>20/1/2024</a:t>
             </a:fld>
             <a:endParaRPr lang="en-SG"/>
           </a:p>
@@ -2939,7 +2941,7 @@
           <a:p>
             <a:fld id="{11AA06AF-8DFA-4137-89EF-0EFE93628E77}" type="datetimeFigureOut">
               <a:rPr lang="en-SG" smtClean="0"/>
-              <a:t>18/1/2024</a:t>
+              <a:t>20/1/2024</a:t>
             </a:fld>
             <a:endParaRPr lang="en-SG"/>
           </a:p>
@@ -6450,6 +6452,595 @@
       </p:grpSpPr>
       <p:pic>
         <p:nvPicPr>
+          <p:cNvPr id="5" name="Picture 4" descr="A diagram of a computer system&#10;&#10;Description automatically generated">
+            <a:extLst>
+              <a:ext uri="{FF2B5EF4-FFF2-40B4-BE49-F238E27FC236}">
+                <a16:creationId xmlns:a16="http://schemas.microsoft.com/office/drawing/2014/main" id="{0BB12E8B-97D4-7422-0D20-62C296230C77}"/>
+              </a:ext>
+            </a:extLst>
+          </p:cNvPr>
+          <p:cNvPicPr>
+            <a:picLocks noChangeAspect="1"/>
+          </p:cNvPicPr>
+          <p:nvPr/>
+        </p:nvPicPr>
+        <p:blipFill>
+          <a:blip r:embed="rId2">
+            <a:extLst>
+              <a:ext uri="{28A0092B-C50C-407E-A947-70E740481C1C}">
+                <a14:useLocalDpi xmlns:a14="http://schemas.microsoft.com/office/drawing/2010/main" val="0"/>
+              </a:ext>
+            </a:extLst>
+          </a:blip>
+          <a:stretch>
+            <a:fillRect/>
+          </a:stretch>
+        </p:blipFill>
+        <p:spPr>
+          <a:xfrm>
+            <a:off x="1562666" y="790905"/>
+            <a:ext cx="9066667" cy="5276190"/>
+          </a:xfrm>
+          <a:prstGeom prst="rect">
+            <a:avLst/>
+          </a:prstGeom>
+        </p:spPr>
+      </p:pic>
+      <p:sp>
+        <p:nvSpPr>
+          <p:cNvPr id="6" name="Multiplication Sign 5">
+            <a:extLst>
+              <a:ext uri="{FF2B5EF4-FFF2-40B4-BE49-F238E27FC236}">
+                <a16:creationId xmlns:a16="http://schemas.microsoft.com/office/drawing/2014/main" id="{FBE990A9-6EB8-6AED-63DF-C7261C90CFBD}"/>
+              </a:ext>
+            </a:extLst>
+          </p:cNvPr>
+          <p:cNvSpPr/>
+          <p:nvPr/>
+        </p:nvSpPr>
+        <p:spPr>
+          <a:xfrm>
+            <a:off x="7970294" y="3780616"/>
+            <a:ext cx="413657" cy="426570"/>
+          </a:xfrm>
+          <a:prstGeom prst="mathMultiply">
+            <a:avLst/>
+          </a:prstGeom>
+          <a:solidFill>
+            <a:srgbClr val="FF0000"/>
+          </a:solidFill>
+        </p:spPr>
+        <p:style>
+          <a:lnRef idx="2">
+            <a:schemeClr val="accent1">
+              <a:shade val="15000"/>
+            </a:schemeClr>
+          </a:lnRef>
+          <a:fillRef idx="1">
+            <a:schemeClr val="accent1"/>
+          </a:fillRef>
+          <a:effectRef idx="0">
+            <a:schemeClr val="accent1"/>
+          </a:effectRef>
+          <a:fontRef idx="minor">
+            <a:schemeClr val="lt1"/>
+          </a:fontRef>
+        </p:style>
+        <p:txBody>
+          <a:bodyPr rtlCol="0" anchor="ctr"/>
+          <a:lstStyle/>
+          <a:p>
+            <a:pPr algn="ctr"/>
+            <a:endParaRPr lang="en-SG" dirty="0"/>
+          </a:p>
+        </p:txBody>
+      </p:sp>
+      <p:sp>
+        <p:nvSpPr>
+          <p:cNvPr id="8" name="Multiplication Sign 7">
+            <a:extLst>
+              <a:ext uri="{FF2B5EF4-FFF2-40B4-BE49-F238E27FC236}">
+                <a16:creationId xmlns:a16="http://schemas.microsoft.com/office/drawing/2014/main" id="{676058BB-2262-F781-9275-7B434CA59ED3}"/>
+              </a:ext>
+            </a:extLst>
+          </p:cNvPr>
+          <p:cNvSpPr/>
+          <p:nvPr/>
+        </p:nvSpPr>
+        <p:spPr>
+          <a:xfrm>
+            <a:off x="7970293" y="4497285"/>
+            <a:ext cx="413657" cy="426570"/>
+          </a:xfrm>
+          <a:prstGeom prst="mathMultiply">
+            <a:avLst/>
+          </a:prstGeom>
+          <a:solidFill>
+            <a:srgbClr val="FF0000"/>
+          </a:solidFill>
+        </p:spPr>
+        <p:style>
+          <a:lnRef idx="2">
+            <a:schemeClr val="accent1">
+              <a:shade val="15000"/>
+            </a:schemeClr>
+          </a:lnRef>
+          <a:fillRef idx="1">
+            <a:schemeClr val="accent1"/>
+          </a:fillRef>
+          <a:effectRef idx="0">
+            <a:schemeClr val="accent1"/>
+          </a:effectRef>
+          <a:fontRef idx="minor">
+            <a:schemeClr val="lt1"/>
+          </a:fontRef>
+        </p:style>
+        <p:txBody>
+          <a:bodyPr rtlCol="0" anchor="ctr"/>
+          <a:lstStyle/>
+          <a:p>
+            <a:pPr algn="ctr"/>
+            <a:endParaRPr lang="en-SG" dirty="0"/>
+          </a:p>
+        </p:txBody>
+      </p:sp>
+      <p:pic>
+        <p:nvPicPr>
+          <p:cNvPr id="9" name="Picture 8">
+            <a:extLst>
+              <a:ext uri="{FF2B5EF4-FFF2-40B4-BE49-F238E27FC236}">
+                <a16:creationId xmlns:a16="http://schemas.microsoft.com/office/drawing/2014/main" id="{A7DFD07E-3004-7E60-2870-317CE540FDE0}"/>
+              </a:ext>
+            </a:extLst>
+          </p:cNvPr>
+          <p:cNvPicPr>
+            <a:picLocks noChangeAspect="1"/>
+          </p:cNvPicPr>
+          <p:nvPr/>
+        </p:nvPicPr>
+        <p:blipFill>
+          <a:blip r:embed="rId3"/>
+          <a:stretch>
+            <a:fillRect/>
+          </a:stretch>
+        </p:blipFill>
+        <p:spPr>
+          <a:xfrm>
+            <a:off x="8471758" y="685847"/>
+            <a:ext cx="489507" cy="542715"/>
+          </a:xfrm>
+          <a:prstGeom prst="rect">
+            <a:avLst/>
+          </a:prstGeom>
+          <a:ln w="9525">
+            <a:solidFill>
+              <a:schemeClr val="tx1"/>
+            </a:solidFill>
+          </a:ln>
+        </p:spPr>
+      </p:pic>
+      <p:cxnSp>
+        <p:nvCxnSpPr>
+          <p:cNvPr id="10" name="Straight Arrow Connector 9">
+            <a:extLst>
+              <a:ext uri="{FF2B5EF4-FFF2-40B4-BE49-F238E27FC236}">
+                <a16:creationId xmlns:a16="http://schemas.microsoft.com/office/drawing/2014/main" id="{5A42E0BD-172C-F5AB-2476-3DC5BA15DB38}"/>
+              </a:ext>
+            </a:extLst>
+          </p:cNvPr>
+          <p:cNvCxnSpPr>
+            <a:cxnSpLocks/>
+          </p:cNvCxnSpPr>
+          <p:nvPr/>
+        </p:nvCxnSpPr>
+        <p:spPr>
+          <a:xfrm flipH="1">
+            <a:off x="8177121" y="1228562"/>
+            <a:ext cx="294637" cy="2418764"/>
+          </a:xfrm>
+          <a:prstGeom prst="straightConnector1">
+            <a:avLst/>
+          </a:prstGeom>
+          <a:ln w="28575">
+            <a:solidFill>
+              <a:srgbClr val="FF0000"/>
+            </a:solidFill>
+            <a:prstDash val="sysDash"/>
+            <a:tailEnd type="triangle"/>
+          </a:ln>
+        </p:spPr>
+        <p:style>
+          <a:lnRef idx="1">
+            <a:schemeClr val="accent1"/>
+          </a:lnRef>
+          <a:fillRef idx="0">
+            <a:schemeClr val="accent1"/>
+          </a:fillRef>
+          <a:effectRef idx="0">
+            <a:schemeClr val="accent1"/>
+          </a:effectRef>
+          <a:fontRef idx="minor">
+            <a:schemeClr val="tx1"/>
+          </a:fontRef>
+        </p:style>
+      </p:cxnSp>
+      <p:cxnSp>
+        <p:nvCxnSpPr>
+          <p:cNvPr id="13" name="Straight Arrow Connector 12">
+            <a:extLst>
+              <a:ext uri="{FF2B5EF4-FFF2-40B4-BE49-F238E27FC236}">
+                <a16:creationId xmlns:a16="http://schemas.microsoft.com/office/drawing/2014/main" id="{1C86A106-186C-D2AB-D7E0-6F822E8A9E66}"/>
+              </a:ext>
+            </a:extLst>
+          </p:cNvPr>
+          <p:cNvCxnSpPr>
+            <a:cxnSpLocks/>
+          </p:cNvCxnSpPr>
+          <p:nvPr/>
+        </p:nvCxnSpPr>
+        <p:spPr>
+          <a:xfrm flipH="1">
+            <a:off x="8383950" y="1228562"/>
+            <a:ext cx="441551" cy="3384535"/>
+          </a:xfrm>
+          <a:prstGeom prst="straightConnector1">
+            <a:avLst/>
+          </a:prstGeom>
+          <a:ln w="28575">
+            <a:solidFill>
+              <a:srgbClr val="FF0000"/>
+            </a:solidFill>
+            <a:prstDash val="sysDash"/>
+            <a:tailEnd type="triangle"/>
+          </a:ln>
+        </p:spPr>
+        <p:style>
+          <a:lnRef idx="1">
+            <a:schemeClr val="accent1"/>
+          </a:lnRef>
+          <a:fillRef idx="0">
+            <a:schemeClr val="accent1"/>
+          </a:fillRef>
+          <a:effectRef idx="0">
+            <a:schemeClr val="accent1"/>
+          </a:effectRef>
+          <a:fontRef idx="minor">
+            <a:schemeClr val="tx1"/>
+          </a:fontRef>
+        </p:style>
+      </p:cxnSp>
+      <p:sp>
+        <p:nvSpPr>
+          <p:cNvPr id="17" name="TextBox 16">
+            <a:extLst>
+              <a:ext uri="{FF2B5EF4-FFF2-40B4-BE49-F238E27FC236}">
+                <a16:creationId xmlns:a16="http://schemas.microsoft.com/office/drawing/2014/main" id="{3069CBF3-FDA4-7813-A761-87B72F4BCBD5}"/>
+              </a:ext>
+            </a:extLst>
+          </p:cNvPr>
+          <p:cNvSpPr txBox="1"/>
+          <p:nvPr/>
+        </p:nvSpPr>
+        <p:spPr>
+          <a:xfrm>
+            <a:off x="8913309" y="558445"/>
+            <a:ext cx="2081725" cy="1569660"/>
+          </a:xfrm>
+          <a:prstGeom prst="rect">
+            <a:avLst/>
+          </a:prstGeom>
+          <a:noFill/>
+        </p:spPr>
+        <p:txBody>
+          <a:bodyPr wrap="square">
+            <a:spAutoFit/>
+          </a:bodyPr>
+          <a:lstStyle/>
+          <a:p>
+            <a:r>
+              <a:rPr lang="en-US" sz="1600" b="1" i="0" dirty="0">
+                <a:solidFill>
+                  <a:srgbClr val="FF0000"/>
+                </a:solidFill>
+                <a:effectLst/>
+                <a:latin typeface="Inter"/>
+              </a:rPr>
+              <a:t>The Attack need to block the 2 PLC challenge traffic to denial the Sensor and signal control HMI service </a:t>
+            </a:r>
+            <a:endParaRPr lang="en-SG" sz="1600" b="1" i="0" dirty="0">
+              <a:solidFill>
+                <a:srgbClr val="FF0000"/>
+              </a:solidFill>
+              <a:effectLst/>
+              <a:latin typeface="Inter"/>
+            </a:endParaRPr>
+          </a:p>
+        </p:txBody>
+      </p:sp>
+    </p:spTree>
+    <p:extLst>
+      <p:ext uri="{BB962C8B-B14F-4D97-AF65-F5344CB8AC3E}">
+        <p14:creationId xmlns:p14="http://schemas.microsoft.com/office/powerpoint/2010/main" val="2356608875"/>
+      </p:ext>
+    </p:extLst>
+  </p:cSld>
+  <p:clrMapOvr>
+    <a:masterClrMapping/>
+  </p:clrMapOvr>
+</p:sld>
+</file>
+
+<file path=ppt/slides/slide11.xml><?xml version="1.0" encoding="utf-8"?>
+<p:sld xmlns:a="http://schemas.openxmlformats.org/drawingml/2006/main" xmlns:r="http://schemas.openxmlformats.org/officeDocument/2006/relationships" xmlns:p="http://schemas.openxmlformats.org/presentationml/2006/main">
+  <p:cSld>
+    <p:spTree>
+      <p:nvGrpSpPr>
+        <p:cNvPr id="1" name=""/>
+        <p:cNvGrpSpPr/>
+        <p:nvPr/>
+      </p:nvGrpSpPr>
+      <p:grpSpPr>
+        <a:xfrm>
+          <a:off x="0" y="0"/>
+          <a:ext cx="0" cy="0"/>
+          <a:chOff x="0" y="0"/>
+          <a:chExt cx="0" cy="0"/>
+        </a:xfrm>
+      </p:grpSpPr>
+      <p:pic>
+        <p:nvPicPr>
+          <p:cNvPr id="5" name="Picture 4" descr="A diagram of a computer system&#10;&#10;Description automatically generated">
+            <a:extLst>
+              <a:ext uri="{FF2B5EF4-FFF2-40B4-BE49-F238E27FC236}">
+                <a16:creationId xmlns:a16="http://schemas.microsoft.com/office/drawing/2014/main" id="{81AAF12B-77A1-F5CF-17BF-BAFD9FFF6D14}"/>
+              </a:ext>
+            </a:extLst>
+          </p:cNvPr>
+          <p:cNvPicPr>
+            <a:picLocks noChangeAspect="1"/>
+          </p:cNvPicPr>
+          <p:nvPr/>
+        </p:nvPicPr>
+        <p:blipFill>
+          <a:blip r:embed="rId2">
+            <a:extLst>
+              <a:ext uri="{28A0092B-C50C-407E-A947-70E740481C1C}">
+                <a14:useLocalDpi xmlns:a14="http://schemas.microsoft.com/office/drawing/2010/main" val="0"/>
+              </a:ext>
+            </a:extLst>
+          </a:blip>
+          <a:stretch>
+            <a:fillRect/>
+          </a:stretch>
+        </p:blipFill>
+        <p:spPr>
+          <a:xfrm>
+            <a:off x="1661064" y="709952"/>
+            <a:ext cx="8104762" cy="5438095"/>
+          </a:xfrm>
+          <a:prstGeom prst="rect">
+            <a:avLst/>
+          </a:prstGeom>
+        </p:spPr>
+      </p:pic>
+      <p:sp>
+        <p:nvSpPr>
+          <p:cNvPr id="6" name="Multiplication Sign 5">
+            <a:extLst>
+              <a:ext uri="{FF2B5EF4-FFF2-40B4-BE49-F238E27FC236}">
+                <a16:creationId xmlns:a16="http://schemas.microsoft.com/office/drawing/2014/main" id="{D70FE906-5F95-F495-F705-D11DB8595877}"/>
+              </a:ext>
+            </a:extLst>
+          </p:cNvPr>
+          <p:cNvSpPr/>
+          <p:nvPr/>
+        </p:nvSpPr>
+        <p:spPr>
+          <a:xfrm>
+            <a:off x="7438448" y="3816150"/>
+            <a:ext cx="413657" cy="426570"/>
+          </a:xfrm>
+          <a:prstGeom prst="mathMultiply">
+            <a:avLst/>
+          </a:prstGeom>
+          <a:solidFill>
+            <a:srgbClr val="FF0000"/>
+          </a:solidFill>
+        </p:spPr>
+        <p:style>
+          <a:lnRef idx="2">
+            <a:schemeClr val="accent1">
+              <a:shade val="15000"/>
+            </a:schemeClr>
+          </a:lnRef>
+          <a:fillRef idx="1">
+            <a:schemeClr val="accent1"/>
+          </a:fillRef>
+          <a:effectRef idx="0">
+            <a:schemeClr val="accent1"/>
+          </a:effectRef>
+          <a:fontRef idx="minor">
+            <a:schemeClr val="lt1"/>
+          </a:fontRef>
+        </p:style>
+        <p:txBody>
+          <a:bodyPr rtlCol="0" anchor="ctr"/>
+          <a:lstStyle/>
+          <a:p>
+            <a:pPr algn="ctr"/>
+            <a:endParaRPr lang="en-SG" dirty="0"/>
+          </a:p>
+        </p:txBody>
+      </p:sp>
+      <p:pic>
+        <p:nvPicPr>
+          <p:cNvPr id="7" name="Picture 6">
+            <a:extLst>
+              <a:ext uri="{FF2B5EF4-FFF2-40B4-BE49-F238E27FC236}">
+                <a16:creationId xmlns:a16="http://schemas.microsoft.com/office/drawing/2014/main" id="{E30EB464-0B18-DF8B-1795-3FB415CFD422}"/>
+              </a:ext>
+            </a:extLst>
+          </p:cNvPr>
+          <p:cNvPicPr>
+            <a:picLocks noChangeAspect="1"/>
+          </p:cNvPicPr>
+          <p:nvPr/>
+        </p:nvPicPr>
+        <p:blipFill>
+          <a:blip r:embed="rId3"/>
+          <a:stretch>
+            <a:fillRect/>
+          </a:stretch>
+        </p:blipFill>
+        <p:spPr>
+          <a:xfrm>
+            <a:off x="7852105" y="1368108"/>
+            <a:ext cx="489507" cy="542715"/>
+          </a:xfrm>
+          <a:prstGeom prst="rect">
+            <a:avLst/>
+          </a:prstGeom>
+          <a:ln w="9525">
+            <a:solidFill>
+              <a:schemeClr val="tx1"/>
+            </a:solidFill>
+          </a:ln>
+        </p:spPr>
+      </p:pic>
+      <p:sp>
+        <p:nvSpPr>
+          <p:cNvPr id="8" name="TextBox 7">
+            <a:extLst>
+              <a:ext uri="{FF2B5EF4-FFF2-40B4-BE49-F238E27FC236}">
+                <a16:creationId xmlns:a16="http://schemas.microsoft.com/office/drawing/2014/main" id="{E7953537-ACA6-E45C-1D0F-78E13931B8B7}"/>
+              </a:ext>
+            </a:extLst>
+          </p:cNvPr>
+          <p:cNvSpPr txBox="1"/>
+          <p:nvPr/>
+        </p:nvSpPr>
+        <p:spPr>
+          <a:xfrm>
+            <a:off x="8449211" y="1295563"/>
+            <a:ext cx="2081725" cy="1323439"/>
+          </a:xfrm>
+          <a:prstGeom prst="rect">
+            <a:avLst/>
+          </a:prstGeom>
+          <a:noFill/>
+        </p:spPr>
+        <p:txBody>
+          <a:bodyPr wrap="square">
+            <a:spAutoFit/>
+          </a:bodyPr>
+          <a:lstStyle/>
+          <a:p>
+            <a:r>
+              <a:rPr lang="en-US" sz="1600" b="1" i="0" dirty="0">
+                <a:solidFill>
+                  <a:srgbClr val="FF0000"/>
+                </a:solidFill>
+                <a:effectLst/>
+                <a:latin typeface="Inter"/>
+              </a:rPr>
+              <a:t>The Attack need to Jam the HMI-PLC challenge traffic to denial/</a:t>
+            </a:r>
+            <a:r>
+              <a:rPr lang="en-US" sz="1600" b="1" dirty="0">
+                <a:solidFill>
+                  <a:srgbClr val="FF0000"/>
+                </a:solidFill>
+                <a:latin typeface="Inter"/>
+              </a:rPr>
+              <a:t>interrupt the train control chain. </a:t>
+            </a:r>
+            <a:endParaRPr lang="en-SG" sz="1600" b="1" i="0" dirty="0">
+              <a:solidFill>
+                <a:srgbClr val="FF0000"/>
+              </a:solidFill>
+              <a:effectLst/>
+              <a:latin typeface="Inter"/>
+            </a:endParaRPr>
+          </a:p>
+        </p:txBody>
+      </p:sp>
+      <p:cxnSp>
+        <p:nvCxnSpPr>
+          <p:cNvPr id="9" name="Straight Arrow Connector 8">
+            <a:extLst>
+              <a:ext uri="{FF2B5EF4-FFF2-40B4-BE49-F238E27FC236}">
+                <a16:creationId xmlns:a16="http://schemas.microsoft.com/office/drawing/2014/main" id="{86BAD339-B594-3879-6E23-54BBF25C3021}"/>
+              </a:ext>
+            </a:extLst>
+          </p:cNvPr>
+          <p:cNvCxnSpPr>
+            <a:cxnSpLocks/>
+          </p:cNvCxnSpPr>
+          <p:nvPr/>
+        </p:nvCxnSpPr>
+        <p:spPr>
+          <a:xfrm flipH="1">
+            <a:off x="7753739" y="1910823"/>
+            <a:ext cx="354563" cy="1802761"/>
+          </a:xfrm>
+          <a:prstGeom prst="straightConnector1">
+            <a:avLst/>
+          </a:prstGeom>
+          <a:ln w="28575">
+            <a:solidFill>
+              <a:srgbClr val="FF0000"/>
+            </a:solidFill>
+            <a:prstDash val="sysDash"/>
+            <a:tailEnd type="triangle"/>
+          </a:ln>
+        </p:spPr>
+        <p:style>
+          <a:lnRef idx="1">
+            <a:schemeClr val="accent1"/>
+          </a:lnRef>
+          <a:fillRef idx="0">
+            <a:schemeClr val="accent1"/>
+          </a:fillRef>
+          <a:effectRef idx="0">
+            <a:schemeClr val="accent1"/>
+          </a:effectRef>
+          <a:fontRef idx="minor">
+            <a:schemeClr val="tx1"/>
+          </a:fontRef>
+        </p:style>
+      </p:cxnSp>
+    </p:spTree>
+    <p:extLst>
+      <p:ext uri="{BB962C8B-B14F-4D97-AF65-F5344CB8AC3E}">
+        <p14:creationId xmlns:p14="http://schemas.microsoft.com/office/powerpoint/2010/main" val="2199883395"/>
+      </p:ext>
+    </p:extLst>
+  </p:cSld>
+  <p:clrMapOvr>
+    <a:masterClrMapping/>
+  </p:clrMapOvr>
+</p:sld>
+</file>
+
+<file path=ppt/slides/slide12.xml><?xml version="1.0" encoding="utf-8"?>
+<p:sld xmlns:a="http://schemas.openxmlformats.org/drawingml/2006/main" xmlns:r="http://schemas.openxmlformats.org/officeDocument/2006/relationships" xmlns:p="http://schemas.openxmlformats.org/presentationml/2006/main">
+  <p:cSld>
+    <p:spTree>
+      <p:nvGrpSpPr>
+        <p:cNvPr id="1" name=""/>
+        <p:cNvGrpSpPr/>
+        <p:nvPr/>
+      </p:nvGrpSpPr>
+      <p:grpSpPr>
+        <a:xfrm>
+          <a:off x="0" y="0"/>
+          <a:ext cx="0" cy="0"/>
+          <a:chOff x="0" y="0"/>
+          <a:chExt cx="0" cy="0"/>
+        </a:xfrm>
+      </p:grpSpPr>
+      <p:pic>
+        <p:nvPicPr>
           <p:cNvPr id="86" name="Picture 85">
             <a:extLst>
               <a:ext uri="{FF2B5EF4-FFF2-40B4-BE49-F238E27FC236}">
@@ -22463,10 +23054,10 @@
       </p:grpSpPr>
       <p:pic>
         <p:nvPicPr>
-          <p:cNvPr id="5" name="Picture 4" descr="A diagram of a computer system&#10;&#10;Description automatically generated">
-            <a:extLst>
-              <a:ext uri="{FF2B5EF4-FFF2-40B4-BE49-F238E27FC236}">
-                <a16:creationId xmlns:a16="http://schemas.microsoft.com/office/drawing/2014/main" id="{0BB12E8B-97D4-7422-0D20-62C296230C77}"/>
+          <p:cNvPr id="4" name="Picture 3">
+            <a:extLst>
+              <a:ext uri="{FF2B5EF4-FFF2-40B4-BE49-F238E27FC236}">
+                <a16:creationId xmlns:a16="http://schemas.microsoft.com/office/drawing/2014/main" id="{71405082-DAB6-1692-8C6B-F8965F963FC4}"/>
               </a:ext>
             </a:extLst>
           </p:cNvPr>
@@ -22476,33 +23067,93 @@
           <p:nvPr/>
         </p:nvPicPr>
         <p:blipFill>
-          <a:blip r:embed="rId2">
-            <a:extLst>
-              <a:ext uri="{28A0092B-C50C-407E-A947-70E740481C1C}">
-                <a14:useLocalDpi xmlns:a14="http://schemas.microsoft.com/office/drawing/2010/main" val="0"/>
-              </a:ext>
-            </a:extLst>
-          </a:blip>
+          <a:blip r:embed="rId2"/>
           <a:stretch>
             <a:fillRect/>
           </a:stretch>
         </p:blipFill>
         <p:spPr>
           <a:xfrm>
-            <a:off x="1562666" y="790905"/>
-            <a:ext cx="9066667" cy="5276190"/>
-          </a:xfrm>
-          <a:prstGeom prst="rect">
-            <a:avLst/>
-          </a:prstGeom>
+            <a:off x="5472407" y="2914502"/>
+            <a:ext cx="946045" cy="746322"/>
+          </a:xfrm>
+          <a:prstGeom prst="rect">
+            <a:avLst/>
+          </a:prstGeom>
+          <a:ln w="9525">
+            <a:solidFill>
+              <a:schemeClr val="tx1"/>
+            </a:solidFill>
+          </a:ln>
         </p:spPr>
       </p:pic>
       <p:sp>
         <p:nvSpPr>
-          <p:cNvPr id="6" name="Multiplication Sign 5">
-            <a:extLst>
-              <a:ext uri="{FF2B5EF4-FFF2-40B4-BE49-F238E27FC236}">
-                <a16:creationId xmlns:a16="http://schemas.microsoft.com/office/drawing/2014/main" id="{FBE990A9-6EB8-6AED-63DF-C7261C90CFBD}"/>
+          <p:cNvPr id="5" name="TextBox 4">
+            <a:extLst>
+              <a:ext uri="{FF2B5EF4-FFF2-40B4-BE49-F238E27FC236}">
+                <a16:creationId xmlns:a16="http://schemas.microsoft.com/office/drawing/2014/main" id="{2A3CB6BB-9344-351C-E0EA-78362882D80F}"/>
+              </a:ext>
+            </a:extLst>
+          </p:cNvPr>
+          <p:cNvSpPr txBox="1"/>
+          <p:nvPr/>
+        </p:nvSpPr>
+        <p:spPr>
+          <a:xfrm>
+            <a:off x="5469726" y="3809942"/>
+            <a:ext cx="1257727" cy="246221"/>
+          </a:xfrm>
+          <a:prstGeom prst="rect">
+            <a:avLst/>
+          </a:prstGeom>
+          <a:noFill/>
+        </p:spPr>
+        <p:txBody>
+          <a:bodyPr wrap="square">
+            <a:spAutoFit/>
+          </a:bodyPr>
+          <a:lstStyle/>
+          <a:p>
+            <a:r>
+              <a:rPr lang="en-US" sz="1000" b="1" dirty="0">
+                <a:solidFill>
+                  <a:schemeClr val="tx1">
+                    <a:lumMod val="75000"/>
+                    <a:lumOff val="25000"/>
+                  </a:schemeClr>
+                </a:solidFill>
+              </a:rPr>
+              <a:t>VM_ID</a:t>
+            </a:r>
+            <a:r>
+              <a:rPr lang="en-US" sz="1000" dirty="0">
+                <a:solidFill>
+                  <a:schemeClr val="tx1">
+                    <a:lumMod val="75000"/>
+                    <a:lumOff val="25000"/>
+                  </a:schemeClr>
+                </a:solidFill>
+              </a:rPr>
+              <a:t>: fw1-rail</a:t>
+            </a:r>
+            <a:endParaRPr lang="en-SG" sz="1000" dirty="0">
+              <a:solidFill>
+                <a:schemeClr val="tx1">
+                  <a:lumMod val="75000"/>
+                  <a:lumOff val="25000"/>
+                </a:schemeClr>
+              </a:solidFill>
+            </a:endParaRPr>
+          </a:p>
+        </p:txBody>
+      </p:sp>
+      <p:sp>
+        <p:nvSpPr>
+          <p:cNvPr id="6" name="Rectangle 5">
+            <a:extLst>
+              <a:ext uri="{FF2B5EF4-FFF2-40B4-BE49-F238E27FC236}">
+                <a16:creationId xmlns:a16="http://schemas.microsoft.com/office/drawing/2014/main" id="{79D5195D-9FC8-2E79-E85F-102141B5D894}"/>
               </a:ext>
             </a:extLst>
           </p:cNvPr>
@@ -22511,30 +23162,35 @@
         </p:nvSpPr>
         <p:spPr>
           <a:xfrm>
-            <a:off x="7970294" y="3780616"/>
-            <a:ext cx="413657" cy="426570"/>
-          </a:xfrm>
-          <a:prstGeom prst="mathMultiply">
-            <a:avLst/>
-          </a:prstGeom>
-          <a:solidFill>
-            <a:srgbClr val="FF0000"/>
-          </a:solidFill>
+            <a:off x="7273808" y="2050632"/>
+            <a:ext cx="4161267" cy="2665744"/>
+          </a:xfrm>
+          <a:prstGeom prst="rect">
+            <a:avLst/>
+          </a:prstGeom>
+          <a:noFill/>
+          <a:ln w="12700" cap="flat" cmpd="sng" algn="ctr">
+            <a:solidFill>
+              <a:schemeClr val="dk1"/>
+            </a:solidFill>
+            <a:prstDash val="dash"/>
+            <a:round/>
+            <a:headEnd type="none" w="med" len="med"/>
+            <a:tailEnd type="none" w="med" len="med"/>
+          </a:ln>
         </p:spPr>
         <p:style>
-          <a:lnRef idx="2">
-            <a:schemeClr val="accent1">
-              <a:shade val="15000"/>
-            </a:schemeClr>
+          <a:lnRef idx="0">
+            <a:scrgbClr r="0" g="0" b="0"/>
           </a:lnRef>
-          <a:fillRef idx="1">
-            <a:schemeClr val="accent1"/>
+          <a:fillRef idx="0">
+            <a:scrgbClr r="0" g="0" b="0"/>
           </a:fillRef>
           <a:effectRef idx="0">
-            <a:schemeClr val="accent1"/>
+            <a:scrgbClr r="0" g="0" b="0"/>
           </a:effectRef>
           <a:fontRef idx="minor">
-            <a:schemeClr val="lt1"/>
+            <a:schemeClr val="dk1"/>
           </a:fontRef>
         </p:style>
         <p:txBody>
@@ -22542,65 +23198,66 @@
           <a:lstStyle/>
           <a:p>
             <a:pPr algn="ctr"/>
-            <a:endParaRPr lang="en-SG" dirty="0"/>
-          </a:p>
-        </p:txBody>
-      </p:sp>
-      <p:sp>
-        <p:nvSpPr>
-          <p:cNvPr id="8" name="Multiplication Sign 7">
-            <a:extLst>
-              <a:ext uri="{FF2B5EF4-FFF2-40B4-BE49-F238E27FC236}">
-                <a16:creationId xmlns:a16="http://schemas.microsoft.com/office/drawing/2014/main" id="{676058BB-2262-F781-9275-7B434CA59ED3}"/>
-              </a:ext>
-            </a:extLst>
-          </p:cNvPr>
-          <p:cNvSpPr/>
-          <p:nvPr/>
-        </p:nvSpPr>
-        <p:spPr>
-          <a:xfrm>
-            <a:off x="7970293" y="4497285"/>
-            <a:ext cx="413657" cy="426570"/>
-          </a:xfrm>
-          <a:prstGeom prst="mathMultiply">
-            <a:avLst/>
-          </a:prstGeom>
-          <a:solidFill>
-            <a:srgbClr val="FF0000"/>
-          </a:solidFill>
-        </p:spPr>
-        <p:style>
-          <a:lnRef idx="2">
-            <a:schemeClr val="accent1">
-              <a:shade val="15000"/>
-            </a:schemeClr>
-          </a:lnRef>
-          <a:fillRef idx="1">
-            <a:schemeClr val="accent1"/>
-          </a:fillRef>
-          <a:effectRef idx="0">
-            <a:schemeClr val="accent1"/>
-          </a:effectRef>
-          <a:fontRef idx="minor">
-            <a:schemeClr val="lt1"/>
-          </a:fontRef>
-        </p:style>
-        <p:txBody>
-          <a:bodyPr rtlCol="0" anchor="ctr"/>
+            <a:endParaRPr lang="en-SG"/>
+          </a:p>
+        </p:txBody>
+      </p:sp>
+      <p:sp>
+        <p:nvSpPr>
+          <p:cNvPr id="7" name="TextBox 6">
+            <a:extLst>
+              <a:ext uri="{FF2B5EF4-FFF2-40B4-BE49-F238E27FC236}">
+                <a16:creationId xmlns:a16="http://schemas.microsoft.com/office/drawing/2014/main" id="{D72DE04E-D65F-AE1B-6BC5-D102A8D66E8B}"/>
+              </a:ext>
+            </a:extLst>
+          </p:cNvPr>
+          <p:cNvSpPr txBox="1"/>
+          <p:nvPr/>
+        </p:nvSpPr>
+        <p:spPr>
+          <a:xfrm>
+            <a:off x="7197626" y="1781850"/>
+            <a:ext cx="3008010" cy="276999"/>
+          </a:xfrm>
+          <a:prstGeom prst="rect">
+            <a:avLst/>
+          </a:prstGeom>
+          <a:noFill/>
+        </p:spPr>
+        <p:txBody>
+          <a:bodyPr wrap="square">
+            <a:spAutoFit/>
+          </a:bodyPr>
           <a:lstStyle/>
           <a:p>
-            <a:pPr algn="ctr"/>
-            <a:endParaRPr lang="en-SG" dirty="0"/>
+            <a:r>
+              <a:rPr lang="en-US" sz="1200" b="1" dirty="0">
+                <a:solidFill>
+                  <a:schemeClr val="tx1">
+                    <a:lumMod val="75000"/>
+                    <a:lumOff val="25000"/>
+                  </a:schemeClr>
+                </a:solidFill>
+              </a:rPr>
+              <a:t>Railway Engineer  Department </a:t>
+            </a:r>
+            <a:endParaRPr lang="en-SG" sz="1200" b="1" dirty="0">
+              <a:solidFill>
+                <a:schemeClr val="tx1">
+                  <a:lumMod val="75000"/>
+                  <a:lumOff val="25000"/>
+                </a:schemeClr>
+              </a:solidFill>
+            </a:endParaRPr>
           </a:p>
         </p:txBody>
       </p:sp>
       <p:pic>
         <p:nvPicPr>
-          <p:cNvPr id="9" name="Picture 8">
-            <a:extLst>
-              <a:ext uri="{FF2B5EF4-FFF2-40B4-BE49-F238E27FC236}">
-                <a16:creationId xmlns:a16="http://schemas.microsoft.com/office/drawing/2014/main" id="{A7DFD07E-3004-7E60-2870-317CE540FDE0}"/>
+          <p:cNvPr id="8" name="Picture 7">
+            <a:extLst>
+              <a:ext uri="{FF2B5EF4-FFF2-40B4-BE49-F238E27FC236}">
+                <a16:creationId xmlns:a16="http://schemas.microsoft.com/office/drawing/2014/main" id="{3B347612-9367-D831-0E5E-71B2B6ED66AD}"/>
               </a:ext>
             </a:extLst>
           </p:cNvPr>
@@ -22617,48 +23274,170 @@
         </p:blipFill>
         <p:spPr>
           <a:xfrm>
-            <a:off x="8471758" y="685847"/>
-            <a:ext cx="489507" cy="542715"/>
-          </a:xfrm>
-          <a:prstGeom prst="rect">
-            <a:avLst/>
-          </a:prstGeom>
-          <a:ln w="9525">
-            <a:solidFill>
-              <a:schemeClr val="tx1"/>
-            </a:solidFill>
-          </a:ln>
+            <a:off x="7412177" y="2108697"/>
+            <a:ext cx="657045" cy="374211"/>
+          </a:xfrm>
+          <a:prstGeom prst="rect">
+            <a:avLst/>
+          </a:prstGeom>
         </p:spPr>
       </p:pic>
       <p:cxnSp>
         <p:nvCxnSpPr>
-          <p:cNvPr id="10" name="Straight Arrow Connector 9">
-            <a:extLst>
-              <a:ext uri="{FF2B5EF4-FFF2-40B4-BE49-F238E27FC236}">
-                <a16:creationId xmlns:a16="http://schemas.microsoft.com/office/drawing/2014/main" id="{5A42E0BD-172C-F5AB-2476-3DC5BA15DB38}"/>
+          <p:cNvPr id="9" name="Straight Connector 8">
+            <a:extLst>
+              <a:ext uri="{FF2B5EF4-FFF2-40B4-BE49-F238E27FC236}">
+                <a16:creationId xmlns:a16="http://schemas.microsoft.com/office/drawing/2014/main" id="{225AECC9-12D6-15FE-D963-CB72F7B68556}"/>
               </a:ext>
             </a:extLst>
           </p:cNvPr>
           <p:cNvCxnSpPr>
             <a:cxnSpLocks/>
+            <a:stCxn id="4" idx="3"/>
+            <a:endCxn id="8" idx="1"/>
           </p:cNvCxnSpPr>
           <p:nvPr/>
         </p:nvCxnSpPr>
         <p:spPr>
-          <a:xfrm flipH="1">
-            <a:off x="8177121" y="1228562"/>
-            <a:ext cx="294637" cy="2418764"/>
-          </a:xfrm>
-          <a:prstGeom prst="straightConnector1">
-            <a:avLst/>
-          </a:prstGeom>
-          <a:ln w="28575">
-            <a:solidFill>
-              <a:srgbClr val="FF0000"/>
-            </a:solidFill>
-            <a:prstDash val="sysDash"/>
-            <a:tailEnd type="triangle"/>
-          </a:ln>
+          <a:xfrm flipV="1">
+            <a:off x="6418452" y="2295803"/>
+            <a:ext cx="993725" cy="991860"/>
+          </a:xfrm>
+          <a:prstGeom prst="line">
+            <a:avLst/>
+          </a:prstGeom>
+          <a:ln w="19050"/>
+        </p:spPr>
+        <p:style>
+          <a:lnRef idx="1">
+            <a:schemeClr val="accent1"/>
+          </a:lnRef>
+          <a:fillRef idx="0">
+            <a:schemeClr val="accent1"/>
+          </a:fillRef>
+          <a:effectRef idx="0">
+            <a:schemeClr val="accent1"/>
+          </a:effectRef>
+          <a:fontRef idx="minor">
+            <a:schemeClr val="tx1"/>
+          </a:fontRef>
+        </p:style>
+      </p:cxnSp>
+      <p:pic>
+        <p:nvPicPr>
+          <p:cNvPr id="10" name="Picture 9">
+            <a:extLst>
+              <a:ext uri="{FF2B5EF4-FFF2-40B4-BE49-F238E27FC236}">
+                <a16:creationId xmlns:a16="http://schemas.microsoft.com/office/drawing/2014/main" id="{E9B5CF8C-915E-A5F0-E6F9-87BB98733992}"/>
+              </a:ext>
+            </a:extLst>
+          </p:cNvPr>
+          <p:cNvPicPr>
+            <a:picLocks noChangeAspect="1"/>
+          </p:cNvPicPr>
+          <p:nvPr/>
+        </p:nvPicPr>
+        <p:blipFill>
+          <a:blip r:embed="rId4"/>
+          <a:stretch>
+            <a:fillRect/>
+          </a:stretch>
+        </p:blipFill>
+        <p:spPr>
+          <a:xfrm>
+            <a:off x="7812409" y="3906428"/>
+            <a:ext cx="531176" cy="467941"/>
+          </a:xfrm>
+          <a:prstGeom prst="rect">
+            <a:avLst/>
+          </a:prstGeom>
+        </p:spPr>
+      </p:pic>
+      <p:pic>
+        <p:nvPicPr>
+          <p:cNvPr id="11" name="Picture 10">
+            <a:extLst>
+              <a:ext uri="{FF2B5EF4-FFF2-40B4-BE49-F238E27FC236}">
+                <a16:creationId xmlns:a16="http://schemas.microsoft.com/office/drawing/2014/main" id="{15060B55-28C6-6DDA-508C-5E3029864E8F}"/>
+              </a:ext>
+            </a:extLst>
+          </p:cNvPr>
+          <p:cNvPicPr>
+            <a:picLocks noChangeAspect="1"/>
+          </p:cNvPicPr>
+          <p:nvPr/>
+        </p:nvPicPr>
+        <p:blipFill>
+          <a:blip r:embed="rId4"/>
+          <a:stretch>
+            <a:fillRect/>
+          </a:stretch>
+        </p:blipFill>
+        <p:spPr>
+          <a:xfrm>
+            <a:off x="8745144" y="3417749"/>
+            <a:ext cx="531176" cy="467941"/>
+          </a:xfrm>
+          <a:prstGeom prst="rect">
+            <a:avLst/>
+          </a:prstGeom>
+        </p:spPr>
+      </p:pic>
+      <p:pic>
+        <p:nvPicPr>
+          <p:cNvPr id="12" name="Picture 11">
+            <a:extLst>
+              <a:ext uri="{FF2B5EF4-FFF2-40B4-BE49-F238E27FC236}">
+                <a16:creationId xmlns:a16="http://schemas.microsoft.com/office/drawing/2014/main" id="{47093F4F-446F-B040-D1A8-587C12D3AC17}"/>
+              </a:ext>
+            </a:extLst>
+          </p:cNvPr>
+          <p:cNvPicPr>
+            <a:picLocks noChangeAspect="1"/>
+          </p:cNvPicPr>
+          <p:nvPr/>
+        </p:nvPicPr>
+        <p:blipFill>
+          <a:blip r:embed="rId4"/>
+          <a:stretch>
+            <a:fillRect/>
+          </a:stretch>
+        </p:blipFill>
+        <p:spPr>
+          <a:xfrm>
+            <a:off x="9608339" y="2756955"/>
+            <a:ext cx="531176" cy="467941"/>
+          </a:xfrm>
+          <a:prstGeom prst="rect">
+            <a:avLst/>
+          </a:prstGeom>
+        </p:spPr>
+      </p:pic>
+      <p:cxnSp>
+        <p:nvCxnSpPr>
+          <p:cNvPr id="13" name="Straight Connector 12">
+            <a:extLst>
+              <a:ext uri="{FF2B5EF4-FFF2-40B4-BE49-F238E27FC236}">
+                <a16:creationId xmlns:a16="http://schemas.microsoft.com/office/drawing/2014/main" id="{EAB8C39A-AFEC-09C5-BDE3-8387E181C3D8}"/>
+              </a:ext>
+            </a:extLst>
+          </p:cNvPr>
+          <p:cNvCxnSpPr>
+            <a:cxnSpLocks/>
+            <a:stCxn id="8" idx="2"/>
+            <a:endCxn id="10" idx="0"/>
+          </p:cNvCxnSpPr>
+          <p:nvPr/>
+        </p:nvCxnSpPr>
+        <p:spPr>
+          <a:xfrm>
+            <a:off x="7740700" y="2482908"/>
+            <a:ext cx="337297" cy="1423520"/>
+          </a:xfrm>
+          <a:prstGeom prst="line">
+            <a:avLst/>
+          </a:prstGeom>
+          <a:ln w="19050"/>
         </p:spPr>
         <p:style>
           <a:lnRef idx="1">
@@ -22677,10 +23456,424 @@
       </p:cxnSp>
       <p:cxnSp>
         <p:nvCxnSpPr>
-          <p:cNvPr id="13" name="Straight Arrow Connector 12">
-            <a:extLst>
-              <a:ext uri="{FF2B5EF4-FFF2-40B4-BE49-F238E27FC236}">
-                <a16:creationId xmlns:a16="http://schemas.microsoft.com/office/drawing/2014/main" id="{1C86A106-186C-D2AB-D7E0-6F822E8A9E66}"/>
+          <p:cNvPr id="14" name="Straight Connector 13">
+            <a:extLst>
+              <a:ext uri="{FF2B5EF4-FFF2-40B4-BE49-F238E27FC236}">
+                <a16:creationId xmlns:a16="http://schemas.microsoft.com/office/drawing/2014/main" id="{9B725B08-96E2-507D-92FD-9EEBF48D4A0C}"/>
+              </a:ext>
+            </a:extLst>
+          </p:cNvPr>
+          <p:cNvCxnSpPr>
+            <a:cxnSpLocks/>
+            <a:stCxn id="8" idx="2"/>
+            <a:endCxn id="11" idx="0"/>
+          </p:cNvCxnSpPr>
+          <p:nvPr/>
+        </p:nvCxnSpPr>
+        <p:spPr>
+          <a:xfrm>
+            <a:off x="7740700" y="2482908"/>
+            <a:ext cx="1270032" cy="934841"/>
+          </a:xfrm>
+          <a:prstGeom prst="line">
+            <a:avLst/>
+          </a:prstGeom>
+          <a:ln w="19050"/>
+        </p:spPr>
+        <p:style>
+          <a:lnRef idx="1">
+            <a:schemeClr val="accent1"/>
+          </a:lnRef>
+          <a:fillRef idx="0">
+            <a:schemeClr val="accent1"/>
+          </a:fillRef>
+          <a:effectRef idx="0">
+            <a:schemeClr val="accent1"/>
+          </a:effectRef>
+          <a:fontRef idx="minor">
+            <a:schemeClr val="tx1"/>
+          </a:fontRef>
+        </p:style>
+      </p:cxnSp>
+      <p:cxnSp>
+        <p:nvCxnSpPr>
+          <p:cNvPr id="15" name="Straight Connector 14">
+            <a:extLst>
+              <a:ext uri="{FF2B5EF4-FFF2-40B4-BE49-F238E27FC236}">
+                <a16:creationId xmlns:a16="http://schemas.microsoft.com/office/drawing/2014/main" id="{E5011537-ED3A-5D32-EA10-EB61B0B64650}"/>
+              </a:ext>
+            </a:extLst>
+          </p:cNvPr>
+          <p:cNvCxnSpPr>
+            <a:cxnSpLocks/>
+            <a:stCxn id="8" idx="2"/>
+            <a:endCxn id="12" idx="0"/>
+          </p:cNvCxnSpPr>
+          <p:nvPr/>
+        </p:nvCxnSpPr>
+        <p:spPr>
+          <a:xfrm>
+            <a:off x="7740700" y="2482908"/>
+            <a:ext cx="2133227" cy="274047"/>
+          </a:xfrm>
+          <a:prstGeom prst="line">
+            <a:avLst/>
+          </a:prstGeom>
+          <a:ln w="19050"/>
+        </p:spPr>
+        <p:style>
+          <a:lnRef idx="1">
+            <a:schemeClr val="accent1"/>
+          </a:lnRef>
+          <a:fillRef idx="0">
+            <a:schemeClr val="accent1"/>
+          </a:fillRef>
+          <a:effectRef idx="0">
+            <a:schemeClr val="accent1"/>
+          </a:effectRef>
+          <a:fontRef idx="minor">
+            <a:schemeClr val="tx1"/>
+          </a:fontRef>
+        </p:style>
+      </p:cxnSp>
+      <p:sp>
+        <p:nvSpPr>
+          <p:cNvPr id="16" name="TextBox 15">
+            <a:extLst>
+              <a:ext uri="{FF2B5EF4-FFF2-40B4-BE49-F238E27FC236}">
+                <a16:creationId xmlns:a16="http://schemas.microsoft.com/office/drawing/2014/main" id="{F41B63DF-E5AA-4997-0E49-E291C019F1FD}"/>
+              </a:ext>
+            </a:extLst>
+          </p:cNvPr>
+          <p:cNvSpPr txBox="1"/>
+          <p:nvPr/>
+        </p:nvSpPr>
+        <p:spPr>
+          <a:xfrm>
+            <a:off x="8283441" y="3970382"/>
+            <a:ext cx="1440693" cy="400110"/>
+          </a:xfrm>
+          <a:prstGeom prst="rect">
+            <a:avLst/>
+          </a:prstGeom>
+          <a:noFill/>
+        </p:spPr>
+        <p:txBody>
+          <a:bodyPr wrap="square">
+            <a:spAutoFit/>
+          </a:bodyPr>
+          <a:lstStyle/>
+          <a:p>
+            <a:r>
+              <a:rPr lang="en-US" sz="1000" b="1" dirty="0">
+                <a:solidFill>
+                  <a:schemeClr val="tx1">
+                    <a:lumMod val="75000"/>
+                    <a:lumOff val="25000"/>
+                  </a:schemeClr>
+                </a:solidFill>
+              </a:rPr>
+              <a:t>VM_ID</a:t>
+            </a:r>
+            <a:r>
+              <a:rPr lang="en-US" sz="1000" dirty="0">
+                <a:solidFill>
+                  <a:schemeClr val="tx1">
+                    <a:lumMod val="75000"/>
+                    <a:lumOff val="25000"/>
+                  </a:schemeClr>
+                </a:solidFill>
+              </a:rPr>
+              <a:t>: OT-Eng-WS1</a:t>
+            </a:r>
+          </a:p>
+          <a:p>
+            <a:r>
+              <a:rPr lang="en-US" sz="1000" b="1" dirty="0">
+                <a:solidFill>
+                  <a:schemeClr val="tx1">
+                    <a:lumMod val="75000"/>
+                    <a:lumOff val="25000"/>
+                  </a:schemeClr>
+                </a:solidFill>
+              </a:rPr>
+              <a:t>State</a:t>
+            </a:r>
+            <a:r>
+              <a:rPr lang="en-US" sz="1000" dirty="0">
+                <a:solidFill>
+                  <a:schemeClr val="tx1">
+                    <a:lumMod val="75000"/>
+                    <a:lumOff val="25000"/>
+                  </a:schemeClr>
+                </a:solidFill>
+              </a:rPr>
+              <a:t>: </a:t>
+            </a:r>
+            <a:r>
+              <a:rPr lang="en-US" sz="1000" b="1" dirty="0">
+                <a:solidFill>
+                  <a:srgbClr val="00B050"/>
+                </a:solidFill>
+              </a:rPr>
+              <a:t>ready</a:t>
+            </a:r>
+            <a:endParaRPr lang="en-SG" sz="1000" b="1" dirty="0">
+              <a:solidFill>
+                <a:srgbClr val="00B050"/>
+              </a:solidFill>
+            </a:endParaRPr>
+          </a:p>
+        </p:txBody>
+      </p:sp>
+      <p:sp>
+        <p:nvSpPr>
+          <p:cNvPr id="17" name="TextBox 16">
+            <a:extLst>
+              <a:ext uri="{FF2B5EF4-FFF2-40B4-BE49-F238E27FC236}">
+                <a16:creationId xmlns:a16="http://schemas.microsoft.com/office/drawing/2014/main" id="{2BA02FFC-15E0-ECC4-C9B6-2577645D0517}"/>
+              </a:ext>
+            </a:extLst>
+          </p:cNvPr>
+          <p:cNvSpPr txBox="1"/>
+          <p:nvPr/>
+        </p:nvSpPr>
+        <p:spPr>
+          <a:xfrm>
+            <a:off x="7576714" y="3651720"/>
+            <a:ext cx="1130069" cy="246221"/>
+          </a:xfrm>
+          <a:prstGeom prst="rect">
+            <a:avLst/>
+          </a:prstGeom>
+          <a:noFill/>
+        </p:spPr>
+        <p:txBody>
+          <a:bodyPr wrap="square">
+            <a:spAutoFit/>
+          </a:bodyPr>
+          <a:lstStyle/>
+          <a:p>
+            <a:r>
+              <a:rPr lang="en-US" sz="1000" b="1" dirty="0"/>
+              <a:t>10.107.105.5</a:t>
+            </a:r>
+            <a:endParaRPr lang="en-SG" sz="1000" b="1" dirty="0"/>
+          </a:p>
+        </p:txBody>
+      </p:sp>
+      <p:sp>
+        <p:nvSpPr>
+          <p:cNvPr id="18" name="TextBox 17">
+            <a:extLst>
+              <a:ext uri="{FF2B5EF4-FFF2-40B4-BE49-F238E27FC236}">
+                <a16:creationId xmlns:a16="http://schemas.microsoft.com/office/drawing/2014/main" id="{F3CF5559-779E-BC07-D996-4BE53E481736}"/>
+              </a:ext>
+            </a:extLst>
+          </p:cNvPr>
+          <p:cNvSpPr txBox="1"/>
+          <p:nvPr/>
+        </p:nvSpPr>
+        <p:spPr>
+          <a:xfrm>
+            <a:off x="8701631" y="3212275"/>
+            <a:ext cx="1130069" cy="246221"/>
+          </a:xfrm>
+          <a:prstGeom prst="rect">
+            <a:avLst/>
+          </a:prstGeom>
+          <a:noFill/>
+        </p:spPr>
+        <p:txBody>
+          <a:bodyPr wrap="square">
+            <a:spAutoFit/>
+          </a:bodyPr>
+          <a:lstStyle/>
+          <a:p>
+            <a:r>
+              <a:rPr lang="en-US" sz="1000" b="1" dirty="0"/>
+              <a:t>10.107.105.6</a:t>
+            </a:r>
+            <a:endParaRPr lang="en-SG" sz="1000" b="1" dirty="0"/>
+          </a:p>
+        </p:txBody>
+      </p:sp>
+      <p:sp>
+        <p:nvSpPr>
+          <p:cNvPr id="19" name="TextBox 18">
+            <a:extLst>
+              <a:ext uri="{FF2B5EF4-FFF2-40B4-BE49-F238E27FC236}">
+                <a16:creationId xmlns:a16="http://schemas.microsoft.com/office/drawing/2014/main" id="{165F7BB2-250B-D034-DD3B-17ED258403D2}"/>
+              </a:ext>
+            </a:extLst>
+          </p:cNvPr>
+          <p:cNvSpPr txBox="1"/>
+          <p:nvPr/>
+        </p:nvSpPr>
+        <p:spPr>
+          <a:xfrm>
+            <a:off x="9230136" y="2564062"/>
+            <a:ext cx="1130069" cy="246221"/>
+          </a:xfrm>
+          <a:prstGeom prst="rect">
+            <a:avLst/>
+          </a:prstGeom>
+          <a:noFill/>
+        </p:spPr>
+        <p:txBody>
+          <a:bodyPr wrap="square">
+            <a:spAutoFit/>
+          </a:bodyPr>
+          <a:lstStyle/>
+          <a:p>
+            <a:r>
+              <a:rPr lang="en-US" sz="1000" b="1" dirty="0"/>
+              <a:t>10.107.105.7</a:t>
+            </a:r>
+            <a:endParaRPr lang="en-SG" sz="1000" b="1" dirty="0"/>
+          </a:p>
+        </p:txBody>
+      </p:sp>
+      <p:sp>
+        <p:nvSpPr>
+          <p:cNvPr id="20" name="Rectangle 19">
+            <a:extLst>
+              <a:ext uri="{FF2B5EF4-FFF2-40B4-BE49-F238E27FC236}">
+                <a16:creationId xmlns:a16="http://schemas.microsoft.com/office/drawing/2014/main" id="{33581CBB-2EAC-00B4-1FF3-18766563851D}"/>
+              </a:ext>
+            </a:extLst>
+          </p:cNvPr>
+          <p:cNvSpPr/>
+          <p:nvPr/>
+        </p:nvSpPr>
+        <p:spPr>
+          <a:xfrm>
+            <a:off x="124687" y="2614038"/>
+            <a:ext cx="4588978" cy="2110684"/>
+          </a:xfrm>
+          <a:prstGeom prst="rect">
+            <a:avLst/>
+          </a:prstGeom>
+          <a:noFill/>
+          <a:ln w="12700" cap="flat" cmpd="sng" algn="ctr">
+            <a:solidFill>
+              <a:schemeClr val="dk1"/>
+            </a:solidFill>
+            <a:prstDash val="dash"/>
+            <a:round/>
+            <a:headEnd type="none" w="med" len="med"/>
+            <a:tailEnd type="none" w="med" len="med"/>
+          </a:ln>
+        </p:spPr>
+        <p:style>
+          <a:lnRef idx="0">
+            <a:scrgbClr r="0" g="0" b="0"/>
+          </a:lnRef>
+          <a:fillRef idx="0">
+            <a:scrgbClr r="0" g="0" b="0"/>
+          </a:fillRef>
+          <a:effectRef idx="0">
+            <a:scrgbClr r="0" g="0" b="0"/>
+          </a:effectRef>
+          <a:fontRef idx="minor">
+            <a:schemeClr val="dk1"/>
+          </a:fontRef>
+        </p:style>
+        <p:txBody>
+          <a:bodyPr rtlCol="0" anchor="ctr"/>
+          <a:lstStyle/>
+          <a:p>
+            <a:pPr algn="ctr"/>
+            <a:endParaRPr lang="en-SG"/>
+          </a:p>
+        </p:txBody>
+      </p:sp>
+      <p:sp>
+        <p:nvSpPr>
+          <p:cNvPr id="21" name="TextBox 20">
+            <a:extLst>
+              <a:ext uri="{FF2B5EF4-FFF2-40B4-BE49-F238E27FC236}">
+                <a16:creationId xmlns:a16="http://schemas.microsoft.com/office/drawing/2014/main" id="{E791D3B8-38BC-90E8-194A-AB2D0AAE5298}"/>
+              </a:ext>
+            </a:extLst>
+          </p:cNvPr>
+          <p:cNvSpPr txBox="1"/>
+          <p:nvPr/>
+        </p:nvSpPr>
+        <p:spPr>
+          <a:xfrm>
+            <a:off x="140808" y="2709565"/>
+            <a:ext cx="2942480" cy="276999"/>
+          </a:xfrm>
+          <a:prstGeom prst="rect">
+            <a:avLst/>
+          </a:prstGeom>
+          <a:noFill/>
+        </p:spPr>
+        <p:txBody>
+          <a:bodyPr wrap="square">
+            <a:spAutoFit/>
+          </a:bodyPr>
+          <a:lstStyle/>
+          <a:p>
+            <a:r>
+              <a:rPr lang="en-US" sz="1200" b="1" dirty="0">
+                <a:solidFill>
+                  <a:schemeClr val="tx1">
+                    <a:lumMod val="75000"/>
+                    <a:lumOff val="25000"/>
+                  </a:schemeClr>
+                </a:solidFill>
+              </a:rPr>
+              <a:t>Railway Operational Room </a:t>
+            </a:r>
+            <a:endParaRPr lang="en-SG" sz="1200" b="1" dirty="0">
+              <a:solidFill>
+                <a:schemeClr val="tx1">
+                  <a:lumMod val="75000"/>
+                  <a:lumOff val="25000"/>
+                </a:schemeClr>
+              </a:solidFill>
+            </a:endParaRPr>
+          </a:p>
+        </p:txBody>
+      </p:sp>
+      <p:pic>
+        <p:nvPicPr>
+          <p:cNvPr id="23" name="Picture 22">
+            <a:extLst>
+              <a:ext uri="{FF2B5EF4-FFF2-40B4-BE49-F238E27FC236}">
+                <a16:creationId xmlns:a16="http://schemas.microsoft.com/office/drawing/2014/main" id="{5EF03D69-A267-FF04-F834-38B57C6A9787}"/>
+              </a:ext>
+            </a:extLst>
+          </p:cNvPr>
+          <p:cNvPicPr>
+            <a:picLocks noChangeAspect="1"/>
+          </p:cNvPicPr>
+          <p:nvPr/>
+        </p:nvPicPr>
+        <p:blipFill>
+          <a:blip r:embed="rId3"/>
+          <a:stretch>
+            <a:fillRect/>
+          </a:stretch>
+        </p:blipFill>
+        <p:spPr>
+          <a:xfrm>
+            <a:off x="3665198" y="3825499"/>
+            <a:ext cx="657045" cy="374211"/>
+          </a:xfrm>
+          <a:prstGeom prst="rect">
+            <a:avLst/>
+          </a:prstGeom>
+        </p:spPr>
+      </p:pic>
+      <p:cxnSp>
+        <p:nvCxnSpPr>
+          <p:cNvPr id="24" name="Straight Connector 23">
+            <a:extLst>
+              <a:ext uri="{FF2B5EF4-FFF2-40B4-BE49-F238E27FC236}">
+                <a16:creationId xmlns:a16="http://schemas.microsoft.com/office/drawing/2014/main" id="{3C2BA329-A18F-8CBB-4FA1-C7016D48A2FD}"/>
               </a:ext>
             </a:extLst>
           </p:cNvPr>
@@ -22691,8 +23884,1257 @@
         </p:nvCxnSpPr>
         <p:spPr>
           <a:xfrm flipH="1">
-            <a:off x="8383950" y="1228562"/>
-            <a:ext cx="441551" cy="3384535"/>
+            <a:off x="4355056" y="3284681"/>
+            <a:ext cx="1150164" cy="724942"/>
+          </a:xfrm>
+          <a:prstGeom prst="line">
+            <a:avLst/>
+          </a:prstGeom>
+          <a:ln w="19050"/>
+        </p:spPr>
+        <p:style>
+          <a:lnRef idx="1">
+            <a:schemeClr val="accent1"/>
+          </a:lnRef>
+          <a:fillRef idx="0">
+            <a:schemeClr val="accent1"/>
+          </a:fillRef>
+          <a:effectRef idx="0">
+            <a:schemeClr val="accent1"/>
+          </a:effectRef>
+          <a:fontRef idx="minor">
+            <a:schemeClr val="tx1"/>
+          </a:fontRef>
+        </p:style>
+      </p:cxnSp>
+      <p:sp>
+        <p:nvSpPr>
+          <p:cNvPr id="25" name="TextBox 24">
+            <a:extLst>
+              <a:ext uri="{FF2B5EF4-FFF2-40B4-BE49-F238E27FC236}">
+                <a16:creationId xmlns:a16="http://schemas.microsoft.com/office/drawing/2014/main" id="{E46FEA79-128E-4F70-CDD6-49A1B6AD3E63}"/>
+              </a:ext>
+            </a:extLst>
+          </p:cNvPr>
+          <p:cNvSpPr txBox="1"/>
+          <p:nvPr/>
+        </p:nvSpPr>
+        <p:spPr>
+          <a:xfrm>
+            <a:off x="4915973" y="3728116"/>
+            <a:ext cx="946045" cy="246221"/>
+          </a:xfrm>
+          <a:prstGeom prst="rect">
+            <a:avLst/>
+          </a:prstGeom>
+          <a:noFill/>
+        </p:spPr>
+        <p:txBody>
+          <a:bodyPr wrap="square">
+            <a:spAutoFit/>
+          </a:bodyPr>
+          <a:lstStyle/>
+          <a:p>
+            <a:r>
+              <a:rPr lang="en-US" sz="1000" b="1" dirty="0">
+                <a:solidFill>
+                  <a:schemeClr val="accent1"/>
+                </a:solidFill>
+              </a:rPr>
+              <a:t>10.107.X07.1</a:t>
+            </a:r>
+            <a:endParaRPr lang="en-SG" sz="1000" b="1" dirty="0">
+              <a:solidFill>
+                <a:schemeClr val="accent1"/>
+              </a:solidFill>
+            </a:endParaRPr>
+          </a:p>
+        </p:txBody>
+      </p:sp>
+      <p:sp>
+        <p:nvSpPr>
+          <p:cNvPr id="26" name="TextBox 25">
+            <a:extLst>
+              <a:ext uri="{FF2B5EF4-FFF2-40B4-BE49-F238E27FC236}">
+                <a16:creationId xmlns:a16="http://schemas.microsoft.com/office/drawing/2014/main" id="{209AD3C8-DCA3-310C-FB6B-222780D9B4DB}"/>
+              </a:ext>
+            </a:extLst>
+          </p:cNvPr>
+          <p:cNvSpPr txBox="1"/>
+          <p:nvPr/>
+        </p:nvSpPr>
+        <p:spPr>
+          <a:xfrm>
+            <a:off x="5851963" y="2574728"/>
+            <a:ext cx="946045" cy="246221"/>
+          </a:xfrm>
+          <a:prstGeom prst="rect">
+            <a:avLst/>
+          </a:prstGeom>
+          <a:noFill/>
+        </p:spPr>
+        <p:txBody>
+          <a:bodyPr wrap="square">
+            <a:spAutoFit/>
+          </a:bodyPr>
+          <a:lstStyle/>
+          <a:p>
+            <a:r>
+              <a:rPr lang="en-US" sz="1000" b="1" dirty="0">
+                <a:solidFill>
+                  <a:schemeClr val="accent1"/>
+                </a:solidFill>
+              </a:rPr>
+              <a:t>10.107.X04.1</a:t>
+            </a:r>
+            <a:endParaRPr lang="en-SG" sz="1000" b="1" dirty="0">
+              <a:solidFill>
+                <a:schemeClr val="accent1"/>
+              </a:solidFill>
+            </a:endParaRPr>
+          </a:p>
+        </p:txBody>
+      </p:sp>
+      <p:pic>
+        <p:nvPicPr>
+          <p:cNvPr id="27" name="Picture 26" descr="A screenshot of a computer&#10;&#10;Description automatically generated">
+            <a:extLst>
+              <a:ext uri="{FF2B5EF4-FFF2-40B4-BE49-F238E27FC236}">
+                <a16:creationId xmlns:a16="http://schemas.microsoft.com/office/drawing/2014/main" id="{047B5589-CFAA-BF64-3162-BF08E599C549}"/>
+              </a:ext>
+            </a:extLst>
+          </p:cNvPr>
+          <p:cNvPicPr>
+            <a:picLocks noChangeAspect="1"/>
+          </p:cNvPicPr>
+          <p:nvPr/>
+        </p:nvPicPr>
+        <p:blipFill>
+          <a:blip r:embed="rId5">
+            <a:extLst>
+              <a:ext uri="{28A0092B-C50C-407E-A947-70E740481C1C}">
+                <a14:useLocalDpi xmlns:a14="http://schemas.microsoft.com/office/drawing/2010/main" val="0"/>
+              </a:ext>
+            </a:extLst>
+          </a:blip>
+          <a:stretch>
+            <a:fillRect/>
+          </a:stretch>
+        </p:blipFill>
+        <p:spPr>
+          <a:xfrm>
+            <a:off x="459008" y="3199882"/>
+            <a:ext cx="2175007" cy="1157438"/>
+          </a:xfrm>
+          <a:prstGeom prst="rect">
+            <a:avLst/>
+          </a:prstGeom>
+          <a:ln w="9525">
+            <a:solidFill>
+              <a:schemeClr val="tx1"/>
+            </a:solidFill>
+          </a:ln>
+        </p:spPr>
+      </p:pic>
+      <p:cxnSp>
+        <p:nvCxnSpPr>
+          <p:cNvPr id="28" name="Straight Connector 27">
+            <a:extLst>
+              <a:ext uri="{FF2B5EF4-FFF2-40B4-BE49-F238E27FC236}">
+                <a16:creationId xmlns:a16="http://schemas.microsoft.com/office/drawing/2014/main" id="{09FB34ED-0CBC-5639-A296-4ED1D8A1F75A}"/>
+              </a:ext>
+            </a:extLst>
+          </p:cNvPr>
+          <p:cNvCxnSpPr>
+            <a:cxnSpLocks/>
+            <a:stCxn id="27" idx="3"/>
+            <a:endCxn id="23" idx="1"/>
+          </p:cNvCxnSpPr>
+          <p:nvPr/>
+        </p:nvCxnSpPr>
+        <p:spPr>
+          <a:xfrm>
+            <a:off x="2634015" y="3778601"/>
+            <a:ext cx="1031183" cy="234004"/>
+          </a:xfrm>
+          <a:prstGeom prst="line">
+            <a:avLst/>
+          </a:prstGeom>
+          <a:ln w="19050"/>
+        </p:spPr>
+        <p:style>
+          <a:lnRef idx="1">
+            <a:schemeClr val="accent1"/>
+          </a:lnRef>
+          <a:fillRef idx="0">
+            <a:schemeClr val="accent1"/>
+          </a:fillRef>
+          <a:effectRef idx="0">
+            <a:schemeClr val="accent1"/>
+          </a:effectRef>
+          <a:fontRef idx="minor">
+            <a:schemeClr val="tx1"/>
+          </a:fontRef>
+        </p:style>
+      </p:cxnSp>
+      <p:sp>
+        <p:nvSpPr>
+          <p:cNvPr id="29" name="TextBox 28">
+            <a:extLst>
+              <a:ext uri="{FF2B5EF4-FFF2-40B4-BE49-F238E27FC236}">
+                <a16:creationId xmlns:a16="http://schemas.microsoft.com/office/drawing/2014/main" id="{460E587E-3A1B-3EA8-BF57-0EA0A32DB5DD}"/>
+              </a:ext>
+            </a:extLst>
+          </p:cNvPr>
+          <p:cNvSpPr txBox="1"/>
+          <p:nvPr/>
+        </p:nvSpPr>
+        <p:spPr>
+          <a:xfrm>
+            <a:off x="2693943" y="3602050"/>
+            <a:ext cx="946045" cy="246221"/>
+          </a:xfrm>
+          <a:prstGeom prst="rect">
+            <a:avLst/>
+          </a:prstGeom>
+          <a:noFill/>
+        </p:spPr>
+        <p:txBody>
+          <a:bodyPr wrap="square">
+            <a:spAutoFit/>
+          </a:bodyPr>
+          <a:lstStyle/>
+          <a:p>
+            <a:r>
+              <a:rPr lang="en-US" sz="1000" b="1" dirty="0"/>
+              <a:t>10.107.107.5</a:t>
+            </a:r>
+            <a:endParaRPr lang="en-SG" sz="1000" b="1" dirty="0"/>
+          </a:p>
+        </p:txBody>
+      </p:sp>
+      <p:pic>
+        <p:nvPicPr>
+          <p:cNvPr id="30" name="Picture 29">
+            <a:extLst>
+              <a:ext uri="{FF2B5EF4-FFF2-40B4-BE49-F238E27FC236}">
+                <a16:creationId xmlns:a16="http://schemas.microsoft.com/office/drawing/2014/main" id="{9920E8D8-6E46-81B6-DC61-213998398D2E}"/>
+              </a:ext>
+            </a:extLst>
+          </p:cNvPr>
+          <p:cNvPicPr>
+            <a:picLocks noChangeAspect="1"/>
+          </p:cNvPicPr>
+          <p:nvPr/>
+        </p:nvPicPr>
+        <p:blipFill>
+          <a:blip r:embed="rId4"/>
+          <a:stretch>
+            <a:fillRect/>
+          </a:stretch>
+        </p:blipFill>
+        <p:spPr>
+          <a:xfrm>
+            <a:off x="3710242" y="2936482"/>
+            <a:ext cx="531176" cy="467941"/>
+          </a:xfrm>
+          <a:prstGeom prst="rect">
+            <a:avLst/>
+          </a:prstGeom>
+        </p:spPr>
+      </p:pic>
+      <p:cxnSp>
+        <p:nvCxnSpPr>
+          <p:cNvPr id="31" name="Straight Connector 30">
+            <a:extLst>
+              <a:ext uri="{FF2B5EF4-FFF2-40B4-BE49-F238E27FC236}">
+                <a16:creationId xmlns:a16="http://schemas.microsoft.com/office/drawing/2014/main" id="{59F787A2-57CE-24A4-91AA-174CF491F454}"/>
+              </a:ext>
+            </a:extLst>
+          </p:cNvPr>
+          <p:cNvCxnSpPr>
+            <a:cxnSpLocks/>
+            <a:stCxn id="30" idx="2"/>
+            <a:endCxn id="23" idx="0"/>
+          </p:cNvCxnSpPr>
+          <p:nvPr/>
+        </p:nvCxnSpPr>
+        <p:spPr>
+          <a:xfrm>
+            <a:off x="3975830" y="3404423"/>
+            <a:ext cx="17891" cy="421076"/>
+          </a:xfrm>
+          <a:prstGeom prst="line">
+            <a:avLst/>
+          </a:prstGeom>
+          <a:ln w="19050"/>
+        </p:spPr>
+        <p:style>
+          <a:lnRef idx="1">
+            <a:schemeClr val="accent1"/>
+          </a:lnRef>
+          <a:fillRef idx="0">
+            <a:schemeClr val="accent1"/>
+          </a:fillRef>
+          <a:effectRef idx="0">
+            <a:schemeClr val="accent1"/>
+          </a:effectRef>
+          <a:fontRef idx="minor">
+            <a:schemeClr val="tx1"/>
+          </a:fontRef>
+        </p:style>
+      </p:cxnSp>
+      <p:sp>
+        <p:nvSpPr>
+          <p:cNvPr id="33" name="TextBox 32">
+            <a:extLst>
+              <a:ext uri="{FF2B5EF4-FFF2-40B4-BE49-F238E27FC236}">
+                <a16:creationId xmlns:a16="http://schemas.microsoft.com/office/drawing/2014/main" id="{06A5D07C-48AF-5A35-F5D9-06B6FCE53498}"/>
+              </a:ext>
+            </a:extLst>
+          </p:cNvPr>
+          <p:cNvSpPr txBox="1"/>
+          <p:nvPr/>
+        </p:nvSpPr>
+        <p:spPr>
+          <a:xfrm>
+            <a:off x="9748247" y="2068997"/>
+            <a:ext cx="1563134" cy="461665"/>
+          </a:xfrm>
+          <a:prstGeom prst="rect">
+            <a:avLst/>
+          </a:prstGeom>
+          <a:noFill/>
+        </p:spPr>
+        <p:txBody>
+          <a:bodyPr wrap="square">
+            <a:spAutoFit/>
+          </a:bodyPr>
+          <a:lstStyle/>
+          <a:p>
+            <a:r>
+              <a:rPr lang="en-US" sz="1200" dirty="0">
+                <a:solidFill>
+                  <a:schemeClr val="tx1">
+                    <a:lumMod val="75000"/>
+                    <a:lumOff val="25000"/>
+                  </a:schemeClr>
+                </a:solidFill>
+              </a:rPr>
+              <a:t>Production network [PLC mode bus]</a:t>
+            </a:r>
+            <a:endParaRPr lang="en-SG" sz="1200" dirty="0">
+              <a:solidFill>
+                <a:schemeClr val="tx1">
+                  <a:lumMod val="75000"/>
+                  <a:lumOff val="25000"/>
+                </a:schemeClr>
+              </a:solidFill>
+            </a:endParaRPr>
+          </a:p>
+        </p:txBody>
+      </p:sp>
+      <p:sp>
+        <p:nvSpPr>
+          <p:cNvPr id="34" name="TextBox 33">
+            <a:extLst>
+              <a:ext uri="{FF2B5EF4-FFF2-40B4-BE49-F238E27FC236}">
+                <a16:creationId xmlns:a16="http://schemas.microsoft.com/office/drawing/2014/main" id="{B09DD7BF-8492-BD6F-0237-B6410FC0429C}"/>
+              </a:ext>
+            </a:extLst>
+          </p:cNvPr>
+          <p:cNvSpPr txBox="1"/>
+          <p:nvPr/>
+        </p:nvSpPr>
+        <p:spPr>
+          <a:xfrm>
+            <a:off x="9257221" y="3431948"/>
+            <a:ext cx="1645544" cy="400110"/>
+          </a:xfrm>
+          <a:prstGeom prst="rect">
+            <a:avLst/>
+          </a:prstGeom>
+          <a:noFill/>
+        </p:spPr>
+        <p:txBody>
+          <a:bodyPr wrap="square">
+            <a:spAutoFit/>
+          </a:bodyPr>
+          <a:lstStyle/>
+          <a:p>
+            <a:r>
+              <a:rPr lang="en-US" sz="1000" b="1" dirty="0">
+                <a:solidFill>
+                  <a:schemeClr val="tx1">
+                    <a:lumMod val="75000"/>
+                    <a:lumOff val="25000"/>
+                  </a:schemeClr>
+                </a:solidFill>
+              </a:rPr>
+              <a:t>VM_ID</a:t>
+            </a:r>
+            <a:r>
+              <a:rPr lang="en-US" sz="1000" dirty="0">
+                <a:solidFill>
+                  <a:schemeClr val="tx1">
+                    <a:lumMod val="75000"/>
+                    <a:lumOff val="25000"/>
+                  </a:schemeClr>
+                </a:solidFill>
+              </a:rPr>
+              <a:t>: : OT-Eng-WS2</a:t>
+            </a:r>
+          </a:p>
+          <a:p>
+            <a:r>
+              <a:rPr lang="en-US" sz="1000" b="1" dirty="0">
+                <a:solidFill>
+                  <a:schemeClr val="tx1">
+                    <a:lumMod val="75000"/>
+                    <a:lumOff val="25000"/>
+                  </a:schemeClr>
+                </a:solidFill>
+              </a:rPr>
+              <a:t>State</a:t>
+            </a:r>
+            <a:r>
+              <a:rPr lang="en-US" sz="1000" dirty="0">
+                <a:solidFill>
+                  <a:schemeClr val="tx1">
+                    <a:lumMod val="75000"/>
+                    <a:lumOff val="25000"/>
+                  </a:schemeClr>
+                </a:solidFill>
+              </a:rPr>
+              <a:t>: </a:t>
+            </a:r>
+            <a:r>
+              <a:rPr lang="en-US" sz="1000" b="1" dirty="0">
+                <a:solidFill>
+                  <a:srgbClr val="00B050"/>
+                </a:solidFill>
+              </a:rPr>
+              <a:t>ready</a:t>
+            </a:r>
+            <a:endParaRPr lang="en-SG" sz="1000" b="1" dirty="0">
+              <a:solidFill>
+                <a:srgbClr val="00B050"/>
+              </a:solidFill>
+            </a:endParaRPr>
+          </a:p>
+        </p:txBody>
+      </p:sp>
+      <p:sp>
+        <p:nvSpPr>
+          <p:cNvPr id="35" name="TextBox 34">
+            <a:extLst>
+              <a:ext uri="{FF2B5EF4-FFF2-40B4-BE49-F238E27FC236}">
+                <a16:creationId xmlns:a16="http://schemas.microsoft.com/office/drawing/2014/main" id="{CCBACFD4-7F38-AE5C-99C8-59E140A0344E}"/>
+              </a:ext>
+            </a:extLst>
+          </p:cNvPr>
+          <p:cNvSpPr txBox="1"/>
+          <p:nvPr/>
+        </p:nvSpPr>
+        <p:spPr>
+          <a:xfrm>
+            <a:off x="10148776" y="2708229"/>
+            <a:ext cx="1241626" cy="553998"/>
+          </a:xfrm>
+          <a:prstGeom prst="rect">
+            <a:avLst/>
+          </a:prstGeom>
+          <a:noFill/>
+        </p:spPr>
+        <p:txBody>
+          <a:bodyPr wrap="square">
+            <a:spAutoFit/>
+          </a:bodyPr>
+          <a:lstStyle/>
+          <a:p>
+            <a:r>
+              <a:rPr lang="en-US" sz="1000" b="1" dirty="0">
+                <a:solidFill>
+                  <a:schemeClr val="tx1">
+                    <a:lumMod val="75000"/>
+                    <a:lumOff val="25000"/>
+                  </a:schemeClr>
+                </a:solidFill>
+              </a:rPr>
+              <a:t>VM_ID</a:t>
+            </a:r>
+            <a:r>
+              <a:rPr lang="en-US" sz="1000" dirty="0">
+                <a:solidFill>
+                  <a:schemeClr val="tx1">
+                    <a:lumMod val="75000"/>
+                    <a:lumOff val="25000"/>
+                  </a:schemeClr>
+                </a:solidFill>
+              </a:rPr>
+              <a:t>:rail-ed-plc03</a:t>
+            </a:r>
+          </a:p>
+          <a:p>
+            <a:r>
+              <a:rPr lang="en-US" sz="1000" b="1" dirty="0" err="1">
+                <a:solidFill>
+                  <a:schemeClr val="tx1">
+                    <a:lumMod val="75000"/>
+                    <a:lumOff val="25000"/>
+                  </a:schemeClr>
+                </a:solidFill>
+              </a:rPr>
+              <a:t>Func</a:t>
+            </a:r>
+            <a:r>
+              <a:rPr lang="en-US" sz="1000" dirty="0">
+                <a:solidFill>
+                  <a:schemeClr val="tx1">
+                    <a:lumMod val="75000"/>
+                    <a:lumOff val="25000"/>
+                  </a:schemeClr>
+                </a:solidFill>
+              </a:rPr>
+              <a:t>: Train Plc set</a:t>
+            </a:r>
+          </a:p>
+          <a:p>
+            <a:r>
+              <a:rPr lang="en-US" sz="1000" b="1" dirty="0">
+                <a:solidFill>
+                  <a:schemeClr val="tx1">
+                    <a:lumMod val="75000"/>
+                    <a:lumOff val="25000"/>
+                  </a:schemeClr>
+                </a:solidFill>
+              </a:rPr>
+              <a:t>State</a:t>
+            </a:r>
+            <a:r>
+              <a:rPr lang="en-US" sz="1000" dirty="0">
+                <a:solidFill>
+                  <a:schemeClr val="tx1">
+                    <a:lumMod val="75000"/>
+                    <a:lumOff val="25000"/>
+                  </a:schemeClr>
+                </a:solidFill>
+              </a:rPr>
+              <a:t>: </a:t>
+            </a:r>
+            <a:r>
+              <a:rPr lang="en-US" sz="1000" b="1" dirty="0">
+                <a:solidFill>
+                  <a:srgbClr val="00B050"/>
+                </a:solidFill>
+              </a:rPr>
+              <a:t>ready</a:t>
+            </a:r>
+            <a:endParaRPr lang="en-SG" sz="1000" b="1" dirty="0">
+              <a:solidFill>
+                <a:srgbClr val="00B050"/>
+              </a:solidFill>
+            </a:endParaRPr>
+          </a:p>
+        </p:txBody>
+      </p:sp>
+      <p:pic>
+        <p:nvPicPr>
+          <p:cNvPr id="36" name="Picture 35">
+            <a:extLst>
+              <a:ext uri="{FF2B5EF4-FFF2-40B4-BE49-F238E27FC236}">
+                <a16:creationId xmlns:a16="http://schemas.microsoft.com/office/drawing/2014/main" id="{CAE37FE5-1800-7891-90E2-0590196B4BA4}"/>
+              </a:ext>
+            </a:extLst>
+          </p:cNvPr>
+          <p:cNvPicPr>
+            <a:picLocks noChangeAspect="1"/>
+          </p:cNvPicPr>
+          <p:nvPr/>
+        </p:nvPicPr>
+        <p:blipFill>
+          <a:blip r:embed="rId6"/>
+          <a:stretch>
+            <a:fillRect/>
+          </a:stretch>
+        </p:blipFill>
+        <p:spPr>
+          <a:xfrm>
+            <a:off x="9984163" y="3045258"/>
+            <a:ext cx="187634" cy="191125"/>
+          </a:xfrm>
+          <a:prstGeom prst="rect">
+            <a:avLst/>
+          </a:prstGeom>
+          <a:ln w="6350">
+            <a:solidFill>
+              <a:schemeClr val="tx1"/>
+            </a:solidFill>
+          </a:ln>
+        </p:spPr>
+      </p:pic>
+      <p:pic>
+        <p:nvPicPr>
+          <p:cNvPr id="37" name="Picture 36">
+            <a:extLst>
+              <a:ext uri="{FF2B5EF4-FFF2-40B4-BE49-F238E27FC236}">
+                <a16:creationId xmlns:a16="http://schemas.microsoft.com/office/drawing/2014/main" id="{9A7EC3FB-A21C-7BF7-EFEB-EF4CFDC9BDA7}"/>
+              </a:ext>
+            </a:extLst>
+          </p:cNvPr>
+          <p:cNvPicPr>
+            <a:picLocks noChangeAspect="1"/>
+          </p:cNvPicPr>
+          <p:nvPr/>
+        </p:nvPicPr>
+        <p:blipFill>
+          <a:blip r:embed="rId6"/>
+          <a:stretch>
+            <a:fillRect/>
+          </a:stretch>
+        </p:blipFill>
+        <p:spPr>
+          <a:xfrm>
+            <a:off x="2475822" y="4337897"/>
+            <a:ext cx="187634" cy="191125"/>
+          </a:xfrm>
+          <a:prstGeom prst="rect">
+            <a:avLst/>
+          </a:prstGeom>
+          <a:ln w="6350">
+            <a:solidFill>
+              <a:schemeClr val="tx1"/>
+            </a:solidFill>
+          </a:ln>
+        </p:spPr>
+      </p:pic>
+      <p:sp>
+        <p:nvSpPr>
+          <p:cNvPr id="38" name="TextBox 37">
+            <a:extLst>
+              <a:ext uri="{FF2B5EF4-FFF2-40B4-BE49-F238E27FC236}">
+                <a16:creationId xmlns:a16="http://schemas.microsoft.com/office/drawing/2014/main" id="{C8D2F544-4B3A-CCC0-FC01-F5E41A7AF78D}"/>
+              </a:ext>
+            </a:extLst>
+          </p:cNvPr>
+          <p:cNvSpPr txBox="1"/>
+          <p:nvPr/>
+        </p:nvSpPr>
+        <p:spPr>
+          <a:xfrm>
+            <a:off x="2636745" y="4152389"/>
+            <a:ext cx="2178074" cy="553998"/>
+          </a:xfrm>
+          <a:prstGeom prst="rect">
+            <a:avLst/>
+          </a:prstGeom>
+          <a:noFill/>
+        </p:spPr>
+        <p:txBody>
+          <a:bodyPr wrap="square">
+            <a:spAutoFit/>
+          </a:bodyPr>
+          <a:lstStyle/>
+          <a:p>
+            <a:r>
+              <a:rPr lang="en-US" sz="1000" b="1" dirty="0">
+                <a:solidFill>
+                  <a:schemeClr val="tx1">
+                    <a:lumMod val="75000"/>
+                    <a:lumOff val="25000"/>
+                  </a:schemeClr>
+                </a:solidFill>
+              </a:rPr>
+              <a:t>VM_ID</a:t>
+            </a:r>
+            <a:r>
+              <a:rPr lang="en-US" sz="1000" dirty="0">
+                <a:solidFill>
+                  <a:schemeClr val="tx1">
+                    <a:lumMod val="75000"/>
+                    <a:lumOff val="25000"/>
+                  </a:schemeClr>
+                </a:solidFill>
+              </a:rPr>
+              <a:t>: railway-op-</a:t>
+            </a:r>
+            <a:r>
+              <a:rPr lang="en-US" sz="1000" dirty="0" err="1">
+                <a:solidFill>
+                  <a:schemeClr val="tx1">
+                    <a:lumMod val="75000"/>
+                    <a:lumOff val="25000"/>
+                  </a:schemeClr>
+                </a:solidFill>
+              </a:rPr>
+              <a:t>trainhmi</a:t>
+            </a:r>
+            <a:endParaRPr lang="en-US" sz="1000" dirty="0">
+              <a:solidFill>
+                <a:schemeClr val="tx1">
+                  <a:lumMod val="75000"/>
+                  <a:lumOff val="25000"/>
+                </a:schemeClr>
+              </a:solidFill>
+            </a:endParaRPr>
+          </a:p>
+          <a:p>
+            <a:r>
+              <a:rPr lang="en-US" sz="1000" b="1" dirty="0" err="1">
+                <a:solidFill>
+                  <a:schemeClr val="tx1">
+                    <a:lumMod val="75000"/>
+                    <a:lumOff val="25000"/>
+                  </a:schemeClr>
+                </a:solidFill>
+              </a:rPr>
+              <a:t>Func</a:t>
+            </a:r>
+            <a:r>
+              <a:rPr lang="en-US" sz="1000" dirty="0">
+                <a:solidFill>
+                  <a:schemeClr val="tx1">
+                    <a:lumMod val="75000"/>
+                    <a:lumOff val="25000"/>
+                  </a:schemeClr>
+                </a:solidFill>
+              </a:rPr>
+              <a:t>: Trains drivers HMI</a:t>
+            </a:r>
+          </a:p>
+          <a:p>
+            <a:r>
+              <a:rPr lang="en-US" sz="1000" b="1" dirty="0">
+                <a:solidFill>
+                  <a:schemeClr val="tx1">
+                    <a:lumMod val="75000"/>
+                    <a:lumOff val="25000"/>
+                  </a:schemeClr>
+                </a:solidFill>
+              </a:rPr>
+              <a:t>State</a:t>
+            </a:r>
+            <a:r>
+              <a:rPr lang="en-US" sz="1000" dirty="0">
+                <a:solidFill>
+                  <a:schemeClr val="tx1">
+                    <a:lumMod val="75000"/>
+                    <a:lumOff val="25000"/>
+                  </a:schemeClr>
+                </a:solidFill>
+              </a:rPr>
+              <a:t>: </a:t>
+            </a:r>
+            <a:r>
+              <a:rPr lang="en-US" sz="1000" b="1" dirty="0">
+                <a:solidFill>
+                  <a:srgbClr val="00B050"/>
+                </a:solidFill>
+              </a:rPr>
+              <a:t>ready</a:t>
+            </a:r>
+            <a:endParaRPr lang="en-SG" sz="1000" b="1" dirty="0">
+              <a:solidFill>
+                <a:srgbClr val="00B050"/>
+              </a:solidFill>
+            </a:endParaRPr>
+          </a:p>
+        </p:txBody>
+      </p:sp>
+      <p:pic>
+        <p:nvPicPr>
+          <p:cNvPr id="39" name="Picture 38">
+            <a:extLst>
+              <a:ext uri="{FF2B5EF4-FFF2-40B4-BE49-F238E27FC236}">
+                <a16:creationId xmlns:a16="http://schemas.microsoft.com/office/drawing/2014/main" id="{CDB41143-FFB4-1594-DF0F-09A0AB97CC64}"/>
+              </a:ext>
+            </a:extLst>
+          </p:cNvPr>
+          <p:cNvPicPr>
+            <a:picLocks noChangeAspect="1"/>
+          </p:cNvPicPr>
+          <p:nvPr/>
+        </p:nvPicPr>
+        <p:blipFill>
+          <a:blip r:embed="rId7"/>
+          <a:stretch>
+            <a:fillRect/>
+          </a:stretch>
+        </p:blipFill>
+        <p:spPr>
+          <a:xfrm>
+            <a:off x="9467203" y="2871964"/>
+            <a:ext cx="297869" cy="175743"/>
+          </a:xfrm>
+          <a:prstGeom prst="rect">
+            <a:avLst/>
+          </a:prstGeom>
+          <a:ln>
+            <a:solidFill>
+              <a:schemeClr val="tx1">
+                <a:lumMod val="75000"/>
+                <a:lumOff val="25000"/>
+              </a:schemeClr>
+            </a:solidFill>
+          </a:ln>
+        </p:spPr>
+      </p:pic>
+      <p:sp>
+        <p:nvSpPr>
+          <p:cNvPr id="40" name="TextBox 39">
+            <a:extLst>
+              <a:ext uri="{FF2B5EF4-FFF2-40B4-BE49-F238E27FC236}">
+                <a16:creationId xmlns:a16="http://schemas.microsoft.com/office/drawing/2014/main" id="{668FE1AB-6208-6261-8F8F-A57FF2C9BE65}"/>
+              </a:ext>
+            </a:extLst>
+          </p:cNvPr>
+          <p:cNvSpPr txBox="1"/>
+          <p:nvPr/>
+        </p:nvSpPr>
+        <p:spPr>
+          <a:xfrm>
+            <a:off x="3472079" y="2702194"/>
+            <a:ext cx="1079631" cy="276999"/>
+          </a:xfrm>
+          <a:prstGeom prst="rect">
+            <a:avLst/>
+          </a:prstGeom>
+          <a:noFill/>
+        </p:spPr>
+        <p:txBody>
+          <a:bodyPr wrap="square">
+            <a:spAutoFit/>
+          </a:bodyPr>
+          <a:lstStyle/>
+          <a:p>
+            <a:r>
+              <a:rPr lang="en-SG" sz="1200" b="1" dirty="0">
+                <a:solidFill>
+                  <a:srgbClr val="FF0000"/>
+                </a:solidFill>
+              </a:rPr>
+              <a:t>victim vm1 </a:t>
+            </a:r>
+          </a:p>
+        </p:txBody>
+      </p:sp>
+      <p:sp>
+        <p:nvSpPr>
+          <p:cNvPr id="41" name="TextBox 40">
+            <a:extLst>
+              <a:ext uri="{FF2B5EF4-FFF2-40B4-BE49-F238E27FC236}">
+                <a16:creationId xmlns:a16="http://schemas.microsoft.com/office/drawing/2014/main" id="{90FB83C0-4BC7-C2C0-9E57-AB11090353F3}"/>
+              </a:ext>
+            </a:extLst>
+          </p:cNvPr>
+          <p:cNvSpPr txBox="1"/>
+          <p:nvPr/>
+        </p:nvSpPr>
+        <p:spPr>
+          <a:xfrm>
+            <a:off x="7600052" y="4420811"/>
+            <a:ext cx="1079631" cy="276999"/>
+          </a:xfrm>
+          <a:prstGeom prst="rect">
+            <a:avLst/>
+          </a:prstGeom>
+          <a:noFill/>
+        </p:spPr>
+        <p:txBody>
+          <a:bodyPr wrap="square">
+            <a:spAutoFit/>
+          </a:bodyPr>
+          <a:lstStyle/>
+          <a:p>
+            <a:r>
+              <a:rPr lang="en-SG" sz="1200" b="1" dirty="0">
+                <a:solidFill>
+                  <a:srgbClr val="FF0000"/>
+                </a:solidFill>
+              </a:rPr>
+              <a:t>victim vm2 </a:t>
+            </a:r>
+          </a:p>
+        </p:txBody>
+      </p:sp>
+      <p:sp>
+        <p:nvSpPr>
+          <p:cNvPr id="42" name="TextBox 41">
+            <a:extLst>
+              <a:ext uri="{FF2B5EF4-FFF2-40B4-BE49-F238E27FC236}">
+                <a16:creationId xmlns:a16="http://schemas.microsoft.com/office/drawing/2014/main" id="{1350756A-6989-0D2B-7F8C-6116027860FB}"/>
+              </a:ext>
+            </a:extLst>
+          </p:cNvPr>
+          <p:cNvSpPr txBox="1"/>
+          <p:nvPr/>
+        </p:nvSpPr>
+        <p:spPr>
+          <a:xfrm>
+            <a:off x="8510011" y="3821903"/>
+            <a:ext cx="1079631" cy="276999"/>
+          </a:xfrm>
+          <a:prstGeom prst="rect">
+            <a:avLst/>
+          </a:prstGeom>
+          <a:noFill/>
+        </p:spPr>
+        <p:txBody>
+          <a:bodyPr wrap="square">
+            <a:spAutoFit/>
+          </a:bodyPr>
+          <a:lstStyle/>
+          <a:p>
+            <a:r>
+              <a:rPr lang="en-SG" sz="1200" b="1" dirty="0">
+                <a:solidFill>
+                  <a:srgbClr val="FF0000"/>
+                </a:solidFill>
+              </a:rPr>
+              <a:t>victim vm3</a:t>
+            </a:r>
+          </a:p>
+        </p:txBody>
+      </p:sp>
+      <p:cxnSp>
+        <p:nvCxnSpPr>
+          <p:cNvPr id="43" name="Straight Arrow Connector 42">
+            <a:extLst>
+              <a:ext uri="{FF2B5EF4-FFF2-40B4-BE49-F238E27FC236}">
+                <a16:creationId xmlns:a16="http://schemas.microsoft.com/office/drawing/2014/main" id="{BFC980F0-7FD9-71E1-27C6-A2F4FC921CD6}"/>
+              </a:ext>
+            </a:extLst>
+          </p:cNvPr>
+          <p:cNvCxnSpPr>
+            <a:cxnSpLocks/>
+          </p:cNvCxnSpPr>
+          <p:nvPr/>
+        </p:nvCxnSpPr>
+        <p:spPr>
+          <a:xfrm>
+            <a:off x="2659225" y="3872003"/>
+            <a:ext cx="900817" cy="246358"/>
+          </a:xfrm>
+          <a:prstGeom prst="straightConnector1">
+            <a:avLst/>
+          </a:prstGeom>
+          <a:ln w="28575">
+            <a:solidFill>
+              <a:schemeClr val="accent6">
+                <a:lumMod val="75000"/>
+              </a:schemeClr>
+            </a:solidFill>
+            <a:prstDash val="sysDash"/>
+            <a:headEnd type="triangle"/>
+            <a:tailEnd type="triangle"/>
+          </a:ln>
+        </p:spPr>
+        <p:style>
+          <a:lnRef idx="1">
+            <a:schemeClr val="accent1"/>
+          </a:lnRef>
+          <a:fillRef idx="0">
+            <a:schemeClr val="accent1"/>
+          </a:fillRef>
+          <a:effectRef idx="0">
+            <a:schemeClr val="accent1"/>
+          </a:effectRef>
+          <a:fontRef idx="minor">
+            <a:schemeClr val="tx1"/>
+          </a:fontRef>
+        </p:style>
+      </p:cxnSp>
+      <p:cxnSp>
+        <p:nvCxnSpPr>
+          <p:cNvPr id="44" name="Straight Arrow Connector 43">
+            <a:extLst>
+              <a:ext uri="{FF2B5EF4-FFF2-40B4-BE49-F238E27FC236}">
+                <a16:creationId xmlns:a16="http://schemas.microsoft.com/office/drawing/2014/main" id="{2784B913-1DB4-1CD5-0F74-71617767FC20}"/>
+              </a:ext>
+            </a:extLst>
+          </p:cNvPr>
+          <p:cNvCxnSpPr>
+            <a:cxnSpLocks/>
+          </p:cNvCxnSpPr>
+          <p:nvPr/>
+        </p:nvCxnSpPr>
+        <p:spPr>
+          <a:xfrm flipV="1">
+            <a:off x="4397224" y="3498336"/>
+            <a:ext cx="1000793" cy="672101"/>
+          </a:xfrm>
+          <a:prstGeom prst="straightConnector1">
+            <a:avLst/>
+          </a:prstGeom>
+          <a:ln w="28575">
+            <a:solidFill>
+              <a:schemeClr val="accent6">
+                <a:lumMod val="75000"/>
+              </a:schemeClr>
+            </a:solidFill>
+            <a:prstDash val="sysDash"/>
+            <a:headEnd type="triangle"/>
+            <a:tailEnd type="triangle"/>
+          </a:ln>
+        </p:spPr>
+        <p:style>
+          <a:lnRef idx="1">
+            <a:schemeClr val="accent1"/>
+          </a:lnRef>
+          <a:fillRef idx="0">
+            <a:schemeClr val="accent1"/>
+          </a:fillRef>
+          <a:effectRef idx="0">
+            <a:schemeClr val="accent1"/>
+          </a:effectRef>
+          <a:fontRef idx="minor">
+            <a:schemeClr val="tx1"/>
+          </a:fontRef>
+        </p:style>
+      </p:cxnSp>
+      <p:cxnSp>
+        <p:nvCxnSpPr>
+          <p:cNvPr id="45" name="Straight Arrow Connector 44">
+            <a:extLst>
+              <a:ext uri="{FF2B5EF4-FFF2-40B4-BE49-F238E27FC236}">
+                <a16:creationId xmlns:a16="http://schemas.microsoft.com/office/drawing/2014/main" id="{9E9A45B0-71F7-35F3-FEF6-2C9C02E88305}"/>
+              </a:ext>
+            </a:extLst>
+          </p:cNvPr>
+          <p:cNvCxnSpPr>
+            <a:cxnSpLocks/>
+          </p:cNvCxnSpPr>
+          <p:nvPr/>
+        </p:nvCxnSpPr>
+        <p:spPr>
+          <a:xfrm flipV="1">
+            <a:off x="6506708" y="2515749"/>
+            <a:ext cx="869199" cy="853740"/>
+          </a:xfrm>
+          <a:prstGeom prst="straightConnector1">
+            <a:avLst/>
+          </a:prstGeom>
+          <a:ln w="28575">
+            <a:solidFill>
+              <a:schemeClr val="accent6">
+                <a:lumMod val="75000"/>
+              </a:schemeClr>
+            </a:solidFill>
+            <a:prstDash val="sysDash"/>
+            <a:headEnd type="triangle"/>
+            <a:tailEnd type="triangle"/>
+          </a:ln>
+        </p:spPr>
+        <p:style>
+          <a:lnRef idx="1">
+            <a:schemeClr val="accent1"/>
+          </a:lnRef>
+          <a:fillRef idx="0">
+            <a:schemeClr val="accent1"/>
+          </a:fillRef>
+          <a:effectRef idx="0">
+            <a:schemeClr val="accent1"/>
+          </a:effectRef>
+          <a:fontRef idx="minor">
+            <a:schemeClr val="tx1"/>
+          </a:fontRef>
+        </p:style>
+      </p:cxnSp>
+      <p:cxnSp>
+        <p:nvCxnSpPr>
+          <p:cNvPr id="46" name="Straight Arrow Connector 45">
+            <a:extLst>
+              <a:ext uri="{FF2B5EF4-FFF2-40B4-BE49-F238E27FC236}">
+                <a16:creationId xmlns:a16="http://schemas.microsoft.com/office/drawing/2014/main" id="{90B54141-54A2-CA70-640F-93D36FF2C6EB}"/>
+              </a:ext>
+            </a:extLst>
+          </p:cNvPr>
+          <p:cNvCxnSpPr>
+            <a:cxnSpLocks/>
+          </p:cNvCxnSpPr>
+          <p:nvPr/>
+        </p:nvCxnSpPr>
+        <p:spPr>
+          <a:xfrm>
+            <a:off x="8090655" y="2387529"/>
+            <a:ext cx="1473011" cy="194190"/>
+          </a:xfrm>
+          <a:prstGeom prst="straightConnector1">
+            <a:avLst/>
+          </a:prstGeom>
+          <a:ln w="28575">
+            <a:solidFill>
+              <a:schemeClr val="accent6">
+                <a:lumMod val="75000"/>
+              </a:schemeClr>
+            </a:solidFill>
+            <a:prstDash val="sysDash"/>
+            <a:headEnd type="triangle"/>
+            <a:tailEnd type="triangle"/>
+          </a:ln>
+        </p:spPr>
+        <p:style>
+          <a:lnRef idx="1">
+            <a:schemeClr val="accent1"/>
+          </a:lnRef>
+          <a:fillRef idx="0">
+            <a:schemeClr val="accent1"/>
+          </a:fillRef>
+          <a:effectRef idx="0">
+            <a:schemeClr val="accent1"/>
+          </a:effectRef>
+          <a:fontRef idx="minor">
+            <a:schemeClr val="tx1"/>
+          </a:fontRef>
+        </p:style>
+      </p:cxnSp>
+      <p:pic>
+        <p:nvPicPr>
+          <p:cNvPr id="49" name="Picture 48">
+            <a:extLst>
+              <a:ext uri="{FF2B5EF4-FFF2-40B4-BE49-F238E27FC236}">
+                <a16:creationId xmlns:a16="http://schemas.microsoft.com/office/drawing/2014/main" id="{AE7AD3EA-7BFA-6DF2-CB38-C267622DA19C}"/>
+              </a:ext>
+            </a:extLst>
+          </p:cNvPr>
+          <p:cNvPicPr>
+            <a:picLocks noChangeAspect="1"/>
+          </p:cNvPicPr>
+          <p:nvPr/>
+        </p:nvPicPr>
+        <p:blipFill>
+          <a:blip r:embed="rId8"/>
+          <a:stretch>
+            <a:fillRect/>
+          </a:stretch>
+        </p:blipFill>
+        <p:spPr>
+          <a:xfrm>
+            <a:off x="4040352" y="3017602"/>
+            <a:ext cx="356212" cy="249348"/>
+          </a:xfrm>
+          <a:prstGeom prst="rect">
+            <a:avLst/>
+          </a:prstGeom>
+        </p:spPr>
+      </p:pic>
+      <p:pic>
+        <p:nvPicPr>
+          <p:cNvPr id="50" name="Picture 49">
+            <a:extLst>
+              <a:ext uri="{FF2B5EF4-FFF2-40B4-BE49-F238E27FC236}">
+                <a16:creationId xmlns:a16="http://schemas.microsoft.com/office/drawing/2014/main" id="{18C60625-5245-C68E-9B1A-D2C551029F15}"/>
+              </a:ext>
+            </a:extLst>
+          </p:cNvPr>
+          <p:cNvPicPr>
+            <a:picLocks noChangeAspect="1"/>
+          </p:cNvPicPr>
+          <p:nvPr/>
+        </p:nvPicPr>
+        <p:blipFill>
+          <a:blip r:embed="rId8"/>
+          <a:stretch>
+            <a:fillRect/>
+          </a:stretch>
+        </p:blipFill>
+        <p:spPr>
+          <a:xfrm>
+            <a:off x="7590951" y="4001807"/>
+            <a:ext cx="356212" cy="249348"/>
+          </a:xfrm>
+          <a:prstGeom prst="rect">
+            <a:avLst/>
+          </a:prstGeom>
+        </p:spPr>
+      </p:pic>
+      <p:pic>
+        <p:nvPicPr>
+          <p:cNvPr id="51" name="Picture 50">
+            <a:extLst>
+              <a:ext uri="{FF2B5EF4-FFF2-40B4-BE49-F238E27FC236}">
+                <a16:creationId xmlns:a16="http://schemas.microsoft.com/office/drawing/2014/main" id="{5960BB2E-FB3D-7B08-8293-830D0468F4E7}"/>
+              </a:ext>
+            </a:extLst>
+          </p:cNvPr>
+          <p:cNvPicPr>
+            <a:picLocks noChangeAspect="1"/>
+          </p:cNvPicPr>
+          <p:nvPr/>
+        </p:nvPicPr>
+        <p:blipFill>
+          <a:blip r:embed="rId8"/>
+          <a:stretch>
+            <a:fillRect/>
+          </a:stretch>
+        </p:blipFill>
+        <p:spPr>
+          <a:xfrm>
+            <a:off x="8566279" y="3486299"/>
+            <a:ext cx="356212" cy="249348"/>
+          </a:xfrm>
+          <a:prstGeom prst="rect">
+            <a:avLst/>
+          </a:prstGeom>
+        </p:spPr>
+      </p:pic>
+      <p:sp>
+        <p:nvSpPr>
+          <p:cNvPr id="52" name="TextBox 51">
+            <a:extLst>
+              <a:ext uri="{FF2B5EF4-FFF2-40B4-BE49-F238E27FC236}">
+                <a16:creationId xmlns:a16="http://schemas.microsoft.com/office/drawing/2014/main" id="{2B8C748A-73BC-9FD4-0C18-82F5BB17C6AD}"/>
+              </a:ext>
+            </a:extLst>
+          </p:cNvPr>
+          <p:cNvSpPr txBox="1"/>
+          <p:nvPr/>
+        </p:nvSpPr>
+        <p:spPr>
+          <a:xfrm>
+            <a:off x="10025890" y="2498097"/>
+            <a:ext cx="1359988" cy="276999"/>
+          </a:xfrm>
+          <a:prstGeom prst="rect">
+            <a:avLst/>
+          </a:prstGeom>
+          <a:noFill/>
+        </p:spPr>
+        <p:txBody>
+          <a:bodyPr wrap="square">
+            <a:spAutoFit/>
+          </a:bodyPr>
+          <a:lstStyle/>
+          <a:p>
+            <a:r>
+              <a:rPr lang="en-SG" sz="1200" b="1" dirty="0">
+                <a:solidFill>
+                  <a:srgbClr val="FF0000"/>
+                </a:solidFill>
+              </a:rPr>
+              <a:t>Attack target VM</a:t>
+            </a:r>
+          </a:p>
+        </p:txBody>
+      </p:sp>
+      <p:cxnSp>
+        <p:nvCxnSpPr>
+          <p:cNvPr id="53" name="Straight Arrow Connector 52">
+            <a:extLst>
+              <a:ext uri="{FF2B5EF4-FFF2-40B4-BE49-F238E27FC236}">
+                <a16:creationId xmlns:a16="http://schemas.microsoft.com/office/drawing/2014/main" id="{4A67C028-1D2B-309F-08E8-57F6D31A4DF9}"/>
+              </a:ext>
+            </a:extLst>
+          </p:cNvPr>
+          <p:cNvCxnSpPr>
+            <a:cxnSpLocks/>
+          </p:cNvCxnSpPr>
+          <p:nvPr/>
+        </p:nvCxnSpPr>
+        <p:spPr>
+          <a:xfrm>
+            <a:off x="4073165" y="3428671"/>
+            <a:ext cx="0" cy="324760"/>
           </a:xfrm>
           <a:prstGeom prst="straightConnector1">
             <a:avLst/>
@@ -22720,12 +25162,238 @@
           </a:fontRef>
         </p:style>
       </p:cxnSp>
-      <p:sp>
-        <p:nvSpPr>
-          <p:cNvPr id="17" name="TextBox 16">
-            <a:extLst>
-              <a:ext uri="{FF2B5EF4-FFF2-40B4-BE49-F238E27FC236}">
-                <a16:creationId xmlns:a16="http://schemas.microsoft.com/office/drawing/2014/main" id="{3069CBF3-FDA4-7813-A761-87B72F4BCBD5}"/>
+      <p:cxnSp>
+        <p:nvCxnSpPr>
+          <p:cNvPr id="54" name="Straight Arrow Connector 53">
+            <a:extLst>
+              <a:ext uri="{FF2B5EF4-FFF2-40B4-BE49-F238E27FC236}">
+                <a16:creationId xmlns:a16="http://schemas.microsoft.com/office/drawing/2014/main" id="{D1E556FF-15D4-F8E6-58C4-46A435DEF421}"/>
+              </a:ext>
+            </a:extLst>
+          </p:cNvPr>
+          <p:cNvCxnSpPr>
+            <a:cxnSpLocks/>
+          </p:cNvCxnSpPr>
+          <p:nvPr/>
+        </p:nvCxnSpPr>
+        <p:spPr>
+          <a:xfrm flipV="1">
+            <a:off x="4324350" y="3198137"/>
+            <a:ext cx="1032262" cy="687553"/>
+          </a:xfrm>
+          <a:prstGeom prst="straightConnector1">
+            <a:avLst/>
+          </a:prstGeom>
+          <a:ln w="28575">
+            <a:solidFill>
+              <a:srgbClr val="FF0000"/>
+            </a:solidFill>
+            <a:prstDash val="sysDash"/>
+            <a:tailEnd type="triangle"/>
+          </a:ln>
+        </p:spPr>
+        <p:style>
+          <a:lnRef idx="1">
+            <a:schemeClr val="accent1"/>
+          </a:lnRef>
+          <a:fillRef idx="0">
+            <a:schemeClr val="accent1"/>
+          </a:fillRef>
+          <a:effectRef idx="0">
+            <a:schemeClr val="accent1"/>
+          </a:effectRef>
+          <a:fontRef idx="minor">
+            <a:schemeClr val="tx1"/>
+          </a:fontRef>
+        </p:style>
+      </p:cxnSp>
+      <p:cxnSp>
+        <p:nvCxnSpPr>
+          <p:cNvPr id="55" name="Straight Arrow Connector 54">
+            <a:extLst>
+              <a:ext uri="{FF2B5EF4-FFF2-40B4-BE49-F238E27FC236}">
+                <a16:creationId xmlns:a16="http://schemas.microsoft.com/office/drawing/2014/main" id="{B1702992-3F47-4380-C006-629D22F334EE}"/>
+              </a:ext>
+            </a:extLst>
+          </p:cNvPr>
+          <p:cNvCxnSpPr>
+            <a:cxnSpLocks/>
+          </p:cNvCxnSpPr>
+          <p:nvPr/>
+        </p:nvCxnSpPr>
+        <p:spPr>
+          <a:xfrm flipV="1">
+            <a:off x="6506708" y="2193585"/>
+            <a:ext cx="748868" cy="729994"/>
+          </a:xfrm>
+          <a:prstGeom prst="straightConnector1">
+            <a:avLst/>
+          </a:prstGeom>
+          <a:ln w="28575">
+            <a:solidFill>
+              <a:srgbClr val="FF0000"/>
+            </a:solidFill>
+            <a:prstDash val="sysDash"/>
+            <a:tailEnd type="triangle"/>
+          </a:ln>
+        </p:spPr>
+        <p:style>
+          <a:lnRef idx="1">
+            <a:schemeClr val="accent1"/>
+          </a:lnRef>
+          <a:fillRef idx="0">
+            <a:schemeClr val="accent1"/>
+          </a:fillRef>
+          <a:effectRef idx="0">
+            <a:schemeClr val="accent1"/>
+          </a:effectRef>
+          <a:fontRef idx="minor">
+            <a:schemeClr val="tx1"/>
+          </a:fontRef>
+        </p:style>
+      </p:cxnSp>
+      <p:cxnSp>
+        <p:nvCxnSpPr>
+          <p:cNvPr id="56" name="Straight Arrow Connector 55">
+            <a:extLst>
+              <a:ext uri="{FF2B5EF4-FFF2-40B4-BE49-F238E27FC236}">
+                <a16:creationId xmlns:a16="http://schemas.microsoft.com/office/drawing/2014/main" id="{C8272C14-9B4C-FF4A-91D9-007DAAD58679}"/>
+              </a:ext>
+            </a:extLst>
+          </p:cNvPr>
+          <p:cNvCxnSpPr>
+            <a:cxnSpLocks/>
+          </p:cNvCxnSpPr>
+          <p:nvPr/>
+        </p:nvCxnSpPr>
+        <p:spPr>
+          <a:xfrm>
+            <a:off x="8115349" y="2613720"/>
+            <a:ext cx="1281879" cy="187672"/>
+          </a:xfrm>
+          <a:prstGeom prst="straightConnector1">
+            <a:avLst/>
+          </a:prstGeom>
+          <a:ln w="28575">
+            <a:solidFill>
+              <a:srgbClr val="FF0000"/>
+            </a:solidFill>
+            <a:prstDash val="sysDash"/>
+            <a:tailEnd type="triangle"/>
+          </a:ln>
+        </p:spPr>
+        <p:style>
+          <a:lnRef idx="1">
+            <a:schemeClr val="accent1"/>
+          </a:lnRef>
+          <a:fillRef idx="0">
+            <a:schemeClr val="accent1"/>
+          </a:fillRef>
+          <a:effectRef idx="0">
+            <a:schemeClr val="accent1"/>
+          </a:effectRef>
+          <a:fontRef idx="minor">
+            <a:schemeClr val="tx1"/>
+          </a:fontRef>
+        </p:style>
+      </p:cxnSp>
+      <p:cxnSp>
+        <p:nvCxnSpPr>
+          <p:cNvPr id="57" name="Straight Arrow Connector 56">
+            <a:extLst>
+              <a:ext uri="{FF2B5EF4-FFF2-40B4-BE49-F238E27FC236}">
+                <a16:creationId xmlns:a16="http://schemas.microsoft.com/office/drawing/2014/main" id="{2F940731-9EFB-2899-F39E-97AB19271209}"/>
+              </a:ext>
+            </a:extLst>
+          </p:cNvPr>
+          <p:cNvCxnSpPr>
+            <a:cxnSpLocks/>
+          </p:cNvCxnSpPr>
+          <p:nvPr/>
+        </p:nvCxnSpPr>
+        <p:spPr>
+          <a:xfrm flipH="1" flipV="1">
+            <a:off x="7623014" y="2564062"/>
+            <a:ext cx="270854" cy="1097973"/>
+          </a:xfrm>
+          <a:prstGeom prst="straightConnector1">
+            <a:avLst/>
+          </a:prstGeom>
+          <a:ln w="28575">
+            <a:solidFill>
+              <a:srgbClr val="FF0000"/>
+            </a:solidFill>
+            <a:prstDash val="sysDash"/>
+            <a:tailEnd type="triangle"/>
+          </a:ln>
+        </p:spPr>
+        <p:style>
+          <a:lnRef idx="1">
+            <a:schemeClr val="accent1"/>
+          </a:lnRef>
+          <a:fillRef idx="0">
+            <a:schemeClr val="accent1"/>
+          </a:fillRef>
+          <a:effectRef idx="0">
+            <a:schemeClr val="accent1"/>
+          </a:effectRef>
+          <a:fontRef idx="minor">
+            <a:schemeClr val="tx1"/>
+          </a:fontRef>
+        </p:style>
+      </p:cxnSp>
+      <p:cxnSp>
+        <p:nvCxnSpPr>
+          <p:cNvPr id="58" name="Straight Arrow Connector 57">
+            <a:extLst>
+              <a:ext uri="{FF2B5EF4-FFF2-40B4-BE49-F238E27FC236}">
+                <a16:creationId xmlns:a16="http://schemas.microsoft.com/office/drawing/2014/main" id="{64883F62-91E2-303C-BEE6-341D28BB4640}"/>
+              </a:ext>
+            </a:extLst>
+          </p:cNvPr>
+          <p:cNvCxnSpPr>
+            <a:cxnSpLocks/>
+            <a:stCxn id="18" idx="1"/>
+          </p:cNvCxnSpPr>
+          <p:nvPr/>
+        </p:nvCxnSpPr>
+        <p:spPr>
+          <a:xfrm flipH="1" flipV="1">
+            <a:off x="7903960" y="2677098"/>
+            <a:ext cx="797671" cy="658288"/>
+          </a:xfrm>
+          <a:prstGeom prst="straightConnector1">
+            <a:avLst/>
+          </a:prstGeom>
+          <a:ln w="28575">
+            <a:solidFill>
+              <a:srgbClr val="FF0000"/>
+            </a:solidFill>
+            <a:prstDash val="sysDash"/>
+            <a:tailEnd type="triangle"/>
+          </a:ln>
+        </p:spPr>
+        <p:style>
+          <a:lnRef idx="1">
+            <a:schemeClr val="accent1"/>
+          </a:lnRef>
+          <a:fillRef idx="0">
+            <a:schemeClr val="accent1"/>
+          </a:fillRef>
+          <a:effectRef idx="0">
+            <a:schemeClr val="accent1"/>
+          </a:effectRef>
+          <a:fontRef idx="minor">
+            <a:schemeClr val="tx1"/>
+          </a:fontRef>
+        </p:style>
+      </p:cxnSp>
+      <p:sp>
+        <p:nvSpPr>
+          <p:cNvPr id="63" name="TextBox 62">
+            <a:extLst>
+              <a:ext uri="{FF2B5EF4-FFF2-40B4-BE49-F238E27FC236}">
+                <a16:creationId xmlns:a16="http://schemas.microsoft.com/office/drawing/2014/main" id="{299160B0-3600-A1C0-4273-6FDA6A31A316}"/>
               </a:ext>
             </a:extLst>
           </p:cNvPr>
@@ -22734,8 +25402,151 @@
         </p:nvSpPr>
         <p:spPr>
           <a:xfrm>
-            <a:off x="8913309" y="558445"/>
-            <a:ext cx="2081725" cy="1569660"/>
+            <a:off x="1" y="-11857"/>
+            <a:ext cx="12191999" cy="461665"/>
+          </a:xfrm>
+          <a:prstGeom prst="rect">
+            <a:avLst/>
+          </a:prstGeom>
+          <a:solidFill>
+            <a:schemeClr val="accent1">
+              <a:lumMod val="75000"/>
+            </a:schemeClr>
+          </a:solidFill>
+          <a:ln>
+            <a:solidFill>
+              <a:schemeClr val="tx1"/>
+            </a:solidFill>
+          </a:ln>
+        </p:spPr>
+        <p:txBody>
+          <a:bodyPr wrap="square" rtlCol="0">
+            <a:spAutoFit/>
+          </a:bodyPr>
+          <a:lstStyle/>
+          <a:p>
+            <a:r>
+              <a:rPr lang="en-US" sz="2400" dirty="0">
+                <a:solidFill>
+                  <a:schemeClr val="bg1"/>
+                </a:solidFill>
+              </a:rPr>
+              <a:t>DDoS Attack on PLC in OT-Network [Attack Scenario Introduction ]</a:t>
+            </a:r>
+            <a:endParaRPr lang="en-SG" sz="2400" dirty="0">
+              <a:solidFill>
+                <a:srgbClr val="FF0000"/>
+              </a:solidFill>
+            </a:endParaRPr>
+          </a:p>
+        </p:txBody>
+      </p:sp>
+      <p:pic>
+        <p:nvPicPr>
+          <p:cNvPr id="64" name="Picture 63" descr="Graphical user interface, text&#10;&#10;Description automatically generated with medium confidence">
+            <a:extLst>
+              <a:ext uri="{FF2B5EF4-FFF2-40B4-BE49-F238E27FC236}">
+                <a16:creationId xmlns:a16="http://schemas.microsoft.com/office/drawing/2014/main" id="{C642922F-7E70-1C76-B33B-D128561EB3EA}"/>
+              </a:ext>
+            </a:extLst>
+          </p:cNvPr>
+          <p:cNvPicPr>
+            <a:picLocks noChangeAspect="1"/>
+          </p:cNvPicPr>
+          <p:nvPr/>
+        </p:nvPicPr>
+        <p:blipFill>
+          <a:blip r:embed="rId9">
+            <a:extLst>
+              <a:ext uri="{28A0092B-C50C-407E-A947-70E740481C1C}">
+                <a14:useLocalDpi xmlns:a14="http://schemas.microsoft.com/office/drawing/2010/main" val="0"/>
+              </a:ext>
+            </a:extLst>
+          </a:blip>
+          <a:stretch>
+            <a:fillRect/>
+          </a:stretch>
+        </p:blipFill>
+        <p:spPr>
+          <a:xfrm>
+            <a:off x="10458746" y="37515"/>
+            <a:ext cx="1598494" cy="348275"/>
+          </a:xfrm>
+          <a:prstGeom prst="rect">
+            <a:avLst/>
+          </a:prstGeom>
+        </p:spPr>
+      </p:pic>
+      <p:sp>
+        <p:nvSpPr>
+          <p:cNvPr id="77" name="Rectangle 76">
+            <a:extLst>
+              <a:ext uri="{FF2B5EF4-FFF2-40B4-BE49-F238E27FC236}">
+                <a16:creationId xmlns:a16="http://schemas.microsoft.com/office/drawing/2014/main" id="{5C6E1AB2-004E-D54E-2038-38C4112674F5}"/>
+              </a:ext>
+            </a:extLst>
+          </p:cNvPr>
+          <p:cNvSpPr/>
+          <p:nvPr/>
+        </p:nvSpPr>
+        <p:spPr>
+          <a:xfrm>
+            <a:off x="140808" y="1689419"/>
+            <a:ext cx="4588978" cy="742199"/>
+          </a:xfrm>
+          <a:prstGeom prst="rect">
+            <a:avLst/>
+          </a:prstGeom>
+          <a:noFill/>
+          <a:ln w="12700" cap="flat" cmpd="sng" algn="ctr">
+            <a:solidFill>
+              <a:schemeClr val="dk1"/>
+            </a:solidFill>
+            <a:prstDash val="dash"/>
+            <a:round/>
+            <a:headEnd type="none" w="med" len="med"/>
+            <a:tailEnd type="none" w="med" len="med"/>
+          </a:ln>
+        </p:spPr>
+        <p:style>
+          <a:lnRef idx="0">
+            <a:scrgbClr r="0" g="0" b="0"/>
+          </a:lnRef>
+          <a:fillRef idx="0">
+            <a:scrgbClr r="0" g="0" b="0"/>
+          </a:fillRef>
+          <a:effectRef idx="0">
+            <a:scrgbClr r="0" g="0" b="0"/>
+          </a:effectRef>
+          <a:fontRef idx="minor">
+            <a:schemeClr val="dk1"/>
+          </a:fontRef>
+        </p:style>
+        <p:txBody>
+          <a:bodyPr rtlCol="0" anchor="ctr"/>
+          <a:lstStyle/>
+          <a:p>
+            <a:pPr algn="ctr"/>
+            <a:endParaRPr lang="en-SG"/>
+          </a:p>
+        </p:txBody>
+      </p:sp>
+      <p:sp>
+        <p:nvSpPr>
+          <p:cNvPr id="78" name="TextBox 77">
+            <a:extLst>
+              <a:ext uri="{FF2B5EF4-FFF2-40B4-BE49-F238E27FC236}">
+                <a16:creationId xmlns:a16="http://schemas.microsoft.com/office/drawing/2014/main" id="{E24E1BE4-899C-8C5D-F939-F839BC8755D7}"/>
+              </a:ext>
+            </a:extLst>
+          </p:cNvPr>
+          <p:cNvSpPr txBox="1"/>
+          <p:nvPr/>
+        </p:nvSpPr>
+        <p:spPr>
+          <a:xfrm>
+            <a:off x="100181" y="1705689"/>
+            <a:ext cx="2942480" cy="276999"/>
           </a:xfrm>
           <a:prstGeom prst="rect">
             <a:avLst/>
@@ -22749,29 +25560,563 @@
           <a:lstStyle/>
           <a:p>
             <a:r>
-              <a:rPr lang="en-US" sz="1600" b="1" i="0" dirty="0">
+              <a:rPr lang="en-US" sz="1200" b="1" dirty="0">
+                <a:solidFill>
+                  <a:schemeClr val="tx1">
+                    <a:lumMod val="75000"/>
+                    <a:lumOff val="25000"/>
+                  </a:schemeClr>
+                </a:solidFill>
+              </a:rPr>
+              <a:t>Railway IT department </a:t>
+            </a:r>
+            <a:endParaRPr lang="en-SG" sz="1200" b="1" dirty="0">
+              <a:solidFill>
+                <a:schemeClr val="tx1">
+                  <a:lumMod val="75000"/>
+                  <a:lumOff val="25000"/>
+                </a:schemeClr>
+              </a:solidFill>
+            </a:endParaRPr>
+          </a:p>
+        </p:txBody>
+      </p:sp>
+      <p:pic>
+        <p:nvPicPr>
+          <p:cNvPr id="79" name="Picture 78">
+            <a:extLst>
+              <a:ext uri="{FF2B5EF4-FFF2-40B4-BE49-F238E27FC236}">
+                <a16:creationId xmlns:a16="http://schemas.microsoft.com/office/drawing/2014/main" id="{9FD7A8FE-058D-EBD0-BB33-F9FAE9F16B4D}"/>
+              </a:ext>
+            </a:extLst>
+          </p:cNvPr>
+          <p:cNvPicPr>
+            <a:picLocks noChangeAspect="1"/>
+          </p:cNvPicPr>
+          <p:nvPr/>
+        </p:nvPicPr>
+        <p:blipFill>
+          <a:blip r:embed="rId4"/>
+          <a:stretch>
+            <a:fillRect/>
+          </a:stretch>
+        </p:blipFill>
+        <p:spPr>
+          <a:xfrm>
+            <a:off x="2374313" y="1853014"/>
+            <a:ext cx="531176" cy="467941"/>
+          </a:xfrm>
+          <a:prstGeom prst="rect">
+            <a:avLst/>
+          </a:prstGeom>
+        </p:spPr>
+      </p:pic>
+      <p:sp>
+        <p:nvSpPr>
+          <p:cNvPr id="80" name="TextBox 79">
+            <a:extLst>
+              <a:ext uri="{FF2B5EF4-FFF2-40B4-BE49-F238E27FC236}">
+                <a16:creationId xmlns:a16="http://schemas.microsoft.com/office/drawing/2014/main" id="{FE8E4B97-27E4-FFD8-C958-2EAE547B83BD}"/>
+              </a:ext>
+            </a:extLst>
+          </p:cNvPr>
+          <p:cNvSpPr txBox="1"/>
+          <p:nvPr/>
+        </p:nvSpPr>
+        <p:spPr>
+          <a:xfrm>
+            <a:off x="1063542" y="2042954"/>
+            <a:ext cx="1079631" cy="276999"/>
+          </a:xfrm>
+          <a:prstGeom prst="rect">
+            <a:avLst/>
+          </a:prstGeom>
+          <a:noFill/>
+        </p:spPr>
+        <p:txBody>
+          <a:bodyPr wrap="square">
+            <a:spAutoFit/>
+          </a:bodyPr>
+          <a:lstStyle/>
+          <a:p>
+            <a:r>
+              <a:rPr lang="en-SG" sz="1200" b="1" dirty="0">
                 <a:solidFill>
                   <a:srgbClr val="FF0000"/>
                 </a:solidFill>
-                <a:effectLst/>
-                <a:latin typeface="Inter"/>
               </a:rPr>
-              <a:t>The Attack need to block the 2 PLC challenge traffic to denial the Sensor and signal control HMI service </a:t>
-            </a:r>
-            <a:endParaRPr lang="en-SG" sz="1600" b="1" i="0" dirty="0">
+              <a:t>victim vm1 </a:t>
+            </a:r>
+          </a:p>
+        </p:txBody>
+      </p:sp>
+      <p:pic>
+        <p:nvPicPr>
+          <p:cNvPr id="81" name="Picture 80">
+            <a:extLst>
+              <a:ext uri="{FF2B5EF4-FFF2-40B4-BE49-F238E27FC236}">
+                <a16:creationId xmlns:a16="http://schemas.microsoft.com/office/drawing/2014/main" id="{C337E7F7-9CBF-728D-7D86-5FC2DCF1752F}"/>
+              </a:ext>
+            </a:extLst>
+          </p:cNvPr>
+          <p:cNvPicPr>
+            <a:picLocks noChangeAspect="1"/>
+          </p:cNvPicPr>
+          <p:nvPr/>
+        </p:nvPicPr>
+        <p:blipFill>
+          <a:blip r:embed="rId8"/>
+          <a:stretch>
+            <a:fillRect/>
+          </a:stretch>
+        </p:blipFill>
+        <p:spPr>
+          <a:xfrm>
+            <a:off x="2639901" y="1964941"/>
+            <a:ext cx="356212" cy="249348"/>
+          </a:xfrm>
+          <a:prstGeom prst="rect">
+            <a:avLst/>
+          </a:prstGeom>
+        </p:spPr>
+      </p:pic>
+      <p:cxnSp>
+        <p:nvCxnSpPr>
+          <p:cNvPr id="82" name="Straight Connector 81">
+            <a:extLst>
+              <a:ext uri="{FF2B5EF4-FFF2-40B4-BE49-F238E27FC236}">
+                <a16:creationId xmlns:a16="http://schemas.microsoft.com/office/drawing/2014/main" id="{DD950D7A-D7EE-7FD6-F2B5-81B614C0F464}"/>
+              </a:ext>
+            </a:extLst>
+          </p:cNvPr>
+          <p:cNvCxnSpPr>
+            <a:cxnSpLocks/>
+            <a:stCxn id="83" idx="3"/>
+          </p:cNvCxnSpPr>
+          <p:nvPr/>
+        </p:nvCxnSpPr>
+        <p:spPr>
+          <a:xfrm>
+            <a:off x="4482643" y="2098380"/>
+            <a:ext cx="1411518" cy="793793"/>
+          </a:xfrm>
+          <a:prstGeom prst="line">
+            <a:avLst/>
+          </a:prstGeom>
+          <a:ln w="19050"/>
+        </p:spPr>
+        <p:style>
+          <a:lnRef idx="1">
+            <a:schemeClr val="accent1"/>
+          </a:lnRef>
+          <a:fillRef idx="0">
+            <a:schemeClr val="accent1"/>
+          </a:fillRef>
+          <a:effectRef idx="0">
+            <a:schemeClr val="accent1"/>
+          </a:effectRef>
+          <a:fontRef idx="minor">
+            <a:schemeClr val="tx1"/>
+          </a:fontRef>
+        </p:style>
+      </p:cxnSp>
+      <p:pic>
+        <p:nvPicPr>
+          <p:cNvPr id="83" name="Picture 82">
+            <a:extLst>
+              <a:ext uri="{FF2B5EF4-FFF2-40B4-BE49-F238E27FC236}">
+                <a16:creationId xmlns:a16="http://schemas.microsoft.com/office/drawing/2014/main" id="{F268D22A-BFB8-A8BB-A29D-1DF2E9533610}"/>
+              </a:ext>
+            </a:extLst>
+          </p:cNvPr>
+          <p:cNvPicPr>
+            <a:picLocks noChangeAspect="1"/>
+          </p:cNvPicPr>
+          <p:nvPr/>
+        </p:nvPicPr>
+        <p:blipFill>
+          <a:blip r:embed="rId3"/>
+          <a:stretch>
+            <a:fillRect/>
+          </a:stretch>
+        </p:blipFill>
+        <p:spPr>
+          <a:xfrm>
+            <a:off x="3825598" y="1911274"/>
+            <a:ext cx="657045" cy="374211"/>
+          </a:xfrm>
+          <a:prstGeom prst="rect">
+            <a:avLst/>
+          </a:prstGeom>
+        </p:spPr>
+      </p:pic>
+      <p:cxnSp>
+        <p:nvCxnSpPr>
+          <p:cNvPr id="84" name="Straight Connector 83">
+            <a:extLst>
+              <a:ext uri="{FF2B5EF4-FFF2-40B4-BE49-F238E27FC236}">
+                <a16:creationId xmlns:a16="http://schemas.microsoft.com/office/drawing/2014/main" id="{33D4A9B4-0F79-DF18-CD4E-F9F5683F8836}"/>
+              </a:ext>
+            </a:extLst>
+          </p:cNvPr>
+          <p:cNvCxnSpPr>
+            <a:cxnSpLocks/>
+            <a:stCxn id="81" idx="3"/>
+            <a:endCxn id="83" idx="1"/>
+          </p:cNvCxnSpPr>
+          <p:nvPr/>
+        </p:nvCxnSpPr>
+        <p:spPr>
+          <a:xfrm>
+            <a:off x="2996113" y="2089615"/>
+            <a:ext cx="829485" cy="8765"/>
+          </a:xfrm>
+          <a:prstGeom prst="line">
+            <a:avLst/>
+          </a:prstGeom>
+          <a:ln w="19050"/>
+        </p:spPr>
+        <p:style>
+          <a:lnRef idx="1">
+            <a:schemeClr val="accent1"/>
+          </a:lnRef>
+          <a:fillRef idx="0">
+            <a:schemeClr val="accent1"/>
+          </a:fillRef>
+          <a:effectRef idx="0">
+            <a:schemeClr val="accent1"/>
+          </a:effectRef>
+          <a:fontRef idx="minor">
+            <a:schemeClr val="tx1"/>
+          </a:fontRef>
+        </p:style>
+      </p:cxnSp>
+      <p:cxnSp>
+        <p:nvCxnSpPr>
+          <p:cNvPr id="89" name="Straight Arrow Connector 88">
+            <a:extLst>
+              <a:ext uri="{FF2B5EF4-FFF2-40B4-BE49-F238E27FC236}">
+                <a16:creationId xmlns:a16="http://schemas.microsoft.com/office/drawing/2014/main" id="{08CEE31F-C047-9E95-3AEC-3A679C35A4AB}"/>
+              </a:ext>
+            </a:extLst>
+          </p:cNvPr>
+          <p:cNvCxnSpPr>
+            <a:cxnSpLocks/>
+          </p:cNvCxnSpPr>
+          <p:nvPr/>
+        </p:nvCxnSpPr>
+        <p:spPr>
+          <a:xfrm>
+            <a:off x="3062053" y="1986034"/>
+            <a:ext cx="667581" cy="0"/>
+          </a:xfrm>
+          <a:prstGeom prst="straightConnector1">
+            <a:avLst/>
+          </a:prstGeom>
+          <a:ln w="28575">
+            <a:solidFill>
+              <a:srgbClr val="FF0000"/>
+            </a:solidFill>
+            <a:prstDash val="sysDash"/>
+            <a:tailEnd type="triangle"/>
+          </a:ln>
+        </p:spPr>
+        <p:style>
+          <a:lnRef idx="1">
+            <a:schemeClr val="accent1"/>
+          </a:lnRef>
+          <a:fillRef idx="0">
+            <a:schemeClr val="accent1"/>
+          </a:fillRef>
+          <a:effectRef idx="0">
+            <a:schemeClr val="accent1"/>
+          </a:effectRef>
+          <a:fontRef idx="minor">
+            <a:schemeClr val="tx1"/>
+          </a:fontRef>
+        </p:style>
+      </p:cxnSp>
+      <p:cxnSp>
+        <p:nvCxnSpPr>
+          <p:cNvPr id="91" name="Straight Arrow Connector 90">
+            <a:extLst>
+              <a:ext uri="{FF2B5EF4-FFF2-40B4-BE49-F238E27FC236}">
+                <a16:creationId xmlns:a16="http://schemas.microsoft.com/office/drawing/2014/main" id="{52E26FBA-2144-A784-48FE-BB9308DD2C7E}"/>
+              </a:ext>
+            </a:extLst>
+          </p:cNvPr>
+          <p:cNvCxnSpPr>
+            <a:cxnSpLocks/>
+          </p:cNvCxnSpPr>
+          <p:nvPr/>
+        </p:nvCxnSpPr>
+        <p:spPr>
+          <a:xfrm>
+            <a:off x="4553033" y="1995321"/>
+            <a:ext cx="1542967" cy="872641"/>
+          </a:xfrm>
+          <a:prstGeom prst="straightConnector1">
+            <a:avLst/>
+          </a:prstGeom>
+          <a:ln w="28575">
+            <a:solidFill>
+              <a:srgbClr val="FF0000"/>
+            </a:solidFill>
+            <a:prstDash val="sysDash"/>
+            <a:tailEnd type="triangle"/>
+          </a:ln>
+        </p:spPr>
+        <p:style>
+          <a:lnRef idx="1">
+            <a:schemeClr val="accent1"/>
+          </a:lnRef>
+          <a:fillRef idx="0">
+            <a:schemeClr val="accent1"/>
+          </a:fillRef>
+          <a:effectRef idx="0">
+            <a:schemeClr val="accent1"/>
+          </a:effectRef>
+          <a:fontRef idx="minor">
+            <a:schemeClr val="tx1"/>
+          </a:fontRef>
+        </p:style>
+      </p:cxnSp>
+      <p:cxnSp>
+        <p:nvCxnSpPr>
+          <p:cNvPr id="93" name="Straight Arrow Connector 92">
+            <a:extLst>
+              <a:ext uri="{FF2B5EF4-FFF2-40B4-BE49-F238E27FC236}">
+                <a16:creationId xmlns:a16="http://schemas.microsoft.com/office/drawing/2014/main" id="{3CD6283D-273C-E74E-AAE9-FFA79E1C5DFA}"/>
+              </a:ext>
+            </a:extLst>
+          </p:cNvPr>
+          <p:cNvCxnSpPr>
+            <a:cxnSpLocks/>
+          </p:cNvCxnSpPr>
+          <p:nvPr/>
+        </p:nvCxnSpPr>
+        <p:spPr>
+          <a:xfrm>
+            <a:off x="5224851" y="1371870"/>
+            <a:ext cx="690316" cy="0"/>
+          </a:xfrm>
+          <a:prstGeom prst="straightConnector1">
+            <a:avLst/>
+          </a:prstGeom>
+          <a:ln w="28575">
+            <a:solidFill>
+              <a:schemeClr val="accent6">
+                <a:lumMod val="75000"/>
+              </a:schemeClr>
+            </a:solidFill>
+            <a:prstDash val="sysDash"/>
+            <a:headEnd type="triangle"/>
+            <a:tailEnd type="triangle"/>
+          </a:ln>
+        </p:spPr>
+        <p:style>
+          <a:lnRef idx="1">
+            <a:schemeClr val="accent1"/>
+          </a:lnRef>
+          <a:fillRef idx="0">
+            <a:schemeClr val="accent1"/>
+          </a:fillRef>
+          <a:effectRef idx="0">
+            <a:schemeClr val="accent1"/>
+          </a:effectRef>
+          <a:fontRef idx="minor">
+            <a:schemeClr val="tx1"/>
+          </a:fontRef>
+        </p:style>
+      </p:cxnSp>
+      <p:sp>
+        <p:nvSpPr>
+          <p:cNvPr id="94" name="TextBox 93">
+            <a:extLst>
+              <a:ext uri="{FF2B5EF4-FFF2-40B4-BE49-F238E27FC236}">
+                <a16:creationId xmlns:a16="http://schemas.microsoft.com/office/drawing/2014/main" id="{6C8CA1E2-A96F-0AF2-15A5-83D6761E4B61}"/>
+              </a:ext>
+            </a:extLst>
+          </p:cNvPr>
+          <p:cNvSpPr txBox="1"/>
+          <p:nvPr/>
+        </p:nvSpPr>
+        <p:spPr>
+          <a:xfrm>
+            <a:off x="5991349" y="1190566"/>
+            <a:ext cx="1585365" cy="461665"/>
+          </a:xfrm>
+          <a:prstGeom prst="rect">
+            <a:avLst/>
+          </a:prstGeom>
+          <a:noFill/>
+        </p:spPr>
+        <p:txBody>
+          <a:bodyPr wrap="square">
+            <a:spAutoFit/>
+          </a:bodyPr>
+          <a:lstStyle/>
+          <a:p>
+            <a:r>
+              <a:rPr lang="en-US" sz="1200" b="1" dirty="0">
+                <a:solidFill>
+                  <a:schemeClr val="tx1">
+                    <a:lumMod val="75000"/>
+                    <a:lumOff val="25000"/>
+                  </a:schemeClr>
+                </a:solidFill>
+              </a:rPr>
+              <a:t>Normal Modbus request and response</a:t>
+            </a:r>
+            <a:endParaRPr lang="en-SG" sz="1200" b="1" dirty="0">
               <a:solidFill>
-                <a:srgbClr val="FF0000"/>
+                <a:schemeClr val="tx1">
+                  <a:lumMod val="75000"/>
+                  <a:lumOff val="25000"/>
+                </a:schemeClr>
               </a:solidFill>
-              <a:effectLst/>
-              <a:latin typeface="Inter"/>
             </a:endParaRPr>
+          </a:p>
+        </p:txBody>
+      </p:sp>
+      <p:cxnSp>
+        <p:nvCxnSpPr>
+          <p:cNvPr id="95" name="Straight Arrow Connector 94">
+            <a:extLst>
+              <a:ext uri="{FF2B5EF4-FFF2-40B4-BE49-F238E27FC236}">
+                <a16:creationId xmlns:a16="http://schemas.microsoft.com/office/drawing/2014/main" id="{B5F9CFF0-AA0B-410C-8C1E-A0462138C2C0}"/>
+              </a:ext>
+            </a:extLst>
+          </p:cNvPr>
+          <p:cNvCxnSpPr>
+            <a:cxnSpLocks/>
+          </p:cNvCxnSpPr>
+          <p:nvPr/>
+        </p:nvCxnSpPr>
+        <p:spPr>
+          <a:xfrm flipH="1">
+            <a:off x="7909438" y="1294362"/>
+            <a:ext cx="601879" cy="0"/>
+          </a:xfrm>
+          <a:prstGeom prst="straightConnector1">
+            <a:avLst/>
+          </a:prstGeom>
+          <a:ln w="28575">
+            <a:solidFill>
+              <a:srgbClr val="FF0000"/>
+            </a:solidFill>
+            <a:prstDash val="sysDash"/>
+            <a:tailEnd type="triangle"/>
+          </a:ln>
+        </p:spPr>
+        <p:style>
+          <a:lnRef idx="1">
+            <a:schemeClr val="accent1"/>
+          </a:lnRef>
+          <a:fillRef idx="0">
+            <a:schemeClr val="accent1"/>
+          </a:fillRef>
+          <a:effectRef idx="0">
+            <a:schemeClr val="accent1"/>
+          </a:effectRef>
+          <a:fontRef idx="minor">
+            <a:schemeClr val="tx1"/>
+          </a:fontRef>
+        </p:style>
+      </p:cxnSp>
+      <p:sp>
+        <p:nvSpPr>
+          <p:cNvPr id="96" name="TextBox 95">
+            <a:extLst>
+              <a:ext uri="{FF2B5EF4-FFF2-40B4-BE49-F238E27FC236}">
+                <a16:creationId xmlns:a16="http://schemas.microsoft.com/office/drawing/2014/main" id="{23D72CD2-1F88-6C8F-FF57-27F1A2645167}"/>
+              </a:ext>
+            </a:extLst>
+          </p:cNvPr>
+          <p:cNvSpPr txBox="1"/>
+          <p:nvPr/>
+        </p:nvSpPr>
+        <p:spPr>
+          <a:xfrm>
+            <a:off x="8679683" y="1174183"/>
+            <a:ext cx="1702000" cy="461665"/>
+          </a:xfrm>
+          <a:prstGeom prst="rect">
+            <a:avLst/>
+          </a:prstGeom>
+          <a:noFill/>
+        </p:spPr>
+        <p:txBody>
+          <a:bodyPr wrap="square">
+            <a:spAutoFit/>
+          </a:bodyPr>
+          <a:lstStyle/>
+          <a:p>
+            <a:r>
+              <a:rPr lang="en-US" sz="1200" b="1" dirty="0">
+                <a:solidFill>
+                  <a:schemeClr val="tx1">
+                    <a:lumMod val="75000"/>
+                    <a:lumOff val="25000"/>
+                  </a:schemeClr>
+                </a:solidFill>
+              </a:rPr>
+              <a:t>High frequency DDoS Modbus request</a:t>
+            </a:r>
+            <a:endParaRPr lang="en-SG" sz="1200" b="1" dirty="0">
+              <a:solidFill>
+                <a:schemeClr val="tx1">
+                  <a:lumMod val="75000"/>
+                  <a:lumOff val="25000"/>
+                </a:schemeClr>
+              </a:solidFill>
+            </a:endParaRPr>
+          </a:p>
+        </p:txBody>
+      </p:sp>
+      <p:sp>
+        <p:nvSpPr>
+          <p:cNvPr id="97" name="TextBox 96">
+            <a:extLst>
+              <a:ext uri="{FF2B5EF4-FFF2-40B4-BE49-F238E27FC236}">
+                <a16:creationId xmlns:a16="http://schemas.microsoft.com/office/drawing/2014/main" id="{018C3999-9EEE-A71C-FA6D-FCFD2517DF93}"/>
+              </a:ext>
+            </a:extLst>
+          </p:cNvPr>
+          <p:cNvSpPr txBox="1"/>
+          <p:nvPr/>
+        </p:nvSpPr>
+        <p:spPr>
+          <a:xfrm>
+            <a:off x="2195154" y="1643350"/>
+            <a:ext cx="1079631" cy="276999"/>
+          </a:xfrm>
+          <a:prstGeom prst="rect">
+            <a:avLst/>
+          </a:prstGeom>
+          <a:noFill/>
+        </p:spPr>
+        <p:txBody>
+          <a:bodyPr wrap="square">
+            <a:spAutoFit/>
+          </a:bodyPr>
+          <a:lstStyle/>
+          <a:p>
+            <a:r>
+              <a:rPr lang="en-SG" sz="1200" b="1" dirty="0">
+                <a:solidFill>
+                  <a:srgbClr val="FF0000"/>
+                </a:solidFill>
+              </a:rPr>
+              <a:t>victim vm4 </a:t>
+            </a:r>
           </a:p>
         </p:txBody>
       </p:sp>
     </p:spTree>
     <p:extLst>
       <p:ext uri="{BB962C8B-B14F-4D97-AF65-F5344CB8AC3E}">
-        <p14:creationId xmlns:p14="http://schemas.microsoft.com/office/powerpoint/2010/main" val="2356608875"/>
+        <p14:creationId xmlns:p14="http://schemas.microsoft.com/office/powerpoint/2010/main" val="3039146266"/>
       </p:ext>
     </p:extLst>
   </p:cSld>

</xml_diff>